<commit_message>
exibição do diario alimentar
</commit_message>
<xml_diff>
--- a/Kcal Control.pptx
+++ b/Kcal Control.pptx
@@ -5,7 +5,7 @@
     <p:sldMasterId id="2147483732" r:id="rId1"/>
   </p:sldMasterIdLst>
   <p:notesMasterIdLst>
-    <p:notesMasterId r:id="rId31"/>
+    <p:notesMasterId r:id="rId29"/>
   </p:notesMasterIdLst>
   <p:sldIdLst>
     <p:sldId id="256" r:id="rId2"/>
@@ -16,27 +16,25 @@
     <p:sldId id="264" r:id="rId7"/>
     <p:sldId id="265" r:id="rId8"/>
     <p:sldId id="266" r:id="rId9"/>
-    <p:sldId id="267" r:id="rId10"/>
-    <p:sldId id="268" r:id="rId11"/>
-    <p:sldId id="269" r:id="rId12"/>
-    <p:sldId id="270" r:id="rId13"/>
-    <p:sldId id="271" r:id="rId14"/>
-    <p:sldId id="278" r:id="rId15"/>
-    <p:sldId id="272" r:id="rId16"/>
-    <p:sldId id="273" r:id="rId17"/>
-    <p:sldId id="279" r:id="rId18"/>
-    <p:sldId id="280" r:id="rId19"/>
-    <p:sldId id="281" r:id="rId20"/>
-    <p:sldId id="282" r:id="rId21"/>
-    <p:sldId id="283" r:id="rId22"/>
-    <p:sldId id="284" r:id="rId23"/>
-    <p:sldId id="285" r:id="rId24"/>
-    <p:sldId id="286" r:id="rId25"/>
-    <p:sldId id="287" r:id="rId26"/>
-    <p:sldId id="274" r:id="rId27"/>
-    <p:sldId id="275" r:id="rId28"/>
-    <p:sldId id="276" r:id="rId29"/>
-    <p:sldId id="277" r:id="rId30"/>
+    <p:sldId id="268" r:id="rId10"/>
+    <p:sldId id="269" r:id="rId11"/>
+    <p:sldId id="270" r:id="rId12"/>
+    <p:sldId id="271" r:id="rId13"/>
+    <p:sldId id="278" r:id="rId14"/>
+    <p:sldId id="272" r:id="rId15"/>
+    <p:sldId id="279" r:id="rId16"/>
+    <p:sldId id="280" r:id="rId17"/>
+    <p:sldId id="281" r:id="rId18"/>
+    <p:sldId id="282" r:id="rId19"/>
+    <p:sldId id="283" r:id="rId20"/>
+    <p:sldId id="284" r:id="rId21"/>
+    <p:sldId id="285" r:id="rId22"/>
+    <p:sldId id="286" r:id="rId23"/>
+    <p:sldId id="287" r:id="rId24"/>
+    <p:sldId id="274" r:id="rId25"/>
+    <p:sldId id="275" r:id="rId26"/>
+    <p:sldId id="276" r:id="rId27"/>
+    <p:sldId id="277" r:id="rId28"/>
   </p:sldIdLst>
   <p:sldSz cx="9144000" cy="6858000" type="screen4x3"/>
   <p:notesSz cx="6858000" cy="9144000"/>
@@ -137,7 +135,7 @@
   </p:defaultTextStyle>
   <p:extLst>
     <p:ext uri="{EFAFB233-063F-42B5-8137-9DF3F51BA10A}">
-      <p15:sldGuideLst xmlns:p15="http://schemas.microsoft.com/office/powerpoint/2012/main" xmlns="">
+      <p15:sldGuideLst xmlns="" xmlns:p15="http://schemas.microsoft.com/office/powerpoint/2012/main">
         <p15:guide id="1" orient="horz" pos="2160">
           <p15:clr>
             <a:srgbClr val="A4A3A4"/>
@@ -237,7 +235,7 @@
             <a:fld id="{3957A1C5-3858-4BD6-A546-1B130AA1BE08}" type="datetimeFigureOut">
               <a:rPr lang="en-US"/>
               <a:pPr/>
-              <a:t>10/23/2014</a:t>
+              <a:t>10/24/2014</a:t>
             </a:fld>
             <a:endParaRPr lang="en-US"/>
           </a:p>
@@ -405,7 +403,7 @@
     </p:spTree>
     <p:extLst>
       <p:ext uri="{BB962C8B-B14F-4D97-AF65-F5344CB8AC3E}">
-        <p14:creationId xmlns:p14="http://schemas.microsoft.com/office/powerpoint/2010/main" xmlns="" val="1020277419"/>
+        <p14:creationId xmlns:p14="http://schemas.microsoft.com/office/powerpoint/2010/main" val="1020277419"/>
       </p:ext>
     </p:extLst>
   </p:cSld>
@@ -580,7 +578,7 @@
     </p:spTree>
     <p:extLst>
       <p:ext uri="{BB962C8B-B14F-4D97-AF65-F5344CB8AC3E}">
-        <p14:creationId xmlns:p14="http://schemas.microsoft.com/office/powerpoint/2010/main" xmlns="" val="2461806275"/>
+        <p14:creationId xmlns:p14="http://schemas.microsoft.com/office/powerpoint/2010/main" val="2461806275"/>
       </p:ext>
     </p:extLst>
   </p:cSld>
@@ -665,7 +663,7 @@
     </p:spTree>
     <p:extLst>
       <p:ext uri="{BB962C8B-B14F-4D97-AF65-F5344CB8AC3E}">
-        <p14:creationId xmlns:p14="http://schemas.microsoft.com/office/powerpoint/2010/main" xmlns="" val="3408433169"/>
+        <p14:creationId xmlns:p14="http://schemas.microsoft.com/office/powerpoint/2010/main" val="1768697153"/>
       </p:ext>
     </p:extLst>
   </p:cSld>
@@ -750,7 +748,7 @@
     </p:spTree>
     <p:extLst>
       <p:ext uri="{BB962C8B-B14F-4D97-AF65-F5344CB8AC3E}">
-        <p14:creationId xmlns:p14="http://schemas.microsoft.com/office/powerpoint/2010/main" xmlns="" val="1768697153"/>
+        <p14:creationId xmlns:p14="http://schemas.microsoft.com/office/powerpoint/2010/main" val="409955554"/>
       </p:ext>
     </p:extLst>
   </p:cSld>
@@ -835,7 +833,7 @@
     </p:spTree>
     <p:extLst>
       <p:ext uri="{BB962C8B-B14F-4D97-AF65-F5344CB8AC3E}">
-        <p14:creationId xmlns:p14="http://schemas.microsoft.com/office/powerpoint/2010/main" xmlns="" val="409955554"/>
+        <p14:creationId xmlns:p14="http://schemas.microsoft.com/office/powerpoint/2010/main" val="1891100407"/>
       </p:ext>
     </p:extLst>
   </p:cSld>
@@ -920,7 +918,7 @@
     </p:spTree>
     <p:extLst>
       <p:ext uri="{BB962C8B-B14F-4D97-AF65-F5344CB8AC3E}">
-        <p14:creationId xmlns:p14="http://schemas.microsoft.com/office/powerpoint/2010/main" xmlns="" val="1891100407"/>
+        <p14:creationId xmlns:p14="http://schemas.microsoft.com/office/powerpoint/2010/main" val="2739578023"/>
       </p:ext>
     </p:extLst>
   </p:cSld>
@@ -1005,7 +1003,7 @@
     </p:spTree>
     <p:extLst>
       <p:ext uri="{BB962C8B-B14F-4D97-AF65-F5344CB8AC3E}">
-        <p14:creationId xmlns:p14="http://schemas.microsoft.com/office/powerpoint/2010/main" xmlns="" val="2739578023"/>
+        <p14:creationId xmlns:p14="http://schemas.microsoft.com/office/powerpoint/2010/main" val="780942936"/>
       </p:ext>
     </p:extLst>
   </p:cSld>
@@ -1081,7 +1079,7 @@
             <a:fld id="{6852FC05-FAE1-4440-921C-50678C694586}" type="slidenum">
               <a:rPr lang="en-US"/>
               <a:pPr/>
-              <a:t>15</a:t>
+              <a:t>24</a:t>
             </a:fld>
             <a:endParaRPr lang="en-US"/>
           </a:p>
@@ -1090,7 +1088,7 @@
     </p:spTree>
     <p:extLst>
       <p:ext uri="{BB962C8B-B14F-4D97-AF65-F5344CB8AC3E}">
-        <p14:creationId xmlns:p14="http://schemas.microsoft.com/office/powerpoint/2010/main" xmlns="" val="780942936"/>
+        <p14:creationId xmlns:p14="http://schemas.microsoft.com/office/powerpoint/2010/main" val="3999827197"/>
       </p:ext>
     </p:extLst>
   </p:cSld>
@@ -1166,7 +1164,7 @@
             <a:fld id="{6852FC05-FAE1-4440-921C-50678C694586}" type="slidenum">
               <a:rPr lang="en-US"/>
               <a:pPr/>
-              <a:t>16</a:t>
+              <a:t>25</a:t>
             </a:fld>
             <a:endParaRPr lang="en-US"/>
           </a:p>
@@ -1175,7 +1173,7 @@
     </p:spTree>
     <p:extLst>
       <p:ext uri="{BB962C8B-B14F-4D97-AF65-F5344CB8AC3E}">
-        <p14:creationId xmlns:p14="http://schemas.microsoft.com/office/powerpoint/2010/main" xmlns="" val="2703322168"/>
+        <p14:creationId xmlns:p14="http://schemas.microsoft.com/office/powerpoint/2010/main" val="426367415"/>
       </p:ext>
     </p:extLst>
   </p:cSld>
@@ -1260,7 +1258,7 @@
     </p:spTree>
     <p:extLst>
       <p:ext uri="{BB962C8B-B14F-4D97-AF65-F5344CB8AC3E}">
-        <p14:creationId xmlns:p14="http://schemas.microsoft.com/office/powerpoint/2010/main" xmlns="" val="3999827197"/>
+        <p14:creationId xmlns:p14="http://schemas.microsoft.com/office/powerpoint/2010/main" val="396310405"/>
       </p:ext>
     </p:extLst>
   </p:cSld>
@@ -1345,92 +1343,7 @@
     </p:spTree>
     <p:extLst>
       <p:ext uri="{BB962C8B-B14F-4D97-AF65-F5344CB8AC3E}">
-        <p14:creationId xmlns:p14="http://schemas.microsoft.com/office/powerpoint/2010/main" xmlns="" val="426367415"/>
-      </p:ext>
-    </p:extLst>
-  </p:cSld>
-  <p:clrMapOvr>
-    <a:masterClrMapping/>
-  </p:clrMapOvr>
-</p:notes>
-</file>
-
-<file path=ppt/notesSlides/notesSlide19.xml><?xml version="1.0" encoding="utf-8"?>
-<p:notes xmlns:a="http://schemas.openxmlformats.org/drawingml/2006/main" xmlns:r="http://schemas.openxmlformats.org/officeDocument/2006/relationships" xmlns:p="http://schemas.openxmlformats.org/presentationml/2006/main">
-  <p:cSld>
-    <p:spTree>
-      <p:nvGrpSpPr>
-        <p:cNvPr id="1" name=""/>
-        <p:cNvGrpSpPr/>
-        <p:nvPr/>
-      </p:nvGrpSpPr>
-      <p:grpSpPr>
-        <a:xfrm>
-          <a:off x="0" y="0"/>
-          <a:ext cx="0" cy="0"/>
-          <a:chOff x="0" y="0"/>
-          <a:chExt cx="0" cy="0"/>
-        </a:xfrm>
-      </p:grpSpPr>
-      <p:sp>
-        <p:nvSpPr>
-          <p:cNvPr id="2" name="Slide Image Placeholder 1"/>
-          <p:cNvSpPr>
-            <a:spLocks noGrp="1" noRot="1" noChangeAspect="1"/>
-          </p:cNvSpPr>
-          <p:nvPr>
-            <p:ph type="sldImg"/>
-          </p:nvPr>
-        </p:nvSpPr>
-        <p:spPr/>
-      </p:sp>
-      <p:sp>
-        <p:nvSpPr>
-          <p:cNvPr id="3" name="Notes Placeholder 2"/>
-          <p:cNvSpPr>
-            <a:spLocks noGrp="1"/>
-          </p:cNvSpPr>
-          <p:nvPr>
-            <p:ph type="body" idx="1"/>
-          </p:nvPr>
-        </p:nvSpPr>
-        <p:spPr/>
-        <p:txBody>
-          <a:bodyPr/>
-          <a:lstStyle/>
-          <a:p>
-            <a:endParaRPr lang="en-US"/>
-          </a:p>
-        </p:txBody>
-      </p:sp>
-      <p:sp>
-        <p:nvSpPr>
-          <p:cNvPr id="4" name="Slide Number Placeholder 3"/>
-          <p:cNvSpPr>
-            <a:spLocks noGrp="1"/>
-          </p:cNvSpPr>
-          <p:nvPr>
-            <p:ph type="sldNum" sz="quarter" idx="10"/>
-          </p:nvPr>
-        </p:nvSpPr>
-        <p:spPr/>
-        <p:txBody>
-          <a:bodyPr/>
-          <a:lstStyle/>
-          <a:p>
-            <a:fld id="{6852FC05-FAE1-4440-921C-50678C694586}" type="slidenum">
-              <a:rPr lang="en-US"/>
-              <a:pPr/>
-              <a:t>28</a:t>
-            </a:fld>
-            <a:endParaRPr lang="en-US"/>
-          </a:p>
-        </p:txBody>
-      </p:sp>
-    </p:spTree>
-    <p:extLst>
-      <p:ext uri="{BB962C8B-B14F-4D97-AF65-F5344CB8AC3E}">
-        <p14:creationId xmlns:p14="http://schemas.microsoft.com/office/powerpoint/2010/main" xmlns="" val="396310405"/>
+        <p14:creationId xmlns:p14="http://schemas.microsoft.com/office/powerpoint/2010/main" val="2963220890"/>
       </p:ext>
     </p:extLst>
   </p:cSld>
@@ -1515,92 +1428,7 @@
     </p:spTree>
     <p:extLst>
       <p:ext uri="{BB962C8B-B14F-4D97-AF65-F5344CB8AC3E}">
-        <p14:creationId xmlns:p14="http://schemas.microsoft.com/office/powerpoint/2010/main" xmlns="" val="2846694639"/>
-      </p:ext>
-    </p:extLst>
-  </p:cSld>
-  <p:clrMapOvr>
-    <a:masterClrMapping/>
-  </p:clrMapOvr>
-</p:notes>
-</file>
-
-<file path=ppt/notesSlides/notesSlide20.xml><?xml version="1.0" encoding="utf-8"?>
-<p:notes xmlns:a="http://schemas.openxmlformats.org/drawingml/2006/main" xmlns:r="http://schemas.openxmlformats.org/officeDocument/2006/relationships" xmlns:p="http://schemas.openxmlformats.org/presentationml/2006/main">
-  <p:cSld>
-    <p:spTree>
-      <p:nvGrpSpPr>
-        <p:cNvPr id="1" name=""/>
-        <p:cNvGrpSpPr/>
-        <p:nvPr/>
-      </p:nvGrpSpPr>
-      <p:grpSpPr>
-        <a:xfrm>
-          <a:off x="0" y="0"/>
-          <a:ext cx="0" cy="0"/>
-          <a:chOff x="0" y="0"/>
-          <a:chExt cx="0" cy="0"/>
-        </a:xfrm>
-      </p:grpSpPr>
-      <p:sp>
-        <p:nvSpPr>
-          <p:cNvPr id="2" name="Slide Image Placeholder 1"/>
-          <p:cNvSpPr>
-            <a:spLocks noGrp="1" noRot="1" noChangeAspect="1"/>
-          </p:cNvSpPr>
-          <p:nvPr>
-            <p:ph type="sldImg"/>
-          </p:nvPr>
-        </p:nvSpPr>
-        <p:spPr/>
-      </p:sp>
-      <p:sp>
-        <p:nvSpPr>
-          <p:cNvPr id="3" name="Notes Placeholder 2"/>
-          <p:cNvSpPr>
-            <a:spLocks noGrp="1"/>
-          </p:cNvSpPr>
-          <p:nvPr>
-            <p:ph type="body" idx="1"/>
-          </p:nvPr>
-        </p:nvSpPr>
-        <p:spPr/>
-        <p:txBody>
-          <a:bodyPr/>
-          <a:lstStyle/>
-          <a:p>
-            <a:endParaRPr lang="en-US"/>
-          </a:p>
-        </p:txBody>
-      </p:sp>
-      <p:sp>
-        <p:nvSpPr>
-          <p:cNvPr id="4" name="Slide Number Placeholder 3"/>
-          <p:cNvSpPr>
-            <a:spLocks noGrp="1"/>
-          </p:cNvSpPr>
-          <p:nvPr>
-            <p:ph type="sldNum" sz="quarter" idx="10"/>
-          </p:nvPr>
-        </p:nvSpPr>
-        <p:spPr/>
-        <p:txBody>
-          <a:bodyPr/>
-          <a:lstStyle/>
-          <a:p>
-            <a:fld id="{6852FC05-FAE1-4440-921C-50678C694586}" type="slidenum">
-              <a:rPr lang="en-US"/>
-              <a:pPr/>
-              <a:t>29</a:t>
-            </a:fld>
-            <a:endParaRPr lang="en-US"/>
-          </a:p>
-        </p:txBody>
-      </p:sp>
-    </p:spTree>
-    <p:extLst>
-      <p:ext uri="{BB962C8B-B14F-4D97-AF65-F5344CB8AC3E}">
-        <p14:creationId xmlns:p14="http://schemas.microsoft.com/office/powerpoint/2010/main" xmlns="" val="2963220890"/>
+        <p14:creationId xmlns:p14="http://schemas.microsoft.com/office/powerpoint/2010/main" val="2846694639"/>
       </p:ext>
     </p:extLst>
   </p:cSld>
@@ -1685,7 +1513,7 @@
     </p:spTree>
     <p:extLst>
       <p:ext uri="{BB962C8B-B14F-4D97-AF65-F5344CB8AC3E}">
-        <p14:creationId xmlns:p14="http://schemas.microsoft.com/office/powerpoint/2010/main" xmlns="" val="3763332725"/>
+        <p14:creationId xmlns:p14="http://schemas.microsoft.com/office/powerpoint/2010/main" val="3763332725"/>
       </p:ext>
     </p:extLst>
   </p:cSld>
@@ -1770,7 +1598,7 @@
     </p:spTree>
     <p:extLst>
       <p:ext uri="{BB962C8B-B14F-4D97-AF65-F5344CB8AC3E}">
-        <p14:creationId xmlns:p14="http://schemas.microsoft.com/office/powerpoint/2010/main" xmlns="" val="2243599117"/>
+        <p14:creationId xmlns:p14="http://schemas.microsoft.com/office/powerpoint/2010/main" val="2243599117"/>
       </p:ext>
     </p:extLst>
   </p:cSld>
@@ -1855,7 +1683,7 @@
     </p:spTree>
     <p:extLst>
       <p:ext uri="{BB962C8B-B14F-4D97-AF65-F5344CB8AC3E}">
-        <p14:creationId xmlns:p14="http://schemas.microsoft.com/office/powerpoint/2010/main" xmlns="" val="842678061"/>
+        <p14:creationId xmlns:p14="http://schemas.microsoft.com/office/powerpoint/2010/main" val="842678061"/>
       </p:ext>
     </p:extLst>
   </p:cSld>
@@ -1940,7 +1768,7 @@
     </p:spTree>
     <p:extLst>
       <p:ext uri="{BB962C8B-B14F-4D97-AF65-F5344CB8AC3E}">
-        <p14:creationId xmlns:p14="http://schemas.microsoft.com/office/powerpoint/2010/main" xmlns="" val="4111672396"/>
+        <p14:creationId xmlns:p14="http://schemas.microsoft.com/office/powerpoint/2010/main" val="4111672396"/>
       </p:ext>
     </p:extLst>
   </p:cSld>
@@ -2025,7 +1853,7 @@
     </p:spTree>
     <p:extLst>
       <p:ext uri="{BB962C8B-B14F-4D97-AF65-F5344CB8AC3E}">
-        <p14:creationId xmlns:p14="http://schemas.microsoft.com/office/powerpoint/2010/main" xmlns="" val="2960941674"/>
+        <p14:creationId xmlns:p14="http://schemas.microsoft.com/office/powerpoint/2010/main" val="2960941674"/>
       </p:ext>
     </p:extLst>
   </p:cSld>
@@ -2110,7 +1938,7 @@
     </p:spTree>
     <p:extLst>
       <p:ext uri="{BB962C8B-B14F-4D97-AF65-F5344CB8AC3E}">
-        <p14:creationId xmlns:p14="http://schemas.microsoft.com/office/powerpoint/2010/main" xmlns="" val="3080460203"/>
+        <p14:creationId xmlns:p14="http://schemas.microsoft.com/office/powerpoint/2010/main" val="3080460203"/>
       </p:ext>
     </p:extLst>
   </p:cSld>
@@ -2195,7 +2023,7 @@
     </p:spTree>
     <p:extLst>
       <p:ext uri="{BB962C8B-B14F-4D97-AF65-F5344CB8AC3E}">
-        <p14:creationId xmlns:p14="http://schemas.microsoft.com/office/powerpoint/2010/main" xmlns="" val="3420959682"/>
+        <p14:creationId xmlns:p14="http://schemas.microsoft.com/office/powerpoint/2010/main" val="3408433169"/>
       </p:ext>
     </p:extLst>
   </p:cSld>
@@ -2335,7 +2163,7 @@
             <a:fld id="{D6D2D89E-F8D6-4D1D-8BFD-B2488F748407}" type="datetimeFigureOut">
               <a:rPr lang="pt-BR" smtClean="0"/>
               <a:pPr/>
-              <a:t>23/10/2014</a:t>
+              <a:t>24/10/2014</a:t>
             </a:fld>
             <a:endParaRPr lang="pt-BR"/>
           </a:p>
@@ -2387,7 +2215,7 @@
     </p:spTree>
     <p:extLst>
       <p:ext uri="{BB962C8B-B14F-4D97-AF65-F5344CB8AC3E}">
-        <p14:creationId xmlns:p14="http://schemas.microsoft.com/office/powerpoint/2010/main" xmlns="" val="1006659494"/>
+        <p14:creationId xmlns:p14="http://schemas.microsoft.com/office/powerpoint/2010/main" val="1006659494"/>
       </p:ext>
     </p:extLst>
   </p:cSld>
@@ -2505,7 +2333,7 @@
             <a:fld id="{D6D2D89E-F8D6-4D1D-8BFD-B2488F748407}" type="datetimeFigureOut">
               <a:rPr lang="pt-BR" smtClean="0"/>
               <a:pPr/>
-              <a:t>23/10/2014</a:t>
+              <a:t>24/10/2014</a:t>
             </a:fld>
             <a:endParaRPr lang="pt-BR"/>
           </a:p>
@@ -2557,7 +2385,7 @@
     </p:spTree>
     <p:extLst>
       <p:ext uri="{BB962C8B-B14F-4D97-AF65-F5344CB8AC3E}">
-        <p14:creationId xmlns:p14="http://schemas.microsoft.com/office/powerpoint/2010/main" xmlns="" val="4068990054"/>
+        <p14:creationId xmlns:p14="http://schemas.microsoft.com/office/powerpoint/2010/main" val="4068990054"/>
       </p:ext>
     </p:extLst>
   </p:cSld>
@@ -2685,7 +2513,7 @@
             <a:fld id="{D6D2D89E-F8D6-4D1D-8BFD-B2488F748407}" type="datetimeFigureOut">
               <a:rPr lang="pt-BR" smtClean="0"/>
               <a:pPr/>
-              <a:t>23/10/2014</a:t>
+              <a:t>24/10/2014</a:t>
             </a:fld>
             <a:endParaRPr lang="pt-BR"/>
           </a:p>
@@ -2737,7 +2565,7 @@
     </p:spTree>
     <p:extLst>
       <p:ext uri="{BB962C8B-B14F-4D97-AF65-F5344CB8AC3E}">
-        <p14:creationId xmlns:p14="http://schemas.microsoft.com/office/powerpoint/2010/main" xmlns="" val="3770394411"/>
+        <p14:creationId xmlns:p14="http://schemas.microsoft.com/office/powerpoint/2010/main" val="3770394411"/>
       </p:ext>
     </p:extLst>
   </p:cSld>
@@ -2855,7 +2683,7 @@
             <a:fld id="{D6D2D89E-F8D6-4D1D-8BFD-B2488F748407}" type="datetimeFigureOut">
               <a:rPr lang="pt-BR" smtClean="0"/>
               <a:pPr/>
-              <a:t>23/10/2014</a:t>
+              <a:t>24/10/2014</a:t>
             </a:fld>
             <a:endParaRPr lang="pt-BR"/>
           </a:p>
@@ -2907,7 +2735,7 @@
     </p:spTree>
     <p:extLst>
       <p:ext uri="{BB962C8B-B14F-4D97-AF65-F5344CB8AC3E}">
-        <p14:creationId xmlns:p14="http://schemas.microsoft.com/office/powerpoint/2010/main" xmlns="" val="3725228815"/>
+        <p14:creationId xmlns:p14="http://schemas.microsoft.com/office/powerpoint/2010/main" val="3725228815"/>
       </p:ext>
     </p:extLst>
   </p:cSld>
@@ -3100,7 +2928,7 @@
             <a:fld id="{D6D2D89E-F8D6-4D1D-8BFD-B2488F748407}" type="datetimeFigureOut">
               <a:rPr lang="pt-BR" smtClean="0"/>
               <a:pPr/>
-              <a:t>23/10/2014</a:t>
+              <a:t>24/10/2014</a:t>
             </a:fld>
             <a:endParaRPr lang="pt-BR"/>
           </a:p>
@@ -3152,7 +2980,7 @@
     </p:spTree>
     <p:extLst>
       <p:ext uri="{BB962C8B-B14F-4D97-AF65-F5344CB8AC3E}">
-        <p14:creationId xmlns:p14="http://schemas.microsoft.com/office/powerpoint/2010/main" xmlns="" val="3362628562"/>
+        <p14:creationId xmlns:p14="http://schemas.microsoft.com/office/powerpoint/2010/main" val="3362628562"/>
       </p:ext>
     </p:extLst>
   </p:cSld>
@@ -3331,7 +3159,7 @@
             <a:fld id="{D6D2D89E-F8D6-4D1D-8BFD-B2488F748407}" type="datetimeFigureOut">
               <a:rPr lang="pt-BR" smtClean="0"/>
               <a:pPr/>
-              <a:t>23/10/2014</a:t>
+              <a:t>24/10/2014</a:t>
             </a:fld>
             <a:endParaRPr lang="pt-BR"/>
           </a:p>
@@ -3383,7 +3211,7 @@
     </p:spTree>
     <p:extLst>
       <p:ext uri="{BB962C8B-B14F-4D97-AF65-F5344CB8AC3E}">
-        <p14:creationId xmlns:p14="http://schemas.microsoft.com/office/powerpoint/2010/main" xmlns="" val="638495378"/>
+        <p14:creationId xmlns:p14="http://schemas.microsoft.com/office/powerpoint/2010/main" val="638495378"/>
       </p:ext>
     </p:extLst>
   </p:cSld>
@@ -3697,7 +3525,7 @@
             <a:fld id="{D6D2D89E-F8D6-4D1D-8BFD-B2488F748407}" type="datetimeFigureOut">
               <a:rPr lang="pt-BR" smtClean="0"/>
               <a:pPr/>
-              <a:t>23/10/2014</a:t>
+              <a:t>24/10/2014</a:t>
             </a:fld>
             <a:endParaRPr lang="pt-BR"/>
           </a:p>
@@ -3749,7 +3577,7 @@
     </p:spTree>
     <p:extLst>
       <p:ext uri="{BB962C8B-B14F-4D97-AF65-F5344CB8AC3E}">
-        <p14:creationId xmlns:p14="http://schemas.microsoft.com/office/powerpoint/2010/main" xmlns="" val="3527343715"/>
+        <p14:creationId xmlns:p14="http://schemas.microsoft.com/office/powerpoint/2010/main" val="3527343715"/>
       </p:ext>
     </p:extLst>
   </p:cSld>
@@ -3816,7 +3644,7 @@
             <a:fld id="{D6D2D89E-F8D6-4D1D-8BFD-B2488F748407}" type="datetimeFigureOut">
               <a:rPr lang="pt-BR" smtClean="0"/>
               <a:pPr/>
-              <a:t>23/10/2014</a:t>
+              <a:t>24/10/2014</a:t>
             </a:fld>
             <a:endParaRPr lang="pt-BR"/>
           </a:p>
@@ -3868,7 +3696,7 @@
     </p:spTree>
     <p:extLst>
       <p:ext uri="{BB962C8B-B14F-4D97-AF65-F5344CB8AC3E}">
-        <p14:creationId xmlns:p14="http://schemas.microsoft.com/office/powerpoint/2010/main" xmlns="" val="4045582354"/>
+        <p14:creationId xmlns:p14="http://schemas.microsoft.com/office/powerpoint/2010/main" val="4045582354"/>
       </p:ext>
     </p:extLst>
   </p:cSld>
@@ -3913,7 +3741,7 @@
             <a:fld id="{D6D2D89E-F8D6-4D1D-8BFD-B2488F748407}" type="datetimeFigureOut">
               <a:rPr lang="pt-BR" smtClean="0"/>
               <a:pPr/>
-              <a:t>23/10/2014</a:t>
+              <a:t>24/10/2014</a:t>
             </a:fld>
             <a:endParaRPr lang="pt-BR"/>
           </a:p>
@@ -3965,7 +3793,7 @@
     </p:spTree>
     <p:extLst>
       <p:ext uri="{BB962C8B-B14F-4D97-AF65-F5344CB8AC3E}">
-        <p14:creationId xmlns:p14="http://schemas.microsoft.com/office/powerpoint/2010/main" xmlns="" val="2221734751"/>
+        <p14:creationId xmlns:p14="http://schemas.microsoft.com/office/powerpoint/2010/main" val="2221734751"/>
       </p:ext>
     </p:extLst>
   </p:cSld>
@@ -4190,7 +4018,7 @@
             <a:fld id="{D6D2D89E-F8D6-4D1D-8BFD-B2488F748407}" type="datetimeFigureOut">
               <a:rPr lang="pt-BR" smtClean="0"/>
               <a:pPr/>
-              <a:t>23/10/2014</a:t>
+              <a:t>24/10/2014</a:t>
             </a:fld>
             <a:endParaRPr lang="pt-BR"/>
           </a:p>
@@ -4242,7 +4070,7 @@
     </p:spTree>
     <p:extLst>
       <p:ext uri="{BB962C8B-B14F-4D97-AF65-F5344CB8AC3E}">
-        <p14:creationId xmlns:p14="http://schemas.microsoft.com/office/powerpoint/2010/main" xmlns="" val="319476846"/>
+        <p14:creationId xmlns:p14="http://schemas.microsoft.com/office/powerpoint/2010/main" val="319476846"/>
       </p:ext>
     </p:extLst>
   </p:cSld>
@@ -4447,7 +4275,7 @@
             <a:fld id="{D6D2D89E-F8D6-4D1D-8BFD-B2488F748407}" type="datetimeFigureOut">
               <a:rPr lang="pt-BR" smtClean="0"/>
               <a:pPr/>
-              <a:t>23/10/2014</a:t>
+              <a:t>24/10/2014</a:t>
             </a:fld>
             <a:endParaRPr lang="pt-BR"/>
           </a:p>
@@ -4499,7 +4327,7 @@
     </p:spTree>
     <p:extLst>
       <p:ext uri="{BB962C8B-B14F-4D97-AF65-F5344CB8AC3E}">
-        <p14:creationId xmlns:p14="http://schemas.microsoft.com/office/powerpoint/2010/main" xmlns="" val="3828453220"/>
+        <p14:creationId xmlns:p14="http://schemas.microsoft.com/office/powerpoint/2010/main" val="3828453220"/>
       </p:ext>
     </p:extLst>
   </p:cSld>
@@ -4663,7 +4491,7 @@
             <a:fld id="{D6D2D89E-F8D6-4D1D-8BFD-B2488F748407}" type="datetimeFigureOut">
               <a:rPr lang="pt-BR" smtClean="0"/>
               <a:pPr/>
-              <a:t>23/10/2014</a:t>
+              <a:t>24/10/2014</a:t>
             </a:fld>
             <a:endParaRPr lang="pt-BR"/>
           </a:p>
@@ -4751,7 +4579,7 @@
     </p:spTree>
     <p:extLst>
       <p:ext uri="{BB962C8B-B14F-4D97-AF65-F5344CB8AC3E}">
-        <p14:creationId xmlns:p14="http://schemas.microsoft.com/office/powerpoint/2010/main" xmlns="" val="3223052927"/>
+        <p14:creationId xmlns:p14="http://schemas.microsoft.com/office/powerpoint/2010/main" val="3223052927"/>
       </p:ext>
     </p:extLst>
   </p:cSld>
@@ -5142,13 +4970,14 @@
           </a:bodyPr>
           <a:lstStyle/>
           <a:p>
+            <a:pPr algn="ctr"/>
             <a:r>
               <a:rPr lang="pt-BR" sz="4000" dirty="0" smtClean="0">
                 <a:latin typeface="Segoe UI" pitchFamily="34" charset="0"/>
                 <a:ea typeface="Segoe UI" pitchFamily="34" charset="0"/>
                 <a:cs typeface="Segoe UI" pitchFamily="34" charset="0"/>
               </a:rPr>
-              <a:t>Definição da solução</a:t>
+              <a:t>Tecnologias e Ferramentas</a:t>
             </a:r>
             <a:endParaRPr lang="pt-BR" sz="4000" dirty="0">
               <a:latin typeface="Segoe UI" pitchFamily="34" charset="0"/>
@@ -5171,112 +5000,110 @@
         <p:spPr/>
         <p:txBody>
           <a:bodyPr>
-            <a:normAutofit fontScale="92500" lnSpcReduction="20000"/>
+            <a:normAutofit/>
           </a:bodyPr>
           <a:lstStyle/>
           <a:p>
-            <a:pPr>
+            <a:pPr algn="ctr">
               <a:buNone/>
             </a:pPr>
             <a:r>
-              <a:rPr lang="pt-BR" sz="3600" dirty="0" smtClean="0"/>
-              <a:t>	</a:t>
-            </a:r>
-            <a:r>
-              <a:rPr lang="pt-BR" b="1" dirty="0" smtClean="0">
-                <a:latin typeface="Segoe UI" pitchFamily="34" charset="0"/>
-                <a:ea typeface="Segoe UI" pitchFamily="34" charset="0"/>
-                <a:cs typeface="Segoe UI" pitchFamily="34" charset="0"/>
-              </a:rPr>
-              <a:t>Quais </a:t>
-            </a:r>
-            <a:r>
-              <a:rPr lang="pt-BR" b="1" dirty="0">
-                <a:latin typeface="Segoe UI" pitchFamily="34" charset="0"/>
-                <a:ea typeface="Segoe UI" pitchFamily="34" charset="0"/>
-                <a:cs typeface="Segoe UI" pitchFamily="34" charset="0"/>
-              </a:rPr>
-              <a:t>funcionalidades?</a:t>
-            </a:r>
-          </a:p>
-          <a:p>
-            <a:r>
-              <a:rPr lang="pt-BR" dirty="0"/>
-              <a:t>Cálculo IMC, Cálculos de calorias </a:t>
-            </a:r>
-            <a:r>
-              <a:rPr lang="pt-BR" dirty="0" smtClean="0"/>
-              <a:t>ingeridas, projeção de perda ou ganho de peso.</a:t>
-            </a:r>
-          </a:p>
-          <a:p>
-            <a:pPr>
+              <a:rPr lang="pt-BR" sz="3600" b="1" dirty="0">
+                <a:latin typeface="Segoe UI" pitchFamily="34" charset="0"/>
+                <a:ea typeface="Segoe UI" pitchFamily="34" charset="0"/>
+                <a:cs typeface="Segoe UI" pitchFamily="34" charset="0"/>
+              </a:rPr>
+              <a:t>Tecnologias Utilizadas:</a:t>
+            </a:r>
+          </a:p>
+          <a:p>
+            <a:pPr algn="ctr">
               <a:buNone/>
             </a:pPr>
-            <a:endParaRPr lang="pt-BR" dirty="0"/>
-          </a:p>
-          <a:p>
-            <a:pPr>
+            <a:r>
+              <a:rPr lang="pt-BR" sz="3600" dirty="0">
+                <a:latin typeface="Segoe UI" pitchFamily="34" charset="0"/>
+                <a:ea typeface="Segoe UI" pitchFamily="34" charset="0"/>
+                <a:cs typeface="Segoe UI" pitchFamily="34" charset="0"/>
+              </a:rPr>
+              <a:t> PHP, CSS, MySQL, AJAX, JavaScript</a:t>
+            </a:r>
+          </a:p>
+          <a:p>
+            <a:pPr algn="ctr">
               <a:buNone/>
             </a:pPr>
-            <a:r>
-              <a:rPr lang="pt-BR" b="1" i="1" dirty="0" smtClean="0"/>
-              <a:t>	</a:t>
-            </a:r>
-            <a:r>
-              <a:rPr lang="pt-BR" b="1" dirty="0" smtClean="0">
-                <a:latin typeface="Segoe UI" pitchFamily="34" charset="0"/>
-                <a:ea typeface="Segoe UI" pitchFamily="34" charset="0"/>
-                <a:cs typeface="Segoe UI" pitchFamily="34" charset="0"/>
-              </a:rPr>
-              <a:t>Funcionamento </a:t>
-            </a:r>
-            <a:r>
-              <a:rPr lang="pt-BR" b="1" dirty="0">
-                <a:latin typeface="Segoe UI" pitchFamily="34" charset="0"/>
-                <a:ea typeface="Segoe UI" pitchFamily="34" charset="0"/>
-                <a:cs typeface="Segoe UI" pitchFamily="34" charset="0"/>
-              </a:rPr>
-              <a:t>básico do sistema?</a:t>
-            </a:r>
-          </a:p>
-          <a:p>
-            <a:r>
-              <a:rPr lang="pt-BR" dirty="0"/>
-              <a:t>Gerenciamento de </a:t>
-            </a:r>
-            <a:r>
-              <a:rPr lang="pt-BR" dirty="0" smtClean="0"/>
-              <a:t>calorias</a:t>
-            </a:r>
-          </a:p>
-          <a:p>
-            <a:r>
-              <a:rPr lang="pt-BR" dirty="0" smtClean="0"/>
-              <a:t>Realizar Pesagem</a:t>
-            </a:r>
-          </a:p>
-          <a:p>
-            <a:r>
-              <a:rPr lang="pt-BR" dirty="0" smtClean="0"/>
-              <a:t>Cadastrar Exercícios Realizados</a:t>
-            </a:r>
-          </a:p>
-          <a:p>
-            <a:pPr>
+            <a:endParaRPr lang="pt-BR" sz="3600" dirty="0">
+              <a:latin typeface="Segoe UI" pitchFamily="34" charset="0"/>
+              <a:ea typeface="Segoe UI" pitchFamily="34" charset="0"/>
+              <a:cs typeface="Segoe UI" pitchFamily="34" charset="0"/>
+            </a:endParaRPr>
+          </a:p>
+          <a:p>
+            <a:pPr algn="ctr">
               <a:buNone/>
             </a:pPr>
-            <a:endParaRPr lang="pt-BR" sz="3600" dirty="0" smtClean="0"/>
-          </a:p>
-          <a:p>
-            <a:pPr>
+            <a:r>
+              <a:rPr lang="pt-BR" sz="3600" b="1" dirty="0">
+                <a:latin typeface="Segoe UI" pitchFamily="34" charset="0"/>
+                <a:ea typeface="Segoe UI" pitchFamily="34" charset="0"/>
+                <a:cs typeface="Segoe UI" pitchFamily="34" charset="0"/>
+              </a:rPr>
+              <a:t>Ferramentas Utilizadas</a:t>
+            </a:r>
+          </a:p>
+          <a:p>
+            <a:pPr algn="ctr">
               <a:buNone/>
             </a:pPr>
             <a:r>
-              <a:rPr lang="pt-BR" sz="3600" dirty="0" smtClean="0"/>
-              <a:t>	</a:t>
-            </a:r>
-            <a:endParaRPr lang="pt-BR" sz="3600" dirty="0"/>
+              <a:rPr lang="pt-BR" sz="3600" dirty="0" smtClean="0">
+                <a:latin typeface="Segoe UI" pitchFamily="34" charset="0"/>
+                <a:ea typeface="Segoe UI" pitchFamily="34" charset="0"/>
+                <a:cs typeface="Segoe UI" pitchFamily="34" charset="0"/>
+              </a:rPr>
+              <a:t>Sublime, </a:t>
+            </a:r>
+            <a:r>
+              <a:rPr lang="pt-BR" sz="3600" dirty="0" err="1">
+                <a:latin typeface="Segoe UI" pitchFamily="34" charset="0"/>
+                <a:ea typeface="Segoe UI" pitchFamily="34" charset="0"/>
+                <a:cs typeface="Segoe UI" pitchFamily="34" charset="0"/>
+              </a:rPr>
+              <a:t>GitHub</a:t>
+            </a:r>
+            <a:r>
+              <a:rPr lang="pt-BR" sz="3600" dirty="0">
+                <a:latin typeface="Segoe UI" pitchFamily="34" charset="0"/>
+                <a:ea typeface="Segoe UI" pitchFamily="34" charset="0"/>
+                <a:cs typeface="Segoe UI" pitchFamily="34" charset="0"/>
+              </a:rPr>
+              <a:t>, </a:t>
+            </a:r>
+            <a:r>
+              <a:rPr lang="pt-BR" sz="3600" dirty="0" err="1"/>
+              <a:t>DreamWeaver</a:t>
+            </a:r>
+            <a:r>
+              <a:rPr lang="pt-BR" sz="3600" dirty="0"/>
+              <a:t>, </a:t>
+            </a:r>
+            <a:r>
+              <a:rPr lang="pt-BR" sz="3600" dirty="0" smtClean="0">
+                <a:latin typeface="Segoe UI" pitchFamily="34" charset="0"/>
+                <a:ea typeface="Segoe UI" pitchFamily="34" charset="0"/>
+                <a:cs typeface="Segoe UI" pitchFamily="34" charset="0"/>
+              </a:rPr>
+              <a:t>Access</a:t>
+            </a:r>
+            <a:r>
+              <a:rPr lang="pt-BR" sz="3600" dirty="0">
+                <a:latin typeface="Segoe UI" pitchFamily="34" charset="0"/>
+                <a:ea typeface="Segoe UI" pitchFamily="34" charset="0"/>
+                <a:cs typeface="Segoe UI" pitchFamily="34" charset="0"/>
+              </a:rPr>
+              <a:t>, Dia</a:t>
+            </a:r>
           </a:p>
         </p:txBody>
       </p:sp>
@@ -5322,7 +5149,12 @@
             <p:ph type="title"/>
           </p:nvPr>
         </p:nvSpPr>
-        <p:spPr/>
+        <p:spPr>
+          <a:xfrm>
+            <a:off x="323528" y="332656"/>
+            <a:ext cx="8229600" cy="1143000"/>
+          </a:xfrm>
+        </p:spPr>
         <p:txBody>
           <a:bodyPr>
             <a:noAutofit/>
@@ -5348,137 +5180,191 @@
       </p:sp>
       <p:sp>
         <p:nvSpPr>
-          <p:cNvPr id="3" name="Espaço Reservado para Conteúdo 2"/>
-          <p:cNvSpPr>
-            <a:spLocks noGrp="1"/>
-          </p:cNvSpPr>
-          <p:nvPr>
-            <p:ph idx="1"/>
-          </p:nvPr>
-        </p:nvSpPr>
-        <p:spPr/>
-        <p:txBody>
-          <a:bodyPr>
+          <p:cNvPr id="4" name="Espaço Reservado para Conteúdo 2"/>
+          <p:cNvSpPr txBox="1">
+            <a:spLocks/>
+          </p:cNvSpPr>
+          <p:nvPr/>
+        </p:nvSpPr>
+        <p:spPr>
+          <a:xfrm>
+            <a:off x="395536" y="2924944"/>
+            <a:ext cx="8229600" cy="2509739"/>
+          </a:xfrm>
+          <a:prstGeom prst="rect">
+            <a:avLst/>
+          </a:prstGeom>
+        </p:spPr>
+        <p:txBody>
+          <a:bodyPr vert="horz" lIns="91440" tIns="45720" rIns="91440" bIns="45720" rtlCol="0">
             <a:normAutofit/>
           </a:bodyPr>
           <a:lstStyle/>
           <a:p>
-            <a:pPr algn="ctr">
-              <a:buNone/>
+            <a:pPr marL="342900" lvl="0" indent="-342900">
+              <a:spcBef>
+                <a:spcPct val="20000"/>
+              </a:spcBef>
             </a:pPr>
             <a:r>
-              <a:rPr lang="pt-BR" sz="3600" b="1" dirty="0">
-                <a:latin typeface="Segoe UI" pitchFamily="34" charset="0"/>
-                <a:ea typeface="Segoe UI" pitchFamily="34" charset="0"/>
-                <a:cs typeface="Segoe UI" pitchFamily="34" charset="0"/>
-              </a:rPr>
-              <a:t>Tecnologias Utilizadas:</a:t>
-            </a:r>
-          </a:p>
-          <a:p>
-            <a:pPr algn="ctr">
-              <a:buNone/>
-            </a:pPr>
-            <a:r>
-              <a:rPr lang="pt-BR" sz="3600" dirty="0">
-                <a:latin typeface="Segoe UI" pitchFamily="34" charset="0"/>
-                <a:ea typeface="Segoe UI" pitchFamily="34" charset="0"/>
-                <a:cs typeface="Segoe UI" pitchFamily="34" charset="0"/>
-              </a:rPr>
-              <a:t> PHP, CSS, MySQL, AJAX, JavaScript</a:t>
-            </a:r>
-          </a:p>
-          <a:p>
-            <a:pPr algn="ctr">
-              <a:buNone/>
-            </a:pPr>
-            <a:endParaRPr lang="pt-BR" sz="3600" dirty="0">
-              <a:latin typeface="Segoe UI" pitchFamily="34" charset="0"/>
-              <a:ea typeface="Segoe UI" pitchFamily="34" charset="0"/>
-              <a:cs typeface="Segoe UI" pitchFamily="34" charset="0"/>
-            </a:endParaRPr>
-          </a:p>
-          <a:p>
-            <a:pPr algn="ctr">
-              <a:buNone/>
-            </a:pPr>
-            <a:r>
-              <a:rPr lang="pt-BR" sz="3600" b="1" dirty="0">
-                <a:latin typeface="Segoe UI" pitchFamily="34" charset="0"/>
-                <a:ea typeface="Segoe UI" pitchFamily="34" charset="0"/>
-                <a:cs typeface="Segoe UI" pitchFamily="34" charset="0"/>
-              </a:rPr>
-              <a:t>Ferramentas Utilizadas</a:t>
-            </a:r>
-          </a:p>
-          <a:p>
-            <a:pPr algn="ctr">
-              <a:buNone/>
-            </a:pPr>
-            <a:r>
-              <a:rPr lang="pt-BR" sz="3600" dirty="0">
-                <a:latin typeface="Segoe UI" pitchFamily="34" charset="0"/>
-                <a:ea typeface="Segoe UI" pitchFamily="34" charset="0"/>
-                <a:cs typeface="Segoe UI" pitchFamily="34" charset="0"/>
-              </a:rPr>
-              <a:t>Sublime, Google </a:t>
-            </a:r>
-            <a:r>
-              <a:rPr lang="pt-BR" sz="3600" dirty="0" err="1">
-                <a:latin typeface="Segoe UI" pitchFamily="34" charset="0"/>
-                <a:ea typeface="Segoe UI" pitchFamily="34" charset="0"/>
-                <a:cs typeface="Segoe UI" pitchFamily="34" charset="0"/>
-              </a:rPr>
-              <a:t>Chrome</a:t>
-            </a:r>
-            <a:r>
-              <a:rPr lang="pt-BR" sz="3600" dirty="0">
-                <a:latin typeface="Segoe UI" pitchFamily="34" charset="0"/>
-                <a:ea typeface="Segoe UI" pitchFamily="34" charset="0"/>
-                <a:cs typeface="Segoe UI" pitchFamily="34" charset="0"/>
-              </a:rPr>
-              <a:t>, </a:t>
-            </a:r>
-            <a:r>
-              <a:rPr lang="pt-BR" sz="3600" dirty="0" err="1">
-                <a:latin typeface="Segoe UI" pitchFamily="34" charset="0"/>
-                <a:ea typeface="Segoe UI" pitchFamily="34" charset="0"/>
-                <a:cs typeface="Segoe UI" pitchFamily="34" charset="0"/>
-              </a:rPr>
-              <a:t>GitHub</a:t>
-            </a:r>
-            <a:r>
-              <a:rPr lang="pt-BR" sz="3600" dirty="0">
-                <a:latin typeface="Segoe UI" pitchFamily="34" charset="0"/>
-                <a:ea typeface="Segoe UI" pitchFamily="34" charset="0"/>
-                <a:cs typeface="Segoe UI" pitchFamily="34" charset="0"/>
-              </a:rPr>
-              <a:t>, </a:t>
-            </a:r>
-            <a:r>
-              <a:rPr lang="pt-BR" sz="3600" dirty="0" err="1"/>
-              <a:t>DreamWeaver</a:t>
-            </a:r>
-            <a:r>
-              <a:rPr lang="pt-BR" sz="3600" dirty="0"/>
-              <a:t>, </a:t>
-            </a:r>
-            <a:r>
-              <a:rPr lang="pt-BR" sz="3600" dirty="0" err="1">
-                <a:latin typeface="Segoe UI" pitchFamily="34" charset="0"/>
-                <a:ea typeface="Segoe UI" pitchFamily="34" charset="0"/>
-                <a:cs typeface="Segoe UI" pitchFamily="34" charset="0"/>
-              </a:rPr>
-              <a:t>Acess</a:t>
-            </a:r>
-            <a:r>
-              <a:rPr lang="pt-BR" sz="3600" dirty="0">
-                <a:latin typeface="Segoe UI" pitchFamily="34" charset="0"/>
-                <a:ea typeface="Segoe UI" pitchFamily="34" charset="0"/>
-                <a:cs typeface="Segoe UI" pitchFamily="34" charset="0"/>
-              </a:rPr>
-              <a:t>, Dia</a:t>
-            </a:r>
+              <a:rPr kumimoji="0" lang="pt-BR" sz="3600" i="0" u="none" strike="noStrike" kern="1200" cap="none" spc="0" normalizeH="0" baseline="0" noProof="0" dirty="0">
+                <a:ln>
+                  <a:noFill/>
+                </a:ln>
+                <a:solidFill>
+                  <a:schemeClr val="tx1"/>
+                </a:solidFill>
+                <a:effectLst/>
+                <a:uLnTx/>
+                <a:uFillTx/>
+                <a:ea typeface="+mn-ea"/>
+                <a:cs typeface="+mn-cs"/>
+              </a:rPr>
+              <a:t>	</a:t>
+            </a:r>
+            <a:r>
+              <a:rPr kumimoji="0" lang="pt-BR" sz="3600" i="0" u="none" strike="noStrike" kern="1200" cap="none" spc="0" normalizeH="0" baseline="0" noProof="0" dirty="0">
+                <a:ln>
+                  <a:noFill/>
+                </a:ln>
+                <a:solidFill>
+                  <a:schemeClr val="tx1"/>
+                </a:solidFill>
+                <a:effectLst/>
+                <a:uLnTx/>
+                <a:uFillTx/>
+                <a:ea typeface="Segoe UI" pitchFamily="34" charset="0"/>
+                <a:cs typeface="Segoe UI" pitchFamily="34" charset="0"/>
+              </a:rPr>
+              <a:t/>
+            </a:r>
+            <a:br>
+              <a:rPr kumimoji="0" lang="pt-BR" sz="3600" i="0" u="none" strike="noStrike" kern="1200" cap="none" spc="0" normalizeH="0" baseline="0" noProof="0" dirty="0">
+                <a:ln>
+                  <a:noFill/>
+                </a:ln>
+                <a:solidFill>
+                  <a:schemeClr val="tx1"/>
+                </a:solidFill>
+                <a:effectLst/>
+                <a:uLnTx/>
+                <a:uFillTx/>
+                <a:ea typeface="Segoe UI" pitchFamily="34" charset="0"/>
+                <a:cs typeface="Segoe UI" pitchFamily="34" charset="0"/>
+              </a:rPr>
+            </a:br>
+            <a:r>
+              <a:rPr kumimoji="0" lang="pt-BR" sz="2800" i="0" u="none" strike="noStrike" kern="1200" cap="none" spc="0" normalizeH="0" baseline="0" noProof="0" dirty="0">
+                <a:ln>
+                  <a:noFill/>
+                </a:ln>
+                <a:solidFill>
+                  <a:srgbClr val="000000"/>
+                </a:solidFill>
+                <a:effectLst/>
+                <a:uLnTx/>
+                <a:uFillTx/>
+                <a:ea typeface="Segoe UI" pitchFamily="34" charset="0"/>
+                <a:cs typeface="Segoe UI" pitchFamily="34" charset="0"/>
+              </a:rPr>
+              <a:t>Hospedagem(a definir), Jquery, </a:t>
+            </a:r>
+            <a:r>
+              <a:rPr kumimoji="0" lang="pt-BR" sz="2800" i="0" u="none" strike="noStrike" kern="1200" cap="none" spc="0" normalizeH="0" baseline="0" noProof="0" dirty="0" err="1">
+                <a:ln>
+                  <a:noFill/>
+                </a:ln>
+                <a:solidFill>
+                  <a:srgbClr val="000000"/>
+                </a:solidFill>
+                <a:effectLst/>
+                <a:uLnTx/>
+                <a:uFillTx/>
+                <a:ea typeface="Segoe UI" pitchFamily="34" charset="0"/>
+                <a:cs typeface="Segoe UI" pitchFamily="34" charset="0"/>
+              </a:rPr>
+              <a:t>Less</a:t>
+            </a:r>
+            <a:r>
+              <a:rPr kumimoji="0" lang="pt-BR" sz="2800" i="0" u="none" strike="noStrike" kern="1200" cap="none" spc="0" normalizeH="0" baseline="0" noProof="0" dirty="0">
+                <a:ln>
+                  <a:noFill/>
+                </a:ln>
+                <a:solidFill>
+                  <a:srgbClr val="000000"/>
+                </a:solidFill>
+                <a:effectLst/>
+                <a:uLnTx/>
+                <a:uFillTx/>
+                <a:ea typeface="Segoe UI" pitchFamily="34" charset="0"/>
+                <a:cs typeface="Segoe UI" pitchFamily="34" charset="0"/>
+              </a:rPr>
+              <a:t>(em </a:t>
+            </a:r>
+            <a:r>
+              <a:rPr kumimoji="0" lang="pt-BR" sz="2800" i="0" u="none" strike="noStrike" kern="1200" cap="none" spc="0" normalizeH="0" baseline="0" noProof="0" dirty="0" smtClean="0">
+                <a:ln>
+                  <a:noFill/>
+                </a:ln>
+                <a:solidFill>
+                  <a:srgbClr val="000000"/>
+                </a:solidFill>
+                <a:effectLst/>
+                <a:uLnTx/>
+                <a:uFillTx/>
+                <a:ea typeface="Segoe UI" pitchFamily="34" charset="0"/>
+                <a:cs typeface="Segoe UI" pitchFamily="34" charset="0"/>
+              </a:rPr>
+              <a:t>análise</a:t>
+            </a:r>
+            <a:r>
+              <a:rPr kumimoji="0" lang="pt-BR" sz="2800" i="0" u="none" strike="noStrike" kern="1200" cap="none" spc="0" normalizeH="0" baseline="0" noProof="0" dirty="0">
+                <a:ln>
+                  <a:noFill/>
+                </a:ln>
+                <a:solidFill>
+                  <a:srgbClr val="000000"/>
+                </a:solidFill>
+                <a:effectLst/>
+                <a:uLnTx/>
+                <a:uFillTx/>
+                <a:ea typeface="Segoe UI" pitchFamily="34" charset="0"/>
+                <a:cs typeface="Segoe UI" pitchFamily="34" charset="0"/>
+              </a:rPr>
+              <a:t>)</a:t>
+            </a:r>
+          </a:p>
+        </p:txBody>
+      </p:sp>
+      <p:sp>
+        <p:nvSpPr>
+          <p:cNvPr id="5" name="Retângulo 4"/>
+          <p:cNvSpPr/>
+          <p:nvPr/>
+        </p:nvSpPr>
+        <p:spPr>
+          <a:xfrm>
+            <a:off x="1331640" y="1844824"/>
+            <a:ext cx="6408712" cy="584775"/>
+          </a:xfrm>
+          <a:prstGeom prst="rect">
+            <a:avLst/>
+          </a:prstGeom>
+        </p:spPr>
+        <p:txBody>
+          <a:bodyPr wrap="square">
+            <a:spAutoFit/>
+          </a:bodyPr>
+          <a:lstStyle/>
+          <a:p>
+            <a:r>
+              <a:rPr lang="pt-BR" sz="3200" b="1" dirty="0" smtClean="0">
+                <a:ea typeface="Segoe UI" pitchFamily="34" charset="0"/>
+                <a:cs typeface="Segoe UI" pitchFamily="34" charset="0"/>
+              </a:rPr>
+              <a:t>Recursos, bibliotecas e frameworks</a:t>
+            </a:r>
+            <a:endParaRPr lang="pt-BR" sz="3200" b="1" dirty="0"/>
           </a:p>
         </p:txBody>
       </p:sp>
@@ -5526,7 +5412,7 @@
         </p:nvSpPr>
         <p:spPr>
           <a:xfrm>
-            <a:off x="323528" y="332656"/>
+            <a:off x="683568" y="476672"/>
             <a:ext cx="8229600" cy="1143000"/>
           </a:xfrm>
         </p:spPr>
@@ -5555,141 +5441,97 @@
       </p:sp>
       <p:sp>
         <p:nvSpPr>
-          <p:cNvPr id="4" name="Espaço Reservado para Conteúdo 2"/>
-          <p:cNvSpPr txBox="1">
-            <a:spLocks/>
-          </p:cNvSpPr>
-          <p:nvPr/>
-        </p:nvSpPr>
-        <p:spPr>
-          <a:xfrm>
-            <a:off x="395536" y="2924944"/>
-            <a:ext cx="8229600" cy="2509739"/>
-          </a:xfrm>
-          <a:prstGeom prst="rect">
-            <a:avLst/>
-          </a:prstGeom>
-        </p:spPr>
-        <p:txBody>
-          <a:bodyPr vert="horz" lIns="91440" tIns="45720" rIns="91440" bIns="45720" rtlCol="0">
+          <p:cNvPr id="3" name="Espaço Reservado para Conteúdo 2"/>
+          <p:cNvSpPr>
+            <a:spLocks noGrp="1"/>
+          </p:cNvSpPr>
+          <p:nvPr>
+            <p:ph idx="1"/>
+          </p:nvPr>
+        </p:nvSpPr>
+        <p:spPr/>
+        <p:txBody>
+          <a:bodyPr>
             <a:normAutofit/>
           </a:bodyPr>
           <a:lstStyle/>
           <a:p>
-            <a:pPr marL="342900" lvl="0" indent="-342900">
-              <a:spcBef>
-                <a:spcPct val="20000"/>
-              </a:spcBef>
+            <a:pPr>
+              <a:buNone/>
             </a:pPr>
             <a:r>
-              <a:rPr kumimoji="0" lang="pt-BR" sz="3600" i="0" u="none" strike="noStrike" kern="1200" cap="none" spc="0" normalizeH="0" baseline="0" noProof="0" dirty="0">
-                <a:ln>
-                  <a:noFill/>
-                </a:ln>
-                <a:solidFill>
-                  <a:schemeClr val="tx1"/>
-                </a:solidFill>
-                <a:effectLst/>
-                <a:uLnTx/>
-                <a:uFillTx/>
-                <a:ea typeface="+mn-ea"/>
-                <a:cs typeface="+mn-cs"/>
-              </a:rPr>
-              <a:t>	</a:t>
-            </a:r>
-            <a:r>
-              <a:rPr kumimoji="0" lang="pt-BR" sz="3600" i="0" u="none" strike="noStrike" kern="1200" cap="none" spc="0" normalizeH="0" baseline="0" noProof="0" dirty="0">
-                <a:ln>
-                  <a:noFill/>
-                </a:ln>
-                <a:solidFill>
-                  <a:schemeClr val="tx1"/>
-                </a:solidFill>
-                <a:effectLst/>
-                <a:uLnTx/>
-                <a:uFillTx/>
-                <a:ea typeface="Segoe UI" pitchFamily="34" charset="0"/>
-                <a:cs typeface="Segoe UI" pitchFamily="34" charset="0"/>
-              </a:rPr>
-              <a:t/>
-            </a:r>
-            <a:br>
-              <a:rPr kumimoji="0" lang="pt-BR" sz="3600" i="0" u="none" strike="noStrike" kern="1200" cap="none" spc="0" normalizeH="0" baseline="0" noProof="0" dirty="0">
-                <a:ln>
-                  <a:noFill/>
-                </a:ln>
-                <a:solidFill>
-                  <a:schemeClr val="tx1"/>
-                </a:solidFill>
-                <a:effectLst/>
-                <a:uLnTx/>
-                <a:uFillTx/>
-                <a:ea typeface="Segoe UI" pitchFamily="34" charset="0"/>
-                <a:cs typeface="Segoe UI" pitchFamily="34" charset="0"/>
-              </a:rPr>
-            </a:br>
-            <a:r>
-              <a:rPr kumimoji="0" lang="pt-BR" sz="2800" i="0" u="none" strike="noStrike" kern="1200" cap="none" spc="0" normalizeH="0" baseline="0" noProof="0" dirty="0">
-                <a:ln>
-                  <a:noFill/>
-                </a:ln>
-                <a:solidFill>
-                  <a:srgbClr val="000000"/>
-                </a:solidFill>
-                <a:effectLst/>
-                <a:uLnTx/>
-                <a:uFillTx/>
-                <a:ea typeface="Segoe UI" pitchFamily="34" charset="0"/>
-                <a:cs typeface="Segoe UI" pitchFamily="34" charset="0"/>
-              </a:rPr>
-              <a:t>Hospedagem(a definir), Jquery, Less(em analise)</a:t>
-            </a:r>
-          </a:p>
-        </p:txBody>
-      </p:sp>
-      <p:sp>
-        <p:nvSpPr>
-          <p:cNvPr id="5" name="Retângulo 4"/>
-          <p:cNvSpPr/>
-          <p:nvPr/>
-        </p:nvSpPr>
-        <p:spPr>
-          <a:xfrm>
-            <a:off x="1331640" y="1844824"/>
-            <a:ext cx="6408712" cy="584775"/>
-          </a:xfrm>
-          <a:prstGeom prst="rect">
-            <a:avLst/>
-          </a:prstGeom>
-        </p:spPr>
-        <p:txBody>
-          <a:bodyPr wrap="square">
-            <a:spAutoFit/>
-          </a:bodyPr>
-          <a:lstStyle/>
-          <a:p>
-            <a:r>
-              <a:rPr lang="pt-BR" sz="3200" b="1" dirty="0" smtClean="0">
-                <a:ea typeface="Segoe UI" pitchFamily="34" charset="0"/>
-                <a:cs typeface="Segoe UI" pitchFamily="34" charset="0"/>
-              </a:rPr>
-              <a:t>Recursos, </a:t>
-            </a:r>
-            <a:r>
-              <a:rPr lang="pt-BR" sz="3200" b="1" dirty="0" smtClean="0">
-                <a:ea typeface="Segoe UI" pitchFamily="34" charset="0"/>
-                <a:cs typeface="Segoe UI" pitchFamily="34" charset="0"/>
-              </a:rPr>
-              <a:t>bibliotecas e </a:t>
-            </a:r>
-            <a:r>
-              <a:rPr lang="pt-BR" sz="3200" b="1" dirty="0" smtClean="0">
-                <a:ea typeface="Segoe UI" pitchFamily="34" charset="0"/>
-                <a:cs typeface="Segoe UI" pitchFamily="34" charset="0"/>
-              </a:rPr>
-              <a:t>frameworks</a:t>
-            </a:r>
-            <a:endParaRPr lang="pt-BR" sz="3200" b="1" dirty="0"/>
+              <a:rPr lang="pt-BR" sz="3600" dirty="0" smtClean="0"/>
+              <a:t> </a:t>
+            </a:r>
+            <a:r>
+              <a:rPr lang="pt-BR" dirty="0" smtClean="0">
+                <a:latin typeface="Segoe UI" pitchFamily="34" charset="0"/>
+                <a:ea typeface="Segoe UI" pitchFamily="34" charset="0"/>
+                <a:cs typeface="Segoe UI" pitchFamily="34" charset="0"/>
+              </a:rPr>
+              <a:t>Qual o motivo das escolhas realizadas?</a:t>
+            </a:r>
+          </a:p>
+          <a:p>
+            <a:pPr>
+              <a:buFontTx/>
+              <a:buChar char="-"/>
+            </a:pPr>
+            <a:r>
+              <a:rPr lang="pt-BR" dirty="0" smtClean="0">
+                <a:latin typeface="Segoe UI" pitchFamily="34" charset="0"/>
+                <a:ea typeface="Segoe UI" pitchFamily="34" charset="0"/>
+                <a:cs typeface="Segoe UI" pitchFamily="34" charset="0"/>
+              </a:rPr>
+              <a:t>Linguagem PHP: Interesse no aprendizado </a:t>
+            </a:r>
+          </a:p>
+          <a:p>
+            <a:pPr>
+              <a:buFontTx/>
+              <a:buChar char="-"/>
+            </a:pPr>
+            <a:r>
+              <a:rPr lang="pt-BR" dirty="0" smtClean="0">
+                <a:latin typeface="Segoe UI" pitchFamily="34" charset="0"/>
+                <a:ea typeface="Segoe UI" pitchFamily="34" charset="0"/>
+                <a:cs typeface="Segoe UI" pitchFamily="34" charset="0"/>
+              </a:rPr>
+              <a:t>MySQL: Ótimo SGBD para a criação e manipulação de banco de dados relacionais</a:t>
+            </a:r>
+          </a:p>
+          <a:p>
+            <a:pPr>
+              <a:buFontTx/>
+              <a:buChar char="-"/>
+            </a:pPr>
+            <a:r>
+              <a:rPr lang="pt-BR" dirty="0" err="1" smtClean="0">
+                <a:latin typeface="Segoe UI" pitchFamily="34" charset="0"/>
+                <a:ea typeface="Segoe UI" pitchFamily="34" charset="0"/>
+                <a:cs typeface="Segoe UI" pitchFamily="34" charset="0"/>
+              </a:rPr>
+              <a:t>GitHub</a:t>
+            </a:r>
+            <a:r>
+              <a:rPr lang="pt-BR" dirty="0" smtClean="0">
+                <a:latin typeface="Segoe UI" pitchFamily="34" charset="0"/>
+                <a:ea typeface="Segoe UI" pitchFamily="34" charset="0"/>
+                <a:cs typeface="Segoe UI" pitchFamily="34" charset="0"/>
+              </a:rPr>
+              <a:t>: Amplamente utilizado para controle de versões e desenvolvimento em grupo</a:t>
+            </a:r>
+          </a:p>
+          <a:p>
+            <a:pPr>
+              <a:buFontTx/>
+              <a:buChar char="-"/>
+            </a:pPr>
+            <a:endParaRPr lang="pt-BR" b="1" dirty="0">
+              <a:latin typeface="Segoe UI" pitchFamily="34" charset="0"/>
+              <a:ea typeface="Segoe UI" pitchFamily="34" charset="0"/>
+              <a:cs typeface="Segoe UI" pitchFamily="34" charset="0"/>
+            </a:endParaRPr>
           </a:p>
         </p:txBody>
       </p:sp>
@@ -5735,32 +5577,12 @@
             <p:ph type="title"/>
           </p:nvPr>
         </p:nvSpPr>
-        <p:spPr>
-          <a:xfrm>
-            <a:off x="683568" y="476672"/>
-            <a:ext cx="8229600" cy="1143000"/>
-          </a:xfrm>
-        </p:spPr>
-        <p:txBody>
-          <a:bodyPr>
-            <a:noAutofit/>
-          </a:bodyPr>
-          <a:lstStyle/>
-          <a:p>
-            <a:pPr algn="ctr"/>
-            <a:r>
-              <a:rPr lang="pt-BR" sz="4000" dirty="0" smtClean="0">
-                <a:latin typeface="Segoe UI" pitchFamily="34" charset="0"/>
-                <a:ea typeface="Segoe UI" pitchFamily="34" charset="0"/>
-                <a:cs typeface="Segoe UI" pitchFamily="34" charset="0"/>
-              </a:rPr>
-              <a:t>Tecnologias e Ferramentas</a:t>
-            </a:r>
-            <a:endParaRPr lang="pt-BR" sz="4000" dirty="0">
-              <a:latin typeface="Segoe UI" pitchFamily="34" charset="0"/>
-              <a:ea typeface="Segoe UI" pitchFamily="34" charset="0"/>
-              <a:cs typeface="Segoe UI" pitchFamily="34" charset="0"/>
-            </a:endParaRPr>
+        <p:spPr/>
+        <p:txBody>
+          <a:bodyPr/>
+          <a:lstStyle/>
+          <a:p>
+            <a:endParaRPr lang="pt-BR"/>
           </a:p>
         </p:txBody>
       </p:sp>
@@ -5776,91 +5598,38 @@
         </p:nvSpPr>
         <p:spPr/>
         <p:txBody>
-          <a:bodyPr>
-            <a:normAutofit/>
-          </a:bodyPr>
-          <a:lstStyle/>
-          <a:p>
-            <a:pPr>
-              <a:buNone/>
-            </a:pPr>
-            <a:r>
-              <a:rPr lang="pt-BR" sz="3600" dirty="0" smtClean="0"/>
-              <a:t> </a:t>
-            </a:r>
-            <a:r>
-              <a:rPr lang="pt-BR" dirty="0" smtClean="0">
-                <a:latin typeface="Segoe UI" pitchFamily="34" charset="0"/>
-                <a:ea typeface="Segoe UI" pitchFamily="34" charset="0"/>
-                <a:cs typeface="Segoe UI" pitchFamily="34" charset="0"/>
-              </a:rPr>
-              <a:t>Qual o motivo das escolhas realizadas?</a:t>
-            </a:r>
-          </a:p>
-          <a:p>
-            <a:pPr>
-              <a:buFontTx/>
-              <a:buChar char="-"/>
-            </a:pPr>
-            <a:r>
-              <a:rPr lang="pt-BR" dirty="0" smtClean="0">
-                <a:latin typeface="Segoe UI" pitchFamily="34" charset="0"/>
-                <a:ea typeface="Segoe UI" pitchFamily="34" charset="0"/>
-                <a:cs typeface="Segoe UI" pitchFamily="34" charset="0"/>
-              </a:rPr>
-              <a:t>Linguagem PHP: Interesse no aprendizado </a:t>
-            </a:r>
-          </a:p>
-          <a:p>
-            <a:pPr>
-              <a:buFontTx/>
-              <a:buChar char="-"/>
-            </a:pPr>
-            <a:r>
-              <a:rPr lang="pt-BR" dirty="0" smtClean="0">
-                <a:latin typeface="Segoe UI" pitchFamily="34" charset="0"/>
-                <a:ea typeface="Segoe UI" pitchFamily="34" charset="0"/>
-                <a:cs typeface="Segoe UI" pitchFamily="34" charset="0"/>
-              </a:rPr>
-              <a:t>MySQL: Ótimo SGBD para a criação e manipulação de banco de dados relacionais</a:t>
-            </a:r>
-          </a:p>
-          <a:p>
-            <a:pPr>
-              <a:buFontTx/>
-              <a:buChar char="-"/>
-            </a:pPr>
-            <a:r>
-              <a:rPr lang="pt-BR" dirty="0" err="1" smtClean="0">
-                <a:latin typeface="Segoe UI" pitchFamily="34" charset="0"/>
-                <a:ea typeface="Segoe UI" pitchFamily="34" charset="0"/>
-                <a:cs typeface="Segoe UI" pitchFamily="34" charset="0"/>
-              </a:rPr>
-              <a:t>GitHub</a:t>
-            </a:r>
-            <a:r>
-              <a:rPr lang="pt-BR" dirty="0" smtClean="0">
-                <a:latin typeface="Segoe UI" pitchFamily="34" charset="0"/>
-                <a:ea typeface="Segoe UI" pitchFamily="34" charset="0"/>
-                <a:cs typeface="Segoe UI" pitchFamily="34" charset="0"/>
-              </a:rPr>
-              <a:t>: Amplamente utilizado para controle de versões e desenvolvimento em grupo</a:t>
-            </a:r>
-          </a:p>
-          <a:p>
-            <a:pPr>
-              <a:buFontTx/>
-              <a:buChar char="-"/>
-            </a:pPr>
-            <a:endParaRPr lang="pt-BR" b="1" dirty="0">
-              <a:latin typeface="Segoe UI" pitchFamily="34" charset="0"/>
-              <a:ea typeface="Segoe UI" pitchFamily="34" charset="0"/>
-              <a:cs typeface="Segoe UI" pitchFamily="34" charset="0"/>
-            </a:endParaRPr>
+          <a:bodyPr/>
+          <a:lstStyle/>
+          <a:p>
+            <a:r>
+              <a:rPr lang="pt-BR" dirty="0" err="1" smtClean="0"/>
+              <a:t>DreamWeaver</a:t>
+            </a:r>
+            <a:r>
+              <a:rPr lang="pt-BR" dirty="0" smtClean="0"/>
+              <a:t>: Ágil para criar interfaces e organizar o projeto</a:t>
+            </a:r>
+          </a:p>
+          <a:p>
+            <a:r>
+              <a:rPr lang="pt-BR" dirty="0" smtClean="0"/>
+              <a:t>Access: utilizado para trabalhar no tratamento das bases de dados pesquisadas</a:t>
+            </a:r>
+          </a:p>
+          <a:p>
+            <a:r>
+              <a:rPr lang="pt-BR" dirty="0" smtClean="0"/>
+              <a:t>Sublime: Agradável para trabalhar no código, rápido, fácil </a:t>
+            </a:r>
           </a:p>
         </p:txBody>
       </p:sp>
     </p:spTree>
+    <p:extLst>
+      <p:ext uri="{BB962C8B-B14F-4D97-AF65-F5344CB8AC3E}">
+        <p14:creationId xmlns:p14="http://schemas.microsoft.com/office/powerpoint/2010/main" val="1305690966"/>
+      </p:ext>
+    </p:extLst>
   </p:cSld>
   <p:clrMapOvr>
     <a:masterClrMapping/>
@@ -5902,12 +5671,31 @@
             <p:ph type="title"/>
           </p:nvPr>
         </p:nvSpPr>
-        <p:spPr/>
-        <p:txBody>
-          <a:bodyPr/>
-          <a:lstStyle/>
-          <a:p>
-            <a:endParaRPr lang="pt-BR"/>
+        <p:spPr>
+          <a:xfrm>
+            <a:off x="683568" y="476672"/>
+            <a:ext cx="8229600" cy="1143000"/>
+          </a:xfrm>
+        </p:spPr>
+        <p:txBody>
+          <a:bodyPr>
+            <a:noAutofit/>
+          </a:bodyPr>
+          <a:lstStyle/>
+          <a:p>
+            <a:r>
+              <a:rPr lang="pt-BR" sz="4000" dirty="0" smtClean="0">
+                <a:latin typeface="Segoe UI" pitchFamily="34" charset="0"/>
+                <a:ea typeface="Segoe UI" pitchFamily="34" charset="0"/>
+                <a:cs typeface="Segoe UI" pitchFamily="34" charset="0"/>
+              </a:rPr>
+              <a:t>Arquitetura do Sistema</a:t>
+            </a:r>
+            <a:endParaRPr lang="pt-BR" sz="4000" dirty="0">
+              <a:latin typeface="Segoe UI" pitchFamily="34" charset="0"/>
+              <a:ea typeface="Segoe UI" pitchFamily="34" charset="0"/>
+              <a:cs typeface="Segoe UI" pitchFamily="34" charset="0"/>
+            </a:endParaRPr>
           </a:p>
         </p:txBody>
       </p:sp>
@@ -5921,55 +5709,111 @@
             <p:ph idx="1"/>
           </p:nvPr>
         </p:nvSpPr>
-        <p:spPr/>
-        <p:txBody>
-          <a:bodyPr/>
-          <a:lstStyle/>
-          <a:p>
-            <a:r>
-              <a:rPr lang="pt-BR" dirty="0" err="1" smtClean="0"/>
-              <a:t>DreamWeaver</a:t>
-            </a:r>
-            <a:r>
-              <a:rPr lang="pt-BR" dirty="0" smtClean="0"/>
-              <a:t>: Ágil para criar interfaces e organizar o projeto</a:t>
-            </a:r>
-          </a:p>
-          <a:p>
-            <a:r>
-              <a:rPr lang="pt-BR" dirty="0" smtClean="0"/>
-              <a:t>Access: utilizado para trabalhar no tratamento das bases de dados pesquisadas</a:t>
-            </a:r>
-          </a:p>
-          <a:p>
-            <a:r>
-              <a:rPr lang="pt-BR" dirty="0" smtClean="0"/>
-              <a:t>Sublime: Agradável para trabalhar no código, rápido, fácil </a:t>
-            </a:r>
-          </a:p>
-          <a:p>
-            <a:r>
-              <a:rPr lang="pt-BR" dirty="0" smtClean="0"/>
-              <a:t>Google </a:t>
-            </a:r>
-            <a:r>
-              <a:rPr lang="pt-BR" dirty="0" err="1" smtClean="0"/>
-              <a:t>Chrome</a:t>
-            </a:r>
-            <a:r>
-              <a:rPr lang="pt-BR" dirty="0" smtClean="0"/>
-              <a:t>: Apenas utilizado para testar a aplicação.</a:t>
-            </a:r>
-            <a:endParaRPr lang="pt-BR" dirty="0"/>
+        <p:spPr>
+          <a:xfrm>
+            <a:off x="539552" y="2348880"/>
+            <a:ext cx="7886700" cy="4351338"/>
+          </a:xfrm>
+        </p:spPr>
+        <p:txBody>
+          <a:bodyPr>
+            <a:normAutofit/>
+          </a:bodyPr>
+          <a:lstStyle/>
+          <a:p>
+            <a:pPr lvl="1"/>
+            <a:r>
+              <a:rPr lang="pt-BR" dirty="0" err="1" smtClean="0">
+                <a:latin typeface="Segoe UI" pitchFamily="34" charset="0"/>
+                <a:ea typeface="Segoe UI" pitchFamily="34" charset="0"/>
+                <a:cs typeface="Segoe UI" pitchFamily="34" charset="0"/>
+              </a:rPr>
+              <a:t>Product</a:t>
+            </a:r>
+            <a:r>
+              <a:rPr lang="pt-BR" dirty="0" smtClean="0">
+                <a:latin typeface="Segoe UI" pitchFamily="34" charset="0"/>
+                <a:ea typeface="Segoe UI" pitchFamily="34" charset="0"/>
+                <a:cs typeface="Segoe UI" pitchFamily="34" charset="0"/>
+              </a:rPr>
+              <a:t> </a:t>
+            </a:r>
+            <a:r>
+              <a:rPr lang="pt-BR" dirty="0" err="1" smtClean="0">
+                <a:latin typeface="Segoe UI" pitchFamily="34" charset="0"/>
+                <a:ea typeface="Segoe UI" pitchFamily="34" charset="0"/>
+                <a:cs typeface="Segoe UI" pitchFamily="34" charset="0"/>
+              </a:rPr>
+              <a:t>backlog</a:t>
+            </a:r>
+            <a:endParaRPr lang="pt-BR" dirty="0" smtClean="0">
+              <a:latin typeface="Segoe UI" pitchFamily="34" charset="0"/>
+              <a:ea typeface="Segoe UI" pitchFamily="34" charset="0"/>
+              <a:cs typeface="Segoe UI" pitchFamily="34" charset="0"/>
+            </a:endParaRPr>
+          </a:p>
+          <a:p>
+            <a:pPr lvl="1"/>
+            <a:r>
+              <a:rPr lang="pt-BR" dirty="0" smtClean="0">
+                <a:latin typeface="Segoe UI" pitchFamily="34" charset="0"/>
+                <a:ea typeface="Segoe UI" pitchFamily="34" charset="0"/>
+                <a:cs typeface="Segoe UI" pitchFamily="34" charset="0"/>
+              </a:rPr>
+              <a:t>Gerenciamento do </a:t>
+            </a:r>
+            <a:r>
+              <a:rPr lang="pt-BR" dirty="0" smtClean="0">
+                <a:latin typeface="Segoe UI" pitchFamily="34" charset="0"/>
+                <a:ea typeface="Segoe UI" pitchFamily="34" charset="0"/>
+                <a:cs typeface="Segoe UI" pitchFamily="34" charset="0"/>
+              </a:rPr>
+              <a:t>projeto-</a:t>
+            </a:r>
+            <a:r>
+              <a:rPr lang="pt-BR" dirty="0" err="1" smtClean="0">
+                <a:latin typeface="Segoe UI" pitchFamily="34" charset="0"/>
+                <a:ea typeface="Segoe UI" pitchFamily="34" charset="0"/>
+                <a:cs typeface="Segoe UI" pitchFamily="34" charset="0"/>
+              </a:rPr>
+              <a:t>Trello</a:t>
+            </a:r>
+            <a:endParaRPr lang="pt-BR" dirty="0" smtClean="0">
+              <a:latin typeface="Segoe UI" pitchFamily="34" charset="0"/>
+              <a:ea typeface="Segoe UI" pitchFamily="34" charset="0"/>
+              <a:cs typeface="Segoe UI" pitchFamily="34" charset="0"/>
+            </a:endParaRPr>
+          </a:p>
+          <a:p>
+            <a:pPr lvl="1"/>
+            <a:r>
+              <a:rPr lang="pt-BR" dirty="0" smtClean="0">
+                <a:latin typeface="Segoe UI" pitchFamily="34" charset="0"/>
+                <a:ea typeface="Segoe UI" pitchFamily="34" charset="0"/>
+                <a:cs typeface="Segoe UI" pitchFamily="34" charset="0"/>
+              </a:rPr>
+              <a:t>Modelo ER</a:t>
+            </a:r>
+          </a:p>
+          <a:p>
+            <a:pPr lvl="1"/>
+            <a:r>
+              <a:rPr lang="pt-BR" dirty="0" smtClean="0">
+                <a:latin typeface="Segoe UI" pitchFamily="34" charset="0"/>
+                <a:ea typeface="Segoe UI" pitchFamily="34" charset="0"/>
+                <a:cs typeface="Segoe UI" pitchFamily="34" charset="0"/>
+              </a:rPr>
+              <a:t>Protótipos de interface</a:t>
+            </a:r>
+            <a:endParaRPr lang="pt-BR" b="1" dirty="0">
+              <a:latin typeface="Segoe UI" pitchFamily="34" charset="0"/>
+              <a:ea typeface="Segoe UI" pitchFamily="34" charset="0"/>
+              <a:cs typeface="Segoe UI" pitchFamily="34" charset="0"/>
+            </a:endParaRPr>
           </a:p>
         </p:txBody>
       </p:sp>
     </p:spTree>
-    <p:extLst>
-      <p:ext uri="{BB962C8B-B14F-4D97-AF65-F5344CB8AC3E}">
-        <p14:creationId xmlns:p14="http://schemas.microsoft.com/office/powerpoint/2010/main" xmlns="" val="1305690966"/>
-      </p:ext>
-    </p:extLst>
   </p:cSld>
   <p:clrMapOvr>
     <a:masterClrMapping/>
@@ -5985,263 +5829,6 @@
 </file>
 
 <file path=ppt/slides/slide15.xml><?xml version="1.0" encoding="utf-8"?>
-<p:sld xmlns:a="http://schemas.openxmlformats.org/drawingml/2006/main" xmlns:r="http://schemas.openxmlformats.org/officeDocument/2006/relationships" xmlns:p="http://schemas.openxmlformats.org/presentationml/2006/main">
-  <p:cSld>
-    <p:spTree>
-      <p:nvGrpSpPr>
-        <p:cNvPr id="1" name=""/>
-        <p:cNvGrpSpPr/>
-        <p:nvPr/>
-      </p:nvGrpSpPr>
-      <p:grpSpPr>
-        <a:xfrm>
-          <a:off x="0" y="0"/>
-          <a:ext cx="0" cy="0"/>
-          <a:chOff x="0" y="0"/>
-          <a:chExt cx="0" cy="0"/>
-        </a:xfrm>
-      </p:grpSpPr>
-      <p:sp>
-        <p:nvSpPr>
-          <p:cNvPr id="2" name="Título 1"/>
-          <p:cNvSpPr>
-            <a:spLocks noGrp="1"/>
-          </p:cNvSpPr>
-          <p:nvPr>
-            <p:ph type="title"/>
-          </p:nvPr>
-        </p:nvSpPr>
-        <p:spPr>
-          <a:xfrm>
-            <a:off x="683568" y="476672"/>
-            <a:ext cx="8229600" cy="1143000"/>
-          </a:xfrm>
-        </p:spPr>
-        <p:txBody>
-          <a:bodyPr>
-            <a:noAutofit/>
-          </a:bodyPr>
-          <a:lstStyle/>
-          <a:p>
-            <a:r>
-              <a:rPr lang="pt-BR" sz="4000" dirty="0" smtClean="0">
-                <a:latin typeface="Segoe UI" pitchFamily="34" charset="0"/>
-                <a:ea typeface="Segoe UI" pitchFamily="34" charset="0"/>
-                <a:cs typeface="Segoe UI" pitchFamily="34" charset="0"/>
-              </a:rPr>
-              <a:t>Arquitetura do Sistema</a:t>
-            </a:r>
-            <a:endParaRPr lang="pt-BR" sz="4000" dirty="0">
-              <a:latin typeface="Segoe UI" pitchFamily="34" charset="0"/>
-              <a:ea typeface="Segoe UI" pitchFamily="34" charset="0"/>
-              <a:cs typeface="Segoe UI" pitchFamily="34" charset="0"/>
-            </a:endParaRPr>
-          </a:p>
-        </p:txBody>
-      </p:sp>
-      <p:sp>
-        <p:nvSpPr>
-          <p:cNvPr id="3" name="Espaço Reservado para Conteúdo 2"/>
-          <p:cNvSpPr>
-            <a:spLocks noGrp="1"/>
-          </p:cNvSpPr>
-          <p:nvPr>
-            <p:ph idx="1"/>
-          </p:nvPr>
-        </p:nvSpPr>
-        <p:spPr/>
-        <p:txBody>
-          <a:bodyPr>
-            <a:normAutofit/>
-          </a:bodyPr>
-          <a:lstStyle/>
-          <a:p>
-            <a:pPr lvl="1">
-              <a:buNone/>
-            </a:pPr>
-            <a:r>
-              <a:rPr lang="pt-BR" dirty="0" err="1" smtClean="0">
-                <a:latin typeface="Segoe UI" pitchFamily="34" charset="0"/>
-                <a:ea typeface="Segoe UI" pitchFamily="34" charset="0"/>
-                <a:cs typeface="Segoe UI" pitchFamily="34" charset="0"/>
-              </a:rPr>
-              <a:t>Product</a:t>
-            </a:r>
-            <a:r>
-              <a:rPr lang="pt-BR" dirty="0" smtClean="0">
-                <a:latin typeface="Segoe UI" pitchFamily="34" charset="0"/>
-                <a:ea typeface="Segoe UI" pitchFamily="34" charset="0"/>
-                <a:cs typeface="Segoe UI" pitchFamily="34" charset="0"/>
-              </a:rPr>
-              <a:t> </a:t>
-            </a:r>
-            <a:r>
-              <a:rPr lang="pt-BR" dirty="0" err="1" smtClean="0">
-                <a:latin typeface="Segoe UI" pitchFamily="34" charset="0"/>
-                <a:ea typeface="Segoe UI" pitchFamily="34" charset="0"/>
-                <a:cs typeface="Segoe UI" pitchFamily="34" charset="0"/>
-              </a:rPr>
-              <a:t>backlog</a:t>
-            </a:r>
-            <a:endParaRPr lang="pt-BR" dirty="0" smtClean="0">
-              <a:latin typeface="Segoe UI" pitchFamily="34" charset="0"/>
-              <a:ea typeface="Segoe UI" pitchFamily="34" charset="0"/>
-              <a:cs typeface="Segoe UI" pitchFamily="34" charset="0"/>
-            </a:endParaRPr>
-          </a:p>
-          <a:p>
-            <a:pPr lvl="1">
-              <a:buNone/>
-            </a:pPr>
-            <a:r>
-              <a:rPr lang="pt-BR" dirty="0" smtClean="0">
-                <a:latin typeface="Segoe UI" pitchFamily="34" charset="0"/>
-                <a:ea typeface="Segoe UI" pitchFamily="34" charset="0"/>
-                <a:cs typeface="Segoe UI" pitchFamily="34" charset="0"/>
-              </a:rPr>
-              <a:t>Gerenciamento do projeto/</a:t>
-            </a:r>
-            <a:r>
-              <a:rPr lang="pt-BR" dirty="0" err="1" smtClean="0">
-                <a:latin typeface="Segoe UI" pitchFamily="34" charset="0"/>
-                <a:ea typeface="Segoe UI" pitchFamily="34" charset="0"/>
-                <a:cs typeface="Segoe UI" pitchFamily="34" charset="0"/>
-              </a:rPr>
-              <a:t>kanban</a:t>
-            </a:r>
-            <a:endParaRPr lang="pt-BR" dirty="0" smtClean="0">
-              <a:latin typeface="Segoe UI" pitchFamily="34" charset="0"/>
-              <a:ea typeface="Segoe UI" pitchFamily="34" charset="0"/>
-              <a:cs typeface="Segoe UI" pitchFamily="34" charset="0"/>
-            </a:endParaRPr>
-          </a:p>
-          <a:p>
-            <a:pPr lvl="1">
-              <a:buNone/>
-            </a:pPr>
-            <a:r>
-              <a:rPr lang="pt-BR" dirty="0" smtClean="0">
-                <a:latin typeface="Segoe UI" pitchFamily="34" charset="0"/>
-                <a:ea typeface="Segoe UI" pitchFamily="34" charset="0"/>
-                <a:cs typeface="Segoe UI" pitchFamily="34" charset="0"/>
-              </a:rPr>
-              <a:t>Modelo </a:t>
-            </a:r>
-            <a:r>
-              <a:rPr lang="pt-BR" dirty="0" smtClean="0">
-                <a:latin typeface="Segoe UI" pitchFamily="34" charset="0"/>
-                <a:ea typeface="Segoe UI" pitchFamily="34" charset="0"/>
-                <a:cs typeface="Segoe UI" pitchFamily="34" charset="0"/>
-              </a:rPr>
-              <a:t>ER</a:t>
-            </a:r>
-          </a:p>
-          <a:p>
-            <a:pPr lvl="1">
-              <a:buNone/>
-            </a:pPr>
-            <a:r>
-              <a:rPr lang="pt-BR" dirty="0" smtClean="0">
-                <a:latin typeface="Segoe UI" pitchFamily="34" charset="0"/>
-                <a:ea typeface="Segoe UI" pitchFamily="34" charset="0"/>
-                <a:cs typeface="Segoe UI" pitchFamily="34" charset="0"/>
-              </a:rPr>
-              <a:t>Protótipos de interface</a:t>
-            </a:r>
-            <a:endParaRPr lang="pt-BR" b="1" dirty="0">
-              <a:latin typeface="Segoe UI" pitchFamily="34" charset="0"/>
-              <a:ea typeface="Segoe UI" pitchFamily="34" charset="0"/>
-              <a:cs typeface="Segoe UI" pitchFamily="34" charset="0"/>
-            </a:endParaRPr>
-          </a:p>
-        </p:txBody>
-      </p:sp>
-    </p:spTree>
-  </p:cSld>
-  <p:clrMapOvr>
-    <a:masterClrMapping/>
-  </p:clrMapOvr>
-  <p:timing>
-    <p:tnLst>
-      <p:par>
-        <p:cTn id="1" dur="indefinite" restart="never" nodeType="tmRoot"/>
-      </p:par>
-    </p:tnLst>
-  </p:timing>
-</p:sld>
-</file>
-
-<file path=ppt/slides/slide16.xml><?xml version="1.0" encoding="utf-8"?>
-<p:sld xmlns:a="http://schemas.openxmlformats.org/drawingml/2006/main" xmlns:r="http://schemas.openxmlformats.org/officeDocument/2006/relationships" xmlns:p="http://schemas.openxmlformats.org/presentationml/2006/main">
-  <p:cSld>
-    <p:spTree>
-      <p:nvGrpSpPr>
-        <p:cNvPr id="1" name=""/>
-        <p:cNvGrpSpPr/>
-        <p:nvPr/>
-      </p:nvGrpSpPr>
-      <p:grpSpPr>
-        <a:xfrm>
-          <a:off x="0" y="0"/>
-          <a:ext cx="0" cy="0"/>
-          <a:chOff x="0" y="0"/>
-          <a:chExt cx="0" cy="0"/>
-        </a:xfrm>
-      </p:grpSpPr>
-      <p:sp>
-        <p:nvSpPr>
-          <p:cNvPr id="2" name="Título 1"/>
-          <p:cNvSpPr>
-            <a:spLocks noGrp="1"/>
-          </p:cNvSpPr>
-          <p:nvPr>
-            <p:ph type="title"/>
-          </p:nvPr>
-        </p:nvSpPr>
-        <p:spPr>
-          <a:xfrm>
-            <a:off x="683568" y="476672"/>
-            <a:ext cx="8229600" cy="1143000"/>
-          </a:xfrm>
-        </p:spPr>
-        <p:txBody>
-          <a:bodyPr>
-            <a:noAutofit/>
-          </a:bodyPr>
-          <a:lstStyle/>
-          <a:p>
-            <a:r>
-              <a:rPr lang="pt-BR" sz="4000" dirty="0" smtClean="0">
-                <a:latin typeface="Segoe UI" pitchFamily="34" charset="0"/>
-                <a:ea typeface="Segoe UI" pitchFamily="34" charset="0"/>
-                <a:cs typeface="Segoe UI" pitchFamily="34" charset="0"/>
-              </a:rPr>
-              <a:t>Arquitetura do Sistema</a:t>
-            </a:r>
-            <a:endParaRPr lang="pt-BR" sz="4000" dirty="0">
-              <a:latin typeface="Segoe UI" pitchFamily="34" charset="0"/>
-              <a:ea typeface="Segoe UI" pitchFamily="34" charset="0"/>
-              <a:cs typeface="Segoe UI" pitchFamily="34" charset="0"/>
-            </a:endParaRPr>
-          </a:p>
-        </p:txBody>
-      </p:sp>
-    </p:spTree>
-  </p:cSld>
-  <p:clrMapOvr>
-    <a:masterClrMapping/>
-  </p:clrMapOvr>
-  <p:timing>
-    <p:tnLst>
-      <p:par>
-        <p:cTn id="1" dur="indefinite" restart="never" nodeType="tmRoot"/>
-      </p:par>
-    </p:tnLst>
-  </p:timing>
-</p:sld>
-</file>
-
-<file path=ppt/slides/slide17.xml><?xml version="1.0" encoding="utf-8"?>
 <p:sld xmlns:a="http://schemas.openxmlformats.org/drawingml/2006/main" xmlns:r="http://schemas.openxmlformats.org/officeDocument/2006/relationships" xmlns:p="http://schemas.openxmlformats.org/presentationml/2006/main">
   <p:cSld>
     <p:spTree>
@@ -6335,7 +5922,7 @@
 </p:sld>
 </file>
 
-<file path=ppt/slides/slide18.xml><?xml version="1.0" encoding="utf-8"?>
+<file path=ppt/slides/slide16.xml><?xml version="1.0" encoding="utf-8"?>
 <p:sld xmlns:a="http://schemas.openxmlformats.org/drawingml/2006/main" xmlns:r="http://schemas.openxmlformats.org/officeDocument/2006/relationships" xmlns:p="http://schemas.openxmlformats.org/presentationml/2006/main">
   <p:cSld>
     <p:spTree>
@@ -6419,10 +6006,17 @@
   <p:clrMapOvr>
     <a:masterClrMapping/>
   </p:clrMapOvr>
+  <p:timing>
+    <p:tnLst>
+      <p:par>
+        <p:cTn id="1" dur="indefinite" restart="never" nodeType="tmRoot"/>
+      </p:par>
+    </p:tnLst>
+  </p:timing>
 </p:sld>
 </file>
 
-<file path=ppt/slides/slide19.xml><?xml version="1.0" encoding="utf-8"?>
+<file path=ppt/slides/slide17.xml><?xml version="1.0" encoding="utf-8"?>
 <p:sld xmlns:a="http://schemas.openxmlformats.org/drawingml/2006/main" xmlns:r="http://schemas.openxmlformats.org/officeDocument/2006/relationships" xmlns:p="http://schemas.openxmlformats.org/presentationml/2006/main">
   <p:cSld>
     <p:spTree>
@@ -6501,6 +6095,191 @@
   <p:clrMapOvr>
     <a:masterClrMapping/>
   </p:clrMapOvr>
+  <p:timing>
+    <p:tnLst>
+      <p:par>
+        <p:cTn id="1" dur="indefinite" restart="never" nodeType="tmRoot"/>
+      </p:par>
+    </p:tnLst>
+  </p:timing>
+</p:sld>
+</file>
+
+<file path=ppt/slides/slide18.xml><?xml version="1.0" encoding="utf-8"?>
+<p:sld xmlns:a="http://schemas.openxmlformats.org/drawingml/2006/main" xmlns:r="http://schemas.openxmlformats.org/officeDocument/2006/relationships" xmlns:p="http://schemas.openxmlformats.org/presentationml/2006/main">
+  <p:cSld>
+    <p:spTree>
+      <p:nvGrpSpPr>
+        <p:cNvPr id="1" name=""/>
+        <p:cNvGrpSpPr/>
+        <p:nvPr/>
+      </p:nvGrpSpPr>
+      <p:grpSpPr>
+        <a:xfrm>
+          <a:off x="0" y="0"/>
+          <a:ext cx="0" cy="0"/>
+          <a:chOff x="0" y="0"/>
+          <a:chExt cx="0" cy="0"/>
+        </a:xfrm>
+      </p:grpSpPr>
+      <p:sp>
+        <p:nvSpPr>
+          <p:cNvPr id="2" name="Título 1"/>
+          <p:cNvSpPr>
+            <a:spLocks noGrp="1"/>
+          </p:cNvSpPr>
+          <p:nvPr>
+            <p:ph type="title"/>
+          </p:nvPr>
+        </p:nvSpPr>
+        <p:spPr/>
+        <p:txBody>
+          <a:bodyPr/>
+          <a:lstStyle/>
+          <a:p>
+            <a:r>
+              <a:rPr lang="pt-BR" dirty="0" smtClean="0">
+                <a:latin typeface="Segoe UI" pitchFamily="34" charset="0"/>
+                <a:ea typeface="Segoe UI" pitchFamily="34" charset="0"/>
+                <a:cs typeface="Segoe UI" pitchFamily="34" charset="0"/>
+              </a:rPr>
+              <a:t>Modelo ER</a:t>
+            </a:r>
+            <a:endParaRPr lang="pt-BR" dirty="0">
+              <a:latin typeface="Segoe UI" pitchFamily="34" charset="0"/>
+              <a:ea typeface="Segoe UI" pitchFamily="34" charset="0"/>
+              <a:cs typeface="Segoe UI" pitchFamily="34" charset="0"/>
+            </a:endParaRPr>
+          </a:p>
+        </p:txBody>
+      </p:sp>
+      <p:pic>
+        <p:nvPicPr>
+          <p:cNvPr id="5122" name="Picture 2" descr="C:\Users\Adriano\Documents\GitHub\Kcal-Control\Diagrama ER\Diagramas\Kcal-Control_Diagrama_ER_versao_1.png"/>
+          <p:cNvPicPr>
+            <a:picLocks noChangeAspect="1" noChangeArrowheads="1"/>
+          </p:cNvPicPr>
+          <p:nvPr/>
+        </p:nvPicPr>
+        <p:blipFill>
+          <a:blip r:embed="rId2" cstate="print"/>
+          <a:srcRect/>
+          <a:stretch>
+            <a:fillRect/>
+          </a:stretch>
+        </p:blipFill>
+        <p:spPr bwMode="auto">
+          <a:xfrm>
+            <a:off x="395536" y="2348880"/>
+            <a:ext cx="8572500" cy="2952750"/>
+          </a:xfrm>
+          <a:prstGeom prst="rect">
+            <a:avLst/>
+          </a:prstGeom>
+          <a:noFill/>
+        </p:spPr>
+      </p:pic>
+    </p:spTree>
+  </p:cSld>
+  <p:clrMapOvr>
+    <a:masterClrMapping/>
+  </p:clrMapOvr>
+  <p:timing>
+    <p:tnLst>
+      <p:par>
+        <p:cTn id="1" dur="indefinite" restart="never" nodeType="tmRoot"/>
+      </p:par>
+    </p:tnLst>
+  </p:timing>
+</p:sld>
+</file>
+
+<file path=ppt/slides/slide19.xml><?xml version="1.0" encoding="utf-8"?>
+<p:sld xmlns:a="http://schemas.openxmlformats.org/drawingml/2006/main" xmlns:r="http://schemas.openxmlformats.org/officeDocument/2006/relationships" xmlns:p="http://schemas.openxmlformats.org/presentationml/2006/main">
+  <p:cSld>
+    <p:spTree>
+      <p:nvGrpSpPr>
+        <p:cNvPr id="1" name=""/>
+        <p:cNvGrpSpPr/>
+        <p:nvPr/>
+      </p:nvGrpSpPr>
+      <p:grpSpPr>
+        <a:xfrm>
+          <a:off x="0" y="0"/>
+          <a:ext cx="0" cy="0"/>
+          <a:chOff x="0" y="0"/>
+          <a:chExt cx="0" cy="0"/>
+        </a:xfrm>
+      </p:grpSpPr>
+      <p:sp>
+        <p:nvSpPr>
+          <p:cNvPr id="2" name="Título 1"/>
+          <p:cNvSpPr>
+            <a:spLocks noGrp="1"/>
+          </p:cNvSpPr>
+          <p:nvPr>
+            <p:ph type="title"/>
+          </p:nvPr>
+        </p:nvSpPr>
+        <p:spPr/>
+        <p:txBody>
+          <a:bodyPr/>
+          <a:lstStyle/>
+          <a:p>
+            <a:r>
+              <a:rPr lang="pt-BR" dirty="0" smtClean="0">
+                <a:latin typeface="Segoe UI" pitchFamily="34" charset="0"/>
+                <a:ea typeface="Segoe UI" pitchFamily="34" charset="0"/>
+                <a:cs typeface="Segoe UI" pitchFamily="34" charset="0"/>
+              </a:rPr>
+              <a:t>Protótipos de interface</a:t>
+            </a:r>
+            <a:endParaRPr lang="pt-BR" dirty="0">
+              <a:latin typeface="Segoe UI" pitchFamily="34" charset="0"/>
+              <a:ea typeface="Segoe UI" pitchFamily="34" charset="0"/>
+              <a:cs typeface="Segoe UI" pitchFamily="34" charset="0"/>
+            </a:endParaRPr>
+          </a:p>
+        </p:txBody>
+      </p:sp>
+      <p:pic>
+        <p:nvPicPr>
+          <p:cNvPr id="6148" name="Picture 4" descr="C:\Users\Adriano\Desktop\prot1.jpg"/>
+          <p:cNvPicPr>
+            <a:picLocks noChangeAspect="1" noChangeArrowheads="1"/>
+          </p:cNvPicPr>
+          <p:nvPr/>
+        </p:nvPicPr>
+        <p:blipFill>
+          <a:blip r:embed="rId2" cstate="print"/>
+          <a:srcRect/>
+          <a:stretch>
+            <a:fillRect/>
+          </a:stretch>
+        </p:blipFill>
+        <p:spPr bwMode="auto">
+          <a:xfrm>
+            <a:off x="1331640" y="1484784"/>
+            <a:ext cx="6439644" cy="4974941"/>
+          </a:xfrm>
+          <a:prstGeom prst="rect">
+            <a:avLst/>
+          </a:prstGeom>
+          <a:noFill/>
+        </p:spPr>
+      </p:pic>
+    </p:spTree>
+  </p:cSld>
+  <p:clrMapOvr>
+    <a:masterClrMapping/>
+  </p:clrMapOvr>
+  <p:timing>
+    <p:tnLst>
+      <p:par>
+        <p:cTn id="1" dur="indefinite" restart="never" nodeType="tmRoot"/>
+      </p:par>
+    </p:tnLst>
+  </p:timing>
 </p:sld>
 </file>
 
@@ -6568,7 +6347,7 @@
         <p:spPr/>
         <p:txBody>
           <a:bodyPr>
-            <a:normAutofit fontScale="92500" lnSpcReduction="10000"/>
+            <a:normAutofit/>
           </a:bodyPr>
           <a:lstStyle/>
           <a:p>
@@ -6592,11 +6371,46 @@
             </a:r>
             <a:r>
               <a:rPr lang="pt-BR" dirty="0" smtClean="0"/>
-              <a:t>– Sem experiência na área. </a:t>
+              <a:t>–Função </a:t>
+            </a:r>
+            <a:r>
+              <a:rPr lang="pt-BR" dirty="0"/>
+              <a:t>na equipe: </a:t>
             </a:r>
             <a:endParaRPr lang="pt-BR" dirty="0" smtClean="0"/>
           </a:p>
           <a:p>
+            <a:pPr lvl="1"/>
+            <a:r>
+              <a:rPr lang="pt-BR" dirty="0" err="1" smtClean="0"/>
+              <a:t>Product</a:t>
+            </a:r>
+            <a:r>
+              <a:rPr lang="pt-BR" dirty="0" smtClean="0"/>
+              <a:t> </a:t>
+            </a:r>
+            <a:r>
+              <a:rPr lang="pt-BR" dirty="0" err="1" smtClean="0"/>
+              <a:t>Owner</a:t>
+            </a:r>
+            <a:r>
+              <a:rPr lang="pt-BR" dirty="0" smtClean="0"/>
+              <a:t> e </a:t>
+            </a:r>
+            <a:r>
+              <a:rPr lang="pt-BR" dirty="0"/>
+              <a:t>Desenvolvedor</a:t>
+            </a:r>
+          </a:p>
+          <a:p>
+            <a:r>
+              <a:rPr lang="pt-BR" b="1" dirty="0"/>
+              <a:t>Bruno Macedo </a:t>
+            </a:r>
+            <a:r>
+              <a:rPr lang="pt-BR" dirty="0"/>
+              <a:t>- </a:t>
+            </a:r>
             <a:r>
               <a:rPr lang="pt-BR" dirty="0" smtClean="0"/>
               <a:t>Função </a:t>
@@ -6605,21 +6419,62 @@
               <a:rPr lang="pt-BR" dirty="0"/>
               <a:t>na equipe: </a:t>
             </a:r>
+            <a:endParaRPr lang="pt-BR" dirty="0" smtClean="0"/>
+          </a:p>
+          <a:p>
+            <a:pPr lvl="1"/>
             <a:r>
               <a:rPr lang="pt-BR" dirty="0" err="1" smtClean="0"/>
-              <a:t>Product</a:t>
+              <a:t>Scrum</a:t>
             </a:r>
             <a:r>
               <a:rPr lang="pt-BR" dirty="0" smtClean="0"/>
               <a:t> </a:t>
             </a:r>
             <a:r>
-              <a:rPr lang="pt-BR" dirty="0" err="1" smtClean="0"/>
-              <a:t>Owner</a:t>
+              <a:rPr lang="pt-BR" dirty="0"/>
+              <a:t>Master, Desenvolvedor</a:t>
+            </a:r>
+          </a:p>
+          <a:p>
+            <a:r>
+              <a:rPr lang="pt-BR" b="1" dirty="0" err="1"/>
+              <a:t>Tailor</a:t>
+            </a:r>
+            <a:r>
+              <a:rPr lang="pt-BR" b="1" dirty="0"/>
+              <a:t> </a:t>
+            </a:r>
+            <a:r>
+              <a:rPr lang="pt-BR" b="1" dirty="0" err="1"/>
+              <a:t>Figueiro</a:t>
+            </a:r>
+            <a:r>
+              <a:rPr lang="pt-BR" b="1" dirty="0"/>
+              <a:t> </a:t>
+            </a:r>
+            <a:r>
+              <a:rPr lang="pt-BR" dirty="0"/>
+              <a:t>- </a:t>
             </a:r>
             <a:r>
               <a:rPr lang="pt-BR" dirty="0" smtClean="0"/>
-              <a:t> e </a:t>
+              <a:t>Função </a:t>
+            </a:r>
+            <a:r>
+              <a:rPr lang="pt-BR" dirty="0"/>
+              <a:t>na equipe</a:t>
+            </a:r>
+            <a:r>
+              <a:rPr lang="pt-BR" dirty="0" smtClean="0"/>
+              <a:t>:</a:t>
+            </a:r>
+          </a:p>
+          <a:p>
+            <a:pPr lvl="1"/>
+            <a:r>
+              <a:rPr lang="pt-BR" dirty="0" smtClean="0"/>
+              <a:t> </a:t>
             </a:r>
             <a:r>
               <a:rPr lang="pt-BR" dirty="0"/>
@@ -6629,111 +6484,27 @@
           <a:p>
             <a:r>
               <a:rPr lang="pt-BR" b="1" dirty="0"/>
-              <a:t>Bruno Macedo </a:t>
-            </a:r>
-            <a:r>
-              <a:rPr lang="pt-BR" dirty="0"/>
-              <a:t>- -- .</a:t>
-            </a:r>
-            <a:endParaRPr lang="pt-BR" dirty="0" smtClean="0"/>
-          </a:p>
-          <a:p>
-            <a:pPr>
-              <a:buNone/>
-            </a:pPr>
+              <a:t>Leon Dias </a:t>
+            </a:r>
             <a:r>
               <a:rPr lang="pt-BR" dirty="0" smtClean="0"/>
-              <a:t>	Função </a:t>
+              <a:t>–Função </a:t>
             </a:r>
             <a:r>
               <a:rPr lang="pt-BR" dirty="0"/>
               <a:t>na equipe: </a:t>
             </a:r>
-            <a:r>
-              <a:rPr lang="pt-BR" dirty="0" err="1"/>
-              <a:t>Scrum</a:t>
-            </a:r>
-            <a:r>
-              <a:rPr lang="pt-BR" dirty="0"/>
-              <a:t> </a:t>
-            </a:r>
-            <a:r>
-              <a:rPr lang="pt-BR" dirty="0" err="1"/>
-              <a:t>Master</a:t>
-            </a:r>
-            <a:r>
-              <a:rPr lang="pt-BR" dirty="0"/>
-              <a:t>, Desenvolvedor</a:t>
-            </a:r>
-          </a:p>
-          <a:p>
-            <a:r>
-              <a:rPr lang="pt-BR" b="1" dirty="0" err="1"/>
-              <a:t>Tailor</a:t>
-            </a:r>
-            <a:r>
-              <a:rPr lang="pt-BR" b="1" dirty="0"/>
-              <a:t> </a:t>
-            </a:r>
-            <a:r>
-              <a:rPr lang="pt-BR" b="1" dirty="0" err="1"/>
-              <a:t>Figueiro</a:t>
-            </a:r>
-            <a:r>
-              <a:rPr lang="pt-BR" b="1" dirty="0"/>
-              <a:t> </a:t>
-            </a:r>
-            <a:r>
-              <a:rPr lang="pt-BR" dirty="0"/>
-              <a:t>- </a:t>
-            </a:r>
+            <a:endParaRPr lang="pt-BR" dirty="0" smtClean="0"/>
+          </a:p>
+          <a:p>
+            <a:pPr lvl="1"/>
             <a:r>
               <a:rPr lang="pt-BR" dirty="0" smtClean="0"/>
-              <a:t>--. </a:t>
-            </a:r>
-          </a:p>
-          <a:p>
-            <a:pPr>
-              <a:buNone/>
-            </a:pPr>
-            <a:r>
-              <a:rPr lang="pt-BR" dirty="0"/>
-              <a:t>	</a:t>
+              <a:t>Desenvolvedor</a:t>
             </a:r>
             <a:r>
               <a:rPr lang="pt-BR" dirty="0" smtClean="0"/>
-              <a:t>Função </a:t>
-            </a:r>
-            <a:r>
-              <a:rPr lang="pt-BR" dirty="0"/>
-              <a:t>na equipe: Desenvolvedor</a:t>
-            </a:r>
-          </a:p>
-          <a:p>
-            <a:r>
-              <a:rPr lang="pt-BR" b="1" dirty="0"/>
-              <a:t>Leon Dias </a:t>
-            </a:r>
-            <a:r>
-              <a:rPr lang="pt-BR" dirty="0" smtClean="0"/>
-              <a:t>– Experiência em Banco de Dados. </a:t>
-            </a:r>
-          </a:p>
-          <a:p>
-            <a:pPr>
-              <a:buNone/>
-            </a:pPr>
-            <a:r>
-              <a:rPr lang="pt-BR" dirty="0" smtClean="0"/>
-              <a:t>	Função </a:t>
-            </a:r>
-            <a:r>
-              <a:rPr lang="pt-BR" dirty="0"/>
-              <a:t>na equipe: </a:t>
-            </a:r>
-            <a:r>
-              <a:rPr lang="pt-BR" dirty="0" smtClean="0"/>
-              <a:t>Desenvolvedor.</a:t>
+              <a:t>.</a:t>
             </a:r>
             <a:endParaRPr lang="pt-BR" dirty="0"/>
           </a:p>
@@ -6795,170 +6566,6 @@
                 <a:ea typeface="Segoe UI" pitchFamily="34" charset="0"/>
                 <a:cs typeface="Segoe UI" pitchFamily="34" charset="0"/>
               </a:rPr>
-              <a:t>Modelo ER</a:t>
-            </a:r>
-            <a:endParaRPr lang="pt-BR" dirty="0">
-              <a:latin typeface="Segoe UI" pitchFamily="34" charset="0"/>
-              <a:ea typeface="Segoe UI" pitchFamily="34" charset="0"/>
-              <a:cs typeface="Segoe UI" pitchFamily="34" charset="0"/>
-            </a:endParaRPr>
-          </a:p>
-        </p:txBody>
-      </p:sp>
-      <p:pic>
-        <p:nvPicPr>
-          <p:cNvPr id="5122" name="Picture 2" descr="C:\Users\Adriano\Documents\GitHub\Kcal-Control\Diagrama ER\Diagramas\Kcal-Control_Diagrama_ER_versao_1.png"/>
-          <p:cNvPicPr>
-            <a:picLocks noChangeAspect="1" noChangeArrowheads="1"/>
-          </p:cNvPicPr>
-          <p:nvPr/>
-        </p:nvPicPr>
-        <p:blipFill>
-          <a:blip r:embed="rId2" cstate="print"/>
-          <a:srcRect/>
-          <a:stretch>
-            <a:fillRect/>
-          </a:stretch>
-        </p:blipFill>
-        <p:spPr bwMode="auto">
-          <a:xfrm>
-            <a:off x="395536" y="2348880"/>
-            <a:ext cx="8572500" cy="2952750"/>
-          </a:xfrm>
-          <a:prstGeom prst="rect">
-            <a:avLst/>
-          </a:prstGeom>
-          <a:noFill/>
-        </p:spPr>
-      </p:pic>
-    </p:spTree>
-  </p:cSld>
-  <p:clrMapOvr>
-    <a:masterClrMapping/>
-  </p:clrMapOvr>
-</p:sld>
-</file>
-
-<file path=ppt/slides/slide21.xml><?xml version="1.0" encoding="utf-8"?>
-<p:sld xmlns:a="http://schemas.openxmlformats.org/drawingml/2006/main" xmlns:r="http://schemas.openxmlformats.org/officeDocument/2006/relationships" xmlns:p="http://schemas.openxmlformats.org/presentationml/2006/main">
-  <p:cSld>
-    <p:spTree>
-      <p:nvGrpSpPr>
-        <p:cNvPr id="1" name=""/>
-        <p:cNvGrpSpPr/>
-        <p:nvPr/>
-      </p:nvGrpSpPr>
-      <p:grpSpPr>
-        <a:xfrm>
-          <a:off x="0" y="0"/>
-          <a:ext cx="0" cy="0"/>
-          <a:chOff x="0" y="0"/>
-          <a:chExt cx="0" cy="0"/>
-        </a:xfrm>
-      </p:grpSpPr>
-      <p:sp>
-        <p:nvSpPr>
-          <p:cNvPr id="2" name="Título 1"/>
-          <p:cNvSpPr>
-            <a:spLocks noGrp="1"/>
-          </p:cNvSpPr>
-          <p:nvPr>
-            <p:ph type="title"/>
-          </p:nvPr>
-        </p:nvSpPr>
-        <p:spPr/>
-        <p:txBody>
-          <a:bodyPr/>
-          <a:lstStyle/>
-          <a:p>
-            <a:r>
-              <a:rPr lang="pt-BR" dirty="0" smtClean="0">
-                <a:latin typeface="Segoe UI" pitchFamily="34" charset="0"/>
-                <a:ea typeface="Segoe UI" pitchFamily="34" charset="0"/>
-                <a:cs typeface="Segoe UI" pitchFamily="34" charset="0"/>
-              </a:rPr>
-              <a:t>Protótipos de interface</a:t>
-            </a:r>
-            <a:endParaRPr lang="pt-BR" dirty="0">
-              <a:latin typeface="Segoe UI" pitchFamily="34" charset="0"/>
-              <a:ea typeface="Segoe UI" pitchFamily="34" charset="0"/>
-              <a:cs typeface="Segoe UI" pitchFamily="34" charset="0"/>
-            </a:endParaRPr>
-          </a:p>
-        </p:txBody>
-      </p:sp>
-      <p:pic>
-        <p:nvPicPr>
-          <p:cNvPr id="6148" name="Picture 4" descr="C:\Users\Adriano\Desktop\prot1.jpg"/>
-          <p:cNvPicPr>
-            <a:picLocks noChangeAspect="1" noChangeArrowheads="1"/>
-          </p:cNvPicPr>
-          <p:nvPr/>
-        </p:nvPicPr>
-        <p:blipFill>
-          <a:blip r:embed="rId2" cstate="print"/>
-          <a:srcRect/>
-          <a:stretch>
-            <a:fillRect/>
-          </a:stretch>
-        </p:blipFill>
-        <p:spPr bwMode="auto">
-          <a:xfrm>
-            <a:off x="1331640" y="1484784"/>
-            <a:ext cx="6439644" cy="4974941"/>
-          </a:xfrm>
-          <a:prstGeom prst="rect">
-            <a:avLst/>
-          </a:prstGeom>
-          <a:noFill/>
-        </p:spPr>
-      </p:pic>
-    </p:spTree>
-  </p:cSld>
-  <p:clrMapOvr>
-    <a:masterClrMapping/>
-  </p:clrMapOvr>
-</p:sld>
-</file>
-
-<file path=ppt/slides/slide22.xml><?xml version="1.0" encoding="utf-8"?>
-<p:sld xmlns:a="http://schemas.openxmlformats.org/drawingml/2006/main" xmlns:r="http://schemas.openxmlformats.org/officeDocument/2006/relationships" xmlns:p="http://schemas.openxmlformats.org/presentationml/2006/main">
-  <p:cSld>
-    <p:spTree>
-      <p:nvGrpSpPr>
-        <p:cNvPr id="1" name=""/>
-        <p:cNvGrpSpPr/>
-        <p:nvPr/>
-      </p:nvGrpSpPr>
-      <p:grpSpPr>
-        <a:xfrm>
-          <a:off x="0" y="0"/>
-          <a:ext cx="0" cy="0"/>
-          <a:chOff x="0" y="0"/>
-          <a:chExt cx="0" cy="0"/>
-        </a:xfrm>
-      </p:grpSpPr>
-      <p:sp>
-        <p:nvSpPr>
-          <p:cNvPr id="2" name="Título 1"/>
-          <p:cNvSpPr>
-            <a:spLocks noGrp="1"/>
-          </p:cNvSpPr>
-          <p:nvPr>
-            <p:ph type="title"/>
-          </p:nvPr>
-        </p:nvSpPr>
-        <p:spPr/>
-        <p:txBody>
-          <a:bodyPr/>
-          <a:lstStyle/>
-          <a:p>
-            <a:r>
-              <a:rPr lang="pt-BR" dirty="0" smtClean="0">
-                <a:latin typeface="Segoe UI" pitchFamily="34" charset="0"/>
-                <a:ea typeface="Segoe UI" pitchFamily="34" charset="0"/>
-                <a:cs typeface="Segoe UI" pitchFamily="34" charset="0"/>
-              </a:rPr>
               <a:t>Protótipos de interface</a:t>
             </a:r>
             <a:endParaRPr lang="pt-BR" dirty="0">
@@ -7000,10 +6607,17 @@
   <p:clrMapOvr>
     <a:masterClrMapping/>
   </p:clrMapOvr>
+  <p:timing>
+    <p:tnLst>
+      <p:par>
+        <p:cTn id="1" dur="indefinite" restart="never" nodeType="tmRoot"/>
+      </p:par>
+    </p:tnLst>
+  </p:timing>
 </p:sld>
 </file>
 
-<file path=ppt/slides/slide23.xml><?xml version="1.0" encoding="utf-8"?>
+<file path=ppt/slides/slide21.xml><?xml version="1.0" encoding="utf-8"?>
 <p:sld xmlns:a="http://schemas.openxmlformats.org/drawingml/2006/main" xmlns:r="http://schemas.openxmlformats.org/officeDocument/2006/relationships" xmlns:p="http://schemas.openxmlformats.org/presentationml/2006/main">
   <p:cSld>
     <p:spTree>
@@ -7082,10 +6696,17 @@
   <p:clrMapOvr>
     <a:masterClrMapping/>
   </p:clrMapOvr>
+  <p:timing>
+    <p:tnLst>
+      <p:par>
+        <p:cTn id="1" dur="indefinite" restart="never" nodeType="tmRoot"/>
+      </p:par>
+    </p:tnLst>
+  </p:timing>
 </p:sld>
 </file>
 
-<file path=ppt/slides/slide24.xml><?xml version="1.0" encoding="utf-8"?>
+<file path=ppt/slides/slide22.xml><?xml version="1.0" encoding="utf-8"?>
 <p:sld xmlns:a="http://schemas.openxmlformats.org/drawingml/2006/main" xmlns:r="http://schemas.openxmlformats.org/officeDocument/2006/relationships" xmlns:p="http://schemas.openxmlformats.org/presentationml/2006/main">
   <p:cSld>
     <p:spTree>
@@ -7164,10 +6785,17 @@
   <p:clrMapOvr>
     <a:masterClrMapping/>
   </p:clrMapOvr>
+  <p:timing>
+    <p:tnLst>
+      <p:par>
+        <p:cTn id="1" dur="indefinite" restart="never" nodeType="tmRoot"/>
+      </p:par>
+    </p:tnLst>
+  </p:timing>
 </p:sld>
 </file>
 
-<file path=ppt/slides/slide25.xml><?xml version="1.0" encoding="utf-8"?>
+<file path=ppt/slides/slide23.xml><?xml version="1.0" encoding="utf-8"?>
 <p:sld xmlns:a="http://schemas.openxmlformats.org/drawingml/2006/main" xmlns:r="http://schemas.openxmlformats.org/officeDocument/2006/relationships" xmlns:p="http://schemas.openxmlformats.org/presentationml/2006/main">
   <p:cSld>
     <p:spTree>
@@ -7251,6 +6879,499 @@
   <p:clrMapOvr>
     <a:masterClrMapping/>
   </p:clrMapOvr>
+  <p:timing>
+    <p:tnLst>
+      <p:par>
+        <p:cTn id="1" dur="indefinite" restart="never" nodeType="tmRoot"/>
+      </p:par>
+    </p:tnLst>
+  </p:timing>
+</p:sld>
+</file>
+
+<file path=ppt/slides/slide24.xml><?xml version="1.0" encoding="utf-8"?>
+<p:sld xmlns:a="http://schemas.openxmlformats.org/drawingml/2006/main" xmlns:r="http://schemas.openxmlformats.org/officeDocument/2006/relationships" xmlns:p="http://schemas.openxmlformats.org/presentationml/2006/main">
+  <p:cSld>
+    <p:spTree>
+      <p:nvGrpSpPr>
+        <p:cNvPr id="1" name=""/>
+        <p:cNvGrpSpPr/>
+        <p:nvPr/>
+      </p:nvGrpSpPr>
+      <p:grpSpPr>
+        <a:xfrm>
+          <a:off x="0" y="0"/>
+          <a:ext cx="0" cy="0"/>
+          <a:chOff x="0" y="0"/>
+          <a:chExt cx="0" cy="0"/>
+        </a:xfrm>
+      </p:grpSpPr>
+      <p:sp>
+        <p:nvSpPr>
+          <p:cNvPr id="2" name="Título 1"/>
+          <p:cNvSpPr>
+            <a:spLocks noGrp="1"/>
+          </p:cNvSpPr>
+          <p:nvPr>
+            <p:ph type="title"/>
+          </p:nvPr>
+        </p:nvSpPr>
+        <p:spPr>
+          <a:xfrm>
+            <a:off x="683568" y="476672"/>
+            <a:ext cx="8229600" cy="1143000"/>
+          </a:xfrm>
+        </p:spPr>
+        <p:txBody>
+          <a:bodyPr>
+            <a:noAutofit/>
+          </a:bodyPr>
+          <a:lstStyle/>
+          <a:p>
+            <a:r>
+              <a:rPr lang="pt-BR" sz="4000" dirty="0" smtClean="0">
+                <a:latin typeface="Segoe UI" pitchFamily="34" charset="0"/>
+                <a:ea typeface="Segoe UI" pitchFamily="34" charset="0"/>
+                <a:cs typeface="Segoe UI" pitchFamily="34" charset="0"/>
+              </a:rPr>
+              <a:t>Andamento do Projeto</a:t>
+            </a:r>
+            <a:endParaRPr lang="pt-BR" sz="4000" dirty="0">
+              <a:latin typeface="Segoe UI" pitchFamily="34" charset="0"/>
+              <a:ea typeface="Segoe UI" pitchFamily="34" charset="0"/>
+              <a:cs typeface="Segoe UI" pitchFamily="34" charset="0"/>
+            </a:endParaRPr>
+          </a:p>
+        </p:txBody>
+      </p:sp>
+      <p:sp>
+        <p:nvSpPr>
+          <p:cNvPr id="3" name="Espaço Reservado para Conteúdo 2"/>
+          <p:cNvSpPr>
+            <a:spLocks noGrp="1"/>
+          </p:cNvSpPr>
+          <p:nvPr>
+            <p:ph idx="1"/>
+          </p:nvPr>
+        </p:nvSpPr>
+        <p:spPr/>
+        <p:txBody>
+          <a:bodyPr>
+            <a:normAutofit/>
+          </a:bodyPr>
+          <a:lstStyle/>
+          <a:p>
+            <a:pPr>
+              <a:buNone/>
+            </a:pPr>
+            <a:r>
+              <a:rPr lang="pt-BR" sz="3600" b="1" dirty="0" smtClean="0">
+                <a:latin typeface="Segoe UI" pitchFamily="34" charset="0"/>
+                <a:ea typeface="Segoe UI" pitchFamily="34" charset="0"/>
+                <a:cs typeface="Segoe UI" pitchFamily="34" charset="0"/>
+              </a:rPr>
+              <a:t> 	</a:t>
+            </a:r>
+            <a:r>
+              <a:rPr lang="pt-BR" b="1" dirty="0" smtClean="0">
+                <a:latin typeface="Segoe UI" pitchFamily="34" charset="0"/>
+                <a:ea typeface="Segoe UI" pitchFamily="34" charset="0"/>
+                <a:cs typeface="Segoe UI" pitchFamily="34" charset="0"/>
+              </a:rPr>
+              <a:t>Quem fez o que ?</a:t>
+            </a:r>
+          </a:p>
+          <a:p>
+            <a:pPr>
+              <a:buNone/>
+            </a:pPr>
+            <a:endParaRPr lang="pt-BR" b="1" dirty="0" smtClean="0">
+              <a:latin typeface="Segoe UI" pitchFamily="34" charset="0"/>
+              <a:ea typeface="Segoe UI" pitchFamily="34" charset="0"/>
+              <a:cs typeface="Segoe UI" pitchFamily="34" charset="0"/>
+            </a:endParaRPr>
+          </a:p>
+          <a:p>
+            <a:pPr>
+              <a:buNone/>
+            </a:pPr>
+            <a:r>
+              <a:rPr lang="pt-BR" b="1" dirty="0" smtClean="0">
+                <a:latin typeface="Segoe UI" pitchFamily="34" charset="0"/>
+                <a:ea typeface="Segoe UI" pitchFamily="34" charset="0"/>
+                <a:cs typeface="Segoe UI" pitchFamily="34" charset="0"/>
+              </a:rPr>
+              <a:t>Adriano</a:t>
+            </a:r>
+            <a:r>
+              <a:rPr lang="pt-BR" dirty="0" smtClean="0">
+                <a:latin typeface="Segoe UI" pitchFamily="34" charset="0"/>
+                <a:ea typeface="Segoe UI" pitchFamily="34" charset="0"/>
+                <a:cs typeface="Segoe UI" pitchFamily="34" charset="0"/>
+              </a:rPr>
+              <a:t> – </a:t>
+            </a:r>
+            <a:r>
+              <a:rPr lang="pt-BR" dirty="0" err="1" smtClean="0">
+                <a:latin typeface="Segoe UI" pitchFamily="34" charset="0"/>
+                <a:ea typeface="Segoe UI" pitchFamily="34" charset="0"/>
+                <a:cs typeface="Segoe UI" pitchFamily="34" charset="0"/>
+              </a:rPr>
+              <a:t>Backlog</a:t>
+            </a:r>
+            <a:r>
+              <a:rPr lang="pt-BR" dirty="0" smtClean="0">
+                <a:latin typeface="Segoe UI" pitchFamily="34" charset="0"/>
+                <a:ea typeface="Segoe UI" pitchFamily="34" charset="0"/>
+                <a:cs typeface="Segoe UI" pitchFamily="34" charset="0"/>
+              </a:rPr>
+              <a:t> do produto e </a:t>
+            </a:r>
+            <a:r>
+              <a:rPr lang="pt-BR" dirty="0" err="1" smtClean="0">
+                <a:latin typeface="Segoe UI" pitchFamily="34" charset="0"/>
+                <a:ea typeface="Segoe UI" pitchFamily="34" charset="0"/>
+                <a:cs typeface="Segoe UI" pitchFamily="34" charset="0"/>
+              </a:rPr>
+              <a:t>back-end</a:t>
+            </a:r>
+            <a:endParaRPr lang="pt-BR" dirty="0" smtClean="0">
+              <a:latin typeface="Segoe UI" pitchFamily="34" charset="0"/>
+              <a:ea typeface="Segoe UI" pitchFamily="34" charset="0"/>
+              <a:cs typeface="Segoe UI" pitchFamily="34" charset="0"/>
+            </a:endParaRPr>
+          </a:p>
+          <a:p>
+            <a:pPr>
+              <a:buNone/>
+            </a:pPr>
+            <a:r>
+              <a:rPr lang="pt-BR" b="1" dirty="0" smtClean="0">
+                <a:latin typeface="Segoe UI" pitchFamily="34" charset="0"/>
+                <a:ea typeface="Segoe UI" pitchFamily="34" charset="0"/>
+                <a:cs typeface="Segoe UI" pitchFamily="34" charset="0"/>
+              </a:rPr>
+              <a:t>Bruno</a:t>
+            </a:r>
+            <a:r>
+              <a:rPr lang="pt-BR" dirty="0" smtClean="0">
+                <a:latin typeface="Segoe UI" pitchFamily="34" charset="0"/>
+                <a:ea typeface="Segoe UI" pitchFamily="34" charset="0"/>
+                <a:cs typeface="Segoe UI" pitchFamily="34" charset="0"/>
+              </a:rPr>
+              <a:t> – Front-</a:t>
+            </a:r>
+            <a:r>
+              <a:rPr lang="pt-BR" dirty="0" err="1" smtClean="0">
+                <a:latin typeface="Segoe UI" pitchFamily="34" charset="0"/>
+                <a:ea typeface="Segoe UI" pitchFamily="34" charset="0"/>
+                <a:cs typeface="Segoe UI" pitchFamily="34" charset="0"/>
+              </a:rPr>
+              <a:t>end</a:t>
+            </a:r>
+            <a:r>
+              <a:rPr lang="pt-BR" dirty="0" smtClean="0">
+                <a:latin typeface="Segoe UI" pitchFamily="34" charset="0"/>
+                <a:ea typeface="Segoe UI" pitchFamily="34" charset="0"/>
+                <a:cs typeface="Segoe UI" pitchFamily="34" charset="0"/>
+              </a:rPr>
+              <a:t> e </a:t>
+            </a:r>
+            <a:r>
+              <a:rPr lang="pt-BR" dirty="0" err="1" smtClean="0">
+                <a:latin typeface="Segoe UI" pitchFamily="34" charset="0"/>
+                <a:ea typeface="Segoe UI" pitchFamily="34" charset="0"/>
+                <a:cs typeface="Segoe UI" pitchFamily="34" charset="0"/>
+              </a:rPr>
+              <a:t>back-end</a:t>
+            </a:r>
+            <a:endParaRPr lang="pt-BR" dirty="0" smtClean="0">
+              <a:latin typeface="Segoe UI" pitchFamily="34" charset="0"/>
+              <a:ea typeface="Segoe UI" pitchFamily="34" charset="0"/>
+              <a:cs typeface="Segoe UI" pitchFamily="34" charset="0"/>
+            </a:endParaRPr>
+          </a:p>
+          <a:p>
+            <a:pPr>
+              <a:buNone/>
+            </a:pPr>
+            <a:r>
+              <a:rPr lang="pt-BR" b="1" dirty="0">
+                <a:latin typeface="Segoe UI" pitchFamily="34" charset="0"/>
+                <a:ea typeface="Segoe UI" pitchFamily="34" charset="0"/>
+                <a:cs typeface="Segoe UI" pitchFamily="34" charset="0"/>
+              </a:rPr>
+              <a:t>Leon</a:t>
+            </a:r>
+            <a:r>
+              <a:rPr lang="pt-BR" dirty="0">
+                <a:latin typeface="Segoe UI" pitchFamily="34" charset="0"/>
+                <a:ea typeface="Segoe UI" pitchFamily="34" charset="0"/>
+                <a:cs typeface="Segoe UI" pitchFamily="34" charset="0"/>
+              </a:rPr>
+              <a:t> </a:t>
+            </a:r>
+            <a:r>
+              <a:rPr lang="pt-BR" dirty="0" smtClean="0">
+                <a:latin typeface="Segoe UI" pitchFamily="34" charset="0"/>
+                <a:ea typeface="Segoe UI" pitchFamily="34" charset="0"/>
+                <a:cs typeface="Segoe UI" pitchFamily="34" charset="0"/>
+              </a:rPr>
+              <a:t>– </a:t>
+            </a:r>
+            <a:r>
+              <a:rPr lang="pt-BR" dirty="0" err="1">
+                <a:latin typeface="Segoe UI" pitchFamily="34" charset="0"/>
+                <a:ea typeface="Segoe UI" pitchFamily="34" charset="0"/>
+                <a:cs typeface="Segoe UI" pitchFamily="34" charset="0"/>
+              </a:rPr>
+              <a:t>Backlog</a:t>
+            </a:r>
+            <a:r>
+              <a:rPr lang="pt-BR" dirty="0">
+                <a:latin typeface="Segoe UI" pitchFamily="34" charset="0"/>
+                <a:ea typeface="Segoe UI" pitchFamily="34" charset="0"/>
+                <a:cs typeface="Segoe UI" pitchFamily="34" charset="0"/>
+              </a:rPr>
+              <a:t> do produto </a:t>
+            </a:r>
+            <a:r>
+              <a:rPr lang="pt-BR" dirty="0" smtClean="0">
+                <a:latin typeface="Segoe UI" pitchFamily="34" charset="0"/>
+                <a:ea typeface="Segoe UI" pitchFamily="34" charset="0"/>
+                <a:cs typeface="Segoe UI" pitchFamily="34" charset="0"/>
+              </a:rPr>
+              <a:t>e Banco </a:t>
+            </a:r>
+            <a:r>
+              <a:rPr lang="pt-BR" dirty="0">
+                <a:latin typeface="Segoe UI" pitchFamily="34" charset="0"/>
+                <a:ea typeface="Segoe UI" pitchFamily="34" charset="0"/>
+                <a:cs typeface="Segoe UI" pitchFamily="34" charset="0"/>
+              </a:rPr>
+              <a:t>de </a:t>
+            </a:r>
+            <a:r>
+              <a:rPr lang="pt-BR" dirty="0" smtClean="0">
+                <a:latin typeface="Segoe UI" pitchFamily="34" charset="0"/>
+                <a:ea typeface="Segoe UI" pitchFamily="34" charset="0"/>
+                <a:cs typeface="Segoe UI" pitchFamily="34" charset="0"/>
+              </a:rPr>
+              <a:t>Dados</a:t>
+            </a:r>
+            <a:endParaRPr lang="pt-BR" dirty="0">
+              <a:latin typeface="Segoe UI" pitchFamily="34" charset="0"/>
+              <a:ea typeface="Segoe UI" pitchFamily="34" charset="0"/>
+              <a:cs typeface="Segoe UI" pitchFamily="34" charset="0"/>
+            </a:endParaRPr>
+          </a:p>
+          <a:p>
+            <a:pPr>
+              <a:buNone/>
+            </a:pPr>
+            <a:r>
+              <a:rPr lang="pt-BR" b="1" dirty="0" err="1" smtClean="0">
+                <a:latin typeface="Segoe UI" pitchFamily="34" charset="0"/>
+                <a:ea typeface="Segoe UI" pitchFamily="34" charset="0"/>
+                <a:cs typeface="Segoe UI" pitchFamily="34" charset="0"/>
+              </a:rPr>
+              <a:t>Tailor</a:t>
+            </a:r>
+            <a:r>
+              <a:rPr lang="pt-BR" dirty="0" smtClean="0">
+                <a:latin typeface="Segoe UI" pitchFamily="34" charset="0"/>
+                <a:ea typeface="Segoe UI" pitchFamily="34" charset="0"/>
+                <a:cs typeface="Segoe UI" pitchFamily="34" charset="0"/>
+              </a:rPr>
+              <a:t> – Front-</a:t>
+            </a:r>
+            <a:r>
+              <a:rPr lang="pt-BR" dirty="0" err="1" smtClean="0">
+                <a:latin typeface="Segoe UI" pitchFamily="34" charset="0"/>
+                <a:ea typeface="Segoe UI" pitchFamily="34" charset="0"/>
+                <a:cs typeface="Segoe UI" pitchFamily="34" charset="0"/>
+              </a:rPr>
+              <a:t>end</a:t>
+            </a:r>
+            <a:r>
+              <a:rPr lang="pt-BR" dirty="0" smtClean="0">
+                <a:latin typeface="Segoe UI" pitchFamily="34" charset="0"/>
+                <a:ea typeface="Segoe UI" pitchFamily="34" charset="0"/>
+                <a:cs typeface="Segoe UI" pitchFamily="34" charset="0"/>
+              </a:rPr>
+              <a:t> e </a:t>
+            </a:r>
+            <a:r>
+              <a:rPr lang="pt-BR" dirty="0" err="1" smtClean="0">
+                <a:latin typeface="Segoe UI" pitchFamily="34" charset="0"/>
+                <a:ea typeface="Segoe UI" pitchFamily="34" charset="0"/>
+                <a:cs typeface="Segoe UI" pitchFamily="34" charset="0"/>
+              </a:rPr>
+              <a:t>back-end</a:t>
+            </a:r>
+            <a:endParaRPr lang="pt-BR" dirty="0" smtClean="0">
+              <a:latin typeface="Segoe UI" pitchFamily="34" charset="0"/>
+              <a:ea typeface="Segoe UI" pitchFamily="34" charset="0"/>
+              <a:cs typeface="Segoe UI" pitchFamily="34" charset="0"/>
+            </a:endParaRPr>
+          </a:p>
+        </p:txBody>
+      </p:sp>
+    </p:spTree>
+  </p:cSld>
+  <p:clrMapOvr>
+    <a:masterClrMapping/>
+  </p:clrMapOvr>
+  <p:timing>
+    <p:tnLst>
+      <p:par>
+        <p:cTn id="1" dur="indefinite" restart="never" nodeType="tmRoot"/>
+      </p:par>
+    </p:tnLst>
+  </p:timing>
+</p:sld>
+</file>
+
+<file path=ppt/slides/slide25.xml><?xml version="1.0" encoding="utf-8"?>
+<p:sld xmlns:a="http://schemas.openxmlformats.org/drawingml/2006/main" xmlns:r="http://schemas.openxmlformats.org/officeDocument/2006/relationships" xmlns:p="http://schemas.openxmlformats.org/presentationml/2006/main">
+  <p:cSld>
+    <p:spTree>
+      <p:nvGrpSpPr>
+        <p:cNvPr id="1" name=""/>
+        <p:cNvGrpSpPr/>
+        <p:nvPr/>
+      </p:nvGrpSpPr>
+      <p:grpSpPr>
+        <a:xfrm>
+          <a:off x="0" y="0"/>
+          <a:ext cx="0" cy="0"/>
+          <a:chOff x="0" y="0"/>
+          <a:chExt cx="0" cy="0"/>
+        </a:xfrm>
+      </p:grpSpPr>
+      <p:sp>
+        <p:nvSpPr>
+          <p:cNvPr id="2" name="Título 1"/>
+          <p:cNvSpPr>
+            <a:spLocks noGrp="1"/>
+          </p:cNvSpPr>
+          <p:nvPr>
+            <p:ph type="title"/>
+          </p:nvPr>
+        </p:nvSpPr>
+        <p:spPr>
+          <a:xfrm>
+            <a:off x="683568" y="476672"/>
+            <a:ext cx="8229600" cy="1143000"/>
+          </a:xfrm>
+        </p:spPr>
+        <p:txBody>
+          <a:bodyPr>
+            <a:noAutofit/>
+          </a:bodyPr>
+          <a:lstStyle/>
+          <a:p>
+            <a:r>
+              <a:rPr lang="pt-BR" sz="4000" dirty="0" smtClean="0">
+                <a:latin typeface="Segoe UI" pitchFamily="34" charset="0"/>
+                <a:ea typeface="Segoe UI" pitchFamily="34" charset="0"/>
+                <a:cs typeface="Segoe UI" pitchFamily="34" charset="0"/>
+              </a:rPr>
+              <a:t>Andamento do Projeto</a:t>
+            </a:r>
+            <a:endParaRPr lang="pt-BR" sz="4000" dirty="0">
+              <a:latin typeface="Segoe UI" pitchFamily="34" charset="0"/>
+              <a:ea typeface="Segoe UI" pitchFamily="34" charset="0"/>
+              <a:cs typeface="Segoe UI" pitchFamily="34" charset="0"/>
+            </a:endParaRPr>
+          </a:p>
+        </p:txBody>
+      </p:sp>
+      <p:sp>
+        <p:nvSpPr>
+          <p:cNvPr id="3" name="Espaço Reservado para Conteúdo 2"/>
+          <p:cNvSpPr>
+            <a:spLocks noGrp="1"/>
+          </p:cNvSpPr>
+          <p:nvPr>
+            <p:ph idx="1"/>
+          </p:nvPr>
+        </p:nvSpPr>
+        <p:spPr/>
+        <p:txBody>
+          <a:bodyPr>
+            <a:normAutofit/>
+          </a:bodyPr>
+          <a:lstStyle/>
+          <a:p>
+            <a:pPr>
+              <a:buNone/>
+            </a:pPr>
+            <a:r>
+              <a:rPr lang="pt-BR" sz="3600" b="1" dirty="0" smtClean="0">
+                <a:latin typeface="Segoe UI" pitchFamily="34" charset="0"/>
+                <a:ea typeface="Segoe UI" pitchFamily="34" charset="0"/>
+                <a:cs typeface="Segoe UI" pitchFamily="34" charset="0"/>
+              </a:rPr>
+              <a:t> 	</a:t>
+            </a:r>
+            <a:r>
+              <a:rPr lang="pt-BR" b="1" dirty="0" smtClean="0">
+                <a:latin typeface="Segoe UI" pitchFamily="34" charset="0"/>
+                <a:ea typeface="Segoe UI" pitchFamily="34" charset="0"/>
+                <a:cs typeface="Segoe UI" pitchFamily="34" charset="0"/>
+              </a:rPr>
+              <a:t>Dificuldades superadas?</a:t>
+            </a:r>
+          </a:p>
+          <a:p>
+            <a:pPr>
+              <a:buNone/>
+            </a:pPr>
+            <a:r>
+              <a:rPr lang="pt-BR" dirty="0" smtClean="0">
+                <a:latin typeface="Segoe UI" pitchFamily="34" charset="0"/>
+                <a:ea typeface="Segoe UI" pitchFamily="34" charset="0"/>
+                <a:cs typeface="Segoe UI" pitchFamily="34" charset="0"/>
+              </a:rPr>
+              <a:t>- </a:t>
+            </a:r>
+            <a:r>
+              <a:rPr lang="pt-BR" dirty="0">
+                <a:latin typeface="Segoe UI" pitchFamily="34" charset="0"/>
+                <a:ea typeface="Segoe UI" pitchFamily="34" charset="0"/>
+                <a:cs typeface="Segoe UI" pitchFamily="34" charset="0"/>
+              </a:rPr>
+              <a:t>Inexperiência de desenvolvimento em grupo	</a:t>
+            </a:r>
+          </a:p>
+          <a:p>
+            <a:pPr>
+              <a:buNone/>
+            </a:pPr>
+            <a:r>
+              <a:rPr lang="pt-BR" dirty="0">
+                <a:latin typeface="Segoe UI" pitchFamily="34" charset="0"/>
+                <a:ea typeface="Segoe UI" pitchFamily="34" charset="0"/>
+                <a:cs typeface="Segoe UI" pitchFamily="34" charset="0"/>
+              </a:rPr>
+              <a:t> - Desorganização </a:t>
+            </a:r>
+          </a:p>
+        </p:txBody>
+      </p:sp>
+    </p:spTree>
+  </p:cSld>
+  <p:clrMapOvr>
+    <a:masterClrMapping/>
+  </p:clrMapOvr>
+  <p:timing>
+    <p:tnLst>
+      <p:par>
+        <p:cTn id="1" dur="indefinite" restart="never" nodeType="tmRoot"/>
+      </p:par>
+    </p:tnLst>
+  </p:timing>
 </p:sld>
 </file>
 
@@ -7299,7 +7420,7 @@
                 <a:ea typeface="Segoe UI" pitchFamily="34" charset="0"/>
                 <a:cs typeface="Segoe UI" pitchFamily="34" charset="0"/>
               </a:rPr>
-              <a:t>Andamento do Projeto</a:t>
+              <a:t>Retrospectiva</a:t>
             </a:r>
             <a:endParaRPr lang="pt-BR" sz="4000" dirty="0">
               <a:latin typeface="Segoe UI" pitchFamily="34" charset="0"/>
@@ -7322,7 +7443,7 @@
         <p:spPr/>
         <p:txBody>
           <a:bodyPr>
-            <a:normAutofit/>
+            <a:normAutofit fontScale="85000" lnSpcReduction="20000"/>
           </a:bodyPr>
           <a:lstStyle/>
           <a:p>
@@ -7330,12 +7451,60 @@
               <a:buNone/>
             </a:pPr>
             <a:r>
+              <a:rPr lang="pt-BR" sz="3600" b="1" dirty="0" smtClean="0"/>
+              <a:t>	</a:t>
+            </a:r>
+            <a:r>
               <a:rPr lang="pt-BR" sz="3600" b="1" dirty="0" smtClean="0">
                 <a:latin typeface="Segoe UI" pitchFamily="34" charset="0"/>
                 <a:ea typeface="Segoe UI" pitchFamily="34" charset="0"/>
                 <a:cs typeface="Segoe UI" pitchFamily="34" charset="0"/>
               </a:rPr>
-              <a:t> 	</a:t>
+              <a:t>Retrospectiva:</a:t>
+            </a:r>
+          </a:p>
+          <a:p>
+            <a:pPr>
+              <a:buNone/>
+            </a:pPr>
+            <a:r>
+              <a:rPr lang="pt-BR" sz="3600" b="1" i="1" dirty="0" smtClean="0"/>
+              <a:t>	</a:t>
+            </a:r>
+          </a:p>
+          <a:p>
+            <a:pPr>
+              <a:buNone/>
+            </a:pPr>
+            <a:r>
+              <a:rPr lang="pt-BR" sz="3600" b="1" i="1" dirty="0" smtClean="0"/>
+              <a:t>	 Aspectos positivos: </a:t>
+            </a:r>
+            <a:r>
+              <a:rPr lang="pt-BR" sz="3600" i="1" dirty="0" smtClean="0"/>
+              <a:t>Criatividade, interesse em novas tecnologias, aplicação dos conhecimentos adquiridos até o presente momento, troca de experiências acadêmicas.</a:t>
+            </a:r>
+            <a:endParaRPr lang="pt-BR" sz="3600" b="1" i="1" dirty="0" smtClean="0"/>
+          </a:p>
+          <a:p>
+            <a:pPr>
+              <a:buNone/>
+            </a:pPr>
+            <a:r>
+              <a:rPr lang="pt-BR" sz="3600" b="1" i="1" dirty="0" smtClean="0"/>
+              <a:t>	 Aspectos a melhorar: </a:t>
+            </a:r>
+            <a:r>
+              <a:rPr lang="pt-BR" sz="3600" i="1" dirty="0" smtClean="0"/>
+              <a:t>Comunicação do Grupo, disponibilidade de tempo, foco nos pontos principais do projeto e suas respectivas </a:t>
+            </a:r>
+            <a:r>
+              <a:rPr lang="pt-BR" sz="3600" i="1" dirty="0" smtClean="0"/>
+              <a:t>entregas.</a:t>
+            </a:r>
+            <a:r>
+              <a:rPr lang="pt-BR" sz="3600" b="1" i="1" dirty="0" smtClean="0"/>
+              <a:t> </a:t>
             </a:r>
             <a:r>
               <a:rPr lang="pt-BR" b="1" dirty="0" smtClean="0">
@@ -7343,218 +7512,21 @@
                 <a:ea typeface="Segoe UI" pitchFamily="34" charset="0"/>
                 <a:cs typeface="Segoe UI" pitchFamily="34" charset="0"/>
               </a:rPr>
-              <a:t>Quem fez o que ?</a:t>
+              <a:t>	</a:t>
             </a:r>
           </a:p>
           <a:p>
             <a:pPr>
               <a:buNone/>
             </a:pPr>
-            <a:endParaRPr lang="pt-BR" b="1" dirty="0" smtClean="0">
-              <a:latin typeface="Segoe UI" pitchFamily="34" charset="0"/>
-              <a:ea typeface="Segoe UI" pitchFamily="34" charset="0"/>
-              <a:cs typeface="Segoe UI" pitchFamily="34" charset="0"/>
-            </a:endParaRPr>
-          </a:p>
-          <a:p>
-            <a:pPr>
-              <a:buNone/>
-            </a:pPr>
             <a:r>
               <a:rPr lang="pt-BR" b="1" dirty="0" smtClean="0">
                 <a:latin typeface="Segoe UI" pitchFamily="34" charset="0"/>
                 <a:ea typeface="Segoe UI" pitchFamily="34" charset="0"/>
                 <a:cs typeface="Segoe UI" pitchFamily="34" charset="0"/>
               </a:rPr>
-              <a:t>Adriano</a:t>
-            </a:r>
-            <a:r>
-              <a:rPr lang="pt-BR" dirty="0" smtClean="0">
-                <a:latin typeface="Segoe UI" pitchFamily="34" charset="0"/>
-                <a:ea typeface="Segoe UI" pitchFamily="34" charset="0"/>
-                <a:cs typeface="Segoe UI" pitchFamily="34" charset="0"/>
-              </a:rPr>
-              <a:t> – </a:t>
-            </a:r>
-            <a:r>
-              <a:rPr lang="pt-BR" dirty="0" err="1" smtClean="0">
-                <a:latin typeface="Segoe UI" pitchFamily="34" charset="0"/>
-                <a:ea typeface="Segoe UI" pitchFamily="34" charset="0"/>
-                <a:cs typeface="Segoe UI" pitchFamily="34" charset="0"/>
-              </a:rPr>
-              <a:t>Backlog</a:t>
-            </a:r>
-            <a:r>
-              <a:rPr lang="pt-BR" dirty="0" smtClean="0">
-                <a:latin typeface="Segoe UI" pitchFamily="34" charset="0"/>
-                <a:ea typeface="Segoe UI" pitchFamily="34" charset="0"/>
-                <a:cs typeface="Segoe UI" pitchFamily="34" charset="0"/>
-              </a:rPr>
-              <a:t> do produto e </a:t>
-            </a:r>
-            <a:r>
-              <a:rPr lang="pt-BR" dirty="0" err="1" smtClean="0">
-                <a:latin typeface="Segoe UI" pitchFamily="34" charset="0"/>
-                <a:ea typeface="Segoe UI" pitchFamily="34" charset="0"/>
-                <a:cs typeface="Segoe UI" pitchFamily="34" charset="0"/>
-              </a:rPr>
-              <a:t>back-end</a:t>
-            </a:r>
-            <a:endParaRPr lang="pt-BR" dirty="0" smtClean="0">
-              <a:latin typeface="Segoe UI" pitchFamily="34" charset="0"/>
-              <a:ea typeface="Segoe UI" pitchFamily="34" charset="0"/>
-              <a:cs typeface="Segoe UI" pitchFamily="34" charset="0"/>
-            </a:endParaRPr>
-          </a:p>
-          <a:p>
-            <a:pPr>
-              <a:buNone/>
-            </a:pPr>
-            <a:r>
-              <a:rPr lang="pt-BR" b="1" dirty="0" smtClean="0">
-                <a:latin typeface="Segoe UI" pitchFamily="34" charset="0"/>
-                <a:ea typeface="Segoe UI" pitchFamily="34" charset="0"/>
-                <a:cs typeface="Segoe UI" pitchFamily="34" charset="0"/>
-              </a:rPr>
-              <a:t>Bruno</a:t>
-            </a:r>
-            <a:r>
-              <a:rPr lang="pt-BR" dirty="0" smtClean="0">
-                <a:latin typeface="Segoe UI" pitchFamily="34" charset="0"/>
-                <a:ea typeface="Segoe UI" pitchFamily="34" charset="0"/>
-                <a:cs typeface="Segoe UI" pitchFamily="34" charset="0"/>
-              </a:rPr>
-              <a:t> – Front-</a:t>
-            </a:r>
-            <a:r>
-              <a:rPr lang="pt-BR" dirty="0" err="1" smtClean="0">
-                <a:latin typeface="Segoe UI" pitchFamily="34" charset="0"/>
-                <a:ea typeface="Segoe UI" pitchFamily="34" charset="0"/>
-                <a:cs typeface="Segoe UI" pitchFamily="34" charset="0"/>
-              </a:rPr>
-              <a:t>end</a:t>
-            </a:r>
-            <a:r>
-              <a:rPr lang="pt-BR" dirty="0" smtClean="0">
-                <a:latin typeface="Segoe UI" pitchFamily="34" charset="0"/>
-                <a:ea typeface="Segoe UI" pitchFamily="34" charset="0"/>
-                <a:cs typeface="Segoe UI" pitchFamily="34" charset="0"/>
-              </a:rPr>
-              <a:t> e </a:t>
-            </a:r>
-            <a:r>
-              <a:rPr lang="pt-BR" dirty="0" err="1" smtClean="0">
-                <a:latin typeface="Segoe UI" pitchFamily="34" charset="0"/>
-                <a:ea typeface="Segoe UI" pitchFamily="34" charset="0"/>
-                <a:cs typeface="Segoe UI" pitchFamily="34" charset="0"/>
-              </a:rPr>
-              <a:t>back-end</a:t>
-            </a:r>
-            <a:endParaRPr lang="pt-BR" dirty="0" smtClean="0">
-              <a:latin typeface="Segoe UI" pitchFamily="34" charset="0"/>
-              <a:ea typeface="Segoe UI" pitchFamily="34" charset="0"/>
-              <a:cs typeface="Segoe UI" pitchFamily="34" charset="0"/>
-            </a:endParaRPr>
-          </a:p>
-          <a:p>
-            <a:pPr>
-              <a:buNone/>
-            </a:pPr>
-            <a:r>
-              <a:rPr lang="pt-BR" b="1" dirty="0">
-                <a:latin typeface="Segoe UI" pitchFamily="34" charset="0"/>
-                <a:ea typeface="Segoe UI" pitchFamily="34" charset="0"/>
-                <a:cs typeface="Segoe UI" pitchFamily="34" charset="0"/>
-              </a:rPr>
-              <a:t>Leon</a:t>
-            </a:r>
-            <a:r>
-              <a:rPr lang="pt-BR" dirty="0">
-                <a:latin typeface="Segoe UI" pitchFamily="34" charset="0"/>
-                <a:ea typeface="Segoe UI" pitchFamily="34" charset="0"/>
-                <a:cs typeface="Segoe UI" pitchFamily="34" charset="0"/>
-              </a:rPr>
-              <a:t> </a:t>
-            </a:r>
-            <a:r>
-              <a:rPr lang="pt-BR" dirty="0" smtClean="0">
-                <a:latin typeface="Segoe UI" pitchFamily="34" charset="0"/>
-                <a:ea typeface="Segoe UI" pitchFamily="34" charset="0"/>
-                <a:cs typeface="Segoe UI" pitchFamily="34" charset="0"/>
-              </a:rPr>
-              <a:t>– Banco </a:t>
-            </a:r>
-            <a:r>
-              <a:rPr lang="pt-BR" dirty="0">
-                <a:latin typeface="Segoe UI" pitchFamily="34" charset="0"/>
-                <a:ea typeface="Segoe UI" pitchFamily="34" charset="0"/>
-                <a:cs typeface="Segoe UI" pitchFamily="34" charset="0"/>
-              </a:rPr>
-              <a:t>de </a:t>
-            </a:r>
-            <a:r>
-              <a:rPr lang="pt-BR" dirty="0" smtClean="0">
-                <a:latin typeface="Segoe UI" pitchFamily="34" charset="0"/>
-                <a:ea typeface="Segoe UI" pitchFamily="34" charset="0"/>
-                <a:cs typeface="Segoe UI" pitchFamily="34" charset="0"/>
-              </a:rPr>
-              <a:t>Dados</a:t>
-            </a:r>
-            <a:endParaRPr lang="pt-BR" dirty="0">
-              <a:latin typeface="Segoe UI" pitchFamily="34" charset="0"/>
-              <a:ea typeface="Segoe UI" pitchFamily="34" charset="0"/>
-              <a:cs typeface="Segoe UI" pitchFamily="34" charset="0"/>
-            </a:endParaRPr>
-          </a:p>
-          <a:p>
-            <a:pPr>
-              <a:buNone/>
-            </a:pPr>
-            <a:r>
-              <a:rPr lang="pt-BR" b="1" dirty="0" err="1" smtClean="0">
-                <a:latin typeface="Segoe UI" pitchFamily="34" charset="0"/>
-                <a:ea typeface="Segoe UI" pitchFamily="34" charset="0"/>
-                <a:cs typeface="Segoe UI" pitchFamily="34" charset="0"/>
-              </a:rPr>
-              <a:t>Tailor</a:t>
-            </a:r>
-            <a:r>
-              <a:rPr lang="pt-BR" dirty="0" smtClean="0">
-                <a:latin typeface="Segoe UI" pitchFamily="34" charset="0"/>
-                <a:ea typeface="Segoe UI" pitchFamily="34" charset="0"/>
-                <a:cs typeface="Segoe UI" pitchFamily="34" charset="0"/>
-              </a:rPr>
-              <a:t> – Front-</a:t>
-            </a:r>
-            <a:r>
-              <a:rPr lang="pt-BR" dirty="0" err="1" smtClean="0">
-                <a:latin typeface="Segoe UI" pitchFamily="34" charset="0"/>
-                <a:ea typeface="Segoe UI" pitchFamily="34" charset="0"/>
-                <a:cs typeface="Segoe UI" pitchFamily="34" charset="0"/>
-              </a:rPr>
-              <a:t>end</a:t>
-            </a:r>
-            <a:r>
-              <a:rPr lang="pt-BR" dirty="0" smtClean="0">
-                <a:latin typeface="Segoe UI" pitchFamily="34" charset="0"/>
-                <a:ea typeface="Segoe UI" pitchFamily="34" charset="0"/>
-                <a:cs typeface="Segoe UI" pitchFamily="34" charset="0"/>
-              </a:rPr>
-              <a:t> e </a:t>
-            </a:r>
-            <a:r>
-              <a:rPr lang="pt-BR" dirty="0" err="1" smtClean="0">
-                <a:latin typeface="Segoe UI" pitchFamily="34" charset="0"/>
-                <a:ea typeface="Segoe UI" pitchFamily="34" charset="0"/>
-                <a:cs typeface="Segoe UI" pitchFamily="34" charset="0"/>
-              </a:rPr>
-              <a:t>back-end</a:t>
-            </a:r>
-            <a:endParaRPr lang="pt-BR" dirty="0" smtClean="0">
-              <a:latin typeface="Segoe UI" pitchFamily="34" charset="0"/>
-              <a:ea typeface="Segoe UI" pitchFamily="34" charset="0"/>
-              <a:cs typeface="Segoe UI" pitchFamily="34" charset="0"/>
-            </a:endParaRPr>
+              <a:t>	</a:t>
+            </a:r>
           </a:p>
         </p:txBody>
       </p:sp>
@@ -7618,7 +7590,7 @@
                 <a:ea typeface="Segoe UI" pitchFamily="34" charset="0"/>
                 <a:cs typeface="Segoe UI" pitchFamily="34" charset="0"/>
               </a:rPr>
-              <a:t>Andamento do Projeto</a:t>
+              <a:t>Próximas ações</a:t>
             </a:r>
             <a:endParaRPr lang="pt-BR" sz="4000" dirty="0">
               <a:latin typeface="Segoe UI" pitchFamily="34" charset="0"/>
@@ -7649,345 +7621,8 @@
               <a:buNone/>
             </a:pPr>
             <a:r>
-              <a:rPr lang="pt-BR" sz="3600" b="1" dirty="0">
-                <a:latin typeface="Segoe UI" pitchFamily="34" charset="0"/>
-                <a:ea typeface="Segoe UI" pitchFamily="34" charset="0"/>
-                <a:cs typeface="Segoe UI" pitchFamily="34" charset="0"/>
-              </a:rPr>
-              <a:t> 	</a:t>
-            </a:r>
-            <a:r>
-              <a:rPr lang="pt-BR" b="1" dirty="0">
-                <a:latin typeface="Segoe UI" pitchFamily="34" charset="0"/>
-                <a:ea typeface="Segoe UI" pitchFamily="34" charset="0"/>
-                <a:cs typeface="Segoe UI" pitchFamily="34" charset="0"/>
-              </a:rPr>
-              <a:t>Dificuldades superadas?</a:t>
-            </a:r>
-          </a:p>
-          <a:p>
-            <a:pPr>
-              <a:buNone/>
-            </a:pPr>
-            <a:r>
-              <a:rPr lang="pt-BR" b="1" dirty="0">
-                <a:latin typeface="Segoe UI" pitchFamily="34" charset="0"/>
-                <a:ea typeface="Segoe UI" pitchFamily="34" charset="0"/>
-                <a:cs typeface="Segoe UI" pitchFamily="34" charset="0"/>
-              </a:rPr>
-              <a:t>- Inexperiência de desenvolvimento em grupo	</a:t>
-            </a:r>
-          </a:p>
-          <a:p>
-            <a:pPr>
-              <a:buNone/>
-            </a:pPr>
-            <a:r>
-              <a:rPr lang="pt-BR" b="1" dirty="0">
-                <a:latin typeface="Segoe UI" pitchFamily="34" charset="0"/>
-                <a:ea typeface="Segoe UI" pitchFamily="34" charset="0"/>
-                <a:cs typeface="Segoe UI" pitchFamily="34" charset="0"/>
-              </a:rPr>
-              <a:t> - Desorganização </a:t>
-            </a:r>
-          </a:p>
-        </p:txBody>
-      </p:sp>
-    </p:spTree>
-  </p:cSld>
-  <p:clrMapOvr>
-    <a:masterClrMapping/>
-  </p:clrMapOvr>
-  <p:timing>
-    <p:tnLst>
-      <p:par>
-        <p:cTn id="1" dur="indefinite" restart="never" nodeType="tmRoot"/>
-      </p:par>
-    </p:tnLst>
-  </p:timing>
-</p:sld>
-</file>
-
-<file path=ppt/slides/slide28.xml><?xml version="1.0" encoding="utf-8"?>
-<p:sld xmlns:a="http://schemas.openxmlformats.org/drawingml/2006/main" xmlns:r="http://schemas.openxmlformats.org/officeDocument/2006/relationships" xmlns:p="http://schemas.openxmlformats.org/presentationml/2006/main">
-  <p:cSld>
-    <p:spTree>
-      <p:nvGrpSpPr>
-        <p:cNvPr id="1" name=""/>
-        <p:cNvGrpSpPr/>
-        <p:nvPr/>
-      </p:nvGrpSpPr>
-      <p:grpSpPr>
-        <a:xfrm>
-          <a:off x="0" y="0"/>
-          <a:ext cx="0" cy="0"/>
-          <a:chOff x="0" y="0"/>
-          <a:chExt cx="0" cy="0"/>
-        </a:xfrm>
-      </p:grpSpPr>
-      <p:sp>
-        <p:nvSpPr>
-          <p:cNvPr id="2" name="Título 1"/>
-          <p:cNvSpPr>
-            <a:spLocks noGrp="1"/>
-          </p:cNvSpPr>
-          <p:nvPr>
-            <p:ph type="title"/>
-          </p:nvPr>
-        </p:nvSpPr>
-        <p:spPr>
-          <a:xfrm>
-            <a:off x="683568" y="476672"/>
-            <a:ext cx="8229600" cy="1143000"/>
-          </a:xfrm>
-        </p:spPr>
-        <p:txBody>
-          <a:bodyPr>
-            <a:noAutofit/>
-          </a:bodyPr>
-          <a:lstStyle/>
-          <a:p>
-            <a:r>
-              <a:rPr lang="pt-BR" sz="4000" dirty="0" smtClean="0">
-                <a:latin typeface="Segoe UI" pitchFamily="34" charset="0"/>
-                <a:ea typeface="Segoe UI" pitchFamily="34" charset="0"/>
-                <a:cs typeface="Segoe UI" pitchFamily="34" charset="0"/>
-              </a:rPr>
-              <a:t>Retrospectiva</a:t>
-            </a:r>
-            <a:endParaRPr lang="pt-BR" sz="4000" dirty="0">
-              <a:latin typeface="Segoe UI" pitchFamily="34" charset="0"/>
-              <a:ea typeface="Segoe UI" pitchFamily="34" charset="0"/>
-              <a:cs typeface="Segoe UI" pitchFamily="34" charset="0"/>
-            </a:endParaRPr>
-          </a:p>
-        </p:txBody>
-      </p:sp>
-      <p:sp>
-        <p:nvSpPr>
-          <p:cNvPr id="3" name="Espaço Reservado para Conteúdo 2"/>
-          <p:cNvSpPr>
-            <a:spLocks noGrp="1"/>
-          </p:cNvSpPr>
-          <p:nvPr>
-            <p:ph idx="1"/>
-          </p:nvPr>
-        </p:nvSpPr>
-        <p:spPr/>
-        <p:txBody>
-          <a:bodyPr>
-            <a:normAutofit fontScale="85000" lnSpcReduction="20000"/>
-          </a:bodyPr>
-          <a:lstStyle/>
-          <a:p>
-            <a:pPr>
-              <a:buNone/>
-            </a:pPr>
-            <a:r>
-              <a:rPr lang="pt-BR" sz="3600" b="1" dirty="0" smtClean="0"/>
-              <a:t>	</a:t>
-            </a:r>
-            <a:r>
-              <a:rPr lang="pt-BR" sz="3600" b="1" dirty="0" smtClean="0">
-                <a:latin typeface="Segoe UI" pitchFamily="34" charset="0"/>
-                <a:ea typeface="Segoe UI" pitchFamily="34" charset="0"/>
-                <a:cs typeface="Segoe UI" pitchFamily="34" charset="0"/>
-              </a:rPr>
-              <a:t>Retrospectiva:</a:t>
-            </a:r>
-          </a:p>
-          <a:p>
-            <a:pPr>
-              <a:buNone/>
-            </a:pPr>
-            <a:r>
-              <a:rPr lang="pt-BR" sz="3600" b="1" i="1" dirty="0" smtClean="0"/>
-              <a:t>	</a:t>
-            </a:r>
-          </a:p>
-          <a:p>
-            <a:pPr>
-              <a:buNone/>
-            </a:pPr>
-            <a:r>
-              <a:rPr lang="pt-BR" sz="3600" b="1" i="1" dirty="0" smtClean="0"/>
-              <a:t>	 Aspectos positivos: </a:t>
-            </a:r>
-            <a:r>
-              <a:rPr lang="pt-BR" sz="3600" i="1" dirty="0" smtClean="0"/>
-              <a:t>Criatividade, </a:t>
-            </a:r>
-            <a:r>
-              <a:rPr lang="pt-BR" sz="3600" i="1" dirty="0" smtClean="0"/>
-              <a:t>interesse </a:t>
-            </a:r>
-            <a:r>
-              <a:rPr lang="pt-BR" sz="3600" i="1" dirty="0" smtClean="0"/>
-              <a:t>em novas </a:t>
-            </a:r>
-            <a:r>
-              <a:rPr lang="pt-BR" sz="3600" i="1" dirty="0" smtClean="0"/>
-              <a:t>tecnologias, a</a:t>
-            </a:r>
-            <a:r>
-              <a:rPr lang="pt-BR" sz="3600" i="1" dirty="0" smtClean="0"/>
-              <a:t>p</a:t>
-            </a:r>
-            <a:r>
-              <a:rPr lang="pt-BR" sz="3600" i="1" dirty="0" smtClean="0"/>
-              <a:t>licação </a:t>
-            </a:r>
-            <a:r>
-              <a:rPr lang="pt-BR" sz="3600" i="1" dirty="0" smtClean="0"/>
-              <a:t>dos conhecimentos adquiridos até o presente momento, troca de experiências acadêmicas.</a:t>
-            </a:r>
-            <a:endParaRPr lang="pt-BR" sz="3600" b="1" i="1" dirty="0" smtClean="0"/>
-          </a:p>
-          <a:p>
-            <a:pPr>
-              <a:buNone/>
-            </a:pPr>
-            <a:r>
-              <a:rPr lang="pt-BR" sz="3600" b="1" i="1" dirty="0" smtClean="0"/>
-              <a:t>	 Aspectos a melhorar: </a:t>
-            </a:r>
-            <a:r>
-              <a:rPr lang="pt-BR" sz="3600" i="1" dirty="0" smtClean="0"/>
-              <a:t>Comunicação do Grupo, disponibilidade de tempo, foco nos pontos principais do projeto e suas respectivas entregas, entrosamento entre a equipe.</a:t>
-            </a:r>
-            <a:r>
-              <a:rPr lang="pt-BR" sz="3600" b="1" i="1" dirty="0" smtClean="0"/>
-              <a:t> </a:t>
-            </a:r>
-            <a:r>
-              <a:rPr lang="pt-BR" b="1" dirty="0" smtClean="0">
-                <a:latin typeface="Segoe UI" pitchFamily="34" charset="0"/>
-                <a:ea typeface="Segoe UI" pitchFamily="34" charset="0"/>
-                <a:cs typeface="Segoe UI" pitchFamily="34" charset="0"/>
-              </a:rPr>
-              <a:t>	</a:t>
-            </a:r>
-          </a:p>
-          <a:p>
-            <a:pPr>
-              <a:buNone/>
-            </a:pPr>
-            <a:r>
-              <a:rPr lang="pt-BR" b="1" dirty="0" smtClean="0">
-                <a:latin typeface="Segoe UI" pitchFamily="34" charset="0"/>
-                <a:ea typeface="Segoe UI" pitchFamily="34" charset="0"/>
-                <a:cs typeface="Segoe UI" pitchFamily="34" charset="0"/>
-              </a:rPr>
-              <a:t>	</a:t>
-            </a:r>
-          </a:p>
-        </p:txBody>
-      </p:sp>
-    </p:spTree>
-  </p:cSld>
-  <p:clrMapOvr>
-    <a:masterClrMapping/>
-  </p:clrMapOvr>
-  <p:timing>
-    <p:tnLst>
-      <p:par>
-        <p:cTn id="1" dur="indefinite" restart="never" nodeType="tmRoot"/>
-      </p:par>
-    </p:tnLst>
-  </p:timing>
-</p:sld>
-</file>
-
-<file path=ppt/slides/slide29.xml><?xml version="1.0" encoding="utf-8"?>
-<p:sld xmlns:a="http://schemas.openxmlformats.org/drawingml/2006/main" xmlns:r="http://schemas.openxmlformats.org/officeDocument/2006/relationships" xmlns:p="http://schemas.openxmlformats.org/presentationml/2006/main">
-  <p:cSld>
-    <p:spTree>
-      <p:nvGrpSpPr>
-        <p:cNvPr id="1" name=""/>
-        <p:cNvGrpSpPr/>
-        <p:nvPr/>
-      </p:nvGrpSpPr>
-      <p:grpSpPr>
-        <a:xfrm>
-          <a:off x="0" y="0"/>
-          <a:ext cx="0" cy="0"/>
-          <a:chOff x="0" y="0"/>
-          <a:chExt cx="0" cy="0"/>
-        </a:xfrm>
-      </p:grpSpPr>
-      <p:sp>
-        <p:nvSpPr>
-          <p:cNvPr id="2" name="Título 1"/>
-          <p:cNvSpPr>
-            <a:spLocks noGrp="1"/>
-          </p:cNvSpPr>
-          <p:nvPr>
-            <p:ph type="title"/>
-          </p:nvPr>
-        </p:nvSpPr>
-        <p:spPr>
-          <a:xfrm>
-            <a:off x="683568" y="476672"/>
-            <a:ext cx="8229600" cy="1143000"/>
-          </a:xfrm>
-        </p:spPr>
-        <p:txBody>
-          <a:bodyPr>
-            <a:noAutofit/>
-          </a:bodyPr>
-          <a:lstStyle/>
-          <a:p>
-            <a:r>
-              <a:rPr lang="pt-BR" sz="4000" dirty="0" smtClean="0">
-                <a:latin typeface="Segoe UI" pitchFamily="34" charset="0"/>
-                <a:ea typeface="Segoe UI" pitchFamily="34" charset="0"/>
-                <a:cs typeface="Segoe UI" pitchFamily="34" charset="0"/>
-              </a:rPr>
-              <a:t>Próximas ações</a:t>
-            </a:r>
-            <a:endParaRPr lang="pt-BR" sz="4000" dirty="0">
-              <a:latin typeface="Segoe UI" pitchFamily="34" charset="0"/>
-              <a:ea typeface="Segoe UI" pitchFamily="34" charset="0"/>
-              <a:cs typeface="Segoe UI" pitchFamily="34" charset="0"/>
-            </a:endParaRPr>
-          </a:p>
-        </p:txBody>
-      </p:sp>
-      <p:sp>
-        <p:nvSpPr>
-          <p:cNvPr id="3" name="Espaço Reservado para Conteúdo 2"/>
-          <p:cNvSpPr>
-            <a:spLocks noGrp="1"/>
-          </p:cNvSpPr>
-          <p:nvPr>
-            <p:ph idx="1"/>
-          </p:nvPr>
-        </p:nvSpPr>
-        <p:spPr/>
-        <p:txBody>
-          <a:bodyPr>
-            <a:normAutofit/>
-          </a:bodyPr>
-          <a:lstStyle/>
-          <a:p>
-            <a:pPr>
-              <a:buNone/>
-            </a:pPr>
-            <a:r>
               <a:rPr lang="pt-BR" sz="3600" dirty="0" smtClean="0"/>
-              <a:t>	- </a:t>
-            </a:r>
-            <a:r>
-              <a:rPr lang="pt-BR" sz="3600" smtClean="0"/>
-              <a:t>Desenvolver </a:t>
-            </a:r>
-            <a:r>
-              <a:rPr lang="pt-BR" sz="3600" smtClean="0"/>
-              <a:t>funcionalidades </a:t>
-            </a:r>
-            <a:r>
-              <a:rPr lang="pt-BR" sz="3600" dirty="0" smtClean="0"/>
-              <a:t>de menos complexidade tais como: cadastro de usuário, </a:t>
+              <a:t>	- Desenvolver funcionalidades de menos complexidade tais como: cadastro de usuário, </a:t>
             </a:r>
             <a:r>
               <a:rPr lang="pt-BR" sz="3600" dirty="0" err="1" smtClean="0"/>
@@ -8135,65 +7770,6 @@
             </a:endParaRPr>
           </a:p>
           <a:p>
-            <a:r>
-              <a:rPr lang="pt-BR" sz="3600" dirty="0"/>
-              <a:t>Um </a:t>
-            </a:r>
-            <a:r>
-              <a:rPr lang="pt-BR" sz="3600" dirty="0" err="1"/>
-              <a:t>app</a:t>
-            </a:r>
-            <a:r>
-              <a:rPr lang="pt-BR" sz="3600" dirty="0"/>
-              <a:t> para controlar calorias ingeridas no </a:t>
-            </a:r>
-            <a:r>
-              <a:rPr lang="pt-BR" sz="3600" dirty="0" smtClean="0"/>
-              <a:t>dia-a-dia;</a:t>
-            </a:r>
-            <a:endParaRPr lang="pt-BR" sz="3600" dirty="0"/>
-          </a:p>
-          <a:p>
-            <a:r>
-              <a:rPr lang="pt-BR" sz="3600" dirty="0"/>
-              <a:t>Jogo de </a:t>
-            </a:r>
-            <a:r>
-              <a:rPr lang="pt-BR" sz="3600" dirty="0" smtClean="0"/>
-              <a:t>cartas;</a:t>
-            </a:r>
-            <a:endParaRPr lang="pt-BR" sz="3600" dirty="0"/>
-          </a:p>
-          <a:p>
-            <a:r>
-              <a:rPr lang="pt-BR" sz="3600" dirty="0"/>
-              <a:t>Jogo de </a:t>
-            </a:r>
-            <a:r>
-              <a:rPr lang="pt-BR" sz="3600" dirty="0" err="1"/>
-              <a:t>rpg</a:t>
-            </a:r>
-            <a:r>
-              <a:rPr lang="pt-BR" sz="3600" dirty="0"/>
-              <a:t> de </a:t>
-            </a:r>
-            <a:r>
-              <a:rPr lang="pt-BR" sz="3600" dirty="0" smtClean="0"/>
-              <a:t>cartas;</a:t>
-            </a:r>
-            <a:endParaRPr lang="pt-BR" sz="3600" dirty="0"/>
-          </a:p>
-          <a:p>
-            <a:r>
-              <a:rPr lang="pt-BR" sz="3600" dirty="0"/>
-              <a:t>Aplicação web para localização de </a:t>
-            </a:r>
-            <a:r>
-              <a:rPr lang="pt-BR" sz="3600" dirty="0" smtClean="0"/>
-              <a:t>restaurantes;</a:t>
-            </a:r>
-          </a:p>
-          <a:p>
             <a:endParaRPr lang="pt-BR" sz="3600" dirty="0"/>
           </a:p>
           <a:p>
@@ -8204,6 +7780,47 @@
           </a:p>
         </p:txBody>
       </p:sp>
+      <p:pic>
+        <p:nvPicPr>
+          <p:cNvPr id="1026" name="Picture 2" descr="C:\Users\bruno\Desktop\figura-com-ponto-de-interrogação-9068618.jpg"/>
+          <p:cNvPicPr>
+            <a:picLocks noChangeAspect="1" noChangeArrowheads="1"/>
+          </p:cNvPicPr>
+          <p:nvPr/>
+        </p:nvPicPr>
+        <p:blipFill>
+          <a:blip r:embed="rId3" cstate="print">
+            <a:extLst>
+              <a:ext uri="{28A0092B-C50C-407E-A947-70E740481C1C}">
+                <a14:useLocalDpi xmlns:a14="http://schemas.microsoft.com/office/drawing/2010/main" val="0"/>
+              </a:ext>
+            </a:extLst>
+          </a:blip>
+          <a:srcRect/>
+          <a:stretch>
+            <a:fillRect/>
+          </a:stretch>
+        </p:blipFill>
+        <p:spPr bwMode="auto">
+          <a:xfrm>
+            <a:off x="2339753" y="2348880"/>
+            <a:ext cx="4608512" cy="4927562"/>
+          </a:xfrm>
+          <a:prstGeom prst="rect">
+            <a:avLst/>
+          </a:prstGeom>
+          <a:noFill/>
+          <a:extLst>
+            <a:ext uri="{909E8E84-426E-40DD-AFC4-6F175D3DCCD1}">
+              <a14:hiddenFill xmlns:a14="http://schemas.microsoft.com/office/drawing/2010/main">
+                <a:solidFill>
+                  <a:srgbClr val="FFFFFF"/>
+                </a:solidFill>
+              </a14:hiddenFill>
+            </a:ext>
+          </a:extLst>
+        </p:spPr>
+      </p:pic>
     </p:spTree>
   </p:cSld>
   <p:clrMapOvr>
@@ -8324,37 +7941,49 @@
               <a:t>	</a:t>
             </a:r>
           </a:p>
-          <a:p>
-            <a:pPr>
-              <a:buNone/>
-            </a:pPr>
-            <a:r>
-              <a:rPr lang="pt-BR" sz="3600" dirty="0"/>
-              <a:t>	</a:t>
-            </a:r>
-            <a:r>
-              <a:rPr lang="pt-BR" sz="3600" dirty="0" smtClean="0"/>
-              <a:t>Dificuldade </a:t>
-            </a:r>
-            <a:r>
-              <a:rPr lang="pt-BR" sz="3600" dirty="0"/>
-              <a:t>no manuseamento </a:t>
-            </a:r>
-            <a:r>
-              <a:rPr lang="pt-BR" sz="3600" dirty="0" smtClean="0"/>
-              <a:t>dos </a:t>
-            </a:r>
-            <a:r>
-              <a:rPr lang="pt-BR" sz="3600" dirty="0" err="1"/>
-              <a:t>apps</a:t>
-            </a:r>
-            <a:r>
-              <a:rPr lang="pt-BR" sz="3600" dirty="0"/>
-              <a:t> dos concorrentes, maior facilidade no controle de calorias.</a:t>
-            </a:r>
-          </a:p>
-        </p:txBody>
-      </p:sp>
+        </p:txBody>
+      </p:sp>
+      <p:pic>
+        <p:nvPicPr>
+          <p:cNvPr id="2051" name="Picture 3" descr="C:\Users\bruno\Desktop\problemas.jpg"/>
+          <p:cNvPicPr>
+            <a:picLocks noChangeAspect="1" noChangeArrowheads="1"/>
+          </p:cNvPicPr>
+          <p:nvPr/>
+        </p:nvPicPr>
+        <p:blipFill>
+          <a:blip r:embed="rId3">
+            <a:extLst>
+              <a:ext uri="{28A0092B-C50C-407E-A947-70E740481C1C}">
+                <a14:useLocalDpi xmlns:a14="http://schemas.microsoft.com/office/drawing/2010/main" val="0"/>
+              </a:ext>
+            </a:extLst>
+          </a:blip>
+          <a:srcRect/>
+          <a:stretch>
+            <a:fillRect/>
+          </a:stretch>
+        </p:blipFill>
+        <p:spPr bwMode="auto">
+          <a:xfrm>
+            <a:off x="1907704" y="2527831"/>
+            <a:ext cx="4680520" cy="4353387"/>
+          </a:xfrm>
+          <a:prstGeom prst="rect">
+            <a:avLst/>
+          </a:prstGeom>
+          <a:noFill/>
+          <a:extLst>
+            <a:ext uri="{909E8E84-426E-40DD-AFC4-6F175D3DCCD1}">
+              <a14:hiddenFill xmlns:a14="http://schemas.microsoft.com/office/drawing/2010/main">
+                <a:solidFill>
+                  <a:srgbClr val="FFFFFF"/>
+                </a:solidFill>
+              </a14:hiddenFill>
+            </a:ext>
+          </a:extLst>
+        </p:spPr>
+      </p:pic>
     </p:spTree>
   </p:cSld>
   <p:clrMapOvr>
@@ -8631,7 +8260,7 @@
             </a:r>
             <a:r>
               <a:rPr lang="pt-BR" sz="3600" dirty="0" smtClean="0"/>
-              <a:t>dados e funcionalidades.</a:t>
+              <a:t>dados.</a:t>
             </a:r>
             <a:endParaRPr lang="pt-BR" sz="3600" dirty="0"/>
           </a:p>
@@ -8766,7 +8395,15 @@
             </a:r>
             <a:r>
               <a:rPr lang="pt-BR" sz="3600" dirty="0"/>
-              <a:t>de usar, maior controle sobre as calorias ingeridas, responsivo.</a:t>
+              <a:t>de usar, maior controle sobre as calorias </a:t>
+            </a:r>
+            <a:r>
+              <a:rPr lang="pt-BR" sz="3600" dirty="0" smtClean="0"/>
+              <a:t>ingeridas e design responsivo</a:t>
+            </a:r>
+            <a:r>
+              <a:rPr lang="pt-BR" sz="3600" dirty="0"/>
+              <a:t>.</a:t>
             </a:r>
           </a:p>
           <a:p>
@@ -8856,7 +8493,7 @@
         <p:spPr/>
         <p:txBody>
           <a:bodyPr>
-            <a:normAutofit fontScale="85000" lnSpcReduction="20000"/>
+            <a:normAutofit fontScale="92500"/>
           </a:bodyPr>
           <a:lstStyle/>
           <a:p>
@@ -8866,62 +8503,20 @@
             </a:pPr>
             <a:r>
               <a:rPr lang="pt-BR" sz="3600" dirty="0" smtClean="0"/>
-              <a:t>Boa </a:t>
-            </a:r>
-            <a:r>
-              <a:rPr lang="pt-BR" sz="3600" dirty="0" smtClean="0"/>
-              <a:t>usabilidade </a:t>
-            </a:r>
-            <a:r>
-              <a:rPr lang="pt-BR" sz="3600" dirty="0" smtClean="0"/>
-              <a:t>em </a:t>
-            </a:r>
-            <a:r>
-              <a:rPr lang="pt-BR" sz="3600" dirty="0" smtClean="0"/>
-              <a:t>diferentes plataformas</a:t>
-            </a:r>
+              <a:t>Boa usabilidade em diferentes plataformas</a:t>
+            </a:r>
+          </a:p>
+          <a:p>
+            <a:pPr marL="0" indent="0">
+              <a:buNone/>
+            </a:pPr>
+            <a:endParaRPr lang="pt-BR" sz="3600" dirty="0" smtClean="0"/>
           </a:p>
           <a:p>
             <a:pPr>
               <a:buFontTx/>
               <a:buChar char="-"/>
             </a:pPr>
-            <a:endParaRPr lang="pt-BR" sz="3600" dirty="0" smtClean="0"/>
-          </a:p>
-          <a:p>
-            <a:pPr>
-              <a:buFontTx/>
-              <a:buChar char="-"/>
-            </a:pPr>
-            <a:r>
-              <a:rPr lang="pt-BR" sz="3600" dirty="0" smtClean="0"/>
-              <a:t>Desempenho </a:t>
-            </a:r>
-            <a:r>
-              <a:rPr lang="pt-BR" sz="3600" dirty="0" smtClean="0"/>
-              <a:t>ágil </a:t>
-            </a:r>
-            <a:r>
-              <a:rPr lang="pt-BR" sz="3600" dirty="0" smtClean="0"/>
-              <a:t>e </a:t>
-            </a:r>
-            <a:r>
-              <a:rPr lang="pt-BR" sz="3600" dirty="0" smtClean="0"/>
-              <a:t>fácil </a:t>
-            </a:r>
-          </a:p>
-          <a:p>
-            <a:pPr>
-              <a:buFontTx/>
-              <a:buChar char="-"/>
-            </a:pPr>
-            <a:endParaRPr lang="pt-BR" sz="3600" dirty="0" smtClean="0"/>
-          </a:p>
-          <a:p>
-            <a:pPr>
-              <a:buFontTx/>
-              <a:buChar char="-"/>
-            </a:pPr>
             <a:r>
               <a:rPr lang="pt-BR" sz="3600" dirty="0" smtClean="0">
                 <a:latin typeface="Segoe UI" pitchFamily="34" charset="0"/>
@@ -8936,7 +8531,7 @@
                 <a:ea typeface="Segoe UI" pitchFamily="34" charset="0"/>
                 <a:cs typeface="Segoe UI" pitchFamily="34" charset="0"/>
               </a:rPr>
-              <a:t>d</a:t>
+              <a:t>design </a:t>
             </a:r>
             <a:r>
               <a:rPr lang="pt-BR" sz="3600" dirty="0" smtClean="0">
@@ -8944,23 +8539,7 @@
                 <a:ea typeface="Segoe UI" pitchFamily="34" charset="0"/>
                 <a:cs typeface="Segoe UI" pitchFamily="34" charset="0"/>
               </a:rPr>
-              <a:t>esign </a:t>
-            </a:r>
-            <a:r>
-              <a:rPr lang="pt-BR" sz="3600" dirty="0" err="1" smtClean="0">
-                <a:latin typeface="Segoe UI" pitchFamily="34" charset="0"/>
-                <a:ea typeface="Segoe UI" pitchFamily="34" charset="0"/>
-                <a:cs typeface="Segoe UI" pitchFamily="34" charset="0"/>
-              </a:rPr>
-              <a:t>r</a:t>
-            </a:r>
-            <a:r>
-              <a:rPr lang="pt-BR" sz="3600" dirty="0" err="1" smtClean="0">
-                <a:latin typeface="Segoe UI" pitchFamily="34" charset="0"/>
-                <a:ea typeface="Segoe UI" pitchFamily="34" charset="0"/>
-                <a:cs typeface="Segoe UI" pitchFamily="34" charset="0"/>
-              </a:rPr>
-              <a:t>esponsível</a:t>
+              <a:t>responsivo</a:t>
             </a:r>
             <a:endParaRPr lang="pt-BR" sz="3600" dirty="0" smtClean="0">
               <a:latin typeface="Segoe UI" pitchFamily="34" charset="0"/>
@@ -9096,66 +8675,9 @@
         <p:spPr/>
         <p:txBody>
           <a:bodyPr>
-            <a:normAutofit/>
+            <a:normAutofit fontScale="92500" lnSpcReduction="20000"/>
           </a:bodyPr>
           <a:lstStyle/>
-          <a:p>
-            <a:pPr>
-              <a:buNone/>
-            </a:pPr>
-            <a:r>
-              <a:rPr lang="pt-BR" sz="3600" dirty="0"/>
-              <a:t>	</a:t>
-            </a:r>
-            <a:r>
-              <a:rPr lang="pt-BR" b="1" i="1" dirty="0"/>
-              <a:t> </a:t>
-            </a:r>
-            <a:r>
-              <a:rPr lang="pt-BR" b="1" dirty="0">
-                <a:latin typeface="Segoe UI" pitchFamily="34" charset="0"/>
-                <a:ea typeface="Segoe UI" pitchFamily="34" charset="0"/>
-                <a:cs typeface="Segoe UI" pitchFamily="34" charset="0"/>
-              </a:rPr>
-              <a:t>O que será implementado?</a:t>
-            </a:r>
-          </a:p>
-          <a:p>
-            <a:pPr>
-              <a:buNone/>
-            </a:pPr>
-            <a:r>
-              <a:rPr lang="pt-BR" dirty="0" smtClean="0"/>
-              <a:t>	</a:t>
-            </a:r>
-          </a:p>
-          <a:p>
-            <a:pPr>
-              <a:buNone/>
-            </a:pPr>
-            <a:r>
-              <a:rPr lang="pt-BR" dirty="0"/>
-              <a:t>	</a:t>
-            </a:r>
-            <a:r>
-              <a:rPr lang="pt-BR" dirty="0" smtClean="0"/>
-              <a:t>Uma </a:t>
-            </a:r>
-            <a:r>
-              <a:rPr lang="pt-BR" dirty="0"/>
-              <a:t>aplicação web que gerencia e controla as calorias ingeridas.</a:t>
-            </a:r>
-          </a:p>
-          <a:p>
-            <a:pPr>
-              <a:buNone/>
-            </a:pPr>
-            <a:endParaRPr lang="pt-BR" sz="3600" b="1" dirty="0">
-              <a:latin typeface="Segoe UI" pitchFamily="34" charset="0"/>
-              <a:ea typeface="Segoe UI" pitchFamily="34" charset="0"/>
-              <a:cs typeface="Segoe UI" pitchFamily="34" charset="0"/>
-            </a:endParaRPr>
-          </a:p>
           <a:p>
             <a:pPr>
               <a:buNone/>
@@ -9164,6 +8686,92 @@
               <a:rPr lang="pt-BR" sz="3600" dirty="0" smtClean="0"/>
               <a:t>	</a:t>
             </a:r>
+            <a:r>
+              <a:rPr lang="pt-BR" b="1" dirty="0" smtClean="0">
+                <a:latin typeface="Segoe UI" pitchFamily="34" charset="0"/>
+                <a:ea typeface="Segoe UI" pitchFamily="34" charset="0"/>
+                <a:cs typeface="Segoe UI" pitchFamily="34" charset="0"/>
+              </a:rPr>
+              <a:t>Quais </a:t>
+            </a:r>
+            <a:r>
+              <a:rPr lang="pt-BR" b="1" dirty="0">
+                <a:latin typeface="Segoe UI" pitchFamily="34" charset="0"/>
+                <a:ea typeface="Segoe UI" pitchFamily="34" charset="0"/>
+                <a:cs typeface="Segoe UI" pitchFamily="34" charset="0"/>
+              </a:rPr>
+              <a:t>funcionalidades?</a:t>
+            </a:r>
+          </a:p>
+          <a:p>
+            <a:r>
+              <a:rPr lang="pt-BR" dirty="0"/>
+              <a:t>Cálculo IMC, Cálculos de calorias </a:t>
+            </a:r>
+            <a:r>
+              <a:rPr lang="pt-BR" dirty="0" smtClean="0"/>
+              <a:t>ingeridas, projeção de perda ou ganho de peso.</a:t>
+            </a:r>
+          </a:p>
+          <a:p>
+            <a:pPr>
+              <a:buNone/>
+            </a:pPr>
+            <a:endParaRPr lang="pt-BR" dirty="0"/>
+          </a:p>
+          <a:p>
+            <a:pPr>
+              <a:buNone/>
+            </a:pPr>
+            <a:r>
+              <a:rPr lang="pt-BR" b="1" i="1" dirty="0" smtClean="0"/>
+              <a:t>	</a:t>
+            </a:r>
+            <a:r>
+              <a:rPr lang="pt-BR" b="1" dirty="0" smtClean="0">
+                <a:latin typeface="Segoe UI" pitchFamily="34" charset="0"/>
+                <a:ea typeface="Segoe UI" pitchFamily="34" charset="0"/>
+                <a:cs typeface="Segoe UI" pitchFamily="34" charset="0"/>
+              </a:rPr>
+              <a:t>Funcionamento </a:t>
+            </a:r>
+            <a:r>
+              <a:rPr lang="pt-BR" b="1" dirty="0">
+                <a:latin typeface="Segoe UI" pitchFamily="34" charset="0"/>
+                <a:ea typeface="Segoe UI" pitchFamily="34" charset="0"/>
+                <a:cs typeface="Segoe UI" pitchFamily="34" charset="0"/>
+              </a:rPr>
+              <a:t>básico do sistema?</a:t>
+            </a:r>
+          </a:p>
+          <a:p>
+            <a:r>
+              <a:rPr lang="pt-BR" dirty="0"/>
+              <a:t>Gerenciamento de </a:t>
+            </a:r>
+            <a:r>
+              <a:rPr lang="pt-BR" dirty="0" smtClean="0"/>
+              <a:t>calorias</a:t>
+            </a:r>
+          </a:p>
+          <a:p>
+            <a:r>
+              <a:rPr lang="pt-BR" dirty="0" smtClean="0"/>
+              <a:t>Inserir peso gradualmente</a:t>
+            </a:r>
+            <a:endParaRPr lang="pt-BR" dirty="0" smtClean="0"/>
+          </a:p>
+          <a:p>
+            <a:r>
+              <a:rPr lang="pt-BR" dirty="0" smtClean="0"/>
+              <a:t>Cadastrar Exercícios Realizados</a:t>
+            </a:r>
+          </a:p>
+          <a:p>
+            <a:pPr>
+              <a:buNone/>
+            </a:pPr>
+            <a:endParaRPr lang="pt-BR" sz="3600" dirty="0" smtClean="0"/>
           </a:p>
           <a:p>
             <a:pPr>
@@ -9447,7 +9055,7 @@
   <a:extraClrSchemeLst/>
   <a:extLst>
     <a:ext uri="{05A4C25C-085E-4340-85A3-A5531E510DB2}">
-      <thm15:themeFamily xmlns:thm15="http://schemas.microsoft.com/office/thememl/2012/main" xmlns="" name="Office Theme" id="{62F939B6-93AF-4DB8-9C6B-D6C7DFDC589F}" vid="{4A3C46E8-61CC-4603-A589-7422A47A8E4A}"/>
+      <thm15:themeFamily xmlns="" xmlns:thm15="http://schemas.microsoft.com/office/thememl/2012/main" name="Office Theme" id="{62F939B6-93AF-4DB8-9C6B-D6C7DFDC589F}" vid="{4A3C46E8-61CC-4603-A589-7422A47A8E4A}"/>
     </a:ext>
   </a:extLst>
 </a:theme>
@@ -9708,7 +9316,7 @@
   <a:extraClrSchemeLst/>
   <a:extLst>
     <a:ext uri="{05A4C25C-085E-4340-85A3-A5531E510DB2}">
-      <thm15:themeFamily xmlns:thm15="http://schemas.microsoft.com/office/thememl/2012/main" xmlns="" name="Office Theme" id="{62F939B6-93AF-4DB8-9C6B-D6C7DFDC589F}" vid="{4A3C46E8-61CC-4603-A589-7422A47A8E4A}"/>
+      <thm15:themeFamily xmlns="" xmlns:thm15="http://schemas.microsoft.com/office/thememl/2012/main" name="Office Theme" id="{62F939B6-93AF-4DB8-9C6B-D6C7DFDC589F}" vid="{4A3C46E8-61CC-4603-A589-7422A47A8E4A}"/>
     </a:ext>
   </a:extLst>
 </a:theme>

</xml_diff>

<commit_message>
ultima atualização antes da poha toda
</commit_message>
<xml_diff>
--- a/Kcal Control.pptx
+++ b/Kcal Control.pptx
@@ -5,7 +5,7 @@
     <p:sldMasterId id="2147483732" r:id="rId1"/>
   </p:sldMasterIdLst>
   <p:notesMasterIdLst>
-    <p:notesMasterId r:id="rId29"/>
+    <p:notesMasterId r:id="rId26"/>
   </p:notesMasterIdLst>
   <p:sldIdLst>
     <p:sldId id="256" r:id="rId2"/>
@@ -13,28 +13,25 @@
     <p:sldId id="258" r:id="rId4"/>
     <p:sldId id="261" r:id="rId5"/>
     <p:sldId id="262" r:id="rId6"/>
-    <p:sldId id="264" r:id="rId7"/>
-    <p:sldId id="265" r:id="rId8"/>
-    <p:sldId id="266" r:id="rId9"/>
-    <p:sldId id="268" r:id="rId10"/>
-    <p:sldId id="269" r:id="rId11"/>
-    <p:sldId id="270" r:id="rId12"/>
-    <p:sldId id="271" r:id="rId13"/>
-    <p:sldId id="278" r:id="rId14"/>
-    <p:sldId id="272" r:id="rId15"/>
-    <p:sldId id="279" r:id="rId16"/>
-    <p:sldId id="280" r:id="rId17"/>
-    <p:sldId id="281" r:id="rId18"/>
-    <p:sldId id="282" r:id="rId19"/>
-    <p:sldId id="283" r:id="rId20"/>
-    <p:sldId id="284" r:id="rId21"/>
-    <p:sldId id="285" r:id="rId22"/>
-    <p:sldId id="286" r:id="rId23"/>
-    <p:sldId id="287" r:id="rId24"/>
-    <p:sldId id="274" r:id="rId25"/>
-    <p:sldId id="275" r:id="rId26"/>
-    <p:sldId id="276" r:id="rId27"/>
-    <p:sldId id="277" r:id="rId28"/>
+    <p:sldId id="265" r:id="rId7"/>
+    <p:sldId id="266" r:id="rId8"/>
+    <p:sldId id="268" r:id="rId9"/>
+    <p:sldId id="269" r:id="rId10"/>
+    <p:sldId id="271" r:id="rId11"/>
+    <p:sldId id="272" r:id="rId12"/>
+    <p:sldId id="279" r:id="rId13"/>
+    <p:sldId id="280" r:id="rId14"/>
+    <p:sldId id="281" r:id="rId15"/>
+    <p:sldId id="282" r:id="rId16"/>
+    <p:sldId id="283" r:id="rId17"/>
+    <p:sldId id="284" r:id="rId18"/>
+    <p:sldId id="285" r:id="rId19"/>
+    <p:sldId id="286" r:id="rId20"/>
+    <p:sldId id="287" r:id="rId21"/>
+    <p:sldId id="274" r:id="rId22"/>
+    <p:sldId id="275" r:id="rId23"/>
+    <p:sldId id="276" r:id="rId24"/>
+    <p:sldId id="277" r:id="rId25"/>
   </p:sldIdLst>
   <p:sldSz cx="9144000" cy="6858000" type="screen4x3"/>
   <p:notesSz cx="6858000" cy="9144000"/>
@@ -135,7 +132,7 @@
   </p:defaultTextStyle>
   <p:extLst>
     <p:ext uri="{EFAFB233-063F-42B5-8137-9DF3F51BA10A}">
-      <p15:sldGuideLst xmlns="" xmlns:p15="http://schemas.microsoft.com/office/powerpoint/2012/main">
+      <p15:sldGuideLst xmlns:p15="http://schemas.microsoft.com/office/powerpoint/2012/main" xmlns="">
         <p15:guide id="1" orient="horz" pos="2160">
           <p15:clr>
             <a:srgbClr val="A4A3A4"/>
@@ -235,7 +232,7 @@
             <a:fld id="{3957A1C5-3858-4BD6-A546-1B130AA1BE08}" type="datetimeFigureOut">
               <a:rPr lang="en-US"/>
               <a:pPr/>
-              <a:t>10/24/2014</a:t>
+              <a:t>12/11/2014</a:t>
             </a:fld>
             <a:endParaRPr lang="en-US"/>
           </a:p>
@@ -663,7 +660,7 @@
     </p:spTree>
     <p:extLst>
       <p:ext uri="{BB962C8B-B14F-4D97-AF65-F5344CB8AC3E}">
-        <p14:creationId xmlns:p14="http://schemas.microsoft.com/office/powerpoint/2010/main" val="1768697153"/>
+        <p14:creationId xmlns:p14="http://schemas.microsoft.com/office/powerpoint/2010/main" val="1891100407"/>
       </p:ext>
     </p:extLst>
   </p:cSld>
@@ -748,7 +745,7 @@
     </p:spTree>
     <p:extLst>
       <p:ext uri="{BB962C8B-B14F-4D97-AF65-F5344CB8AC3E}">
-        <p14:creationId xmlns:p14="http://schemas.microsoft.com/office/powerpoint/2010/main" val="409955554"/>
+        <p14:creationId xmlns:p14="http://schemas.microsoft.com/office/powerpoint/2010/main" val="780942936"/>
       </p:ext>
     </p:extLst>
   </p:cSld>
@@ -824,7 +821,7 @@
             <a:fld id="{6852FC05-FAE1-4440-921C-50678C694586}" type="slidenum">
               <a:rPr lang="en-US"/>
               <a:pPr/>
-              <a:t>12</a:t>
+              <a:t>21</a:t>
             </a:fld>
             <a:endParaRPr lang="en-US"/>
           </a:p>
@@ -833,7 +830,7 @@
     </p:spTree>
     <p:extLst>
       <p:ext uri="{BB962C8B-B14F-4D97-AF65-F5344CB8AC3E}">
-        <p14:creationId xmlns:p14="http://schemas.microsoft.com/office/powerpoint/2010/main" val="1891100407"/>
+        <p14:creationId xmlns:p14="http://schemas.microsoft.com/office/powerpoint/2010/main" val="3999827197"/>
       </p:ext>
     </p:extLst>
   </p:cSld>
@@ -909,7 +906,7 @@
             <a:fld id="{6852FC05-FAE1-4440-921C-50678C694586}" type="slidenum">
               <a:rPr lang="en-US"/>
               <a:pPr/>
-              <a:t>13</a:t>
+              <a:t>22</a:t>
             </a:fld>
             <a:endParaRPr lang="en-US"/>
           </a:p>
@@ -918,7 +915,7 @@
     </p:spTree>
     <p:extLst>
       <p:ext uri="{BB962C8B-B14F-4D97-AF65-F5344CB8AC3E}">
-        <p14:creationId xmlns:p14="http://schemas.microsoft.com/office/powerpoint/2010/main" val="2739578023"/>
+        <p14:creationId xmlns:p14="http://schemas.microsoft.com/office/powerpoint/2010/main" val="426367415"/>
       </p:ext>
     </p:extLst>
   </p:cSld>
@@ -994,7 +991,7 @@
             <a:fld id="{6852FC05-FAE1-4440-921C-50678C694586}" type="slidenum">
               <a:rPr lang="en-US"/>
               <a:pPr/>
-              <a:t>14</a:t>
+              <a:t>23</a:t>
             </a:fld>
             <a:endParaRPr lang="en-US"/>
           </a:p>
@@ -1003,7 +1000,7 @@
     </p:spTree>
     <p:extLst>
       <p:ext uri="{BB962C8B-B14F-4D97-AF65-F5344CB8AC3E}">
-        <p14:creationId xmlns:p14="http://schemas.microsoft.com/office/powerpoint/2010/main" val="780942936"/>
+        <p14:creationId xmlns:p14="http://schemas.microsoft.com/office/powerpoint/2010/main" val="396310405"/>
       </p:ext>
     </p:extLst>
   </p:cSld>
@@ -1080,261 +1077,6 @@
               <a:rPr lang="en-US"/>
               <a:pPr/>
               <a:t>24</a:t>
-            </a:fld>
-            <a:endParaRPr lang="en-US"/>
-          </a:p>
-        </p:txBody>
-      </p:sp>
-    </p:spTree>
-    <p:extLst>
-      <p:ext uri="{BB962C8B-B14F-4D97-AF65-F5344CB8AC3E}">
-        <p14:creationId xmlns:p14="http://schemas.microsoft.com/office/powerpoint/2010/main" val="3999827197"/>
-      </p:ext>
-    </p:extLst>
-  </p:cSld>
-  <p:clrMapOvr>
-    <a:masterClrMapping/>
-  </p:clrMapOvr>
-</p:notes>
-</file>
-
-<file path=ppt/notesSlides/notesSlide16.xml><?xml version="1.0" encoding="utf-8"?>
-<p:notes xmlns:a="http://schemas.openxmlformats.org/drawingml/2006/main" xmlns:r="http://schemas.openxmlformats.org/officeDocument/2006/relationships" xmlns:p="http://schemas.openxmlformats.org/presentationml/2006/main">
-  <p:cSld>
-    <p:spTree>
-      <p:nvGrpSpPr>
-        <p:cNvPr id="1" name=""/>
-        <p:cNvGrpSpPr/>
-        <p:nvPr/>
-      </p:nvGrpSpPr>
-      <p:grpSpPr>
-        <a:xfrm>
-          <a:off x="0" y="0"/>
-          <a:ext cx="0" cy="0"/>
-          <a:chOff x="0" y="0"/>
-          <a:chExt cx="0" cy="0"/>
-        </a:xfrm>
-      </p:grpSpPr>
-      <p:sp>
-        <p:nvSpPr>
-          <p:cNvPr id="2" name="Slide Image Placeholder 1"/>
-          <p:cNvSpPr>
-            <a:spLocks noGrp="1" noRot="1" noChangeAspect="1"/>
-          </p:cNvSpPr>
-          <p:nvPr>
-            <p:ph type="sldImg"/>
-          </p:nvPr>
-        </p:nvSpPr>
-        <p:spPr/>
-      </p:sp>
-      <p:sp>
-        <p:nvSpPr>
-          <p:cNvPr id="3" name="Notes Placeholder 2"/>
-          <p:cNvSpPr>
-            <a:spLocks noGrp="1"/>
-          </p:cNvSpPr>
-          <p:nvPr>
-            <p:ph type="body" idx="1"/>
-          </p:nvPr>
-        </p:nvSpPr>
-        <p:spPr/>
-        <p:txBody>
-          <a:bodyPr/>
-          <a:lstStyle/>
-          <a:p>
-            <a:endParaRPr lang="en-US"/>
-          </a:p>
-        </p:txBody>
-      </p:sp>
-      <p:sp>
-        <p:nvSpPr>
-          <p:cNvPr id="4" name="Slide Number Placeholder 3"/>
-          <p:cNvSpPr>
-            <a:spLocks noGrp="1"/>
-          </p:cNvSpPr>
-          <p:nvPr>
-            <p:ph type="sldNum" sz="quarter" idx="10"/>
-          </p:nvPr>
-        </p:nvSpPr>
-        <p:spPr/>
-        <p:txBody>
-          <a:bodyPr/>
-          <a:lstStyle/>
-          <a:p>
-            <a:fld id="{6852FC05-FAE1-4440-921C-50678C694586}" type="slidenum">
-              <a:rPr lang="en-US"/>
-              <a:pPr/>
-              <a:t>25</a:t>
-            </a:fld>
-            <a:endParaRPr lang="en-US"/>
-          </a:p>
-        </p:txBody>
-      </p:sp>
-    </p:spTree>
-    <p:extLst>
-      <p:ext uri="{BB962C8B-B14F-4D97-AF65-F5344CB8AC3E}">
-        <p14:creationId xmlns:p14="http://schemas.microsoft.com/office/powerpoint/2010/main" val="426367415"/>
-      </p:ext>
-    </p:extLst>
-  </p:cSld>
-  <p:clrMapOvr>
-    <a:masterClrMapping/>
-  </p:clrMapOvr>
-</p:notes>
-</file>
-
-<file path=ppt/notesSlides/notesSlide17.xml><?xml version="1.0" encoding="utf-8"?>
-<p:notes xmlns:a="http://schemas.openxmlformats.org/drawingml/2006/main" xmlns:r="http://schemas.openxmlformats.org/officeDocument/2006/relationships" xmlns:p="http://schemas.openxmlformats.org/presentationml/2006/main">
-  <p:cSld>
-    <p:spTree>
-      <p:nvGrpSpPr>
-        <p:cNvPr id="1" name=""/>
-        <p:cNvGrpSpPr/>
-        <p:nvPr/>
-      </p:nvGrpSpPr>
-      <p:grpSpPr>
-        <a:xfrm>
-          <a:off x="0" y="0"/>
-          <a:ext cx="0" cy="0"/>
-          <a:chOff x="0" y="0"/>
-          <a:chExt cx="0" cy="0"/>
-        </a:xfrm>
-      </p:grpSpPr>
-      <p:sp>
-        <p:nvSpPr>
-          <p:cNvPr id="2" name="Slide Image Placeholder 1"/>
-          <p:cNvSpPr>
-            <a:spLocks noGrp="1" noRot="1" noChangeAspect="1"/>
-          </p:cNvSpPr>
-          <p:nvPr>
-            <p:ph type="sldImg"/>
-          </p:nvPr>
-        </p:nvSpPr>
-        <p:spPr/>
-      </p:sp>
-      <p:sp>
-        <p:nvSpPr>
-          <p:cNvPr id="3" name="Notes Placeholder 2"/>
-          <p:cNvSpPr>
-            <a:spLocks noGrp="1"/>
-          </p:cNvSpPr>
-          <p:nvPr>
-            <p:ph type="body" idx="1"/>
-          </p:nvPr>
-        </p:nvSpPr>
-        <p:spPr/>
-        <p:txBody>
-          <a:bodyPr/>
-          <a:lstStyle/>
-          <a:p>
-            <a:endParaRPr lang="en-US"/>
-          </a:p>
-        </p:txBody>
-      </p:sp>
-      <p:sp>
-        <p:nvSpPr>
-          <p:cNvPr id="4" name="Slide Number Placeholder 3"/>
-          <p:cNvSpPr>
-            <a:spLocks noGrp="1"/>
-          </p:cNvSpPr>
-          <p:nvPr>
-            <p:ph type="sldNum" sz="quarter" idx="10"/>
-          </p:nvPr>
-        </p:nvSpPr>
-        <p:spPr/>
-        <p:txBody>
-          <a:bodyPr/>
-          <a:lstStyle/>
-          <a:p>
-            <a:fld id="{6852FC05-FAE1-4440-921C-50678C694586}" type="slidenum">
-              <a:rPr lang="en-US"/>
-              <a:pPr/>
-              <a:t>26</a:t>
-            </a:fld>
-            <a:endParaRPr lang="en-US"/>
-          </a:p>
-        </p:txBody>
-      </p:sp>
-    </p:spTree>
-    <p:extLst>
-      <p:ext uri="{BB962C8B-B14F-4D97-AF65-F5344CB8AC3E}">
-        <p14:creationId xmlns:p14="http://schemas.microsoft.com/office/powerpoint/2010/main" val="396310405"/>
-      </p:ext>
-    </p:extLst>
-  </p:cSld>
-  <p:clrMapOvr>
-    <a:masterClrMapping/>
-  </p:clrMapOvr>
-</p:notes>
-</file>
-
-<file path=ppt/notesSlides/notesSlide18.xml><?xml version="1.0" encoding="utf-8"?>
-<p:notes xmlns:a="http://schemas.openxmlformats.org/drawingml/2006/main" xmlns:r="http://schemas.openxmlformats.org/officeDocument/2006/relationships" xmlns:p="http://schemas.openxmlformats.org/presentationml/2006/main">
-  <p:cSld>
-    <p:spTree>
-      <p:nvGrpSpPr>
-        <p:cNvPr id="1" name=""/>
-        <p:cNvGrpSpPr/>
-        <p:nvPr/>
-      </p:nvGrpSpPr>
-      <p:grpSpPr>
-        <a:xfrm>
-          <a:off x="0" y="0"/>
-          <a:ext cx="0" cy="0"/>
-          <a:chOff x="0" y="0"/>
-          <a:chExt cx="0" cy="0"/>
-        </a:xfrm>
-      </p:grpSpPr>
-      <p:sp>
-        <p:nvSpPr>
-          <p:cNvPr id="2" name="Slide Image Placeholder 1"/>
-          <p:cNvSpPr>
-            <a:spLocks noGrp="1" noRot="1" noChangeAspect="1"/>
-          </p:cNvSpPr>
-          <p:nvPr>
-            <p:ph type="sldImg"/>
-          </p:nvPr>
-        </p:nvSpPr>
-        <p:spPr/>
-      </p:sp>
-      <p:sp>
-        <p:nvSpPr>
-          <p:cNvPr id="3" name="Notes Placeholder 2"/>
-          <p:cNvSpPr>
-            <a:spLocks noGrp="1"/>
-          </p:cNvSpPr>
-          <p:nvPr>
-            <p:ph type="body" idx="1"/>
-          </p:nvPr>
-        </p:nvSpPr>
-        <p:spPr/>
-        <p:txBody>
-          <a:bodyPr/>
-          <a:lstStyle/>
-          <a:p>
-            <a:endParaRPr lang="en-US"/>
-          </a:p>
-        </p:txBody>
-      </p:sp>
-      <p:sp>
-        <p:nvSpPr>
-          <p:cNvPr id="4" name="Slide Number Placeholder 3"/>
-          <p:cNvSpPr>
-            <a:spLocks noGrp="1"/>
-          </p:cNvSpPr>
-          <p:nvPr>
-            <p:ph type="sldNum" sz="quarter" idx="10"/>
-          </p:nvPr>
-        </p:nvSpPr>
-        <p:spPr/>
-        <p:txBody>
-          <a:bodyPr/>
-          <a:lstStyle/>
-          <a:p>
-            <a:fld id="{6852FC05-FAE1-4440-921C-50678C694586}" type="slidenum">
-              <a:rPr lang="en-US"/>
-              <a:pPr/>
-              <a:t>27</a:t>
             </a:fld>
             <a:endParaRPr lang="en-US"/>
           </a:p>
@@ -1768,7 +1510,7 @@
     </p:spTree>
     <p:extLst>
       <p:ext uri="{BB962C8B-B14F-4D97-AF65-F5344CB8AC3E}">
-        <p14:creationId xmlns:p14="http://schemas.microsoft.com/office/powerpoint/2010/main" val="4111672396"/>
+        <p14:creationId xmlns:p14="http://schemas.microsoft.com/office/powerpoint/2010/main" val="2960941674"/>
       </p:ext>
     </p:extLst>
   </p:cSld>
@@ -1853,7 +1595,7 @@
     </p:spTree>
     <p:extLst>
       <p:ext uri="{BB962C8B-B14F-4D97-AF65-F5344CB8AC3E}">
-        <p14:creationId xmlns:p14="http://schemas.microsoft.com/office/powerpoint/2010/main" val="2960941674"/>
+        <p14:creationId xmlns:p14="http://schemas.microsoft.com/office/powerpoint/2010/main" val="3080460203"/>
       </p:ext>
     </p:extLst>
   </p:cSld>
@@ -1938,7 +1680,7 @@
     </p:spTree>
     <p:extLst>
       <p:ext uri="{BB962C8B-B14F-4D97-AF65-F5344CB8AC3E}">
-        <p14:creationId xmlns:p14="http://schemas.microsoft.com/office/powerpoint/2010/main" val="3080460203"/>
+        <p14:creationId xmlns:p14="http://schemas.microsoft.com/office/powerpoint/2010/main" val="3408433169"/>
       </p:ext>
     </p:extLst>
   </p:cSld>
@@ -2023,7 +1765,7 @@
     </p:spTree>
     <p:extLst>
       <p:ext uri="{BB962C8B-B14F-4D97-AF65-F5344CB8AC3E}">
-        <p14:creationId xmlns:p14="http://schemas.microsoft.com/office/powerpoint/2010/main" val="3408433169"/>
+        <p14:creationId xmlns:p14="http://schemas.microsoft.com/office/powerpoint/2010/main" val="1768697153"/>
       </p:ext>
     </p:extLst>
   </p:cSld>
@@ -2163,7 +1905,7 @@
             <a:fld id="{D6D2D89E-F8D6-4D1D-8BFD-B2488F748407}" type="datetimeFigureOut">
               <a:rPr lang="pt-BR" smtClean="0"/>
               <a:pPr/>
-              <a:t>24/10/2014</a:t>
+              <a:t>11/12/2014</a:t>
             </a:fld>
             <a:endParaRPr lang="pt-BR"/>
           </a:p>
@@ -2333,7 +2075,7 @@
             <a:fld id="{D6D2D89E-F8D6-4D1D-8BFD-B2488F748407}" type="datetimeFigureOut">
               <a:rPr lang="pt-BR" smtClean="0"/>
               <a:pPr/>
-              <a:t>24/10/2014</a:t>
+              <a:t>11/12/2014</a:t>
             </a:fld>
             <a:endParaRPr lang="pt-BR"/>
           </a:p>
@@ -2513,7 +2255,7 @@
             <a:fld id="{D6D2D89E-F8D6-4D1D-8BFD-B2488F748407}" type="datetimeFigureOut">
               <a:rPr lang="pt-BR" smtClean="0"/>
               <a:pPr/>
-              <a:t>24/10/2014</a:t>
+              <a:t>11/12/2014</a:t>
             </a:fld>
             <a:endParaRPr lang="pt-BR"/>
           </a:p>
@@ -2683,7 +2425,7 @@
             <a:fld id="{D6D2D89E-F8D6-4D1D-8BFD-B2488F748407}" type="datetimeFigureOut">
               <a:rPr lang="pt-BR" smtClean="0"/>
               <a:pPr/>
-              <a:t>24/10/2014</a:t>
+              <a:t>11/12/2014</a:t>
             </a:fld>
             <a:endParaRPr lang="pt-BR"/>
           </a:p>
@@ -2928,7 +2670,7 @@
             <a:fld id="{D6D2D89E-F8D6-4D1D-8BFD-B2488F748407}" type="datetimeFigureOut">
               <a:rPr lang="pt-BR" smtClean="0"/>
               <a:pPr/>
-              <a:t>24/10/2014</a:t>
+              <a:t>11/12/2014</a:t>
             </a:fld>
             <a:endParaRPr lang="pt-BR"/>
           </a:p>
@@ -3159,7 +2901,7 @@
             <a:fld id="{D6D2D89E-F8D6-4D1D-8BFD-B2488F748407}" type="datetimeFigureOut">
               <a:rPr lang="pt-BR" smtClean="0"/>
               <a:pPr/>
-              <a:t>24/10/2014</a:t>
+              <a:t>11/12/2014</a:t>
             </a:fld>
             <a:endParaRPr lang="pt-BR"/>
           </a:p>
@@ -3525,7 +3267,7 @@
             <a:fld id="{D6D2D89E-F8D6-4D1D-8BFD-B2488F748407}" type="datetimeFigureOut">
               <a:rPr lang="pt-BR" smtClean="0"/>
               <a:pPr/>
-              <a:t>24/10/2014</a:t>
+              <a:t>11/12/2014</a:t>
             </a:fld>
             <a:endParaRPr lang="pt-BR"/>
           </a:p>
@@ -3644,7 +3386,7 @@
             <a:fld id="{D6D2D89E-F8D6-4D1D-8BFD-B2488F748407}" type="datetimeFigureOut">
               <a:rPr lang="pt-BR" smtClean="0"/>
               <a:pPr/>
-              <a:t>24/10/2014</a:t>
+              <a:t>11/12/2014</a:t>
             </a:fld>
             <a:endParaRPr lang="pt-BR"/>
           </a:p>
@@ -3741,7 +3483,7 @@
             <a:fld id="{D6D2D89E-F8D6-4D1D-8BFD-B2488F748407}" type="datetimeFigureOut">
               <a:rPr lang="pt-BR" smtClean="0"/>
               <a:pPr/>
-              <a:t>24/10/2014</a:t>
+              <a:t>11/12/2014</a:t>
             </a:fld>
             <a:endParaRPr lang="pt-BR"/>
           </a:p>
@@ -4018,7 +3760,7 @@
             <a:fld id="{D6D2D89E-F8D6-4D1D-8BFD-B2488F748407}" type="datetimeFigureOut">
               <a:rPr lang="pt-BR" smtClean="0"/>
               <a:pPr/>
-              <a:t>24/10/2014</a:t>
+              <a:t>11/12/2014</a:t>
             </a:fld>
             <a:endParaRPr lang="pt-BR"/>
           </a:p>
@@ -4275,7 +4017,7 @@
             <a:fld id="{D6D2D89E-F8D6-4D1D-8BFD-B2488F748407}" type="datetimeFigureOut">
               <a:rPr lang="pt-BR" smtClean="0"/>
               <a:pPr/>
-              <a:t>24/10/2014</a:t>
+              <a:t>11/12/2014</a:t>
             </a:fld>
             <a:endParaRPr lang="pt-BR"/>
           </a:p>
@@ -4491,7 +4233,7 @@
             <a:fld id="{D6D2D89E-F8D6-4D1D-8BFD-B2488F748407}" type="datetimeFigureOut">
               <a:rPr lang="pt-BR" smtClean="0"/>
               <a:pPr/>
-              <a:t>24/10/2014</a:t>
+              <a:t>11/12/2014</a:t>
             </a:fld>
             <a:endParaRPr lang="pt-BR"/>
           </a:p>
@@ -4963,7 +4705,12 @@
             <p:ph type="title"/>
           </p:nvPr>
         </p:nvSpPr>
-        <p:spPr/>
+        <p:spPr>
+          <a:xfrm>
+            <a:off x="683568" y="476672"/>
+            <a:ext cx="8229600" cy="1143000"/>
+          </a:xfrm>
+        </p:spPr>
         <p:txBody>
           <a:bodyPr>
             <a:noAutofit/>
@@ -5004,68 +4751,57 @@
           </a:bodyPr>
           <a:lstStyle/>
           <a:p>
-            <a:pPr algn="ctr">
+            <a:pPr>
               <a:buNone/>
             </a:pPr>
             <a:r>
-              <a:rPr lang="pt-BR" sz="3600" b="1" dirty="0">
+              <a:rPr lang="pt-BR" sz="3600" dirty="0" smtClean="0"/>
+              <a:t> </a:t>
+            </a:r>
+            <a:r>
+              <a:rPr lang="pt-BR" dirty="0" smtClean="0">
                 <a:latin typeface="Segoe UI" pitchFamily="34" charset="0"/>
                 <a:ea typeface="Segoe UI" pitchFamily="34" charset="0"/>
                 <a:cs typeface="Segoe UI" pitchFamily="34" charset="0"/>
               </a:rPr>
-              <a:t>Tecnologias Utilizadas:</a:t>
-            </a:r>
-          </a:p>
-          <a:p>
-            <a:pPr algn="ctr">
-              <a:buNone/>
+              <a:t>Qual o motivo das escolhas realizadas?</a:t>
+            </a:r>
+          </a:p>
+          <a:p>
+            <a:pPr>
+              <a:buFontTx/>
+              <a:buChar char="-"/>
             </a:pPr>
             <a:r>
-              <a:rPr lang="pt-BR" sz="3600" dirty="0">
+              <a:rPr lang="pt-BR" dirty="0" smtClean="0">
                 <a:latin typeface="Segoe UI" pitchFamily="34" charset="0"/>
                 <a:ea typeface="Segoe UI" pitchFamily="34" charset="0"/>
                 <a:cs typeface="Segoe UI" pitchFamily="34" charset="0"/>
               </a:rPr>
-              <a:t> PHP, CSS, MySQL, AJAX, JavaScript</a:t>
-            </a:r>
-          </a:p>
-          <a:p>
-            <a:pPr algn="ctr">
-              <a:buNone/>
+              <a:t>Linguagem PHP: Interesse no aprendizado </a:t>
+            </a:r>
+          </a:p>
+          <a:p>
+            <a:pPr>
+              <a:buFontTx/>
+              <a:buChar char="-"/>
             </a:pPr>
-            <a:endParaRPr lang="pt-BR" sz="3600" dirty="0">
-              <a:latin typeface="Segoe UI" pitchFamily="34" charset="0"/>
-              <a:ea typeface="Segoe UI" pitchFamily="34" charset="0"/>
-              <a:cs typeface="Segoe UI" pitchFamily="34" charset="0"/>
-            </a:endParaRPr>
-          </a:p>
-          <a:p>
-            <a:pPr algn="ctr">
-              <a:buNone/>
-            </a:pPr>
-            <a:r>
-              <a:rPr lang="pt-BR" sz="3600" b="1" dirty="0">
+            <a:r>
+              <a:rPr lang="pt-BR" dirty="0" smtClean="0">
                 <a:latin typeface="Segoe UI" pitchFamily="34" charset="0"/>
                 <a:ea typeface="Segoe UI" pitchFamily="34" charset="0"/>
                 <a:cs typeface="Segoe UI" pitchFamily="34" charset="0"/>
               </a:rPr>
-              <a:t>Ferramentas Utilizadas</a:t>
-            </a:r>
-          </a:p>
-          <a:p>
-            <a:pPr algn="ctr">
-              <a:buNone/>
+              <a:t>MySQL: Ótimo SGBD para a criação e manipulação de banco de dados relacionais</a:t>
+            </a:r>
+          </a:p>
+          <a:p>
+            <a:pPr>
+              <a:buFontTx/>
+              <a:buChar char="-"/>
             </a:pPr>
             <a:r>
-              <a:rPr lang="pt-BR" sz="3600" dirty="0" smtClean="0">
-                <a:latin typeface="Segoe UI" pitchFamily="34" charset="0"/>
-                <a:ea typeface="Segoe UI" pitchFamily="34" charset="0"/>
-                <a:cs typeface="Segoe UI" pitchFamily="34" charset="0"/>
-              </a:rPr>
-              <a:t>Sublime, </a:t>
-            </a:r>
-            <a:r>
-              <a:rPr lang="pt-BR" sz="3600" dirty="0" err="1">
+              <a:rPr lang="pt-BR" dirty="0" err="1" smtClean="0">
                 <a:latin typeface="Segoe UI" pitchFamily="34" charset="0"/>
                 <a:ea typeface="Segoe UI" pitchFamily="34" charset="0"/>
                 <a:cs typeface="Segoe UI" pitchFamily="34" charset="0"/>
@@ -5073,37 +4809,24 @@
               <a:t>GitHub</a:t>
             </a:r>
             <a:r>
-              <a:rPr lang="pt-BR" sz="3600" dirty="0">
+              <a:rPr lang="pt-BR" dirty="0" smtClean="0">
                 <a:latin typeface="Segoe UI" pitchFamily="34" charset="0"/>
                 <a:ea typeface="Segoe UI" pitchFamily="34" charset="0"/>
                 <a:cs typeface="Segoe UI" pitchFamily="34" charset="0"/>
               </a:rPr>
-              <a:t>, </a:t>
-            </a:r>
-            <a:r>
-              <a:rPr lang="pt-BR" sz="3600" dirty="0" err="1"/>
-              <a:t>DreamWeaver</a:t>
-            </a:r>
-            <a:r>
-              <a:rPr lang="pt-BR" sz="3600" dirty="0"/>
-              <a:t>, </a:t>
-            </a:r>
-            <a:r>
-              <a:rPr lang="pt-BR" sz="3600" dirty="0" smtClean="0">
-                <a:latin typeface="Segoe UI" pitchFamily="34" charset="0"/>
-                <a:ea typeface="Segoe UI" pitchFamily="34" charset="0"/>
-                <a:cs typeface="Segoe UI" pitchFamily="34" charset="0"/>
-              </a:rPr>
-              <a:t>Access</a:t>
-            </a:r>
-            <a:r>
-              <a:rPr lang="pt-BR" sz="3600" dirty="0">
-                <a:latin typeface="Segoe UI" pitchFamily="34" charset="0"/>
-                <a:ea typeface="Segoe UI" pitchFamily="34" charset="0"/>
-                <a:cs typeface="Segoe UI" pitchFamily="34" charset="0"/>
-              </a:rPr>
-              <a:t>, Dia</a:t>
-            </a:r>
+              <a:t>: Amplamente utilizado para controle de versões e desenvolvimento em grupo</a:t>
+            </a:r>
+          </a:p>
+          <a:p>
+            <a:pPr>
+              <a:buFontTx/>
+              <a:buChar char="-"/>
+            </a:pPr>
+            <a:endParaRPr lang="pt-BR" b="1" dirty="0">
+              <a:latin typeface="Segoe UI" pitchFamily="34" charset="0"/>
+              <a:ea typeface="Segoe UI" pitchFamily="34" charset="0"/>
+              <a:cs typeface="Segoe UI" pitchFamily="34" charset="0"/>
+            </a:endParaRPr>
           </a:p>
         </p:txBody>
       </p:sp>
@@ -5151,7 +4874,7 @@
         </p:nvSpPr>
         <p:spPr>
           <a:xfrm>
-            <a:off x="323528" y="332656"/>
+            <a:off x="683568" y="476672"/>
             <a:ext cx="8229600" cy="1143000"/>
           </a:xfrm>
         </p:spPr>
@@ -5161,14 +4884,13 @@
           </a:bodyPr>
           <a:lstStyle/>
           <a:p>
-            <a:pPr algn="ctr"/>
             <a:r>
               <a:rPr lang="pt-BR" sz="4000" dirty="0" smtClean="0">
                 <a:latin typeface="Segoe UI" pitchFamily="34" charset="0"/>
                 <a:ea typeface="Segoe UI" pitchFamily="34" charset="0"/>
                 <a:cs typeface="Segoe UI" pitchFamily="34" charset="0"/>
               </a:rPr>
-              <a:t>Tecnologias e Ferramentas</a:t>
+              <a:t>Arquitetura do Sistema</a:t>
             </a:r>
             <a:endParaRPr lang="pt-BR" sz="4000" dirty="0">
               <a:latin typeface="Segoe UI" pitchFamily="34" charset="0"/>
@@ -5180,191 +4902,107 @@
       </p:sp>
       <p:sp>
         <p:nvSpPr>
-          <p:cNvPr id="4" name="Espaço Reservado para Conteúdo 2"/>
-          <p:cNvSpPr txBox="1">
-            <a:spLocks/>
-          </p:cNvSpPr>
-          <p:nvPr/>
+          <p:cNvPr id="3" name="Espaço Reservado para Conteúdo 2"/>
+          <p:cNvSpPr>
+            <a:spLocks noGrp="1"/>
+          </p:cNvSpPr>
+          <p:nvPr>
+            <p:ph idx="1"/>
+          </p:nvPr>
         </p:nvSpPr>
         <p:spPr>
           <a:xfrm>
-            <a:off x="395536" y="2924944"/>
-            <a:ext cx="8229600" cy="2509739"/>
+            <a:off x="539552" y="2348880"/>
+            <a:ext cx="7886700" cy="4351338"/>
           </a:xfrm>
-          <a:prstGeom prst="rect">
-            <a:avLst/>
-          </a:prstGeom>
         </p:spPr>
         <p:txBody>
-          <a:bodyPr vert="horz" lIns="91440" tIns="45720" rIns="91440" bIns="45720" rtlCol="0">
+          <a:bodyPr>
             <a:normAutofit/>
           </a:bodyPr>
           <a:lstStyle/>
           <a:p>
-            <a:pPr marL="342900" lvl="0" indent="-342900">
-              <a:spcBef>
-                <a:spcPct val="20000"/>
-              </a:spcBef>
-            </a:pPr>
-            <a:r>
-              <a:rPr kumimoji="0" lang="pt-BR" sz="3600" i="0" u="none" strike="noStrike" kern="1200" cap="none" spc="0" normalizeH="0" baseline="0" noProof="0" dirty="0">
-                <a:ln>
-                  <a:noFill/>
-                </a:ln>
-                <a:solidFill>
-                  <a:schemeClr val="tx1"/>
-                </a:solidFill>
-                <a:effectLst/>
-                <a:uLnTx/>
-                <a:uFillTx/>
-                <a:ea typeface="+mn-ea"/>
-                <a:cs typeface="+mn-cs"/>
-              </a:rPr>
-              <a:t>	</a:t>
-            </a:r>
-            <a:r>
-              <a:rPr kumimoji="0" lang="pt-BR" sz="3600" i="0" u="none" strike="noStrike" kern="1200" cap="none" spc="0" normalizeH="0" baseline="0" noProof="0" dirty="0">
-                <a:ln>
-                  <a:noFill/>
-                </a:ln>
-                <a:solidFill>
-                  <a:schemeClr val="tx1"/>
-                </a:solidFill>
-                <a:effectLst/>
-                <a:uLnTx/>
-                <a:uFillTx/>
+            <a:pPr lvl="1"/>
+            <a:r>
+              <a:rPr lang="pt-BR" dirty="0" err="1" smtClean="0">
+                <a:latin typeface="Segoe UI" pitchFamily="34" charset="0"/>
                 <a:ea typeface="Segoe UI" pitchFamily="34" charset="0"/>
                 <a:cs typeface="Segoe UI" pitchFamily="34" charset="0"/>
               </a:rPr>
-              <a:t/>
-            </a:r>
-            <a:br>
-              <a:rPr kumimoji="0" lang="pt-BR" sz="3600" i="0" u="none" strike="noStrike" kern="1200" cap="none" spc="0" normalizeH="0" baseline="0" noProof="0" dirty="0">
-                <a:ln>
-                  <a:noFill/>
-                </a:ln>
-                <a:solidFill>
-                  <a:schemeClr val="tx1"/>
-                </a:solidFill>
-                <a:effectLst/>
-                <a:uLnTx/>
-                <a:uFillTx/>
+              <a:t>Product</a:t>
+            </a:r>
+            <a:r>
+              <a:rPr lang="pt-BR" dirty="0" smtClean="0">
+                <a:latin typeface="Segoe UI" pitchFamily="34" charset="0"/>
                 <a:ea typeface="Segoe UI" pitchFamily="34" charset="0"/>
                 <a:cs typeface="Segoe UI" pitchFamily="34" charset="0"/>
               </a:rPr>
-            </a:br>
-            <a:r>
-              <a:rPr kumimoji="0" lang="pt-BR" sz="2800" i="0" u="none" strike="noStrike" kern="1200" cap="none" spc="0" normalizeH="0" baseline="0" noProof="0" dirty="0">
-                <a:ln>
-                  <a:noFill/>
-                </a:ln>
-                <a:solidFill>
-                  <a:srgbClr val="000000"/>
-                </a:solidFill>
-                <a:effectLst/>
-                <a:uLnTx/>
-                <a:uFillTx/>
+              <a:t> </a:t>
+            </a:r>
+            <a:r>
+              <a:rPr lang="pt-BR" dirty="0" err="1" smtClean="0">
+                <a:latin typeface="Segoe UI" pitchFamily="34" charset="0"/>
                 <a:ea typeface="Segoe UI" pitchFamily="34" charset="0"/>
                 <a:cs typeface="Segoe UI" pitchFamily="34" charset="0"/>
               </a:rPr>
-              <a:t>Hospedagem(a definir), Jquery, </a:t>
-            </a:r>
-            <a:r>
-              <a:rPr kumimoji="0" lang="pt-BR" sz="2800" i="0" u="none" strike="noStrike" kern="1200" cap="none" spc="0" normalizeH="0" baseline="0" noProof="0" dirty="0" err="1">
-                <a:ln>
-                  <a:noFill/>
-                </a:ln>
-                <a:solidFill>
-                  <a:srgbClr val="000000"/>
-                </a:solidFill>
-                <a:effectLst/>
-                <a:uLnTx/>
-                <a:uFillTx/>
+              <a:t>backlog</a:t>
+            </a:r>
+            <a:endParaRPr lang="pt-BR" dirty="0" smtClean="0">
+              <a:latin typeface="Segoe UI" pitchFamily="34" charset="0"/>
+              <a:ea typeface="Segoe UI" pitchFamily="34" charset="0"/>
+              <a:cs typeface="Segoe UI" pitchFamily="34" charset="0"/>
+            </a:endParaRPr>
+          </a:p>
+          <a:p>
+            <a:pPr lvl="1"/>
+            <a:r>
+              <a:rPr lang="pt-BR" dirty="0" smtClean="0">
+                <a:latin typeface="Segoe UI" pitchFamily="34" charset="0"/>
                 <a:ea typeface="Segoe UI" pitchFamily="34" charset="0"/>
                 <a:cs typeface="Segoe UI" pitchFamily="34" charset="0"/>
               </a:rPr>
-              <a:t>Less</a:t>
-            </a:r>
-            <a:r>
-              <a:rPr kumimoji="0" lang="pt-BR" sz="2800" i="0" u="none" strike="noStrike" kern="1200" cap="none" spc="0" normalizeH="0" baseline="0" noProof="0" dirty="0">
-                <a:ln>
-                  <a:noFill/>
-                </a:ln>
-                <a:solidFill>
-                  <a:srgbClr val="000000"/>
-                </a:solidFill>
-                <a:effectLst/>
-                <a:uLnTx/>
-                <a:uFillTx/>
+              <a:t>Gerenciamento do projeto-</a:t>
+            </a:r>
+            <a:r>
+              <a:rPr lang="pt-BR" dirty="0" err="1" smtClean="0">
+                <a:latin typeface="Segoe UI" pitchFamily="34" charset="0"/>
                 <a:ea typeface="Segoe UI" pitchFamily="34" charset="0"/>
                 <a:cs typeface="Segoe UI" pitchFamily="34" charset="0"/>
               </a:rPr>
-              <a:t>(em </a:t>
-            </a:r>
-            <a:r>
-              <a:rPr kumimoji="0" lang="pt-BR" sz="2800" i="0" u="none" strike="noStrike" kern="1200" cap="none" spc="0" normalizeH="0" baseline="0" noProof="0" dirty="0" smtClean="0">
-                <a:ln>
-                  <a:noFill/>
-                </a:ln>
-                <a:solidFill>
-                  <a:srgbClr val="000000"/>
-                </a:solidFill>
-                <a:effectLst/>
-                <a:uLnTx/>
-                <a:uFillTx/>
+              <a:t>Trello</a:t>
+            </a:r>
+            <a:endParaRPr lang="pt-BR" dirty="0" smtClean="0">
+              <a:latin typeface="Segoe UI" pitchFamily="34" charset="0"/>
+              <a:ea typeface="Segoe UI" pitchFamily="34" charset="0"/>
+              <a:cs typeface="Segoe UI" pitchFamily="34" charset="0"/>
+            </a:endParaRPr>
+          </a:p>
+          <a:p>
+            <a:pPr lvl="1"/>
+            <a:r>
+              <a:rPr lang="pt-BR" dirty="0" smtClean="0">
+                <a:latin typeface="Segoe UI" pitchFamily="34" charset="0"/>
                 <a:ea typeface="Segoe UI" pitchFamily="34" charset="0"/>
                 <a:cs typeface="Segoe UI" pitchFamily="34" charset="0"/>
               </a:rPr>
-              <a:t>análise</a:t>
-            </a:r>
-            <a:r>
-              <a:rPr kumimoji="0" lang="pt-BR" sz="2800" i="0" u="none" strike="noStrike" kern="1200" cap="none" spc="0" normalizeH="0" baseline="0" noProof="0" dirty="0">
-                <a:ln>
-                  <a:noFill/>
-                </a:ln>
-                <a:solidFill>
-                  <a:srgbClr val="000000"/>
-                </a:solidFill>
-                <a:effectLst/>
-                <a:uLnTx/>
-                <a:uFillTx/>
+              <a:t>Modelo ER</a:t>
+            </a:r>
+          </a:p>
+          <a:p>
+            <a:pPr lvl="1"/>
+            <a:r>
+              <a:rPr lang="pt-BR" dirty="0" smtClean="0">
+                <a:latin typeface="Segoe UI" pitchFamily="34" charset="0"/>
                 <a:ea typeface="Segoe UI" pitchFamily="34" charset="0"/>
                 <a:cs typeface="Segoe UI" pitchFamily="34" charset="0"/>
               </a:rPr>
-              <a:t>)</a:t>
-            </a:r>
-          </a:p>
-        </p:txBody>
-      </p:sp>
-      <p:sp>
-        <p:nvSpPr>
-          <p:cNvPr id="5" name="Retângulo 4"/>
-          <p:cNvSpPr/>
-          <p:nvPr/>
-        </p:nvSpPr>
-        <p:spPr>
-          <a:xfrm>
-            <a:off x="1331640" y="1844824"/>
-            <a:ext cx="6408712" cy="584775"/>
-          </a:xfrm>
-          <a:prstGeom prst="rect">
-            <a:avLst/>
-          </a:prstGeom>
-        </p:spPr>
-        <p:txBody>
-          <a:bodyPr wrap="square">
-            <a:spAutoFit/>
-          </a:bodyPr>
-          <a:lstStyle/>
-          <a:p>
-            <a:r>
-              <a:rPr lang="pt-BR" sz="3200" b="1" dirty="0" smtClean="0">
-                <a:ea typeface="Segoe UI" pitchFamily="34" charset="0"/>
-                <a:cs typeface="Segoe UI" pitchFamily="34" charset="0"/>
-              </a:rPr>
-              <a:t>Recursos, bibliotecas e frameworks</a:t>
-            </a:r>
-            <a:endParaRPr lang="pt-BR" sz="3200" b="1" dirty="0"/>
+              <a:t>Protótipos de interface</a:t>
+            </a:r>
+            <a:endParaRPr lang="pt-BR" b="1" dirty="0">
+              <a:latin typeface="Segoe UI" pitchFamily="34" charset="0"/>
+              <a:ea typeface="Segoe UI" pitchFamily="34" charset="0"/>
+              <a:cs typeface="Segoe UI" pitchFamily="34" charset="0"/>
+            </a:endParaRPr>
           </a:p>
         </p:txBody>
       </p:sp>
@@ -5384,451 +5022,6 @@
 </file>
 
 <file path=ppt/slides/slide12.xml><?xml version="1.0" encoding="utf-8"?>
-<p:sld xmlns:a="http://schemas.openxmlformats.org/drawingml/2006/main" xmlns:r="http://schemas.openxmlformats.org/officeDocument/2006/relationships" xmlns:p="http://schemas.openxmlformats.org/presentationml/2006/main">
-  <p:cSld>
-    <p:spTree>
-      <p:nvGrpSpPr>
-        <p:cNvPr id="1" name=""/>
-        <p:cNvGrpSpPr/>
-        <p:nvPr/>
-      </p:nvGrpSpPr>
-      <p:grpSpPr>
-        <a:xfrm>
-          <a:off x="0" y="0"/>
-          <a:ext cx="0" cy="0"/>
-          <a:chOff x="0" y="0"/>
-          <a:chExt cx="0" cy="0"/>
-        </a:xfrm>
-      </p:grpSpPr>
-      <p:sp>
-        <p:nvSpPr>
-          <p:cNvPr id="2" name="Título 1"/>
-          <p:cNvSpPr>
-            <a:spLocks noGrp="1"/>
-          </p:cNvSpPr>
-          <p:nvPr>
-            <p:ph type="title"/>
-          </p:nvPr>
-        </p:nvSpPr>
-        <p:spPr>
-          <a:xfrm>
-            <a:off x="683568" y="476672"/>
-            <a:ext cx="8229600" cy="1143000"/>
-          </a:xfrm>
-        </p:spPr>
-        <p:txBody>
-          <a:bodyPr>
-            <a:noAutofit/>
-          </a:bodyPr>
-          <a:lstStyle/>
-          <a:p>
-            <a:pPr algn="ctr"/>
-            <a:r>
-              <a:rPr lang="pt-BR" sz="4000" dirty="0" smtClean="0">
-                <a:latin typeface="Segoe UI" pitchFamily="34" charset="0"/>
-                <a:ea typeface="Segoe UI" pitchFamily="34" charset="0"/>
-                <a:cs typeface="Segoe UI" pitchFamily="34" charset="0"/>
-              </a:rPr>
-              <a:t>Tecnologias e Ferramentas</a:t>
-            </a:r>
-            <a:endParaRPr lang="pt-BR" sz="4000" dirty="0">
-              <a:latin typeface="Segoe UI" pitchFamily="34" charset="0"/>
-              <a:ea typeface="Segoe UI" pitchFamily="34" charset="0"/>
-              <a:cs typeface="Segoe UI" pitchFamily="34" charset="0"/>
-            </a:endParaRPr>
-          </a:p>
-        </p:txBody>
-      </p:sp>
-      <p:sp>
-        <p:nvSpPr>
-          <p:cNvPr id="3" name="Espaço Reservado para Conteúdo 2"/>
-          <p:cNvSpPr>
-            <a:spLocks noGrp="1"/>
-          </p:cNvSpPr>
-          <p:nvPr>
-            <p:ph idx="1"/>
-          </p:nvPr>
-        </p:nvSpPr>
-        <p:spPr/>
-        <p:txBody>
-          <a:bodyPr>
-            <a:normAutofit/>
-          </a:bodyPr>
-          <a:lstStyle/>
-          <a:p>
-            <a:pPr>
-              <a:buNone/>
-            </a:pPr>
-            <a:r>
-              <a:rPr lang="pt-BR" sz="3600" dirty="0" smtClean="0"/>
-              <a:t> </a:t>
-            </a:r>
-            <a:r>
-              <a:rPr lang="pt-BR" dirty="0" smtClean="0">
-                <a:latin typeface="Segoe UI" pitchFamily="34" charset="0"/>
-                <a:ea typeface="Segoe UI" pitchFamily="34" charset="0"/>
-                <a:cs typeface="Segoe UI" pitchFamily="34" charset="0"/>
-              </a:rPr>
-              <a:t>Qual o motivo das escolhas realizadas?</a:t>
-            </a:r>
-          </a:p>
-          <a:p>
-            <a:pPr>
-              <a:buFontTx/>
-              <a:buChar char="-"/>
-            </a:pPr>
-            <a:r>
-              <a:rPr lang="pt-BR" dirty="0" smtClean="0">
-                <a:latin typeface="Segoe UI" pitchFamily="34" charset="0"/>
-                <a:ea typeface="Segoe UI" pitchFamily="34" charset="0"/>
-                <a:cs typeface="Segoe UI" pitchFamily="34" charset="0"/>
-              </a:rPr>
-              <a:t>Linguagem PHP: Interesse no aprendizado </a:t>
-            </a:r>
-          </a:p>
-          <a:p>
-            <a:pPr>
-              <a:buFontTx/>
-              <a:buChar char="-"/>
-            </a:pPr>
-            <a:r>
-              <a:rPr lang="pt-BR" dirty="0" smtClean="0">
-                <a:latin typeface="Segoe UI" pitchFamily="34" charset="0"/>
-                <a:ea typeface="Segoe UI" pitchFamily="34" charset="0"/>
-                <a:cs typeface="Segoe UI" pitchFamily="34" charset="0"/>
-              </a:rPr>
-              <a:t>MySQL: Ótimo SGBD para a criação e manipulação de banco de dados relacionais</a:t>
-            </a:r>
-          </a:p>
-          <a:p>
-            <a:pPr>
-              <a:buFontTx/>
-              <a:buChar char="-"/>
-            </a:pPr>
-            <a:r>
-              <a:rPr lang="pt-BR" dirty="0" err="1" smtClean="0">
-                <a:latin typeface="Segoe UI" pitchFamily="34" charset="0"/>
-                <a:ea typeface="Segoe UI" pitchFamily="34" charset="0"/>
-                <a:cs typeface="Segoe UI" pitchFamily="34" charset="0"/>
-              </a:rPr>
-              <a:t>GitHub</a:t>
-            </a:r>
-            <a:r>
-              <a:rPr lang="pt-BR" dirty="0" smtClean="0">
-                <a:latin typeface="Segoe UI" pitchFamily="34" charset="0"/>
-                <a:ea typeface="Segoe UI" pitchFamily="34" charset="0"/>
-                <a:cs typeface="Segoe UI" pitchFamily="34" charset="0"/>
-              </a:rPr>
-              <a:t>: Amplamente utilizado para controle de versões e desenvolvimento em grupo</a:t>
-            </a:r>
-          </a:p>
-          <a:p>
-            <a:pPr>
-              <a:buFontTx/>
-              <a:buChar char="-"/>
-            </a:pPr>
-            <a:endParaRPr lang="pt-BR" b="1" dirty="0">
-              <a:latin typeface="Segoe UI" pitchFamily="34" charset="0"/>
-              <a:ea typeface="Segoe UI" pitchFamily="34" charset="0"/>
-              <a:cs typeface="Segoe UI" pitchFamily="34" charset="0"/>
-            </a:endParaRPr>
-          </a:p>
-        </p:txBody>
-      </p:sp>
-    </p:spTree>
-  </p:cSld>
-  <p:clrMapOvr>
-    <a:masterClrMapping/>
-  </p:clrMapOvr>
-  <p:timing>
-    <p:tnLst>
-      <p:par>
-        <p:cTn id="1" dur="indefinite" restart="never" nodeType="tmRoot"/>
-      </p:par>
-    </p:tnLst>
-  </p:timing>
-</p:sld>
-</file>
-
-<file path=ppt/slides/slide13.xml><?xml version="1.0" encoding="utf-8"?>
-<p:sld xmlns:a="http://schemas.openxmlformats.org/drawingml/2006/main" xmlns:r="http://schemas.openxmlformats.org/officeDocument/2006/relationships" xmlns:p="http://schemas.openxmlformats.org/presentationml/2006/main">
-  <p:cSld>
-    <p:spTree>
-      <p:nvGrpSpPr>
-        <p:cNvPr id="1" name=""/>
-        <p:cNvGrpSpPr/>
-        <p:nvPr/>
-      </p:nvGrpSpPr>
-      <p:grpSpPr>
-        <a:xfrm>
-          <a:off x="0" y="0"/>
-          <a:ext cx="0" cy="0"/>
-          <a:chOff x="0" y="0"/>
-          <a:chExt cx="0" cy="0"/>
-        </a:xfrm>
-      </p:grpSpPr>
-      <p:sp>
-        <p:nvSpPr>
-          <p:cNvPr id="2" name="Título 1"/>
-          <p:cNvSpPr>
-            <a:spLocks noGrp="1"/>
-          </p:cNvSpPr>
-          <p:nvPr>
-            <p:ph type="title"/>
-          </p:nvPr>
-        </p:nvSpPr>
-        <p:spPr/>
-        <p:txBody>
-          <a:bodyPr/>
-          <a:lstStyle/>
-          <a:p>
-            <a:endParaRPr lang="pt-BR"/>
-          </a:p>
-        </p:txBody>
-      </p:sp>
-      <p:sp>
-        <p:nvSpPr>
-          <p:cNvPr id="3" name="Espaço Reservado para Conteúdo 2"/>
-          <p:cNvSpPr>
-            <a:spLocks noGrp="1"/>
-          </p:cNvSpPr>
-          <p:nvPr>
-            <p:ph idx="1"/>
-          </p:nvPr>
-        </p:nvSpPr>
-        <p:spPr/>
-        <p:txBody>
-          <a:bodyPr/>
-          <a:lstStyle/>
-          <a:p>
-            <a:r>
-              <a:rPr lang="pt-BR" dirty="0" err="1" smtClean="0"/>
-              <a:t>DreamWeaver</a:t>
-            </a:r>
-            <a:r>
-              <a:rPr lang="pt-BR" dirty="0" smtClean="0"/>
-              <a:t>: Ágil para criar interfaces e organizar o projeto</a:t>
-            </a:r>
-          </a:p>
-          <a:p>
-            <a:r>
-              <a:rPr lang="pt-BR" dirty="0" smtClean="0"/>
-              <a:t>Access: utilizado para trabalhar no tratamento das bases de dados pesquisadas</a:t>
-            </a:r>
-          </a:p>
-          <a:p>
-            <a:r>
-              <a:rPr lang="pt-BR" dirty="0" smtClean="0"/>
-              <a:t>Sublime: Agradável para trabalhar no código, rápido, fácil </a:t>
-            </a:r>
-          </a:p>
-        </p:txBody>
-      </p:sp>
-    </p:spTree>
-    <p:extLst>
-      <p:ext uri="{BB962C8B-B14F-4D97-AF65-F5344CB8AC3E}">
-        <p14:creationId xmlns:p14="http://schemas.microsoft.com/office/powerpoint/2010/main" val="1305690966"/>
-      </p:ext>
-    </p:extLst>
-  </p:cSld>
-  <p:clrMapOvr>
-    <a:masterClrMapping/>
-  </p:clrMapOvr>
-  <p:timing>
-    <p:tnLst>
-      <p:par>
-        <p:cTn id="1" dur="indefinite" restart="never" nodeType="tmRoot"/>
-      </p:par>
-    </p:tnLst>
-  </p:timing>
-</p:sld>
-</file>
-
-<file path=ppt/slides/slide14.xml><?xml version="1.0" encoding="utf-8"?>
-<p:sld xmlns:a="http://schemas.openxmlformats.org/drawingml/2006/main" xmlns:r="http://schemas.openxmlformats.org/officeDocument/2006/relationships" xmlns:p="http://schemas.openxmlformats.org/presentationml/2006/main">
-  <p:cSld>
-    <p:spTree>
-      <p:nvGrpSpPr>
-        <p:cNvPr id="1" name=""/>
-        <p:cNvGrpSpPr/>
-        <p:nvPr/>
-      </p:nvGrpSpPr>
-      <p:grpSpPr>
-        <a:xfrm>
-          <a:off x="0" y="0"/>
-          <a:ext cx="0" cy="0"/>
-          <a:chOff x="0" y="0"/>
-          <a:chExt cx="0" cy="0"/>
-        </a:xfrm>
-      </p:grpSpPr>
-      <p:sp>
-        <p:nvSpPr>
-          <p:cNvPr id="2" name="Título 1"/>
-          <p:cNvSpPr>
-            <a:spLocks noGrp="1"/>
-          </p:cNvSpPr>
-          <p:nvPr>
-            <p:ph type="title"/>
-          </p:nvPr>
-        </p:nvSpPr>
-        <p:spPr>
-          <a:xfrm>
-            <a:off x="683568" y="476672"/>
-            <a:ext cx="8229600" cy="1143000"/>
-          </a:xfrm>
-        </p:spPr>
-        <p:txBody>
-          <a:bodyPr>
-            <a:noAutofit/>
-          </a:bodyPr>
-          <a:lstStyle/>
-          <a:p>
-            <a:r>
-              <a:rPr lang="pt-BR" sz="4000" dirty="0" smtClean="0">
-                <a:latin typeface="Segoe UI" pitchFamily="34" charset="0"/>
-                <a:ea typeface="Segoe UI" pitchFamily="34" charset="0"/>
-                <a:cs typeface="Segoe UI" pitchFamily="34" charset="0"/>
-              </a:rPr>
-              <a:t>Arquitetura do Sistema</a:t>
-            </a:r>
-            <a:endParaRPr lang="pt-BR" sz="4000" dirty="0">
-              <a:latin typeface="Segoe UI" pitchFamily="34" charset="0"/>
-              <a:ea typeface="Segoe UI" pitchFamily="34" charset="0"/>
-              <a:cs typeface="Segoe UI" pitchFamily="34" charset="0"/>
-            </a:endParaRPr>
-          </a:p>
-        </p:txBody>
-      </p:sp>
-      <p:sp>
-        <p:nvSpPr>
-          <p:cNvPr id="3" name="Espaço Reservado para Conteúdo 2"/>
-          <p:cNvSpPr>
-            <a:spLocks noGrp="1"/>
-          </p:cNvSpPr>
-          <p:nvPr>
-            <p:ph idx="1"/>
-          </p:nvPr>
-        </p:nvSpPr>
-        <p:spPr>
-          <a:xfrm>
-            <a:off x="539552" y="2348880"/>
-            <a:ext cx="7886700" cy="4351338"/>
-          </a:xfrm>
-        </p:spPr>
-        <p:txBody>
-          <a:bodyPr>
-            <a:normAutofit/>
-          </a:bodyPr>
-          <a:lstStyle/>
-          <a:p>
-            <a:pPr lvl="1"/>
-            <a:r>
-              <a:rPr lang="pt-BR" dirty="0" err="1" smtClean="0">
-                <a:latin typeface="Segoe UI" pitchFamily="34" charset="0"/>
-                <a:ea typeface="Segoe UI" pitchFamily="34" charset="0"/>
-                <a:cs typeface="Segoe UI" pitchFamily="34" charset="0"/>
-              </a:rPr>
-              <a:t>Product</a:t>
-            </a:r>
-            <a:r>
-              <a:rPr lang="pt-BR" dirty="0" smtClean="0">
-                <a:latin typeface="Segoe UI" pitchFamily="34" charset="0"/>
-                <a:ea typeface="Segoe UI" pitchFamily="34" charset="0"/>
-                <a:cs typeface="Segoe UI" pitchFamily="34" charset="0"/>
-              </a:rPr>
-              <a:t> </a:t>
-            </a:r>
-            <a:r>
-              <a:rPr lang="pt-BR" dirty="0" err="1" smtClean="0">
-                <a:latin typeface="Segoe UI" pitchFamily="34" charset="0"/>
-                <a:ea typeface="Segoe UI" pitchFamily="34" charset="0"/>
-                <a:cs typeface="Segoe UI" pitchFamily="34" charset="0"/>
-              </a:rPr>
-              <a:t>backlog</a:t>
-            </a:r>
-            <a:endParaRPr lang="pt-BR" dirty="0" smtClean="0">
-              <a:latin typeface="Segoe UI" pitchFamily="34" charset="0"/>
-              <a:ea typeface="Segoe UI" pitchFamily="34" charset="0"/>
-              <a:cs typeface="Segoe UI" pitchFamily="34" charset="0"/>
-            </a:endParaRPr>
-          </a:p>
-          <a:p>
-            <a:pPr lvl="1"/>
-            <a:r>
-              <a:rPr lang="pt-BR" dirty="0" smtClean="0">
-                <a:latin typeface="Segoe UI" pitchFamily="34" charset="0"/>
-                <a:ea typeface="Segoe UI" pitchFamily="34" charset="0"/>
-                <a:cs typeface="Segoe UI" pitchFamily="34" charset="0"/>
-              </a:rPr>
-              <a:t>Gerenciamento do </a:t>
-            </a:r>
-            <a:r>
-              <a:rPr lang="pt-BR" dirty="0" smtClean="0">
-                <a:latin typeface="Segoe UI" pitchFamily="34" charset="0"/>
-                <a:ea typeface="Segoe UI" pitchFamily="34" charset="0"/>
-                <a:cs typeface="Segoe UI" pitchFamily="34" charset="0"/>
-              </a:rPr>
-              <a:t>projeto-</a:t>
-            </a:r>
-            <a:r>
-              <a:rPr lang="pt-BR" dirty="0" err="1" smtClean="0">
-                <a:latin typeface="Segoe UI" pitchFamily="34" charset="0"/>
-                <a:ea typeface="Segoe UI" pitchFamily="34" charset="0"/>
-                <a:cs typeface="Segoe UI" pitchFamily="34" charset="0"/>
-              </a:rPr>
-              <a:t>Trello</a:t>
-            </a:r>
-            <a:endParaRPr lang="pt-BR" dirty="0" smtClean="0">
-              <a:latin typeface="Segoe UI" pitchFamily="34" charset="0"/>
-              <a:ea typeface="Segoe UI" pitchFamily="34" charset="0"/>
-              <a:cs typeface="Segoe UI" pitchFamily="34" charset="0"/>
-            </a:endParaRPr>
-          </a:p>
-          <a:p>
-            <a:pPr lvl="1"/>
-            <a:r>
-              <a:rPr lang="pt-BR" dirty="0" smtClean="0">
-                <a:latin typeface="Segoe UI" pitchFamily="34" charset="0"/>
-                <a:ea typeface="Segoe UI" pitchFamily="34" charset="0"/>
-                <a:cs typeface="Segoe UI" pitchFamily="34" charset="0"/>
-              </a:rPr>
-              <a:t>Modelo ER</a:t>
-            </a:r>
-          </a:p>
-          <a:p>
-            <a:pPr lvl="1"/>
-            <a:r>
-              <a:rPr lang="pt-BR" dirty="0" smtClean="0">
-                <a:latin typeface="Segoe UI" pitchFamily="34" charset="0"/>
-                <a:ea typeface="Segoe UI" pitchFamily="34" charset="0"/>
-                <a:cs typeface="Segoe UI" pitchFamily="34" charset="0"/>
-              </a:rPr>
-              <a:t>Protótipos de interface</a:t>
-            </a:r>
-            <a:endParaRPr lang="pt-BR" b="1" dirty="0">
-              <a:latin typeface="Segoe UI" pitchFamily="34" charset="0"/>
-              <a:ea typeface="Segoe UI" pitchFamily="34" charset="0"/>
-              <a:cs typeface="Segoe UI" pitchFamily="34" charset="0"/>
-            </a:endParaRPr>
-          </a:p>
-        </p:txBody>
-      </p:sp>
-    </p:spTree>
-  </p:cSld>
-  <p:clrMapOvr>
-    <a:masterClrMapping/>
-  </p:clrMapOvr>
-  <p:timing>
-    <p:tnLst>
-      <p:par>
-        <p:cTn id="1" dur="indefinite" restart="never" nodeType="tmRoot"/>
-      </p:par>
-    </p:tnLst>
-  </p:timing>
-</p:sld>
-</file>
-
-<file path=ppt/slides/slide15.xml><?xml version="1.0" encoding="utf-8"?>
 <p:sld xmlns:a="http://schemas.openxmlformats.org/drawingml/2006/main" xmlns:r="http://schemas.openxmlformats.org/officeDocument/2006/relationships" xmlns:p="http://schemas.openxmlformats.org/presentationml/2006/main">
   <p:cSld>
     <p:spTree>
@@ -5922,7 +5115,7 @@
 </p:sld>
 </file>
 
-<file path=ppt/slides/slide16.xml><?xml version="1.0" encoding="utf-8"?>
+<file path=ppt/slides/slide13.xml><?xml version="1.0" encoding="utf-8"?>
 <p:sld xmlns:a="http://schemas.openxmlformats.org/drawingml/2006/main" xmlns:r="http://schemas.openxmlformats.org/officeDocument/2006/relationships" xmlns:p="http://schemas.openxmlformats.org/presentationml/2006/main">
   <p:cSld>
     <p:spTree>
@@ -6016,7 +5209,7 @@
 </p:sld>
 </file>
 
-<file path=ppt/slides/slide17.xml><?xml version="1.0" encoding="utf-8"?>
+<file path=ppt/slides/slide14.xml><?xml version="1.0" encoding="utf-8"?>
 <p:sld xmlns:a="http://schemas.openxmlformats.org/drawingml/2006/main" xmlns:r="http://schemas.openxmlformats.org/officeDocument/2006/relationships" xmlns:p="http://schemas.openxmlformats.org/presentationml/2006/main">
   <p:cSld>
     <p:spTree>
@@ -6105,7 +5298,7 @@
 </p:sld>
 </file>
 
-<file path=ppt/slides/slide18.xml><?xml version="1.0" encoding="utf-8"?>
+<file path=ppt/slides/slide15.xml><?xml version="1.0" encoding="utf-8"?>
 <p:sld xmlns:a="http://schemas.openxmlformats.org/drawingml/2006/main" xmlns:r="http://schemas.openxmlformats.org/officeDocument/2006/relationships" xmlns:p="http://schemas.openxmlformats.org/presentationml/2006/main">
   <p:cSld>
     <p:spTree>
@@ -6194,7 +5387,7 @@
 </p:sld>
 </file>
 
-<file path=ppt/slides/slide19.xml><?xml version="1.0" encoding="utf-8"?>
+<file path=ppt/slides/slide16.xml><?xml version="1.0" encoding="utf-8"?>
 <p:sld xmlns:a="http://schemas.openxmlformats.org/drawingml/2006/main" xmlns:r="http://schemas.openxmlformats.org/officeDocument/2006/relationships" xmlns:p="http://schemas.openxmlformats.org/presentationml/2006/main">
   <p:cSld>
     <p:spTree>
@@ -6283,252 +5476,7 @@
 </p:sld>
 </file>
 
-<file path=ppt/slides/slide2.xml><?xml version="1.0" encoding="utf-8"?>
-<p:sld xmlns:a="http://schemas.openxmlformats.org/drawingml/2006/main" xmlns:r="http://schemas.openxmlformats.org/officeDocument/2006/relationships" xmlns:p="http://schemas.openxmlformats.org/presentationml/2006/main">
-  <p:cSld>
-    <p:spTree>
-      <p:nvGrpSpPr>
-        <p:cNvPr id="1" name=""/>
-        <p:cNvGrpSpPr/>
-        <p:nvPr/>
-      </p:nvGrpSpPr>
-      <p:grpSpPr>
-        <a:xfrm>
-          <a:off x="0" y="0"/>
-          <a:ext cx="0" cy="0"/>
-          <a:chOff x="0" y="0"/>
-          <a:chExt cx="0" cy="0"/>
-        </a:xfrm>
-      </p:grpSpPr>
-      <p:sp>
-        <p:nvSpPr>
-          <p:cNvPr id="2" name="Título 1"/>
-          <p:cNvSpPr>
-            <a:spLocks noGrp="1"/>
-          </p:cNvSpPr>
-          <p:nvPr>
-            <p:ph type="title"/>
-          </p:nvPr>
-        </p:nvSpPr>
-        <p:spPr/>
-        <p:txBody>
-          <a:bodyPr>
-            <a:normAutofit/>
-          </a:bodyPr>
-          <a:lstStyle/>
-          <a:p>
-            <a:pPr algn="ctr"/>
-            <a:r>
-              <a:rPr lang="pt-BR" sz="6600" dirty="0" smtClean="0">
-                <a:latin typeface="Segoe UI" pitchFamily="34" charset="0"/>
-                <a:ea typeface="Segoe UI" pitchFamily="34" charset="0"/>
-                <a:cs typeface="Segoe UI" pitchFamily="34" charset="0"/>
-              </a:rPr>
-              <a:t>O Grupo</a:t>
-            </a:r>
-            <a:endParaRPr lang="pt-BR" sz="6600" dirty="0">
-              <a:latin typeface="Segoe UI" pitchFamily="34" charset="0"/>
-              <a:ea typeface="Segoe UI" pitchFamily="34" charset="0"/>
-              <a:cs typeface="Segoe UI" pitchFamily="34" charset="0"/>
-            </a:endParaRPr>
-          </a:p>
-        </p:txBody>
-      </p:sp>
-      <p:sp>
-        <p:nvSpPr>
-          <p:cNvPr id="3" name="Espaço Reservado para Conteúdo 2"/>
-          <p:cNvSpPr>
-            <a:spLocks noGrp="1"/>
-          </p:cNvSpPr>
-          <p:nvPr>
-            <p:ph idx="1"/>
-          </p:nvPr>
-        </p:nvSpPr>
-        <p:spPr/>
-        <p:txBody>
-          <a:bodyPr>
-            <a:normAutofit/>
-          </a:bodyPr>
-          <a:lstStyle/>
-          <a:p>
-            <a:pPr>
-              <a:buNone/>
-            </a:pPr>
-            <a:r>
-              <a:rPr lang="pt-BR" sz="3600" dirty="0" smtClean="0">
-                <a:latin typeface="Segoe UI" pitchFamily="34" charset="0"/>
-                <a:ea typeface="Segoe UI" pitchFamily="34" charset="0"/>
-                <a:cs typeface="Segoe UI" pitchFamily="34" charset="0"/>
-              </a:rPr>
-              <a:t>	</a:t>
-            </a:r>
-            <a:endParaRPr lang="pt-BR" sz="3600" dirty="0"/>
-          </a:p>
-          <a:p>
-            <a:r>
-              <a:rPr lang="pt-BR" b="1" dirty="0"/>
-              <a:t>Adriano Duarte </a:t>
-            </a:r>
-            <a:r>
-              <a:rPr lang="pt-BR" dirty="0" smtClean="0"/>
-              <a:t>–Função </a:t>
-            </a:r>
-            <a:r>
-              <a:rPr lang="pt-BR" dirty="0"/>
-              <a:t>na equipe: </a:t>
-            </a:r>
-            <a:endParaRPr lang="pt-BR" dirty="0" smtClean="0"/>
-          </a:p>
-          <a:p>
-            <a:pPr lvl="1"/>
-            <a:r>
-              <a:rPr lang="pt-BR" dirty="0" err="1" smtClean="0"/>
-              <a:t>Product</a:t>
-            </a:r>
-            <a:r>
-              <a:rPr lang="pt-BR" dirty="0" smtClean="0"/>
-              <a:t> </a:t>
-            </a:r>
-            <a:r>
-              <a:rPr lang="pt-BR" dirty="0" err="1" smtClean="0"/>
-              <a:t>Owner</a:t>
-            </a:r>
-            <a:r>
-              <a:rPr lang="pt-BR" dirty="0" smtClean="0"/>
-              <a:t> e </a:t>
-            </a:r>
-            <a:r>
-              <a:rPr lang="pt-BR" dirty="0"/>
-              <a:t>Desenvolvedor</a:t>
-            </a:r>
-          </a:p>
-          <a:p>
-            <a:r>
-              <a:rPr lang="pt-BR" b="1" dirty="0"/>
-              <a:t>Bruno Macedo </a:t>
-            </a:r>
-            <a:r>
-              <a:rPr lang="pt-BR" dirty="0"/>
-              <a:t>- </a:t>
-            </a:r>
-            <a:r>
-              <a:rPr lang="pt-BR" dirty="0" smtClean="0"/>
-              <a:t>Função </a:t>
-            </a:r>
-            <a:r>
-              <a:rPr lang="pt-BR" dirty="0"/>
-              <a:t>na equipe: </a:t>
-            </a:r>
-            <a:endParaRPr lang="pt-BR" dirty="0" smtClean="0"/>
-          </a:p>
-          <a:p>
-            <a:pPr lvl="1"/>
-            <a:r>
-              <a:rPr lang="pt-BR" dirty="0" err="1" smtClean="0"/>
-              <a:t>Scrum</a:t>
-            </a:r>
-            <a:r>
-              <a:rPr lang="pt-BR" dirty="0" smtClean="0"/>
-              <a:t> </a:t>
-            </a:r>
-            <a:r>
-              <a:rPr lang="pt-BR" dirty="0"/>
-              <a:t>Master, Desenvolvedor</a:t>
-            </a:r>
-          </a:p>
-          <a:p>
-            <a:r>
-              <a:rPr lang="pt-BR" b="1" dirty="0" err="1"/>
-              <a:t>Tailor</a:t>
-            </a:r>
-            <a:r>
-              <a:rPr lang="pt-BR" b="1" dirty="0"/>
-              <a:t> </a:t>
-            </a:r>
-            <a:r>
-              <a:rPr lang="pt-BR" b="1" dirty="0" err="1"/>
-              <a:t>Figueiro</a:t>
-            </a:r>
-            <a:r>
-              <a:rPr lang="pt-BR" b="1" dirty="0"/>
-              <a:t> </a:t>
-            </a:r>
-            <a:r>
-              <a:rPr lang="pt-BR" dirty="0"/>
-              <a:t>- </a:t>
-            </a:r>
-            <a:r>
-              <a:rPr lang="pt-BR" dirty="0" smtClean="0"/>
-              <a:t>Função </a:t>
-            </a:r>
-            <a:r>
-              <a:rPr lang="pt-BR" dirty="0"/>
-              <a:t>na equipe</a:t>
-            </a:r>
-            <a:r>
-              <a:rPr lang="pt-BR" dirty="0" smtClean="0"/>
-              <a:t>:</a:t>
-            </a:r>
-          </a:p>
-          <a:p>
-            <a:pPr lvl="1"/>
-            <a:r>
-              <a:rPr lang="pt-BR" dirty="0" smtClean="0"/>
-              <a:t> </a:t>
-            </a:r>
-            <a:r>
-              <a:rPr lang="pt-BR" dirty="0"/>
-              <a:t>Desenvolvedor</a:t>
-            </a:r>
-          </a:p>
-          <a:p>
-            <a:r>
-              <a:rPr lang="pt-BR" b="1" dirty="0"/>
-              <a:t>Leon Dias </a:t>
-            </a:r>
-            <a:r>
-              <a:rPr lang="pt-BR" dirty="0" smtClean="0"/>
-              <a:t>–Função </a:t>
-            </a:r>
-            <a:r>
-              <a:rPr lang="pt-BR" dirty="0"/>
-              <a:t>na equipe: </a:t>
-            </a:r>
-            <a:endParaRPr lang="pt-BR" dirty="0" smtClean="0"/>
-          </a:p>
-          <a:p>
-            <a:pPr lvl="1"/>
-            <a:r>
-              <a:rPr lang="pt-BR" dirty="0" smtClean="0"/>
-              <a:t>Desenvolvedor</a:t>
-            </a:r>
-            <a:r>
-              <a:rPr lang="pt-BR" dirty="0" smtClean="0"/>
-              <a:t>.</a:t>
-            </a:r>
-            <a:endParaRPr lang="pt-BR" dirty="0"/>
-          </a:p>
-          <a:p>
-            <a:endParaRPr lang="pt-BR" dirty="0"/>
-          </a:p>
-        </p:txBody>
-      </p:sp>
-    </p:spTree>
-  </p:cSld>
-  <p:clrMapOvr>
-    <a:masterClrMapping/>
-  </p:clrMapOvr>
-  <p:timing>
-    <p:tnLst>
-      <p:par>
-        <p:cTn id="1" dur="indefinite" restart="never" nodeType="tmRoot"/>
-      </p:par>
-    </p:tnLst>
-  </p:timing>
-</p:sld>
-</file>
-
-<file path=ppt/slides/slide20.xml><?xml version="1.0" encoding="utf-8"?>
+<file path=ppt/slides/slide17.xml><?xml version="1.0" encoding="utf-8"?>
 <p:sld xmlns:a="http://schemas.openxmlformats.org/drawingml/2006/main" xmlns:r="http://schemas.openxmlformats.org/officeDocument/2006/relationships" xmlns:p="http://schemas.openxmlformats.org/presentationml/2006/main">
   <p:cSld>
     <p:spTree>
@@ -6617,7 +5565,7 @@
 </p:sld>
 </file>
 
-<file path=ppt/slides/slide21.xml><?xml version="1.0" encoding="utf-8"?>
+<file path=ppt/slides/slide18.xml><?xml version="1.0" encoding="utf-8"?>
 <p:sld xmlns:a="http://schemas.openxmlformats.org/drawingml/2006/main" xmlns:r="http://schemas.openxmlformats.org/officeDocument/2006/relationships" xmlns:p="http://schemas.openxmlformats.org/presentationml/2006/main">
   <p:cSld>
     <p:spTree>
@@ -6706,7 +5654,7 @@
 </p:sld>
 </file>
 
-<file path=ppt/slides/slide22.xml><?xml version="1.0" encoding="utf-8"?>
+<file path=ppt/slides/slide19.xml><?xml version="1.0" encoding="utf-8"?>
 <p:sld xmlns:a="http://schemas.openxmlformats.org/drawingml/2006/main" xmlns:r="http://schemas.openxmlformats.org/officeDocument/2006/relationships" xmlns:p="http://schemas.openxmlformats.org/presentationml/2006/main">
   <p:cSld>
     <p:spTree>
@@ -6795,7 +5743,248 @@
 </p:sld>
 </file>
 
-<file path=ppt/slides/slide23.xml><?xml version="1.0" encoding="utf-8"?>
+<file path=ppt/slides/slide2.xml><?xml version="1.0" encoding="utf-8"?>
+<p:sld xmlns:a="http://schemas.openxmlformats.org/drawingml/2006/main" xmlns:r="http://schemas.openxmlformats.org/officeDocument/2006/relationships" xmlns:p="http://schemas.openxmlformats.org/presentationml/2006/main">
+  <p:cSld>
+    <p:spTree>
+      <p:nvGrpSpPr>
+        <p:cNvPr id="1" name=""/>
+        <p:cNvGrpSpPr/>
+        <p:nvPr/>
+      </p:nvGrpSpPr>
+      <p:grpSpPr>
+        <a:xfrm>
+          <a:off x="0" y="0"/>
+          <a:ext cx="0" cy="0"/>
+          <a:chOff x="0" y="0"/>
+          <a:chExt cx="0" cy="0"/>
+        </a:xfrm>
+      </p:grpSpPr>
+      <p:sp>
+        <p:nvSpPr>
+          <p:cNvPr id="2" name="Título 1"/>
+          <p:cNvSpPr>
+            <a:spLocks noGrp="1"/>
+          </p:cNvSpPr>
+          <p:nvPr>
+            <p:ph type="title"/>
+          </p:nvPr>
+        </p:nvSpPr>
+        <p:spPr/>
+        <p:txBody>
+          <a:bodyPr>
+            <a:normAutofit/>
+          </a:bodyPr>
+          <a:lstStyle/>
+          <a:p>
+            <a:pPr algn="ctr"/>
+            <a:r>
+              <a:rPr lang="pt-BR" sz="6600" dirty="0" smtClean="0">
+                <a:latin typeface="Segoe UI" pitchFamily="34" charset="0"/>
+                <a:ea typeface="Segoe UI" pitchFamily="34" charset="0"/>
+                <a:cs typeface="Segoe UI" pitchFamily="34" charset="0"/>
+              </a:rPr>
+              <a:t>O Grupo</a:t>
+            </a:r>
+            <a:endParaRPr lang="pt-BR" sz="6600" dirty="0">
+              <a:latin typeface="Segoe UI" pitchFamily="34" charset="0"/>
+              <a:ea typeface="Segoe UI" pitchFamily="34" charset="0"/>
+              <a:cs typeface="Segoe UI" pitchFamily="34" charset="0"/>
+            </a:endParaRPr>
+          </a:p>
+        </p:txBody>
+      </p:sp>
+      <p:sp>
+        <p:nvSpPr>
+          <p:cNvPr id="3" name="Espaço Reservado para Conteúdo 2"/>
+          <p:cNvSpPr>
+            <a:spLocks noGrp="1"/>
+          </p:cNvSpPr>
+          <p:nvPr>
+            <p:ph idx="1"/>
+          </p:nvPr>
+        </p:nvSpPr>
+        <p:spPr/>
+        <p:txBody>
+          <a:bodyPr>
+            <a:normAutofit/>
+          </a:bodyPr>
+          <a:lstStyle/>
+          <a:p>
+            <a:pPr>
+              <a:buNone/>
+            </a:pPr>
+            <a:r>
+              <a:rPr lang="pt-BR" sz="3600" dirty="0" smtClean="0">
+                <a:latin typeface="Segoe UI" pitchFamily="34" charset="0"/>
+                <a:ea typeface="Segoe UI" pitchFamily="34" charset="0"/>
+                <a:cs typeface="Segoe UI" pitchFamily="34" charset="0"/>
+              </a:rPr>
+              <a:t>	</a:t>
+            </a:r>
+            <a:endParaRPr lang="pt-BR" sz="3600" dirty="0"/>
+          </a:p>
+          <a:p>
+            <a:r>
+              <a:rPr lang="pt-BR" b="1" dirty="0"/>
+              <a:t>Adriano Duarte </a:t>
+            </a:r>
+            <a:r>
+              <a:rPr lang="pt-BR" dirty="0" smtClean="0"/>
+              <a:t>–Função </a:t>
+            </a:r>
+            <a:r>
+              <a:rPr lang="pt-BR" dirty="0"/>
+              <a:t>na equipe: </a:t>
+            </a:r>
+            <a:endParaRPr lang="pt-BR" dirty="0" smtClean="0"/>
+          </a:p>
+          <a:p>
+            <a:pPr lvl="1"/>
+            <a:r>
+              <a:rPr lang="pt-BR" dirty="0" err="1" smtClean="0"/>
+              <a:t>Product</a:t>
+            </a:r>
+            <a:r>
+              <a:rPr lang="pt-BR" dirty="0" smtClean="0"/>
+              <a:t> </a:t>
+            </a:r>
+            <a:r>
+              <a:rPr lang="pt-BR" dirty="0" err="1" smtClean="0"/>
+              <a:t>Owner</a:t>
+            </a:r>
+            <a:r>
+              <a:rPr lang="pt-BR" dirty="0" smtClean="0"/>
+              <a:t> e </a:t>
+            </a:r>
+            <a:r>
+              <a:rPr lang="pt-BR" dirty="0"/>
+              <a:t>Desenvolvedor</a:t>
+            </a:r>
+          </a:p>
+          <a:p>
+            <a:r>
+              <a:rPr lang="pt-BR" b="1" dirty="0"/>
+              <a:t>Bruno Macedo </a:t>
+            </a:r>
+            <a:r>
+              <a:rPr lang="pt-BR" dirty="0"/>
+              <a:t>- </a:t>
+            </a:r>
+            <a:r>
+              <a:rPr lang="pt-BR" dirty="0" smtClean="0"/>
+              <a:t>Função </a:t>
+            </a:r>
+            <a:r>
+              <a:rPr lang="pt-BR" dirty="0"/>
+              <a:t>na equipe: </a:t>
+            </a:r>
+            <a:endParaRPr lang="pt-BR" dirty="0" smtClean="0"/>
+          </a:p>
+          <a:p>
+            <a:pPr lvl="1"/>
+            <a:r>
+              <a:rPr lang="pt-BR" dirty="0" err="1" smtClean="0"/>
+              <a:t>Scrum</a:t>
+            </a:r>
+            <a:r>
+              <a:rPr lang="pt-BR" dirty="0" smtClean="0"/>
+              <a:t> </a:t>
+            </a:r>
+            <a:r>
+              <a:rPr lang="pt-BR" dirty="0"/>
+              <a:t>Master, Desenvolvedor</a:t>
+            </a:r>
+          </a:p>
+          <a:p>
+            <a:r>
+              <a:rPr lang="pt-BR" b="1" dirty="0" err="1"/>
+              <a:t>Tailor</a:t>
+            </a:r>
+            <a:r>
+              <a:rPr lang="pt-BR" b="1" dirty="0"/>
+              <a:t> </a:t>
+            </a:r>
+            <a:r>
+              <a:rPr lang="pt-BR" b="1" dirty="0" err="1"/>
+              <a:t>Figueiro</a:t>
+            </a:r>
+            <a:r>
+              <a:rPr lang="pt-BR" b="1" dirty="0"/>
+              <a:t> </a:t>
+            </a:r>
+            <a:r>
+              <a:rPr lang="pt-BR" dirty="0"/>
+              <a:t>- </a:t>
+            </a:r>
+            <a:r>
+              <a:rPr lang="pt-BR" dirty="0" smtClean="0"/>
+              <a:t>Função </a:t>
+            </a:r>
+            <a:r>
+              <a:rPr lang="pt-BR" dirty="0"/>
+              <a:t>na equipe</a:t>
+            </a:r>
+            <a:r>
+              <a:rPr lang="pt-BR" dirty="0" smtClean="0"/>
+              <a:t>:</a:t>
+            </a:r>
+          </a:p>
+          <a:p>
+            <a:pPr lvl="1"/>
+            <a:r>
+              <a:rPr lang="pt-BR" dirty="0" smtClean="0"/>
+              <a:t> </a:t>
+            </a:r>
+            <a:r>
+              <a:rPr lang="pt-BR" dirty="0"/>
+              <a:t>Desenvolvedor</a:t>
+            </a:r>
+          </a:p>
+          <a:p>
+            <a:r>
+              <a:rPr lang="pt-BR" b="1" dirty="0"/>
+              <a:t>Leon Dias </a:t>
+            </a:r>
+            <a:r>
+              <a:rPr lang="pt-BR" dirty="0" smtClean="0"/>
+              <a:t>–Função </a:t>
+            </a:r>
+            <a:r>
+              <a:rPr lang="pt-BR" dirty="0"/>
+              <a:t>na equipe: </a:t>
+            </a:r>
+            <a:endParaRPr lang="pt-BR" dirty="0" smtClean="0"/>
+          </a:p>
+          <a:p>
+            <a:pPr lvl="1"/>
+            <a:r>
+              <a:rPr lang="pt-BR" dirty="0" smtClean="0"/>
+              <a:t>Desenvolvedor.</a:t>
+            </a:r>
+            <a:endParaRPr lang="pt-BR" dirty="0"/>
+          </a:p>
+          <a:p>
+            <a:endParaRPr lang="pt-BR" dirty="0"/>
+          </a:p>
+        </p:txBody>
+      </p:sp>
+    </p:spTree>
+  </p:cSld>
+  <p:clrMapOvr>
+    <a:masterClrMapping/>
+  </p:clrMapOvr>
+  <p:timing>
+    <p:tnLst>
+      <p:par>
+        <p:cTn id="1" dur="indefinite" restart="never" nodeType="tmRoot"/>
+      </p:par>
+    </p:tnLst>
+  </p:timing>
+</p:sld>
+</file>
+
+<file path=ppt/slides/slide20.xml><?xml version="1.0" encoding="utf-8"?>
 <p:sld xmlns:a="http://schemas.openxmlformats.org/drawingml/2006/main" xmlns:r="http://schemas.openxmlformats.org/officeDocument/2006/relationships" xmlns:p="http://schemas.openxmlformats.org/presentationml/2006/main">
   <p:cSld>
     <p:spTree>
@@ -6889,6 +6078,626 @@
 </p:sld>
 </file>
 
+<file path=ppt/slides/slide21.xml><?xml version="1.0" encoding="utf-8"?>
+<p:sld xmlns:a="http://schemas.openxmlformats.org/drawingml/2006/main" xmlns:r="http://schemas.openxmlformats.org/officeDocument/2006/relationships" xmlns:p="http://schemas.openxmlformats.org/presentationml/2006/main">
+  <p:cSld>
+    <p:spTree>
+      <p:nvGrpSpPr>
+        <p:cNvPr id="1" name=""/>
+        <p:cNvGrpSpPr/>
+        <p:nvPr/>
+      </p:nvGrpSpPr>
+      <p:grpSpPr>
+        <a:xfrm>
+          <a:off x="0" y="0"/>
+          <a:ext cx="0" cy="0"/>
+          <a:chOff x="0" y="0"/>
+          <a:chExt cx="0" cy="0"/>
+        </a:xfrm>
+      </p:grpSpPr>
+      <p:sp>
+        <p:nvSpPr>
+          <p:cNvPr id="2" name="Título 1"/>
+          <p:cNvSpPr>
+            <a:spLocks noGrp="1"/>
+          </p:cNvSpPr>
+          <p:nvPr>
+            <p:ph type="title"/>
+          </p:nvPr>
+        </p:nvSpPr>
+        <p:spPr>
+          <a:xfrm>
+            <a:off x="683568" y="476672"/>
+            <a:ext cx="8229600" cy="1143000"/>
+          </a:xfrm>
+        </p:spPr>
+        <p:txBody>
+          <a:bodyPr>
+            <a:noAutofit/>
+          </a:bodyPr>
+          <a:lstStyle/>
+          <a:p>
+            <a:r>
+              <a:rPr lang="pt-BR" sz="4000" dirty="0" smtClean="0">
+                <a:latin typeface="Segoe UI" pitchFamily="34" charset="0"/>
+                <a:ea typeface="Segoe UI" pitchFamily="34" charset="0"/>
+                <a:cs typeface="Segoe UI" pitchFamily="34" charset="0"/>
+              </a:rPr>
+              <a:t>Andamento do Projeto</a:t>
+            </a:r>
+            <a:endParaRPr lang="pt-BR" sz="4000" dirty="0">
+              <a:latin typeface="Segoe UI" pitchFamily="34" charset="0"/>
+              <a:ea typeface="Segoe UI" pitchFamily="34" charset="0"/>
+              <a:cs typeface="Segoe UI" pitchFamily="34" charset="0"/>
+            </a:endParaRPr>
+          </a:p>
+        </p:txBody>
+      </p:sp>
+      <p:sp>
+        <p:nvSpPr>
+          <p:cNvPr id="3" name="Espaço Reservado para Conteúdo 2"/>
+          <p:cNvSpPr>
+            <a:spLocks noGrp="1"/>
+          </p:cNvSpPr>
+          <p:nvPr>
+            <p:ph idx="1"/>
+          </p:nvPr>
+        </p:nvSpPr>
+        <p:spPr/>
+        <p:txBody>
+          <a:bodyPr>
+            <a:normAutofit/>
+          </a:bodyPr>
+          <a:lstStyle/>
+          <a:p>
+            <a:pPr>
+              <a:buNone/>
+            </a:pPr>
+            <a:r>
+              <a:rPr lang="pt-BR" sz="3600" b="1" dirty="0" smtClean="0">
+                <a:latin typeface="Segoe UI" pitchFamily="34" charset="0"/>
+                <a:ea typeface="Segoe UI" pitchFamily="34" charset="0"/>
+                <a:cs typeface="Segoe UI" pitchFamily="34" charset="0"/>
+              </a:rPr>
+              <a:t> 	</a:t>
+            </a:r>
+            <a:r>
+              <a:rPr lang="pt-BR" b="1" dirty="0" smtClean="0">
+                <a:latin typeface="Segoe UI" pitchFamily="34" charset="0"/>
+                <a:ea typeface="Segoe UI" pitchFamily="34" charset="0"/>
+                <a:cs typeface="Segoe UI" pitchFamily="34" charset="0"/>
+              </a:rPr>
+              <a:t>Quem fez o que ?</a:t>
+            </a:r>
+          </a:p>
+          <a:p>
+            <a:pPr>
+              <a:buNone/>
+            </a:pPr>
+            <a:endParaRPr lang="pt-BR" b="1" dirty="0" smtClean="0">
+              <a:latin typeface="Segoe UI" pitchFamily="34" charset="0"/>
+              <a:ea typeface="Segoe UI" pitchFamily="34" charset="0"/>
+              <a:cs typeface="Segoe UI" pitchFamily="34" charset="0"/>
+            </a:endParaRPr>
+          </a:p>
+          <a:p>
+            <a:pPr>
+              <a:buNone/>
+            </a:pPr>
+            <a:r>
+              <a:rPr lang="pt-BR" b="1" dirty="0" smtClean="0">
+                <a:latin typeface="Segoe UI" pitchFamily="34" charset="0"/>
+                <a:ea typeface="Segoe UI" pitchFamily="34" charset="0"/>
+                <a:cs typeface="Segoe UI" pitchFamily="34" charset="0"/>
+              </a:rPr>
+              <a:t>Adriano</a:t>
+            </a:r>
+            <a:r>
+              <a:rPr lang="pt-BR" dirty="0" smtClean="0">
+                <a:latin typeface="Segoe UI" pitchFamily="34" charset="0"/>
+                <a:ea typeface="Segoe UI" pitchFamily="34" charset="0"/>
+                <a:cs typeface="Segoe UI" pitchFamily="34" charset="0"/>
+              </a:rPr>
+              <a:t> – </a:t>
+            </a:r>
+            <a:r>
+              <a:rPr lang="pt-BR" dirty="0" err="1" smtClean="0">
+                <a:latin typeface="Segoe UI" pitchFamily="34" charset="0"/>
+                <a:ea typeface="Segoe UI" pitchFamily="34" charset="0"/>
+                <a:cs typeface="Segoe UI" pitchFamily="34" charset="0"/>
+              </a:rPr>
+              <a:t>Backlog</a:t>
+            </a:r>
+            <a:r>
+              <a:rPr lang="pt-BR" dirty="0" smtClean="0">
+                <a:latin typeface="Segoe UI" pitchFamily="34" charset="0"/>
+                <a:ea typeface="Segoe UI" pitchFamily="34" charset="0"/>
+                <a:cs typeface="Segoe UI" pitchFamily="34" charset="0"/>
+              </a:rPr>
+              <a:t> do produto e </a:t>
+            </a:r>
+            <a:r>
+              <a:rPr lang="pt-BR" dirty="0" err="1" smtClean="0">
+                <a:latin typeface="Segoe UI" pitchFamily="34" charset="0"/>
+                <a:ea typeface="Segoe UI" pitchFamily="34" charset="0"/>
+                <a:cs typeface="Segoe UI" pitchFamily="34" charset="0"/>
+              </a:rPr>
+              <a:t>back-end</a:t>
+            </a:r>
+            <a:endParaRPr lang="pt-BR" dirty="0" smtClean="0">
+              <a:latin typeface="Segoe UI" pitchFamily="34" charset="0"/>
+              <a:ea typeface="Segoe UI" pitchFamily="34" charset="0"/>
+              <a:cs typeface="Segoe UI" pitchFamily="34" charset="0"/>
+            </a:endParaRPr>
+          </a:p>
+          <a:p>
+            <a:pPr>
+              <a:buNone/>
+            </a:pPr>
+            <a:r>
+              <a:rPr lang="pt-BR" b="1" dirty="0" smtClean="0">
+                <a:latin typeface="Segoe UI" pitchFamily="34" charset="0"/>
+                <a:ea typeface="Segoe UI" pitchFamily="34" charset="0"/>
+                <a:cs typeface="Segoe UI" pitchFamily="34" charset="0"/>
+              </a:rPr>
+              <a:t>Bruno</a:t>
+            </a:r>
+            <a:r>
+              <a:rPr lang="pt-BR" dirty="0" smtClean="0">
+                <a:latin typeface="Segoe UI" pitchFamily="34" charset="0"/>
+                <a:ea typeface="Segoe UI" pitchFamily="34" charset="0"/>
+                <a:cs typeface="Segoe UI" pitchFamily="34" charset="0"/>
+              </a:rPr>
+              <a:t> – Front-</a:t>
+            </a:r>
+            <a:r>
+              <a:rPr lang="pt-BR" dirty="0" err="1" smtClean="0">
+                <a:latin typeface="Segoe UI" pitchFamily="34" charset="0"/>
+                <a:ea typeface="Segoe UI" pitchFamily="34" charset="0"/>
+                <a:cs typeface="Segoe UI" pitchFamily="34" charset="0"/>
+              </a:rPr>
+              <a:t>end</a:t>
+            </a:r>
+            <a:r>
+              <a:rPr lang="pt-BR" dirty="0" smtClean="0">
+                <a:latin typeface="Segoe UI" pitchFamily="34" charset="0"/>
+                <a:ea typeface="Segoe UI" pitchFamily="34" charset="0"/>
+                <a:cs typeface="Segoe UI" pitchFamily="34" charset="0"/>
+              </a:rPr>
+              <a:t> e </a:t>
+            </a:r>
+            <a:r>
+              <a:rPr lang="pt-BR" dirty="0" err="1" smtClean="0">
+                <a:latin typeface="Segoe UI" pitchFamily="34" charset="0"/>
+                <a:ea typeface="Segoe UI" pitchFamily="34" charset="0"/>
+                <a:cs typeface="Segoe UI" pitchFamily="34" charset="0"/>
+              </a:rPr>
+              <a:t>back-end</a:t>
+            </a:r>
+            <a:endParaRPr lang="pt-BR" dirty="0" smtClean="0">
+              <a:latin typeface="Segoe UI" pitchFamily="34" charset="0"/>
+              <a:ea typeface="Segoe UI" pitchFamily="34" charset="0"/>
+              <a:cs typeface="Segoe UI" pitchFamily="34" charset="0"/>
+            </a:endParaRPr>
+          </a:p>
+          <a:p>
+            <a:pPr>
+              <a:buNone/>
+            </a:pPr>
+            <a:r>
+              <a:rPr lang="pt-BR" b="1" dirty="0">
+                <a:latin typeface="Segoe UI" pitchFamily="34" charset="0"/>
+                <a:ea typeface="Segoe UI" pitchFamily="34" charset="0"/>
+                <a:cs typeface="Segoe UI" pitchFamily="34" charset="0"/>
+              </a:rPr>
+              <a:t>Leon</a:t>
+            </a:r>
+            <a:r>
+              <a:rPr lang="pt-BR" dirty="0">
+                <a:latin typeface="Segoe UI" pitchFamily="34" charset="0"/>
+                <a:ea typeface="Segoe UI" pitchFamily="34" charset="0"/>
+                <a:cs typeface="Segoe UI" pitchFamily="34" charset="0"/>
+              </a:rPr>
+              <a:t> </a:t>
+            </a:r>
+            <a:r>
+              <a:rPr lang="pt-BR" dirty="0" smtClean="0">
+                <a:latin typeface="Segoe UI" pitchFamily="34" charset="0"/>
+                <a:ea typeface="Segoe UI" pitchFamily="34" charset="0"/>
+                <a:cs typeface="Segoe UI" pitchFamily="34" charset="0"/>
+              </a:rPr>
+              <a:t>– </a:t>
+            </a:r>
+            <a:r>
+              <a:rPr lang="pt-BR" dirty="0" err="1">
+                <a:latin typeface="Segoe UI" pitchFamily="34" charset="0"/>
+                <a:ea typeface="Segoe UI" pitchFamily="34" charset="0"/>
+                <a:cs typeface="Segoe UI" pitchFamily="34" charset="0"/>
+              </a:rPr>
+              <a:t>Backlog</a:t>
+            </a:r>
+            <a:r>
+              <a:rPr lang="pt-BR" dirty="0">
+                <a:latin typeface="Segoe UI" pitchFamily="34" charset="0"/>
+                <a:ea typeface="Segoe UI" pitchFamily="34" charset="0"/>
+                <a:cs typeface="Segoe UI" pitchFamily="34" charset="0"/>
+              </a:rPr>
+              <a:t> do produto </a:t>
+            </a:r>
+            <a:r>
+              <a:rPr lang="pt-BR" dirty="0" smtClean="0">
+                <a:latin typeface="Segoe UI" pitchFamily="34" charset="0"/>
+                <a:ea typeface="Segoe UI" pitchFamily="34" charset="0"/>
+                <a:cs typeface="Segoe UI" pitchFamily="34" charset="0"/>
+              </a:rPr>
+              <a:t>e Banco </a:t>
+            </a:r>
+            <a:r>
+              <a:rPr lang="pt-BR" dirty="0">
+                <a:latin typeface="Segoe UI" pitchFamily="34" charset="0"/>
+                <a:ea typeface="Segoe UI" pitchFamily="34" charset="0"/>
+                <a:cs typeface="Segoe UI" pitchFamily="34" charset="0"/>
+              </a:rPr>
+              <a:t>de </a:t>
+            </a:r>
+            <a:r>
+              <a:rPr lang="pt-BR" dirty="0" smtClean="0">
+                <a:latin typeface="Segoe UI" pitchFamily="34" charset="0"/>
+                <a:ea typeface="Segoe UI" pitchFamily="34" charset="0"/>
+                <a:cs typeface="Segoe UI" pitchFamily="34" charset="0"/>
+              </a:rPr>
+              <a:t>Dados</a:t>
+            </a:r>
+            <a:endParaRPr lang="pt-BR" dirty="0">
+              <a:latin typeface="Segoe UI" pitchFamily="34" charset="0"/>
+              <a:ea typeface="Segoe UI" pitchFamily="34" charset="0"/>
+              <a:cs typeface="Segoe UI" pitchFamily="34" charset="0"/>
+            </a:endParaRPr>
+          </a:p>
+          <a:p>
+            <a:pPr>
+              <a:buNone/>
+            </a:pPr>
+            <a:r>
+              <a:rPr lang="pt-BR" b="1" dirty="0" err="1" smtClean="0">
+                <a:latin typeface="Segoe UI" pitchFamily="34" charset="0"/>
+                <a:ea typeface="Segoe UI" pitchFamily="34" charset="0"/>
+                <a:cs typeface="Segoe UI" pitchFamily="34" charset="0"/>
+              </a:rPr>
+              <a:t>Tailor</a:t>
+            </a:r>
+            <a:r>
+              <a:rPr lang="pt-BR" dirty="0" smtClean="0">
+                <a:latin typeface="Segoe UI" pitchFamily="34" charset="0"/>
+                <a:ea typeface="Segoe UI" pitchFamily="34" charset="0"/>
+                <a:cs typeface="Segoe UI" pitchFamily="34" charset="0"/>
+              </a:rPr>
+              <a:t> – Front-</a:t>
+            </a:r>
+            <a:r>
+              <a:rPr lang="pt-BR" dirty="0" err="1" smtClean="0">
+                <a:latin typeface="Segoe UI" pitchFamily="34" charset="0"/>
+                <a:ea typeface="Segoe UI" pitchFamily="34" charset="0"/>
+                <a:cs typeface="Segoe UI" pitchFamily="34" charset="0"/>
+              </a:rPr>
+              <a:t>end</a:t>
+            </a:r>
+            <a:r>
+              <a:rPr lang="pt-BR" dirty="0" smtClean="0">
+                <a:latin typeface="Segoe UI" pitchFamily="34" charset="0"/>
+                <a:ea typeface="Segoe UI" pitchFamily="34" charset="0"/>
+                <a:cs typeface="Segoe UI" pitchFamily="34" charset="0"/>
+              </a:rPr>
+              <a:t> e </a:t>
+            </a:r>
+            <a:r>
+              <a:rPr lang="pt-BR" dirty="0" err="1" smtClean="0">
+                <a:latin typeface="Segoe UI" pitchFamily="34" charset="0"/>
+                <a:ea typeface="Segoe UI" pitchFamily="34" charset="0"/>
+                <a:cs typeface="Segoe UI" pitchFamily="34" charset="0"/>
+              </a:rPr>
+              <a:t>back-end</a:t>
+            </a:r>
+            <a:endParaRPr lang="pt-BR" dirty="0" smtClean="0">
+              <a:latin typeface="Segoe UI" pitchFamily="34" charset="0"/>
+              <a:ea typeface="Segoe UI" pitchFamily="34" charset="0"/>
+              <a:cs typeface="Segoe UI" pitchFamily="34" charset="0"/>
+            </a:endParaRPr>
+          </a:p>
+        </p:txBody>
+      </p:sp>
+    </p:spTree>
+  </p:cSld>
+  <p:clrMapOvr>
+    <a:masterClrMapping/>
+  </p:clrMapOvr>
+  <p:timing>
+    <p:tnLst>
+      <p:par>
+        <p:cTn id="1" dur="indefinite" restart="never" nodeType="tmRoot"/>
+      </p:par>
+    </p:tnLst>
+  </p:timing>
+</p:sld>
+</file>
+
+<file path=ppt/slides/slide22.xml><?xml version="1.0" encoding="utf-8"?>
+<p:sld xmlns:a="http://schemas.openxmlformats.org/drawingml/2006/main" xmlns:r="http://schemas.openxmlformats.org/officeDocument/2006/relationships" xmlns:p="http://schemas.openxmlformats.org/presentationml/2006/main">
+  <p:cSld>
+    <p:spTree>
+      <p:nvGrpSpPr>
+        <p:cNvPr id="1" name=""/>
+        <p:cNvGrpSpPr/>
+        <p:nvPr/>
+      </p:nvGrpSpPr>
+      <p:grpSpPr>
+        <a:xfrm>
+          <a:off x="0" y="0"/>
+          <a:ext cx="0" cy="0"/>
+          <a:chOff x="0" y="0"/>
+          <a:chExt cx="0" cy="0"/>
+        </a:xfrm>
+      </p:grpSpPr>
+      <p:sp>
+        <p:nvSpPr>
+          <p:cNvPr id="2" name="Título 1"/>
+          <p:cNvSpPr>
+            <a:spLocks noGrp="1"/>
+          </p:cNvSpPr>
+          <p:nvPr>
+            <p:ph type="title"/>
+          </p:nvPr>
+        </p:nvSpPr>
+        <p:spPr>
+          <a:xfrm>
+            <a:off x="683568" y="476672"/>
+            <a:ext cx="8229600" cy="1143000"/>
+          </a:xfrm>
+        </p:spPr>
+        <p:txBody>
+          <a:bodyPr>
+            <a:noAutofit/>
+          </a:bodyPr>
+          <a:lstStyle/>
+          <a:p>
+            <a:r>
+              <a:rPr lang="pt-BR" sz="4000" dirty="0" smtClean="0">
+                <a:latin typeface="Segoe UI" pitchFamily="34" charset="0"/>
+                <a:ea typeface="Segoe UI" pitchFamily="34" charset="0"/>
+                <a:cs typeface="Segoe UI" pitchFamily="34" charset="0"/>
+              </a:rPr>
+              <a:t>Dificuldades superadas !</a:t>
+            </a:r>
+            <a:endParaRPr lang="pt-BR" sz="4000" dirty="0">
+              <a:latin typeface="Segoe UI" pitchFamily="34" charset="0"/>
+              <a:ea typeface="Segoe UI" pitchFamily="34" charset="0"/>
+              <a:cs typeface="Segoe UI" pitchFamily="34" charset="0"/>
+            </a:endParaRPr>
+          </a:p>
+        </p:txBody>
+      </p:sp>
+      <p:pic>
+        <p:nvPicPr>
+          <p:cNvPr id="2050" name="Picture 2" descr="C:\Users\bruno\Desktop\Untitled-15.png"/>
+          <p:cNvPicPr>
+            <a:picLocks noChangeAspect="1" noChangeArrowheads="1"/>
+          </p:cNvPicPr>
+          <p:nvPr/>
+        </p:nvPicPr>
+        <p:blipFill>
+          <a:blip r:embed="rId3" cstate="print">
+            <a:extLst>
+              <a:ext uri="{28A0092B-C50C-407E-A947-70E740481C1C}">
+                <a14:useLocalDpi xmlns:a14="http://schemas.microsoft.com/office/drawing/2010/main" val="0"/>
+              </a:ext>
+            </a:extLst>
+          </a:blip>
+          <a:srcRect/>
+          <a:stretch>
+            <a:fillRect/>
+          </a:stretch>
+        </p:blipFill>
+        <p:spPr bwMode="auto">
+          <a:xfrm>
+            <a:off x="2443994" y="1412776"/>
+            <a:ext cx="4032448" cy="5183749"/>
+          </a:xfrm>
+          <a:prstGeom prst="rect">
+            <a:avLst/>
+          </a:prstGeom>
+          <a:noFill/>
+          <a:extLst>
+            <a:ext uri="{909E8E84-426E-40DD-AFC4-6F175D3DCCD1}">
+              <a14:hiddenFill xmlns:a14="http://schemas.microsoft.com/office/drawing/2010/main">
+                <a:solidFill>
+                  <a:srgbClr val="FFFFFF"/>
+                </a:solidFill>
+              </a14:hiddenFill>
+            </a:ext>
+          </a:extLst>
+        </p:spPr>
+      </p:pic>
+    </p:spTree>
+  </p:cSld>
+  <p:clrMapOvr>
+    <a:masterClrMapping/>
+  </p:clrMapOvr>
+  <p:timing>
+    <p:tnLst>
+      <p:par>
+        <p:cTn id="1" dur="indefinite" restart="never" nodeType="tmRoot"/>
+      </p:par>
+    </p:tnLst>
+  </p:timing>
+</p:sld>
+</file>
+
+<file path=ppt/slides/slide23.xml><?xml version="1.0" encoding="utf-8"?>
+<p:sld xmlns:a="http://schemas.openxmlformats.org/drawingml/2006/main" xmlns:r="http://schemas.openxmlformats.org/officeDocument/2006/relationships" xmlns:p="http://schemas.openxmlformats.org/presentationml/2006/main">
+  <p:cSld>
+    <p:spTree>
+      <p:nvGrpSpPr>
+        <p:cNvPr id="1" name=""/>
+        <p:cNvGrpSpPr/>
+        <p:nvPr/>
+      </p:nvGrpSpPr>
+      <p:grpSpPr>
+        <a:xfrm>
+          <a:off x="0" y="0"/>
+          <a:ext cx="0" cy="0"/>
+          <a:chOff x="0" y="0"/>
+          <a:chExt cx="0" cy="0"/>
+        </a:xfrm>
+      </p:grpSpPr>
+      <p:sp>
+        <p:nvSpPr>
+          <p:cNvPr id="2" name="Título 1"/>
+          <p:cNvSpPr>
+            <a:spLocks noGrp="1"/>
+          </p:cNvSpPr>
+          <p:nvPr>
+            <p:ph type="title"/>
+          </p:nvPr>
+        </p:nvSpPr>
+        <p:spPr>
+          <a:xfrm>
+            <a:off x="683568" y="476672"/>
+            <a:ext cx="8229600" cy="1143000"/>
+          </a:xfrm>
+        </p:spPr>
+        <p:txBody>
+          <a:bodyPr>
+            <a:noAutofit/>
+          </a:bodyPr>
+          <a:lstStyle/>
+          <a:p>
+            <a:r>
+              <a:rPr lang="pt-BR" sz="4000" dirty="0" smtClean="0">
+                <a:latin typeface="Segoe UI" pitchFamily="34" charset="0"/>
+                <a:ea typeface="Segoe UI" pitchFamily="34" charset="0"/>
+                <a:cs typeface="Segoe UI" pitchFamily="34" charset="0"/>
+              </a:rPr>
+              <a:t>Retrospectiva</a:t>
+            </a:r>
+            <a:endParaRPr lang="pt-BR" sz="4000" dirty="0">
+              <a:latin typeface="Segoe UI" pitchFamily="34" charset="0"/>
+              <a:ea typeface="Segoe UI" pitchFamily="34" charset="0"/>
+              <a:cs typeface="Segoe UI" pitchFamily="34" charset="0"/>
+            </a:endParaRPr>
+          </a:p>
+        </p:txBody>
+      </p:sp>
+      <p:sp>
+        <p:nvSpPr>
+          <p:cNvPr id="3" name="Espaço Reservado para Conteúdo 2"/>
+          <p:cNvSpPr>
+            <a:spLocks noGrp="1"/>
+          </p:cNvSpPr>
+          <p:nvPr>
+            <p:ph idx="1"/>
+          </p:nvPr>
+        </p:nvSpPr>
+        <p:spPr/>
+        <p:txBody>
+          <a:bodyPr>
+            <a:normAutofit fontScale="85000" lnSpcReduction="20000"/>
+          </a:bodyPr>
+          <a:lstStyle/>
+          <a:p>
+            <a:pPr>
+              <a:buNone/>
+            </a:pPr>
+            <a:r>
+              <a:rPr lang="pt-BR" sz="3600" b="1" dirty="0" smtClean="0"/>
+              <a:t>	</a:t>
+            </a:r>
+            <a:r>
+              <a:rPr lang="pt-BR" sz="3600" b="1" dirty="0" smtClean="0">
+                <a:latin typeface="Segoe UI" pitchFamily="34" charset="0"/>
+                <a:ea typeface="Segoe UI" pitchFamily="34" charset="0"/>
+                <a:cs typeface="Segoe UI" pitchFamily="34" charset="0"/>
+              </a:rPr>
+              <a:t>Retrospectiva:</a:t>
+            </a:r>
+          </a:p>
+          <a:p>
+            <a:pPr>
+              <a:buNone/>
+            </a:pPr>
+            <a:r>
+              <a:rPr lang="pt-BR" sz="3600" b="1" i="1" dirty="0" smtClean="0"/>
+              <a:t>	</a:t>
+            </a:r>
+          </a:p>
+          <a:p>
+            <a:pPr>
+              <a:buNone/>
+            </a:pPr>
+            <a:r>
+              <a:rPr lang="pt-BR" sz="3600" b="1" i="1" dirty="0" smtClean="0"/>
+              <a:t>	 Aspectos positivos: </a:t>
+            </a:r>
+            <a:r>
+              <a:rPr lang="pt-BR" sz="3600" i="1" dirty="0" smtClean="0"/>
+              <a:t>Criatividade, interesse em novas tecnologias, aplicação dos conhecimentos adquiridos até o presente momento, troca de experiências acadêmicas.</a:t>
+            </a:r>
+            <a:endParaRPr lang="pt-BR" sz="3600" b="1" i="1" dirty="0" smtClean="0"/>
+          </a:p>
+          <a:p>
+            <a:pPr>
+              <a:buNone/>
+            </a:pPr>
+            <a:r>
+              <a:rPr lang="pt-BR" sz="3600" b="1" i="1" dirty="0" smtClean="0"/>
+              <a:t>	 Aspectos a melhorar: </a:t>
+            </a:r>
+            <a:r>
+              <a:rPr lang="pt-BR" sz="3600" i="1" dirty="0" smtClean="0"/>
+              <a:t>Comunicação do Grupo, disponibilidade de tempo, foco nos pontos principais do projeto e suas respectivas entregas.</a:t>
+            </a:r>
+            <a:r>
+              <a:rPr lang="pt-BR" sz="3600" b="1" i="1" dirty="0" smtClean="0"/>
+              <a:t> </a:t>
+            </a:r>
+            <a:r>
+              <a:rPr lang="pt-BR" b="1" dirty="0" smtClean="0">
+                <a:latin typeface="Segoe UI" pitchFamily="34" charset="0"/>
+                <a:ea typeface="Segoe UI" pitchFamily="34" charset="0"/>
+                <a:cs typeface="Segoe UI" pitchFamily="34" charset="0"/>
+              </a:rPr>
+              <a:t>	</a:t>
+            </a:r>
+          </a:p>
+          <a:p>
+            <a:pPr>
+              <a:buNone/>
+            </a:pPr>
+            <a:r>
+              <a:rPr lang="pt-BR" b="1" dirty="0" smtClean="0">
+                <a:latin typeface="Segoe UI" pitchFamily="34" charset="0"/>
+                <a:ea typeface="Segoe UI" pitchFamily="34" charset="0"/>
+                <a:cs typeface="Segoe UI" pitchFamily="34" charset="0"/>
+              </a:rPr>
+              <a:t>	</a:t>
+            </a:r>
+          </a:p>
+        </p:txBody>
+      </p:sp>
+    </p:spTree>
+  </p:cSld>
+  <p:clrMapOvr>
+    <a:masterClrMapping/>
+  </p:clrMapOvr>
+  <p:timing>
+    <p:tnLst>
+      <p:par>
+        <p:cTn id="1" dur="indefinite" restart="never" nodeType="tmRoot"/>
+      </p:par>
+    </p:tnLst>
+  </p:timing>
+</p:sld>
+</file>
+
 <file path=ppt/slides/slide24.xml><?xml version="1.0" encoding="utf-8"?>
 <p:sld xmlns:a="http://schemas.openxmlformats.org/drawingml/2006/main" xmlns:r="http://schemas.openxmlformats.org/officeDocument/2006/relationships" xmlns:p="http://schemas.openxmlformats.org/presentationml/2006/main">
   <p:cSld>
@@ -6934,7 +6743,7 @@
                 <a:ea typeface="Segoe UI" pitchFamily="34" charset="0"/>
                 <a:cs typeface="Segoe UI" pitchFamily="34" charset="0"/>
               </a:rPr>
-              <a:t>Andamento do Projeto</a:t>
+              <a:t>Próximas ações</a:t>
             </a:r>
             <a:endParaRPr lang="pt-BR" sz="4000" dirty="0">
               <a:latin typeface="Segoe UI" pitchFamily="34" charset="0"/>
@@ -6965,672 +6774,32 @@
               <a:buNone/>
             </a:pPr>
             <a:r>
-              <a:rPr lang="pt-BR" sz="3600" b="1" dirty="0" smtClean="0">
-                <a:latin typeface="Segoe UI" pitchFamily="34" charset="0"/>
-                <a:ea typeface="Segoe UI" pitchFamily="34" charset="0"/>
-                <a:cs typeface="Segoe UI" pitchFamily="34" charset="0"/>
-              </a:rPr>
-              <a:t> 	</a:t>
-            </a:r>
-            <a:r>
-              <a:rPr lang="pt-BR" b="1" dirty="0" smtClean="0">
-                <a:latin typeface="Segoe UI" pitchFamily="34" charset="0"/>
-                <a:ea typeface="Segoe UI" pitchFamily="34" charset="0"/>
-                <a:cs typeface="Segoe UI" pitchFamily="34" charset="0"/>
-              </a:rPr>
-              <a:t>Quem fez o que ?</a:t>
-            </a:r>
-          </a:p>
-          <a:p>
-            <a:pPr>
-              <a:buNone/>
-            </a:pPr>
-            <a:endParaRPr lang="pt-BR" b="1" dirty="0" smtClean="0">
-              <a:latin typeface="Segoe UI" pitchFamily="34" charset="0"/>
-              <a:ea typeface="Segoe UI" pitchFamily="34" charset="0"/>
-              <a:cs typeface="Segoe UI" pitchFamily="34" charset="0"/>
-            </a:endParaRPr>
-          </a:p>
-          <a:p>
-            <a:pPr>
-              <a:buNone/>
-            </a:pPr>
-            <a:r>
-              <a:rPr lang="pt-BR" b="1" dirty="0" smtClean="0">
-                <a:latin typeface="Segoe UI" pitchFamily="34" charset="0"/>
-                <a:ea typeface="Segoe UI" pitchFamily="34" charset="0"/>
-                <a:cs typeface="Segoe UI" pitchFamily="34" charset="0"/>
-              </a:rPr>
-              <a:t>Adriano</a:t>
-            </a:r>
-            <a:r>
-              <a:rPr lang="pt-BR" dirty="0" smtClean="0">
-                <a:latin typeface="Segoe UI" pitchFamily="34" charset="0"/>
-                <a:ea typeface="Segoe UI" pitchFamily="34" charset="0"/>
-                <a:cs typeface="Segoe UI" pitchFamily="34" charset="0"/>
-              </a:rPr>
-              <a:t> – </a:t>
-            </a:r>
-            <a:r>
-              <a:rPr lang="pt-BR" dirty="0" err="1" smtClean="0">
-                <a:latin typeface="Segoe UI" pitchFamily="34" charset="0"/>
-                <a:ea typeface="Segoe UI" pitchFamily="34" charset="0"/>
-                <a:cs typeface="Segoe UI" pitchFamily="34" charset="0"/>
-              </a:rPr>
-              <a:t>Backlog</a:t>
-            </a:r>
-            <a:r>
-              <a:rPr lang="pt-BR" dirty="0" smtClean="0">
-                <a:latin typeface="Segoe UI" pitchFamily="34" charset="0"/>
-                <a:ea typeface="Segoe UI" pitchFamily="34" charset="0"/>
-                <a:cs typeface="Segoe UI" pitchFamily="34" charset="0"/>
-              </a:rPr>
-              <a:t> do produto e </a:t>
-            </a:r>
-            <a:r>
-              <a:rPr lang="pt-BR" dirty="0" err="1" smtClean="0">
-                <a:latin typeface="Segoe UI" pitchFamily="34" charset="0"/>
-                <a:ea typeface="Segoe UI" pitchFamily="34" charset="0"/>
-                <a:cs typeface="Segoe UI" pitchFamily="34" charset="0"/>
-              </a:rPr>
-              <a:t>back-end</a:t>
-            </a:r>
-            <a:endParaRPr lang="pt-BR" dirty="0" smtClean="0">
-              <a:latin typeface="Segoe UI" pitchFamily="34" charset="0"/>
-              <a:ea typeface="Segoe UI" pitchFamily="34" charset="0"/>
-              <a:cs typeface="Segoe UI" pitchFamily="34" charset="0"/>
-            </a:endParaRPr>
-          </a:p>
-          <a:p>
-            <a:pPr>
-              <a:buNone/>
-            </a:pPr>
-            <a:r>
-              <a:rPr lang="pt-BR" b="1" dirty="0" smtClean="0">
-                <a:latin typeface="Segoe UI" pitchFamily="34" charset="0"/>
-                <a:ea typeface="Segoe UI" pitchFamily="34" charset="0"/>
-                <a:cs typeface="Segoe UI" pitchFamily="34" charset="0"/>
-              </a:rPr>
-              <a:t>Bruno</a:t>
-            </a:r>
-            <a:r>
-              <a:rPr lang="pt-BR" dirty="0" smtClean="0">
-                <a:latin typeface="Segoe UI" pitchFamily="34" charset="0"/>
-                <a:ea typeface="Segoe UI" pitchFamily="34" charset="0"/>
-                <a:cs typeface="Segoe UI" pitchFamily="34" charset="0"/>
-              </a:rPr>
-              <a:t> – Front-</a:t>
-            </a:r>
-            <a:r>
-              <a:rPr lang="pt-BR" dirty="0" err="1" smtClean="0">
-                <a:latin typeface="Segoe UI" pitchFamily="34" charset="0"/>
-                <a:ea typeface="Segoe UI" pitchFamily="34" charset="0"/>
-                <a:cs typeface="Segoe UI" pitchFamily="34" charset="0"/>
-              </a:rPr>
-              <a:t>end</a:t>
-            </a:r>
-            <a:r>
-              <a:rPr lang="pt-BR" dirty="0" smtClean="0">
-                <a:latin typeface="Segoe UI" pitchFamily="34" charset="0"/>
-                <a:ea typeface="Segoe UI" pitchFamily="34" charset="0"/>
-                <a:cs typeface="Segoe UI" pitchFamily="34" charset="0"/>
-              </a:rPr>
-              <a:t> e </a:t>
-            </a:r>
-            <a:r>
-              <a:rPr lang="pt-BR" dirty="0" err="1" smtClean="0">
-                <a:latin typeface="Segoe UI" pitchFamily="34" charset="0"/>
-                <a:ea typeface="Segoe UI" pitchFamily="34" charset="0"/>
-                <a:cs typeface="Segoe UI" pitchFamily="34" charset="0"/>
-              </a:rPr>
-              <a:t>back-end</a:t>
-            </a:r>
-            <a:endParaRPr lang="pt-BR" dirty="0" smtClean="0">
-              <a:latin typeface="Segoe UI" pitchFamily="34" charset="0"/>
-              <a:ea typeface="Segoe UI" pitchFamily="34" charset="0"/>
-              <a:cs typeface="Segoe UI" pitchFamily="34" charset="0"/>
-            </a:endParaRPr>
-          </a:p>
-          <a:p>
-            <a:pPr>
-              <a:buNone/>
-            </a:pPr>
-            <a:r>
-              <a:rPr lang="pt-BR" b="1" dirty="0">
-                <a:latin typeface="Segoe UI" pitchFamily="34" charset="0"/>
-                <a:ea typeface="Segoe UI" pitchFamily="34" charset="0"/>
-                <a:cs typeface="Segoe UI" pitchFamily="34" charset="0"/>
-              </a:rPr>
-              <a:t>Leon</a:t>
-            </a:r>
-            <a:r>
-              <a:rPr lang="pt-BR" dirty="0">
-                <a:latin typeface="Segoe UI" pitchFamily="34" charset="0"/>
-                <a:ea typeface="Segoe UI" pitchFamily="34" charset="0"/>
-                <a:cs typeface="Segoe UI" pitchFamily="34" charset="0"/>
-              </a:rPr>
-              <a:t> </a:t>
-            </a:r>
-            <a:r>
-              <a:rPr lang="pt-BR" dirty="0" smtClean="0">
-                <a:latin typeface="Segoe UI" pitchFamily="34" charset="0"/>
-                <a:ea typeface="Segoe UI" pitchFamily="34" charset="0"/>
-                <a:cs typeface="Segoe UI" pitchFamily="34" charset="0"/>
-              </a:rPr>
-              <a:t>– </a:t>
-            </a:r>
-            <a:r>
-              <a:rPr lang="pt-BR" dirty="0" err="1">
-                <a:latin typeface="Segoe UI" pitchFamily="34" charset="0"/>
-                <a:ea typeface="Segoe UI" pitchFamily="34" charset="0"/>
-                <a:cs typeface="Segoe UI" pitchFamily="34" charset="0"/>
-              </a:rPr>
-              <a:t>Backlog</a:t>
-            </a:r>
-            <a:r>
-              <a:rPr lang="pt-BR" dirty="0">
-                <a:latin typeface="Segoe UI" pitchFamily="34" charset="0"/>
-                <a:ea typeface="Segoe UI" pitchFamily="34" charset="0"/>
-                <a:cs typeface="Segoe UI" pitchFamily="34" charset="0"/>
-              </a:rPr>
-              <a:t> do produto </a:t>
-            </a:r>
-            <a:r>
-              <a:rPr lang="pt-BR" dirty="0" smtClean="0">
-                <a:latin typeface="Segoe UI" pitchFamily="34" charset="0"/>
-                <a:ea typeface="Segoe UI" pitchFamily="34" charset="0"/>
-                <a:cs typeface="Segoe UI" pitchFamily="34" charset="0"/>
-              </a:rPr>
-              <a:t>e Banco </a:t>
-            </a:r>
-            <a:r>
-              <a:rPr lang="pt-BR" dirty="0">
-                <a:latin typeface="Segoe UI" pitchFamily="34" charset="0"/>
-                <a:ea typeface="Segoe UI" pitchFamily="34" charset="0"/>
-                <a:cs typeface="Segoe UI" pitchFamily="34" charset="0"/>
-              </a:rPr>
-              <a:t>de </a:t>
-            </a:r>
-            <a:r>
-              <a:rPr lang="pt-BR" dirty="0" smtClean="0">
-                <a:latin typeface="Segoe UI" pitchFamily="34" charset="0"/>
-                <a:ea typeface="Segoe UI" pitchFamily="34" charset="0"/>
-                <a:cs typeface="Segoe UI" pitchFamily="34" charset="0"/>
-              </a:rPr>
-              <a:t>Dados</a:t>
-            </a:r>
-            <a:endParaRPr lang="pt-BR" dirty="0">
-              <a:latin typeface="Segoe UI" pitchFamily="34" charset="0"/>
-              <a:ea typeface="Segoe UI" pitchFamily="34" charset="0"/>
-              <a:cs typeface="Segoe UI" pitchFamily="34" charset="0"/>
-            </a:endParaRPr>
-          </a:p>
-          <a:p>
-            <a:pPr>
-              <a:buNone/>
-            </a:pPr>
-            <a:r>
-              <a:rPr lang="pt-BR" b="1" dirty="0" err="1" smtClean="0">
-                <a:latin typeface="Segoe UI" pitchFamily="34" charset="0"/>
-                <a:ea typeface="Segoe UI" pitchFamily="34" charset="0"/>
-                <a:cs typeface="Segoe UI" pitchFamily="34" charset="0"/>
-              </a:rPr>
-              <a:t>Tailor</a:t>
-            </a:r>
-            <a:r>
-              <a:rPr lang="pt-BR" dirty="0" smtClean="0">
-                <a:latin typeface="Segoe UI" pitchFamily="34" charset="0"/>
-                <a:ea typeface="Segoe UI" pitchFamily="34" charset="0"/>
-                <a:cs typeface="Segoe UI" pitchFamily="34" charset="0"/>
-              </a:rPr>
-              <a:t> – Front-</a:t>
-            </a:r>
-            <a:r>
-              <a:rPr lang="pt-BR" dirty="0" err="1" smtClean="0">
-                <a:latin typeface="Segoe UI" pitchFamily="34" charset="0"/>
-                <a:ea typeface="Segoe UI" pitchFamily="34" charset="0"/>
-                <a:cs typeface="Segoe UI" pitchFamily="34" charset="0"/>
-              </a:rPr>
-              <a:t>end</a:t>
-            </a:r>
-            <a:r>
-              <a:rPr lang="pt-BR" dirty="0" smtClean="0">
-                <a:latin typeface="Segoe UI" pitchFamily="34" charset="0"/>
-                <a:ea typeface="Segoe UI" pitchFamily="34" charset="0"/>
-                <a:cs typeface="Segoe UI" pitchFamily="34" charset="0"/>
-              </a:rPr>
-              <a:t> e </a:t>
-            </a:r>
-            <a:r>
-              <a:rPr lang="pt-BR" dirty="0" err="1" smtClean="0">
-                <a:latin typeface="Segoe UI" pitchFamily="34" charset="0"/>
-                <a:ea typeface="Segoe UI" pitchFamily="34" charset="0"/>
-                <a:cs typeface="Segoe UI" pitchFamily="34" charset="0"/>
-              </a:rPr>
-              <a:t>back-end</a:t>
-            </a:r>
-            <a:endParaRPr lang="pt-BR" dirty="0" smtClean="0">
-              <a:latin typeface="Segoe UI" pitchFamily="34" charset="0"/>
-              <a:ea typeface="Segoe UI" pitchFamily="34" charset="0"/>
-              <a:cs typeface="Segoe UI" pitchFamily="34" charset="0"/>
-            </a:endParaRPr>
-          </a:p>
-        </p:txBody>
-      </p:sp>
-    </p:spTree>
-  </p:cSld>
-  <p:clrMapOvr>
-    <a:masterClrMapping/>
-  </p:clrMapOvr>
-  <p:timing>
-    <p:tnLst>
-      <p:par>
-        <p:cTn id="1" dur="indefinite" restart="never" nodeType="tmRoot"/>
-      </p:par>
-    </p:tnLst>
-  </p:timing>
-</p:sld>
-</file>
-
-<file path=ppt/slides/slide25.xml><?xml version="1.0" encoding="utf-8"?>
-<p:sld xmlns:a="http://schemas.openxmlformats.org/drawingml/2006/main" xmlns:r="http://schemas.openxmlformats.org/officeDocument/2006/relationships" xmlns:p="http://schemas.openxmlformats.org/presentationml/2006/main">
-  <p:cSld>
-    <p:spTree>
-      <p:nvGrpSpPr>
-        <p:cNvPr id="1" name=""/>
-        <p:cNvGrpSpPr/>
-        <p:nvPr/>
-      </p:nvGrpSpPr>
-      <p:grpSpPr>
-        <a:xfrm>
-          <a:off x="0" y="0"/>
-          <a:ext cx="0" cy="0"/>
-          <a:chOff x="0" y="0"/>
-          <a:chExt cx="0" cy="0"/>
-        </a:xfrm>
-      </p:grpSpPr>
-      <p:sp>
-        <p:nvSpPr>
-          <p:cNvPr id="2" name="Título 1"/>
-          <p:cNvSpPr>
-            <a:spLocks noGrp="1"/>
-          </p:cNvSpPr>
-          <p:nvPr>
-            <p:ph type="title"/>
-          </p:nvPr>
-        </p:nvSpPr>
-        <p:spPr>
-          <a:xfrm>
-            <a:off x="683568" y="476672"/>
-            <a:ext cx="8229600" cy="1143000"/>
-          </a:xfrm>
-        </p:spPr>
-        <p:txBody>
-          <a:bodyPr>
-            <a:noAutofit/>
-          </a:bodyPr>
-          <a:lstStyle/>
-          <a:p>
-            <a:r>
-              <a:rPr lang="pt-BR" sz="4000" dirty="0" smtClean="0">
-                <a:latin typeface="Segoe UI" pitchFamily="34" charset="0"/>
-                <a:ea typeface="Segoe UI" pitchFamily="34" charset="0"/>
-                <a:cs typeface="Segoe UI" pitchFamily="34" charset="0"/>
-              </a:rPr>
-              <a:t>Andamento do Projeto</a:t>
-            </a:r>
-            <a:endParaRPr lang="pt-BR" sz="4000" dirty="0">
-              <a:latin typeface="Segoe UI" pitchFamily="34" charset="0"/>
-              <a:ea typeface="Segoe UI" pitchFamily="34" charset="0"/>
-              <a:cs typeface="Segoe UI" pitchFamily="34" charset="0"/>
-            </a:endParaRPr>
-          </a:p>
-        </p:txBody>
-      </p:sp>
-      <p:sp>
-        <p:nvSpPr>
-          <p:cNvPr id="3" name="Espaço Reservado para Conteúdo 2"/>
-          <p:cNvSpPr>
-            <a:spLocks noGrp="1"/>
-          </p:cNvSpPr>
-          <p:nvPr>
-            <p:ph idx="1"/>
-          </p:nvPr>
-        </p:nvSpPr>
-        <p:spPr/>
-        <p:txBody>
-          <a:bodyPr>
-            <a:normAutofit/>
-          </a:bodyPr>
-          <a:lstStyle/>
-          <a:p>
-            <a:pPr>
-              <a:buNone/>
-            </a:pPr>
-            <a:r>
-              <a:rPr lang="pt-BR" sz="3600" b="1" dirty="0" smtClean="0">
-                <a:latin typeface="Segoe UI" pitchFamily="34" charset="0"/>
-                <a:ea typeface="Segoe UI" pitchFamily="34" charset="0"/>
-                <a:cs typeface="Segoe UI" pitchFamily="34" charset="0"/>
-              </a:rPr>
-              <a:t> 	</a:t>
-            </a:r>
-            <a:r>
-              <a:rPr lang="pt-BR" b="1" dirty="0" smtClean="0">
-                <a:latin typeface="Segoe UI" pitchFamily="34" charset="0"/>
-                <a:ea typeface="Segoe UI" pitchFamily="34" charset="0"/>
-                <a:cs typeface="Segoe UI" pitchFamily="34" charset="0"/>
-              </a:rPr>
-              <a:t>Dificuldades superadas?</a:t>
-            </a:r>
-          </a:p>
-          <a:p>
-            <a:pPr>
-              <a:buNone/>
-            </a:pPr>
-            <a:r>
-              <a:rPr lang="pt-BR" dirty="0" smtClean="0">
-                <a:latin typeface="Segoe UI" pitchFamily="34" charset="0"/>
-                <a:ea typeface="Segoe UI" pitchFamily="34" charset="0"/>
-                <a:cs typeface="Segoe UI" pitchFamily="34" charset="0"/>
-              </a:rPr>
-              <a:t>- </a:t>
-            </a:r>
-            <a:r>
-              <a:rPr lang="pt-BR" dirty="0">
-                <a:latin typeface="Segoe UI" pitchFamily="34" charset="0"/>
-                <a:ea typeface="Segoe UI" pitchFamily="34" charset="0"/>
-                <a:cs typeface="Segoe UI" pitchFamily="34" charset="0"/>
-              </a:rPr>
-              <a:t>Inexperiência de desenvolvimento em grupo	</a:t>
-            </a:r>
-          </a:p>
-          <a:p>
-            <a:pPr>
-              <a:buNone/>
-            </a:pPr>
-            <a:r>
-              <a:rPr lang="pt-BR" dirty="0">
-                <a:latin typeface="Segoe UI" pitchFamily="34" charset="0"/>
-                <a:ea typeface="Segoe UI" pitchFamily="34" charset="0"/>
-                <a:cs typeface="Segoe UI" pitchFamily="34" charset="0"/>
-              </a:rPr>
-              <a:t> - Desorganização </a:t>
-            </a:r>
-          </a:p>
-        </p:txBody>
-      </p:sp>
-    </p:spTree>
-  </p:cSld>
-  <p:clrMapOvr>
-    <a:masterClrMapping/>
-  </p:clrMapOvr>
-  <p:timing>
-    <p:tnLst>
-      <p:par>
-        <p:cTn id="1" dur="indefinite" restart="never" nodeType="tmRoot"/>
-      </p:par>
-    </p:tnLst>
-  </p:timing>
-</p:sld>
-</file>
-
-<file path=ppt/slides/slide26.xml><?xml version="1.0" encoding="utf-8"?>
-<p:sld xmlns:a="http://schemas.openxmlformats.org/drawingml/2006/main" xmlns:r="http://schemas.openxmlformats.org/officeDocument/2006/relationships" xmlns:p="http://schemas.openxmlformats.org/presentationml/2006/main">
-  <p:cSld>
-    <p:spTree>
-      <p:nvGrpSpPr>
-        <p:cNvPr id="1" name=""/>
-        <p:cNvGrpSpPr/>
-        <p:nvPr/>
-      </p:nvGrpSpPr>
-      <p:grpSpPr>
-        <a:xfrm>
-          <a:off x="0" y="0"/>
-          <a:ext cx="0" cy="0"/>
-          <a:chOff x="0" y="0"/>
-          <a:chExt cx="0" cy="0"/>
-        </a:xfrm>
-      </p:grpSpPr>
-      <p:sp>
-        <p:nvSpPr>
-          <p:cNvPr id="2" name="Título 1"/>
-          <p:cNvSpPr>
-            <a:spLocks noGrp="1"/>
-          </p:cNvSpPr>
-          <p:nvPr>
-            <p:ph type="title"/>
-          </p:nvPr>
-        </p:nvSpPr>
-        <p:spPr>
-          <a:xfrm>
-            <a:off x="683568" y="476672"/>
-            <a:ext cx="8229600" cy="1143000"/>
-          </a:xfrm>
-        </p:spPr>
-        <p:txBody>
-          <a:bodyPr>
-            <a:noAutofit/>
-          </a:bodyPr>
-          <a:lstStyle/>
-          <a:p>
-            <a:r>
-              <a:rPr lang="pt-BR" sz="4000" dirty="0" smtClean="0">
-                <a:latin typeface="Segoe UI" pitchFamily="34" charset="0"/>
-                <a:ea typeface="Segoe UI" pitchFamily="34" charset="0"/>
-                <a:cs typeface="Segoe UI" pitchFamily="34" charset="0"/>
-              </a:rPr>
-              <a:t>Retrospectiva</a:t>
-            </a:r>
-            <a:endParaRPr lang="pt-BR" sz="4000" dirty="0">
-              <a:latin typeface="Segoe UI" pitchFamily="34" charset="0"/>
-              <a:ea typeface="Segoe UI" pitchFamily="34" charset="0"/>
-              <a:cs typeface="Segoe UI" pitchFamily="34" charset="0"/>
-            </a:endParaRPr>
-          </a:p>
-        </p:txBody>
-      </p:sp>
-      <p:sp>
-        <p:nvSpPr>
-          <p:cNvPr id="3" name="Espaço Reservado para Conteúdo 2"/>
-          <p:cNvSpPr>
-            <a:spLocks noGrp="1"/>
-          </p:cNvSpPr>
-          <p:nvPr>
-            <p:ph idx="1"/>
-          </p:nvPr>
-        </p:nvSpPr>
-        <p:spPr/>
-        <p:txBody>
-          <a:bodyPr>
-            <a:normAutofit fontScale="85000" lnSpcReduction="20000"/>
-          </a:bodyPr>
-          <a:lstStyle/>
-          <a:p>
-            <a:pPr>
-              <a:buNone/>
-            </a:pPr>
-            <a:r>
-              <a:rPr lang="pt-BR" sz="3600" b="1" dirty="0" smtClean="0"/>
+              <a:rPr lang="pt-BR" sz="3600" dirty="0" smtClean="0"/>
+              <a:t>	- Desenvolver funcionalidades de menos complexidade tais como: </a:t>
+            </a:r>
+            <a:r>
+              <a:rPr lang="pt-BR" sz="3600" dirty="0" smtClean="0"/>
+              <a:t>melhor </a:t>
+            </a:r>
+            <a:r>
+              <a:rPr lang="pt-BR" sz="3600" dirty="0" smtClean="0"/>
+              <a:t>estruturação do </a:t>
+            </a:r>
+            <a:r>
+              <a:rPr lang="pt-BR" sz="3600" dirty="0" smtClean="0"/>
+              <a:t>código, </a:t>
+            </a:r>
+            <a:r>
+              <a:rPr lang="pt-BR" sz="3600" dirty="0" err="1" smtClean="0"/>
+              <a:t>responsividade</a:t>
+            </a:r>
+            <a:r>
+              <a:rPr lang="pt-BR" sz="3600" dirty="0" smtClean="0"/>
+              <a:t>.</a:t>
+            </a:r>
+            <a:r>
+              <a:rPr lang="pt-BR" sz="3600" dirty="0" smtClean="0"/>
               <a:t>	</a:t>
-            </a:r>
-            <a:r>
-              <a:rPr lang="pt-BR" sz="3600" b="1" dirty="0" smtClean="0">
-                <a:latin typeface="Segoe UI" pitchFamily="34" charset="0"/>
-                <a:ea typeface="Segoe UI" pitchFamily="34" charset="0"/>
-                <a:cs typeface="Segoe UI" pitchFamily="34" charset="0"/>
-              </a:rPr>
-              <a:t>Retrospectiva:</a:t>
-            </a:r>
-          </a:p>
-          <a:p>
-            <a:pPr>
-              <a:buNone/>
-            </a:pPr>
-            <a:r>
-              <a:rPr lang="pt-BR" sz="3600" b="1" i="1" dirty="0" smtClean="0"/>
-              <a:t>	</a:t>
-            </a:r>
-          </a:p>
-          <a:p>
-            <a:pPr>
-              <a:buNone/>
-            </a:pPr>
-            <a:r>
-              <a:rPr lang="pt-BR" sz="3600" b="1" i="1" dirty="0" smtClean="0"/>
-              <a:t>	 Aspectos positivos: </a:t>
-            </a:r>
-            <a:r>
-              <a:rPr lang="pt-BR" sz="3600" i="1" dirty="0" smtClean="0"/>
-              <a:t>Criatividade, interesse em novas tecnologias, aplicação dos conhecimentos adquiridos até o presente momento, troca de experiências acadêmicas.</a:t>
-            </a:r>
-            <a:endParaRPr lang="pt-BR" sz="3600" b="1" i="1" dirty="0" smtClean="0"/>
-          </a:p>
-          <a:p>
-            <a:pPr>
-              <a:buNone/>
-            </a:pPr>
-            <a:r>
-              <a:rPr lang="pt-BR" sz="3600" b="1" i="1" dirty="0" smtClean="0"/>
-              <a:t>	 Aspectos a melhorar: </a:t>
-            </a:r>
-            <a:r>
-              <a:rPr lang="pt-BR" sz="3600" i="1" dirty="0" smtClean="0"/>
-              <a:t>Comunicação do Grupo, disponibilidade de tempo, foco nos pontos principais do projeto e suas respectivas </a:t>
-            </a:r>
-            <a:r>
-              <a:rPr lang="pt-BR" sz="3600" i="1" dirty="0" smtClean="0"/>
-              <a:t>entregas.</a:t>
-            </a:r>
-            <a:r>
-              <a:rPr lang="pt-BR" sz="3600" b="1" i="1" dirty="0" smtClean="0"/>
-              <a:t> </a:t>
-            </a:r>
-            <a:r>
-              <a:rPr lang="pt-BR" b="1" dirty="0" smtClean="0">
-                <a:latin typeface="Segoe UI" pitchFamily="34" charset="0"/>
-                <a:ea typeface="Segoe UI" pitchFamily="34" charset="0"/>
-                <a:cs typeface="Segoe UI" pitchFamily="34" charset="0"/>
-              </a:rPr>
-              <a:t>	</a:t>
-            </a:r>
-          </a:p>
-          <a:p>
-            <a:pPr>
-              <a:buNone/>
-            </a:pPr>
-            <a:r>
-              <a:rPr lang="pt-BR" b="1" dirty="0" smtClean="0">
-                <a:latin typeface="Segoe UI" pitchFamily="34" charset="0"/>
-                <a:ea typeface="Segoe UI" pitchFamily="34" charset="0"/>
-                <a:cs typeface="Segoe UI" pitchFamily="34" charset="0"/>
-              </a:rPr>
-              <a:t>	</a:t>
-            </a:r>
-          </a:p>
-        </p:txBody>
-      </p:sp>
-    </p:spTree>
-  </p:cSld>
-  <p:clrMapOvr>
-    <a:masterClrMapping/>
-  </p:clrMapOvr>
-  <p:timing>
-    <p:tnLst>
-      <p:par>
-        <p:cTn id="1" dur="indefinite" restart="never" nodeType="tmRoot"/>
-      </p:par>
-    </p:tnLst>
-  </p:timing>
-</p:sld>
-</file>
-
-<file path=ppt/slides/slide27.xml><?xml version="1.0" encoding="utf-8"?>
-<p:sld xmlns:a="http://schemas.openxmlformats.org/drawingml/2006/main" xmlns:r="http://schemas.openxmlformats.org/officeDocument/2006/relationships" xmlns:p="http://schemas.openxmlformats.org/presentationml/2006/main">
-  <p:cSld>
-    <p:spTree>
-      <p:nvGrpSpPr>
-        <p:cNvPr id="1" name=""/>
-        <p:cNvGrpSpPr/>
-        <p:nvPr/>
-      </p:nvGrpSpPr>
-      <p:grpSpPr>
-        <a:xfrm>
-          <a:off x="0" y="0"/>
-          <a:ext cx="0" cy="0"/>
-          <a:chOff x="0" y="0"/>
-          <a:chExt cx="0" cy="0"/>
-        </a:xfrm>
-      </p:grpSpPr>
-      <p:sp>
-        <p:nvSpPr>
-          <p:cNvPr id="2" name="Título 1"/>
-          <p:cNvSpPr>
-            <a:spLocks noGrp="1"/>
-          </p:cNvSpPr>
-          <p:nvPr>
-            <p:ph type="title"/>
-          </p:nvPr>
-        </p:nvSpPr>
-        <p:spPr>
-          <a:xfrm>
-            <a:off x="683568" y="476672"/>
-            <a:ext cx="8229600" cy="1143000"/>
-          </a:xfrm>
-        </p:spPr>
-        <p:txBody>
-          <a:bodyPr>
-            <a:noAutofit/>
-          </a:bodyPr>
-          <a:lstStyle/>
-          <a:p>
-            <a:r>
-              <a:rPr lang="pt-BR" sz="4000" dirty="0" smtClean="0">
-                <a:latin typeface="Segoe UI" pitchFamily="34" charset="0"/>
-                <a:ea typeface="Segoe UI" pitchFamily="34" charset="0"/>
-                <a:cs typeface="Segoe UI" pitchFamily="34" charset="0"/>
-              </a:rPr>
-              <a:t>Próximas ações</a:t>
-            </a:r>
-            <a:endParaRPr lang="pt-BR" sz="4000" dirty="0">
-              <a:latin typeface="Segoe UI" pitchFamily="34" charset="0"/>
-              <a:ea typeface="Segoe UI" pitchFamily="34" charset="0"/>
-              <a:cs typeface="Segoe UI" pitchFamily="34" charset="0"/>
-            </a:endParaRPr>
-          </a:p>
-        </p:txBody>
-      </p:sp>
-      <p:sp>
-        <p:nvSpPr>
-          <p:cNvPr id="3" name="Espaço Reservado para Conteúdo 2"/>
-          <p:cNvSpPr>
-            <a:spLocks noGrp="1"/>
-          </p:cNvSpPr>
-          <p:nvPr>
-            <p:ph idx="1"/>
-          </p:nvPr>
-        </p:nvSpPr>
-        <p:spPr/>
-        <p:txBody>
-          <a:bodyPr>
-            <a:normAutofit/>
-          </a:bodyPr>
-          <a:lstStyle/>
-          <a:p>
-            <a:pPr>
-              <a:buNone/>
-            </a:pPr>
-            <a:r>
-              <a:rPr lang="pt-BR" sz="3600" dirty="0" smtClean="0"/>
-              <a:t>	- Desenvolver funcionalidades de menos complexidade tais como: cadastro de usuário, </a:t>
-            </a:r>
-            <a:r>
-              <a:rPr lang="pt-BR" sz="3600" dirty="0" err="1" smtClean="0"/>
-              <a:t>login</a:t>
-            </a:r>
-            <a:r>
-              <a:rPr lang="pt-BR" sz="3600" dirty="0" smtClean="0"/>
-              <a:t>, melhor estruturação do código, pesagem etc.	</a:t>
             </a:r>
             <a:r>
               <a:rPr lang="pt-BR" sz="3600" b="1" i="1" dirty="0" smtClean="0"/>
@@ -8217,7 +7386,7 @@
                 <a:ea typeface="Segoe UI" pitchFamily="34" charset="0"/>
                 <a:cs typeface="Segoe UI" pitchFamily="34" charset="0"/>
               </a:rPr>
-              <a:t>Comparativos realizados: </a:t>
+              <a:t>Aspecto diferencial do projeto: </a:t>
             </a:r>
             <a:endParaRPr lang="pt-BR" sz="3600" b="1" dirty="0">
               <a:latin typeface="Segoe UI" pitchFamily="34" charset="0"/>
@@ -8239,30 +7408,21 @@
               <a:buNone/>
             </a:pPr>
             <a:r>
+              <a:rPr lang="pt-BR" sz="3600" dirty="0" smtClean="0"/>
+              <a:t>	 Fácil </a:t>
+            </a:r>
+            <a:r>
               <a:rPr lang="pt-BR" sz="3600" dirty="0"/>
-              <a:t>	 Facilidade no uso, cálculos de </a:t>
+              <a:t>de usar, maior controle sobre as calorias </a:t>
             </a:r>
             <a:r>
               <a:rPr lang="pt-BR" sz="3600" dirty="0" smtClean="0"/>
-              <a:t>IMC, cálculos </a:t>
+              <a:t>ingeridas e design responsivo</a:t>
             </a:r>
             <a:r>
               <a:rPr lang="pt-BR" sz="3600" dirty="0"/>
-              <a:t>de </a:t>
-            </a:r>
-            <a:r>
-              <a:rPr lang="pt-BR" sz="3600" dirty="0" smtClean="0"/>
-              <a:t>calorias, </a:t>
-            </a:r>
-            <a:r>
-              <a:rPr lang="pt-BR" sz="3600" dirty="0"/>
-              <a:t>base de </a:t>
-            </a:r>
-            <a:r>
-              <a:rPr lang="pt-BR" sz="3600" dirty="0" smtClean="0"/>
-              <a:t>dados.</a:t>
-            </a:r>
-            <a:endParaRPr lang="pt-BR" sz="3600" dirty="0"/>
+              <a:t>.</a:t>
+            </a:r>
           </a:p>
           <a:p>
             <a:pPr>
@@ -8328,7 +7488,7 @@
                 <a:ea typeface="Segoe UI" pitchFamily="34" charset="0"/>
                 <a:cs typeface="Segoe UI" pitchFamily="34" charset="0"/>
               </a:rPr>
-              <a:t>Definição do problema</a:t>
+              <a:t>Objetivos</a:t>
             </a:r>
             <a:endParaRPr lang="pt-BR" sz="4000" dirty="0">
               <a:latin typeface="Segoe UI" pitchFamily="34" charset="0"/>
@@ -8351,24 +7511,61 @@
         <p:spPr/>
         <p:txBody>
           <a:bodyPr>
-            <a:normAutofit/>
+            <a:normAutofit fontScale="92500"/>
           </a:bodyPr>
           <a:lstStyle/>
           <a:p>
             <a:pPr>
-              <a:buNone/>
+              <a:buFontTx/>
+              <a:buChar char="-"/>
             </a:pPr>
             <a:r>
-              <a:rPr lang="pt-BR" sz="3600" dirty="0"/>
-              <a:t>	</a:t>
-            </a:r>
-            <a:r>
-              <a:rPr lang="pt-BR" b="1" dirty="0" smtClean="0">
+              <a:rPr lang="pt-BR" sz="3600" dirty="0" smtClean="0"/>
+              <a:t>Boa usabilidade em diferentes plataformas</a:t>
+            </a:r>
+          </a:p>
+          <a:p>
+            <a:pPr marL="0" indent="0">
+              <a:buNone/>
+            </a:pPr>
+            <a:endParaRPr lang="pt-BR" sz="3600" dirty="0" smtClean="0"/>
+          </a:p>
+          <a:p>
+            <a:pPr>
+              <a:buFontTx/>
+              <a:buChar char="-"/>
+            </a:pPr>
+            <a:r>
+              <a:rPr lang="pt-BR" sz="3600" dirty="0" smtClean="0">
                 <a:latin typeface="Segoe UI" pitchFamily="34" charset="0"/>
                 <a:ea typeface="Segoe UI" pitchFamily="34" charset="0"/>
                 <a:cs typeface="Segoe UI" pitchFamily="34" charset="0"/>
               </a:rPr>
-              <a:t>Aspecto diferencial do projeto: </a:t>
+              <a:t>Haver design responsivo</a:t>
+            </a:r>
+          </a:p>
+          <a:p>
+            <a:pPr>
+              <a:buNone/>
+            </a:pPr>
+            <a:endParaRPr lang="pt-BR" sz="3600" dirty="0" smtClean="0">
+              <a:latin typeface="Segoe UI" pitchFamily="34" charset="0"/>
+              <a:ea typeface="Segoe UI" pitchFamily="34" charset="0"/>
+              <a:cs typeface="Segoe UI" pitchFamily="34" charset="0"/>
+            </a:endParaRPr>
+          </a:p>
+          <a:p>
+            <a:pPr>
+              <a:buFontTx/>
+              <a:buChar char="-"/>
+            </a:pPr>
+            <a:r>
+              <a:rPr lang="pt-BR" dirty="0" smtClean="0">
+                <a:latin typeface="Segoe UI" pitchFamily="34" charset="0"/>
+                <a:ea typeface="Segoe UI" pitchFamily="34" charset="0"/>
+                <a:cs typeface="Segoe UI" pitchFamily="34" charset="0"/>
+              </a:rPr>
+              <a:t>Produto específico para controle de calorias com o objetivo final de controle de peso.</a:t>
             </a:r>
             <a:endParaRPr lang="pt-BR" sz="3600" b="1" dirty="0">
               <a:latin typeface="Segoe UI" pitchFamily="34" charset="0"/>
@@ -8391,25 +7588,8 @@
             </a:pPr>
             <a:r>
               <a:rPr lang="pt-BR" sz="3600" dirty="0" smtClean="0"/>
-              <a:t>	 Fácil </a:t>
-            </a:r>
-            <a:r>
-              <a:rPr lang="pt-BR" sz="3600" dirty="0"/>
-              <a:t>de usar, maior controle sobre as calorias </a:t>
-            </a:r>
-            <a:r>
-              <a:rPr lang="pt-BR" sz="3600" dirty="0" smtClean="0"/>
-              <a:t>ingeridas e design responsivo</a:t>
-            </a:r>
-            <a:r>
-              <a:rPr lang="pt-BR" sz="3600" dirty="0"/>
-              <a:t>.</a:t>
-            </a:r>
-          </a:p>
-          <a:p>
-            <a:pPr>
-              <a:buNone/>
-            </a:pPr>
+              <a:t>	</a:t>
+            </a:r>
             <a:endParaRPr lang="pt-BR" sz="3600" dirty="0"/>
           </a:p>
         </p:txBody>
@@ -8463,14 +7643,13 @@
           </a:bodyPr>
           <a:lstStyle/>
           <a:p>
-            <a:pPr algn="ctr"/>
             <a:r>
               <a:rPr lang="pt-BR" sz="4000" dirty="0" smtClean="0">
                 <a:latin typeface="Segoe UI" pitchFamily="34" charset="0"/>
                 <a:ea typeface="Segoe UI" pitchFamily="34" charset="0"/>
                 <a:cs typeface="Segoe UI" pitchFamily="34" charset="0"/>
               </a:rPr>
-              <a:t>Objetivos</a:t>
+              <a:t>Definição da solução</a:t>
             </a:r>
             <a:endParaRPr lang="pt-BR" sz="4000" dirty="0">
               <a:latin typeface="Segoe UI" pitchFamily="34" charset="0"/>
@@ -8493,97 +7672,106 @@
         <p:spPr/>
         <p:txBody>
           <a:bodyPr>
-            <a:normAutofit fontScale="92500"/>
+            <a:normAutofit fontScale="92500" lnSpcReduction="20000"/>
           </a:bodyPr>
           <a:lstStyle/>
           <a:p>
             <a:pPr>
-              <a:buFontTx/>
-              <a:buChar char="-"/>
+              <a:buNone/>
             </a:pPr>
             <a:r>
               <a:rPr lang="pt-BR" sz="3600" dirty="0" smtClean="0"/>
-              <a:t>Boa usabilidade em diferentes plataformas</a:t>
-            </a:r>
-          </a:p>
-          <a:p>
-            <a:pPr marL="0" indent="0">
-              <a:buNone/>
-            </a:pPr>
-            <a:endParaRPr lang="pt-BR" sz="3600" dirty="0" smtClean="0"/>
-          </a:p>
-          <a:p>
-            <a:pPr>
-              <a:buFontTx/>
-              <a:buChar char="-"/>
-            </a:pPr>
-            <a:r>
-              <a:rPr lang="pt-BR" sz="3600" dirty="0" smtClean="0">
+              <a:t>	</a:t>
+            </a:r>
+            <a:r>
+              <a:rPr lang="pt-BR" b="1" dirty="0" smtClean="0">
                 <a:latin typeface="Segoe UI" pitchFamily="34" charset="0"/>
                 <a:ea typeface="Segoe UI" pitchFamily="34" charset="0"/>
                 <a:cs typeface="Segoe UI" pitchFamily="34" charset="0"/>
               </a:rPr>
-              <a:t>Haver </a:t>
-            </a:r>
-            <a:r>
-              <a:rPr lang="pt-BR" sz="3600" dirty="0" smtClean="0">
+              <a:t>Quais </a:t>
+            </a:r>
+            <a:r>
+              <a:rPr lang="pt-BR" b="1" dirty="0">
                 <a:latin typeface="Segoe UI" pitchFamily="34" charset="0"/>
                 <a:ea typeface="Segoe UI" pitchFamily="34" charset="0"/>
                 <a:cs typeface="Segoe UI" pitchFamily="34" charset="0"/>
               </a:rPr>
-              <a:t>design </a:t>
-            </a:r>
-            <a:r>
-              <a:rPr lang="pt-BR" sz="3600" dirty="0" smtClean="0">
+              <a:t>funcionalidades?</a:t>
+            </a:r>
+          </a:p>
+          <a:p>
+            <a:r>
+              <a:rPr lang="pt-BR" dirty="0" smtClean="0"/>
+              <a:t> </a:t>
+            </a:r>
+            <a:r>
+              <a:rPr lang="pt-BR" dirty="0"/>
+              <a:t>Cálculos de calorias </a:t>
+            </a:r>
+            <a:r>
+              <a:rPr lang="pt-BR" dirty="0" smtClean="0"/>
+              <a:t>ingeridas, projeção de perda ou ganho de peso.</a:t>
+            </a:r>
+          </a:p>
+          <a:p>
+            <a:pPr>
+              <a:buNone/>
+            </a:pPr>
+            <a:endParaRPr lang="pt-BR" dirty="0"/>
+          </a:p>
+          <a:p>
+            <a:pPr>
+              <a:buNone/>
+            </a:pPr>
+            <a:r>
+              <a:rPr lang="pt-BR" b="1" i="1" dirty="0" smtClean="0"/>
+              <a:t>	</a:t>
+            </a:r>
+            <a:r>
+              <a:rPr lang="pt-BR" b="1" dirty="0" smtClean="0">
                 <a:latin typeface="Segoe UI" pitchFamily="34" charset="0"/>
                 <a:ea typeface="Segoe UI" pitchFamily="34" charset="0"/>
                 <a:cs typeface="Segoe UI" pitchFamily="34" charset="0"/>
               </a:rPr>
-              <a:t>responsivo</a:t>
-            </a:r>
-            <a:endParaRPr lang="pt-BR" sz="3600" dirty="0" smtClean="0">
-              <a:latin typeface="Segoe UI" pitchFamily="34" charset="0"/>
-              <a:ea typeface="Segoe UI" pitchFamily="34" charset="0"/>
-              <a:cs typeface="Segoe UI" pitchFamily="34" charset="0"/>
-            </a:endParaRPr>
-          </a:p>
-          <a:p>
-            <a:pPr>
-              <a:buNone/>
-            </a:pPr>
-            <a:endParaRPr lang="pt-BR" sz="3600" dirty="0" smtClean="0">
-              <a:latin typeface="Segoe UI" pitchFamily="34" charset="0"/>
-              <a:ea typeface="Segoe UI" pitchFamily="34" charset="0"/>
-              <a:cs typeface="Segoe UI" pitchFamily="34" charset="0"/>
-            </a:endParaRPr>
-          </a:p>
-          <a:p>
-            <a:pPr>
-              <a:buFontTx/>
-              <a:buChar char="-"/>
-            </a:pPr>
-            <a:r>
-              <a:rPr lang="pt-BR" dirty="0" smtClean="0">
+              <a:t>Funcionamento </a:t>
+            </a:r>
+            <a:r>
+              <a:rPr lang="pt-BR" b="1" dirty="0">
                 <a:latin typeface="Segoe UI" pitchFamily="34" charset="0"/>
                 <a:ea typeface="Segoe UI" pitchFamily="34" charset="0"/>
                 <a:cs typeface="Segoe UI" pitchFamily="34" charset="0"/>
               </a:rPr>
-              <a:t>Produto específico para controle de calorias com o objetivo final de controle de peso.</a:t>
-            </a:r>
-            <a:endParaRPr lang="pt-BR" sz="3600" b="1" dirty="0">
-              <a:latin typeface="Segoe UI" pitchFamily="34" charset="0"/>
-              <a:ea typeface="Segoe UI" pitchFamily="34" charset="0"/>
-              <a:cs typeface="Segoe UI" pitchFamily="34" charset="0"/>
-            </a:endParaRPr>
+              <a:t>básico do sistema?</a:t>
+            </a:r>
+          </a:p>
+          <a:p>
+            <a:r>
+              <a:rPr lang="pt-BR" dirty="0"/>
+              <a:t>Gerenciamento de </a:t>
+            </a:r>
+            <a:r>
+              <a:rPr lang="pt-BR" dirty="0" smtClean="0"/>
+              <a:t>calorias</a:t>
+            </a:r>
+          </a:p>
+          <a:p>
+            <a:r>
+              <a:rPr lang="pt-BR" dirty="0" smtClean="0"/>
+              <a:t>Inserir peso gradualmente</a:t>
+            </a:r>
+          </a:p>
+          <a:p>
+            <a:r>
+              <a:rPr lang="pt-BR" dirty="0" smtClean="0"/>
+              <a:t>Cadastrar Exercícios Realizados</a:t>
+            </a:r>
           </a:p>
           <a:p>
             <a:pPr>
               <a:buNone/>
             </a:pPr>
-            <a:r>
-              <a:rPr lang="pt-BR" sz="3600" dirty="0" smtClean="0"/>
-              <a:t>	</a:t>
-            </a:r>
+            <a:endParaRPr lang="pt-BR" sz="3600" dirty="0" smtClean="0"/>
           </a:p>
           <a:p>
             <a:pPr>
@@ -8646,13 +7834,14 @@
           </a:bodyPr>
           <a:lstStyle/>
           <a:p>
+            <a:pPr algn="ctr"/>
             <a:r>
               <a:rPr lang="pt-BR" sz="4000" dirty="0" smtClean="0">
                 <a:latin typeface="Segoe UI" pitchFamily="34" charset="0"/>
                 <a:ea typeface="Segoe UI" pitchFamily="34" charset="0"/>
                 <a:cs typeface="Segoe UI" pitchFamily="34" charset="0"/>
               </a:rPr>
-              <a:t>Definição da solução</a:t>
+              <a:t>Tecnologias e Ferramentas</a:t>
             </a:r>
             <a:endParaRPr lang="pt-BR" sz="4000" dirty="0">
               <a:latin typeface="Segoe UI" pitchFamily="34" charset="0"/>
@@ -8662,129 +7851,47 @@
           </a:p>
         </p:txBody>
       </p:sp>
-      <p:sp>
-        <p:nvSpPr>
-          <p:cNvPr id="3" name="Espaço Reservado para Conteúdo 2"/>
-          <p:cNvSpPr>
-            <a:spLocks noGrp="1"/>
-          </p:cNvSpPr>
-          <p:nvPr>
-            <p:ph idx="1"/>
-          </p:nvPr>
-        </p:nvSpPr>
-        <p:spPr/>
-        <p:txBody>
-          <a:bodyPr>
-            <a:normAutofit fontScale="92500" lnSpcReduction="20000"/>
-          </a:bodyPr>
-          <a:lstStyle/>
-          <a:p>
-            <a:pPr>
-              <a:buNone/>
-            </a:pPr>
-            <a:r>
-              <a:rPr lang="pt-BR" sz="3600" dirty="0" smtClean="0"/>
-              <a:t>	</a:t>
-            </a:r>
-            <a:r>
-              <a:rPr lang="pt-BR" b="1" dirty="0" smtClean="0">
-                <a:latin typeface="Segoe UI" pitchFamily="34" charset="0"/>
-                <a:ea typeface="Segoe UI" pitchFamily="34" charset="0"/>
-                <a:cs typeface="Segoe UI" pitchFamily="34" charset="0"/>
-              </a:rPr>
-              <a:t>Quais </a:t>
-            </a:r>
-            <a:r>
-              <a:rPr lang="pt-BR" b="1" dirty="0">
-                <a:latin typeface="Segoe UI" pitchFamily="34" charset="0"/>
-                <a:ea typeface="Segoe UI" pitchFamily="34" charset="0"/>
-                <a:cs typeface="Segoe UI" pitchFamily="34" charset="0"/>
-              </a:rPr>
-              <a:t>funcionalidades?</a:t>
-            </a:r>
-          </a:p>
-          <a:p>
-            <a:r>
-              <a:rPr lang="pt-BR" dirty="0"/>
-              <a:t>Cálculo IMC, Cálculos de calorias </a:t>
-            </a:r>
-            <a:r>
-              <a:rPr lang="pt-BR" dirty="0" smtClean="0"/>
-              <a:t>ingeridas, projeção de perda ou ganho de peso.</a:t>
-            </a:r>
-          </a:p>
-          <a:p>
-            <a:pPr>
-              <a:buNone/>
-            </a:pPr>
-            <a:endParaRPr lang="pt-BR" dirty="0"/>
-          </a:p>
-          <a:p>
-            <a:pPr>
-              <a:buNone/>
-            </a:pPr>
-            <a:r>
-              <a:rPr lang="pt-BR" b="1" i="1" dirty="0" smtClean="0"/>
-              <a:t>	</a:t>
-            </a:r>
-            <a:r>
-              <a:rPr lang="pt-BR" b="1" dirty="0" smtClean="0">
-                <a:latin typeface="Segoe UI" pitchFamily="34" charset="0"/>
-                <a:ea typeface="Segoe UI" pitchFamily="34" charset="0"/>
-                <a:cs typeface="Segoe UI" pitchFamily="34" charset="0"/>
-              </a:rPr>
-              <a:t>Funcionamento </a:t>
-            </a:r>
-            <a:r>
-              <a:rPr lang="pt-BR" b="1" dirty="0">
-                <a:latin typeface="Segoe UI" pitchFamily="34" charset="0"/>
-                <a:ea typeface="Segoe UI" pitchFamily="34" charset="0"/>
-                <a:cs typeface="Segoe UI" pitchFamily="34" charset="0"/>
-              </a:rPr>
-              <a:t>básico do sistema?</a:t>
-            </a:r>
-          </a:p>
-          <a:p>
-            <a:r>
-              <a:rPr lang="pt-BR" dirty="0"/>
-              <a:t>Gerenciamento de </a:t>
-            </a:r>
-            <a:r>
-              <a:rPr lang="pt-BR" dirty="0" smtClean="0"/>
-              <a:t>calorias</a:t>
-            </a:r>
-          </a:p>
-          <a:p>
-            <a:r>
-              <a:rPr lang="pt-BR" dirty="0" smtClean="0"/>
-              <a:t>Inserir peso gradualmente</a:t>
-            </a:r>
-            <a:endParaRPr lang="pt-BR" dirty="0" smtClean="0"/>
-          </a:p>
-          <a:p>
-            <a:r>
-              <a:rPr lang="pt-BR" dirty="0" smtClean="0"/>
-              <a:t>Cadastrar Exercícios Realizados</a:t>
-            </a:r>
-          </a:p>
-          <a:p>
-            <a:pPr>
-              <a:buNone/>
-            </a:pPr>
-            <a:endParaRPr lang="pt-BR" sz="3600" dirty="0" smtClean="0"/>
-          </a:p>
-          <a:p>
-            <a:pPr>
-              <a:buNone/>
-            </a:pPr>
-            <a:r>
-              <a:rPr lang="pt-BR" sz="3600" dirty="0" smtClean="0"/>
-              <a:t>	</a:t>
-            </a:r>
-            <a:endParaRPr lang="pt-BR" sz="3600" dirty="0"/>
-          </a:p>
-        </p:txBody>
-      </p:sp>
+      <p:pic>
+        <p:nvPicPr>
+          <p:cNvPr id="1026" name="Picture 2" descr="C:\Users\bruno\Desktop\111.png"/>
+          <p:cNvPicPr>
+            <a:picLocks noChangeAspect="1" noChangeArrowheads="1"/>
+          </p:cNvPicPr>
+          <p:nvPr/>
+        </p:nvPicPr>
+        <p:blipFill>
+          <a:blip r:embed="rId3">
+            <a:extLst>
+              <a:ext uri="{28A0092B-C50C-407E-A947-70E740481C1C}">
+                <a14:useLocalDpi xmlns:a14="http://schemas.microsoft.com/office/drawing/2010/main" val="0"/>
+              </a:ext>
+            </a:extLst>
+          </a:blip>
+          <a:srcRect/>
+          <a:stretch>
+            <a:fillRect/>
+          </a:stretch>
+        </p:blipFill>
+        <p:spPr bwMode="auto">
+          <a:xfrm>
+            <a:off x="1835696" y="1628800"/>
+            <a:ext cx="5544616" cy="4970416"/>
+          </a:xfrm>
+          <a:prstGeom prst="rect">
+            <a:avLst/>
+          </a:prstGeom>
+          <a:noFill/>
+          <a:extLst>
+            <a:ext uri="{909E8E84-426E-40DD-AFC4-6F175D3DCCD1}">
+              <a14:hiddenFill xmlns:a14="http://schemas.microsoft.com/office/drawing/2010/main">
+                <a:solidFill>
+                  <a:srgbClr val="FFFFFF"/>
+                </a:solidFill>
+              </a14:hiddenFill>
+            </a:ext>
+          </a:extLst>
+        </p:spPr>
+      </p:pic>
     </p:spTree>
   </p:cSld>
   <p:clrMapOvr>
@@ -9055,7 +8162,7 @@
   <a:extraClrSchemeLst/>
   <a:extLst>
     <a:ext uri="{05A4C25C-085E-4340-85A3-A5531E510DB2}">
-      <thm15:themeFamily xmlns="" xmlns:thm15="http://schemas.microsoft.com/office/thememl/2012/main" name="Office Theme" id="{62F939B6-93AF-4DB8-9C6B-D6C7DFDC589F}" vid="{4A3C46E8-61CC-4603-A589-7422A47A8E4A}"/>
+      <thm15:themeFamily xmlns:thm15="http://schemas.microsoft.com/office/thememl/2012/main" xmlns="" name="Office Theme" id="{62F939B6-93AF-4DB8-9C6B-D6C7DFDC589F}" vid="{4A3C46E8-61CC-4603-A589-7422A47A8E4A}"/>
     </a:ext>
   </a:extLst>
 </a:theme>
@@ -9316,7 +8423,7 @@
   <a:extraClrSchemeLst/>
   <a:extLst>
     <a:ext uri="{05A4C25C-085E-4340-85A3-A5531E510DB2}">
-      <thm15:themeFamily xmlns="" xmlns:thm15="http://schemas.microsoft.com/office/thememl/2012/main" name="Office Theme" id="{62F939B6-93AF-4DB8-9C6B-D6C7DFDC589F}" vid="{4A3C46E8-61CC-4603-A589-7422A47A8E4A}"/>
+      <thm15:themeFamily xmlns:thm15="http://schemas.microsoft.com/office/thememl/2012/main" xmlns="" name="Office Theme" id="{62F939B6-93AF-4DB8-9C6B-D6C7DFDC589F}" vid="{4A3C46E8-61CC-4603-A589-7422A47A8E4A}"/>
     </a:ext>
   </a:extLst>
 </a:theme>

</xml_diff>

<commit_message>
Apresentacao final e relatorio final
</commit_message>
<xml_diff>
--- a/Kcal Control.pptx
+++ b/Kcal Control.pptx
@@ -5,7 +5,7 @@
     <p:sldMasterId id="2147483732" r:id="rId1"/>
   </p:sldMasterIdLst>
   <p:notesMasterIdLst>
-    <p:notesMasterId r:id="rId26"/>
+    <p:notesMasterId r:id="rId27"/>
   </p:notesMasterIdLst>
   <p:sldIdLst>
     <p:sldId id="256" r:id="rId2"/>
@@ -22,16 +22,17 @@
     <p:sldId id="279" r:id="rId13"/>
     <p:sldId id="280" r:id="rId14"/>
     <p:sldId id="281" r:id="rId15"/>
-    <p:sldId id="282" r:id="rId16"/>
-    <p:sldId id="283" r:id="rId17"/>
-    <p:sldId id="284" r:id="rId18"/>
-    <p:sldId id="285" r:id="rId19"/>
-    <p:sldId id="286" r:id="rId20"/>
-    <p:sldId id="287" r:id="rId21"/>
-    <p:sldId id="274" r:id="rId22"/>
-    <p:sldId id="275" r:id="rId23"/>
-    <p:sldId id="276" r:id="rId24"/>
-    <p:sldId id="277" r:id="rId25"/>
+    <p:sldId id="288" r:id="rId16"/>
+    <p:sldId id="289" r:id="rId17"/>
+    <p:sldId id="282" r:id="rId18"/>
+    <p:sldId id="283" r:id="rId19"/>
+    <p:sldId id="284" r:id="rId20"/>
+    <p:sldId id="285" r:id="rId21"/>
+    <p:sldId id="286" r:id="rId22"/>
+    <p:sldId id="287" r:id="rId23"/>
+    <p:sldId id="274" r:id="rId24"/>
+    <p:sldId id="275" r:id="rId25"/>
+    <p:sldId id="276" r:id="rId26"/>
   </p:sldIdLst>
   <p:sldSz cx="9144000" cy="6858000" type="screen4x3"/>
   <p:notesSz cx="6858000" cy="9144000"/>
@@ -232,7 +233,7 @@
             <a:fld id="{3957A1C5-3858-4BD6-A546-1B130AA1BE08}" type="datetimeFigureOut">
               <a:rPr lang="en-US"/>
               <a:pPr/>
-              <a:t>12/11/2014</a:t>
+              <a:t>12/12/2014</a:t>
             </a:fld>
             <a:endParaRPr lang="en-US"/>
           </a:p>
@@ -821,7 +822,7 @@
             <a:fld id="{6852FC05-FAE1-4440-921C-50678C694586}" type="slidenum">
               <a:rPr lang="en-US"/>
               <a:pPr/>
-              <a:t>21</a:t>
+              <a:t>23</a:t>
             </a:fld>
             <a:endParaRPr lang="en-US"/>
           </a:p>
@@ -906,7 +907,7 @@
             <a:fld id="{6852FC05-FAE1-4440-921C-50678C694586}" type="slidenum">
               <a:rPr lang="en-US"/>
               <a:pPr/>
-              <a:t>22</a:t>
+              <a:t>24</a:t>
             </a:fld>
             <a:endParaRPr lang="en-US"/>
           </a:p>
@@ -991,7 +992,7 @@
             <a:fld id="{6852FC05-FAE1-4440-921C-50678C694586}" type="slidenum">
               <a:rPr lang="en-US"/>
               <a:pPr/>
-              <a:t>23</a:t>
+              <a:t>25</a:t>
             </a:fld>
             <a:endParaRPr lang="en-US"/>
           </a:p>
@@ -1001,91 +1002,6 @@
     <p:extLst>
       <p:ext uri="{BB962C8B-B14F-4D97-AF65-F5344CB8AC3E}">
         <p14:creationId xmlns:p14="http://schemas.microsoft.com/office/powerpoint/2010/main" val="396310405"/>
-      </p:ext>
-    </p:extLst>
-  </p:cSld>
-  <p:clrMapOvr>
-    <a:masterClrMapping/>
-  </p:clrMapOvr>
-</p:notes>
-</file>
-
-<file path=ppt/notesSlides/notesSlide15.xml><?xml version="1.0" encoding="utf-8"?>
-<p:notes xmlns:a="http://schemas.openxmlformats.org/drawingml/2006/main" xmlns:r="http://schemas.openxmlformats.org/officeDocument/2006/relationships" xmlns:p="http://schemas.openxmlformats.org/presentationml/2006/main">
-  <p:cSld>
-    <p:spTree>
-      <p:nvGrpSpPr>
-        <p:cNvPr id="1" name=""/>
-        <p:cNvGrpSpPr/>
-        <p:nvPr/>
-      </p:nvGrpSpPr>
-      <p:grpSpPr>
-        <a:xfrm>
-          <a:off x="0" y="0"/>
-          <a:ext cx="0" cy="0"/>
-          <a:chOff x="0" y="0"/>
-          <a:chExt cx="0" cy="0"/>
-        </a:xfrm>
-      </p:grpSpPr>
-      <p:sp>
-        <p:nvSpPr>
-          <p:cNvPr id="2" name="Slide Image Placeholder 1"/>
-          <p:cNvSpPr>
-            <a:spLocks noGrp="1" noRot="1" noChangeAspect="1"/>
-          </p:cNvSpPr>
-          <p:nvPr>
-            <p:ph type="sldImg"/>
-          </p:nvPr>
-        </p:nvSpPr>
-        <p:spPr/>
-      </p:sp>
-      <p:sp>
-        <p:nvSpPr>
-          <p:cNvPr id="3" name="Notes Placeholder 2"/>
-          <p:cNvSpPr>
-            <a:spLocks noGrp="1"/>
-          </p:cNvSpPr>
-          <p:nvPr>
-            <p:ph type="body" idx="1"/>
-          </p:nvPr>
-        </p:nvSpPr>
-        <p:spPr/>
-        <p:txBody>
-          <a:bodyPr/>
-          <a:lstStyle/>
-          <a:p>
-            <a:endParaRPr lang="en-US"/>
-          </a:p>
-        </p:txBody>
-      </p:sp>
-      <p:sp>
-        <p:nvSpPr>
-          <p:cNvPr id="4" name="Slide Number Placeholder 3"/>
-          <p:cNvSpPr>
-            <a:spLocks noGrp="1"/>
-          </p:cNvSpPr>
-          <p:nvPr>
-            <p:ph type="sldNum" sz="quarter" idx="10"/>
-          </p:nvPr>
-        </p:nvSpPr>
-        <p:spPr/>
-        <p:txBody>
-          <a:bodyPr/>
-          <a:lstStyle/>
-          <a:p>
-            <a:fld id="{6852FC05-FAE1-4440-921C-50678C694586}" type="slidenum">
-              <a:rPr lang="en-US"/>
-              <a:pPr/>
-              <a:t>24</a:t>
-            </a:fld>
-            <a:endParaRPr lang="en-US"/>
-          </a:p>
-        </p:txBody>
-      </p:sp>
-    </p:spTree>
-    <p:extLst>
-      <p:ext uri="{BB962C8B-B14F-4D97-AF65-F5344CB8AC3E}">
-        <p14:creationId xmlns:p14="http://schemas.microsoft.com/office/powerpoint/2010/main" val="2963220890"/>
       </p:ext>
     </p:extLst>
   </p:cSld>
@@ -1905,7 +1821,7 @@
             <a:fld id="{D6D2D89E-F8D6-4D1D-8BFD-B2488F748407}" type="datetimeFigureOut">
               <a:rPr lang="pt-BR" smtClean="0"/>
               <a:pPr/>
-              <a:t>11/12/2014</a:t>
+              <a:t>12/12/2014</a:t>
             </a:fld>
             <a:endParaRPr lang="pt-BR"/>
           </a:p>
@@ -2075,7 +1991,7 @@
             <a:fld id="{D6D2D89E-F8D6-4D1D-8BFD-B2488F748407}" type="datetimeFigureOut">
               <a:rPr lang="pt-BR" smtClean="0"/>
               <a:pPr/>
-              <a:t>11/12/2014</a:t>
+              <a:t>12/12/2014</a:t>
             </a:fld>
             <a:endParaRPr lang="pt-BR"/>
           </a:p>
@@ -2255,7 +2171,7 @@
             <a:fld id="{D6D2D89E-F8D6-4D1D-8BFD-B2488F748407}" type="datetimeFigureOut">
               <a:rPr lang="pt-BR" smtClean="0"/>
               <a:pPr/>
-              <a:t>11/12/2014</a:t>
+              <a:t>12/12/2014</a:t>
             </a:fld>
             <a:endParaRPr lang="pt-BR"/>
           </a:p>
@@ -2425,7 +2341,7 @@
             <a:fld id="{D6D2D89E-F8D6-4D1D-8BFD-B2488F748407}" type="datetimeFigureOut">
               <a:rPr lang="pt-BR" smtClean="0"/>
               <a:pPr/>
-              <a:t>11/12/2014</a:t>
+              <a:t>12/12/2014</a:t>
             </a:fld>
             <a:endParaRPr lang="pt-BR"/>
           </a:p>
@@ -2670,7 +2586,7 @@
             <a:fld id="{D6D2D89E-F8D6-4D1D-8BFD-B2488F748407}" type="datetimeFigureOut">
               <a:rPr lang="pt-BR" smtClean="0"/>
               <a:pPr/>
-              <a:t>11/12/2014</a:t>
+              <a:t>12/12/2014</a:t>
             </a:fld>
             <a:endParaRPr lang="pt-BR"/>
           </a:p>
@@ -2901,7 +2817,7 @@
             <a:fld id="{D6D2D89E-F8D6-4D1D-8BFD-B2488F748407}" type="datetimeFigureOut">
               <a:rPr lang="pt-BR" smtClean="0"/>
               <a:pPr/>
-              <a:t>11/12/2014</a:t>
+              <a:t>12/12/2014</a:t>
             </a:fld>
             <a:endParaRPr lang="pt-BR"/>
           </a:p>
@@ -3267,7 +3183,7 @@
             <a:fld id="{D6D2D89E-F8D6-4D1D-8BFD-B2488F748407}" type="datetimeFigureOut">
               <a:rPr lang="pt-BR" smtClean="0"/>
               <a:pPr/>
-              <a:t>11/12/2014</a:t>
+              <a:t>12/12/2014</a:t>
             </a:fld>
             <a:endParaRPr lang="pt-BR"/>
           </a:p>
@@ -3386,7 +3302,7 @@
             <a:fld id="{D6D2D89E-F8D6-4D1D-8BFD-B2488F748407}" type="datetimeFigureOut">
               <a:rPr lang="pt-BR" smtClean="0"/>
               <a:pPr/>
-              <a:t>11/12/2014</a:t>
+              <a:t>12/12/2014</a:t>
             </a:fld>
             <a:endParaRPr lang="pt-BR"/>
           </a:p>
@@ -3483,7 +3399,7 @@
             <a:fld id="{D6D2D89E-F8D6-4D1D-8BFD-B2488F748407}" type="datetimeFigureOut">
               <a:rPr lang="pt-BR" smtClean="0"/>
               <a:pPr/>
-              <a:t>11/12/2014</a:t>
+              <a:t>12/12/2014</a:t>
             </a:fld>
             <a:endParaRPr lang="pt-BR"/>
           </a:p>
@@ -3760,7 +3676,7 @@
             <a:fld id="{D6D2D89E-F8D6-4D1D-8BFD-B2488F748407}" type="datetimeFigureOut">
               <a:rPr lang="pt-BR" smtClean="0"/>
               <a:pPr/>
-              <a:t>11/12/2014</a:t>
+              <a:t>12/12/2014</a:t>
             </a:fld>
             <a:endParaRPr lang="pt-BR"/>
           </a:p>
@@ -4017,7 +3933,7 @@
             <a:fld id="{D6D2D89E-F8D6-4D1D-8BFD-B2488F748407}" type="datetimeFigureOut">
               <a:rPr lang="pt-BR" smtClean="0"/>
               <a:pPr/>
-              <a:t>11/12/2014</a:t>
+              <a:t>12/12/2014</a:t>
             </a:fld>
             <a:endParaRPr lang="pt-BR"/>
           </a:p>
@@ -4233,7 +4149,7 @@
             <a:fld id="{D6D2D89E-F8D6-4D1D-8BFD-B2488F748407}" type="datetimeFigureOut">
               <a:rPr lang="pt-BR" smtClean="0"/>
               <a:pPr/>
-              <a:t>11/12/2014</a:t>
+              <a:t>12/12/2014</a:t>
             </a:fld>
             <a:endParaRPr lang="pt-BR"/>
           </a:p>
@@ -5050,7 +4966,7 @@
         </p:nvSpPr>
         <p:spPr>
           <a:xfrm>
-            <a:off x="251520" y="332656"/>
+            <a:off x="17124" y="14001"/>
             <a:ext cx="7886700" cy="1325563"/>
           </a:xfrm>
         </p:spPr>
@@ -5076,14 +4992,20 @@
       </p:sp>
       <p:pic>
         <p:nvPicPr>
-          <p:cNvPr id="4" name="Picture 3" descr="C:\Users\Adriano\Desktop\trello.png"/>
+          <p:cNvPr id="3076" name="Picture 4"/>
           <p:cNvPicPr>
             <a:picLocks noChangeAspect="1" noChangeArrowheads="1"/>
           </p:cNvPicPr>
           <p:nvPr/>
         </p:nvPicPr>
         <p:blipFill>
-          <a:blip r:embed="rId2" cstate="print"/>
+          <a:blip r:embed="rId2">
+            <a:extLst>
+              <a:ext uri="{28A0092B-C50C-407E-A947-70E740481C1C}">
+                <a14:useLocalDpi xmlns:a14="http://schemas.microsoft.com/office/drawing/2010/main" val="0"/>
+              </a:ext>
+            </a:extLst>
+          </a:blip>
           <a:srcRect/>
           <a:stretch>
             <a:fillRect/>
@@ -5091,13 +5013,35 @@
         </p:blipFill>
         <p:spPr bwMode="auto">
           <a:xfrm>
-            <a:off x="0" y="1844824"/>
-            <a:ext cx="9252520" cy="4267200"/>
+            <a:off x="251520" y="1052736"/>
+            <a:ext cx="8572500" cy="5676900"/>
           </a:xfrm>
           <a:prstGeom prst="rect">
             <a:avLst/>
           </a:prstGeom>
           <a:noFill/>
+          <a:ln>
+            <a:noFill/>
+          </a:ln>
+          <a:extLst>
+            <a:ext uri="{909E8E84-426E-40DD-AFC4-6F175D3DCCD1}">
+              <a14:hiddenFill xmlns:a14="http://schemas.microsoft.com/office/drawing/2010/main">
+                <a:solidFill>
+                  <a:schemeClr val="accent1"/>
+                </a:solidFill>
+              </a14:hiddenFill>
+            </a:ext>
+            <a:ext uri="{91240B29-F687-4F45-9708-019B960494DF}">
+              <a14:hiddenLine xmlns:a14="http://schemas.microsoft.com/office/drawing/2010/main" w="9525">
+                <a:solidFill>
+                  <a:schemeClr val="tx1"/>
+                </a:solidFill>
+                <a:miter lim="800000"/>
+                <a:headEnd/>
+                <a:tailEnd/>
+              </a14:hiddenLine>
+            </a:ext>
+          </a:extLst>
         </p:spPr>
       </p:pic>
     </p:spTree>
@@ -5331,6 +5275,250 @@
           <a:lstStyle/>
           <a:p>
             <a:r>
+              <a:rPr lang="pt-BR" dirty="0" err="1" smtClean="0">
+                <a:latin typeface="Segoe UI" panose="020B0502040204020203" pitchFamily="34" charset="0"/>
+                <a:ea typeface="Segoe UI" panose="020B0502040204020203" pitchFamily="34" charset="0"/>
+                <a:cs typeface="Segoe UI" panose="020B0502040204020203" pitchFamily="34" charset="0"/>
+              </a:rPr>
+              <a:t>Backlog</a:t>
+            </a:r>
+            <a:endParaRPr lang="pt-BR" dirty="0">
+              <a:latin typeface="Segoe UI" panose="020B0502040204020203" pitchFamily="34" charset="0"/>
+              <a:ea typeface="Segoe UI" panose="020B0502040204020203" pitchFamily="34" charset="0"/>
+              <a:cs typeface="Segoe UI" panose="020B0502040204020203" pitchFamily="34" charset="0"/>
+            </a:endParaRPr>
+          </a:p>
+        </p:txBody>
+      </p:sp>
+      <p:pic>
+        <p:nvPicPr>
+          <p:cNvPr id="1027" name="Picture 3"/>
+          <p:cNvPicPr>
+            <a:picLocks noChangeAspect="1" noChangeArrowheads="1"/>
+          </p:cNvPicPr>
+          <p:nvPr/>
+        </p:nvPicPr>
+        <p:blipFill>
+          <a:blip r:embed="rId2">
+            <a:extLst>
+              <a:ext uri="{28A0092B-C50C-407E-A947-70E740481C1C}">
+                <a14:useLocalDpi xmlns:a14="http://schemas.microsoft.com/office/drawing/2010/main" val="0"/>
+              </a:ext>
+            </a:extLst>
+          </a:blip>
+          <a:srcRect/>
+          <a:stretch>
+            <a:fillRect/>
+          </a:stretch>
+        </p:blipFill>
+        <p:spPr bwMode="auto">
+          <a:xfrm>
+            <a:off x="1023917" y="2590800"/>
+            <a:ext cx="7029450" cy="1676400"/>
+          </a:xfrm>
+          <a:prstGeom prst="rect">
+            <a:avLst/>
+          </a:prstGeom>
+          <a:noFill/>
+          <a:ln>
+            <a:noFill/>
+          </a:ln>
+          <a:extLst>
+            <a:ext uri="{909E8E84-426E-40DD-AFC4-6F175D3DCCD1}">
+              <a14:hiddenFill xmlns:a14="http://schemas.microsoft.com/office/drawing/2010/main">
+                <a:solidFill>
+                  <a:schemeClr val="accent1"/>
+                </a:solidFill>
+              </a14:hiddenFill>
+            </a:ext>
+            <a:ext uri="{91240B29-F687-4F45-9708-019B960494DF}">
+              <a14:hiddenLine xmlns:a14="http://schemas.microsoft.com/office/drawing/2010/main" w="9525">
+                <a:solidFill>
+                  <a:schemeClr val="tx1"/>
+                </a:solidFill>
+                <a:miter lim="800000"/>
+                <a:headEnd/>
+                <a:tailEnd/>
+              </a14:hiddenLine>
+            </a:ext>
+          </a:extLst>
+        </p:spPr>
+      </p:pic>
+    </p:spTree>
+    <p:extLst>
+      <p:ext uri="{BB962C8B-B14F-4D97-AF65-F5344CB8AC3E}">
+        <p14:creationId xmlns:p14="http://schemas.microsoft.com/office/powerpoint/2010/main" val="1582797675"/>
+      </p:ext>
+    </p:extLst>
+  </p:cSld>
+  <p:clrMapOvr>
+    <a:masterClrMapping/>
+  </p:clrMapOvr>
+  <p:timing>
+    <p:tnLst>
+      <p:par>
+        <p:cTn id="1" dur="indefinite" restart="never" nodeType="tmRoot"/>
+      </p:par>
+    </p:tnLst>
+  </p:timing>
+</p:sld>
+</file>
+
+<file path=ppt/slides/slide16.xml><?xml version="1.0" encoding="utf-8"?>
+<p:sld xmlns:a="http://schemas.openxmlformats.org/drawingml/2006/main" xmlns:r="http://schemas.openxmlformats.org/officeDocument/2006/relationships" xmlns:p="http://schemas.openxmlformats.org/presentationml/2006/main">
+  <p:cSld>
+    <p:spTree>
+      <p:nvGrpSpPr>
+        <p:cNvPr id="1" name=""/>
+        <p:cNvGrpSpPr/>
+        <p:nvPr/>
+      </p:nvGrpSpPr>
+      <p:grpSpPr>
+        <a:xfrm>
+          <a:off x="0" y="0"/>
+          <a:ext cx="0" cy="0"/>
+          <a:chOff x="0" y="0"/>
+          <a:chExt cx="0" cy="0"/>
+        </a:xfrm>
+      </p:grpSpPr>
+      <p:sp>
+        <p:nvSpPr>
+          <p:cNvPr id="2" name="Título 1"/>
+          <p:cNvSpPr>
+            <a:spLocks noGrp="1"/>
+          </p:cNvSpPr>
+          <p:nvPr>
+            <p:ph type="title"/>
+          </p:nvPr>
+        </p:nvSpPr>
+        <p:spPr/>
+        <p:txBody>
+          <a:bodyPr/>
+          <a:lstStyle/>
+          <a:p>
+            <a:r>
+              <a:rPr lang="pt-BR" dirty="0" err="1" smtClean="0">
+                <a:latin typeface="Segoe UI" panose="020B0502040204020203" pitchFamily="34" charset="0"/>
+                <a:ea typeface="Segoe UI" panose="020B0502040204020203" pitchFamily="34" charset="0"/>
+                <a:cs typeface="Segoe UI" panose="020B0502040204020203" pitchFamily="34" charset="0"/>
+              </a:rPr>
+              <a:t>Backlog</a:t>
+            </a:r>
+            <a:endParaRPr lang="pt-BR" dirty="0">
+              <a:latin typeface="Segoe UI" panose="020B0502040204020203" pitchFamily="34" charset="0"/>
+              <a:ea typeface="Segoe UI" panose="020B0502040204020203" pitchFamily="34" charset="0"/>
+              <a:cs typeface="Segoe UI" panose="020B0502040204020203" pitchFamily="34" charset="0"/>
+            </a:endParaRPr>
+          </a:p>
+        </p:txBody>
+      </p:sp>
+      <p:pic>
+        <p:nvPicPr>
+          <p:cNvPr id="2050" name="Picture 2"/>
+          <p:cNvPicPr>
+            <a:picLocks noChangeAspect="1" noChangeArrowheads="1"/>
+          </p:cNvPicPr>
+          <p:nvPr/>
+        </p:nvPicPr>
+        <p:blipFill>
+          <a:blip r:embed="rId2">
+            <a:extLst>
+              <a:ext uri="{28A0092B-C50C-407E-A947-70E740481C1C}">
+                <a14:useLocalDpi xmlns:a14="http://schemas.microsoft.com/office/drawing/2010/main" val="0"/>
+              </a:ext>
+            </a:extLst>
+          </a:blip>
+          <a:srcRect/>
+          <a:stretch>
+            <a:fillRect/>
+          </a:stretch>
+        </p:blipFill>
+        <p:spPr bwMode="auto">
+          <a:xfrm>
+            <a:off x="1062038" y="1628800"/>
+            <a:ext cx="7019925" cy="4086225"/>
+          </a:xfrm>
+          <a:prstGeom prst="rect">
+            <a:avLst/>
+          </a:prstGeom>
+          <a:noFill/>
+          <a:ln>
+            <a:noFill/>
+          </a:ln>
+          <a:extLst>
+            <a:ext uri="{909E8E84-426E-40DD-AFC4-6F175D3DCCD1}">
+              <a14:hiddenFill xmlns:a14="http://schemas.microsoft.com/office/drawing/2010/main">
+                <a:solidFill>
+                  <a:schemeClr val="accent1"/>
+                </a:solidFill>
+              </a14:hiddenFill>
+            </a:ext>
+            <a:ext uri="{91240B29-F687-4F45-9708-019B960494DF}">
+              <a14:hiddenLine xmlns:a14="http://schemas.microsoft.com/office/drawing/2010/main" w="9525">
+                <a:solidFill>
+                  <a:schemeClr val="tx1"/>
+                </a:solidFill>
+                <a:miter lim="800000"/>
+                <a:headEnd/>
+                <a:tailEnd/>
+              </a14:hiddenLine>
+            </a:ext>
+          </a:extLst>
+        </p:spPr>
+      </p:pic>
+    </p:spTree>
+    <p:extLst>
+      <p:ext uri="{BB962C8B-B14F-4D97-AF65-F5344CB8AC3E}">
+        <p14:creationId xmlns:p14="http://schemas.microsoft.com/office/powerpoint/2010/main" val="2124699994"/>
+      </p:ext>
+    </p:extLst>
+  </p:cSld>
+  <p:clrMapOvr>
+    <a:masterClrMapping/>
+  </p:clrMapOvr>
+  <p:timing>
+    <p:tnLst>
+      <p:par>
+        <p:cTn id="1" dur="indefinite" restart="never" nodeType="tmRoot"/>
+      </p:par>
+    </p:tnLst>
+  </p:timing>
+</p:sld>
+</file>
+
+<file path=ppt/slides/slide17.xml><?xml version="1.0" encoding="utf-8"?>
+<p:sld xmlns:a="http://schemas.openxmlformats.org/drawingml/2006/main" xmlns:r="http://schemas.openxmlformats.org/officeDocument/2006/relationships" xmlns:p="http://schemas.openxmlformats.org/presentationml/2006/main">
+  <p:cSld>
+    <p:spTree>
+      <p:nvGrpSpPr>
+        <p:cNvPr id="1" name=""/>
+        <p:cNvGrpSpPr/>
+        <p:nvPr/>
+      </p:nvGrpSpPr>
+      <p:grpSpPr>
+        <a:xfrm>
+          <a:off x="0" y="0"/>
+          <a:ext cx="0" cy="0"/>
+          <a:chOff x="0" y="0"/>
+          <a:chExt cx="0" cy="0"/>
+        </a:xfrm>
+      </p:grpSpPr>
+      <p:sp>
+        <p:nvSpPr>
+          <p:cNvPr id="2" name="Título 1"/>
+          <p:cNvSpPr>
+            <a:spLocks noGrp="1"/>
+          </p:cNvSpPr>
+          <p:nvPr>
+            <p:ph type="title"/>
+          </p:nvPr>
+        </p:nvSpPr>
+        <p:spPr/>
+        <p:txBody>
+          <a:bodyPr/>
+          <a:lstStyle/>
+          <a:p>
+            <a:r>
               <a:rPr lang="pt-BR" dirty="0" smtClean="0">
                 <a:latin typeface="Segoe UI" pitchFamily="34" charset="0"/>
                 <a:ea typeface="Segoe UI" pitchFamily="34" charset="0"/>
@@ -5387,7 +5575,7 @@
 </p:sld>
 </file>
 
-<file path=ppt/slides/slide16.xml><?xml version="1.0" encoding="utf-8"?>
+<file path=ppt/slides/slide18.xml><?xml version="1.0" encoding="utf-8"?>
 <p:sld xmlns:a="http://schemas.openxmlformats.org/drawingml/2006/main" xmlns:r="http://schemas.openxmlformats.org/officeDocument/2006/relationships" xmlns:p="http://schemas.openxmlformats.org/presentationml/2006/main">
   <p:cSld>
     <p:spTree>
@@ -5476,7 +5664,7 @@
 </p:sld>
 </file>
 
-<file path=ppt/slides/slide17.xml><?xml version="1.0" encoding="utf-8"?>
+<file path=ppt/slides/slide19.xml><?xml version="1.0" encoding="utf-8"?>
 <p:sld xmlns:a="http://schemas.openxmlformats.org/drawingml/2006/main" xmlns:r="http://schemas.openxmlformats.org/officeDocument/2006/relationships" xmlns:p="http://schemas.openxmlformats.org/presentationml/2006/main">
   <p:cSld>
     <p:spTree>
@@ -5565,7 +5753,248 @@
 </p:sld>
 </file>
 
-<file path=ppt/slides/slide18.xml><?xml version="1.0" encoding="utf-8"?>
+<file path=ppt/slides/slide2.xml><?xml version="1.0" encoding="utf-8"?>
+<p:sld xmlns:a="http://schemas.openxmlformats.org/drawingml/2006/main" xmlns:r="http://schemas.openxmlformats.org/officeDocument/2006/relationships" xmlns:p="http://schemas.openxmlformats.org/presentationml/2006/main">
+  <p:cSld>
+    <p:spTree>
+      <p:nvGrpSpPr>
+        <p:cNvPr id="1" name=""/>
+        <p:cNvGrpSpPr/>
+        <p:nvPr/>
+      </p:nvGrpSpPr>
+      <p:grpSpPr>
+        <a:xfrm>
+          <a:off x="0" y="0"/>
+          <a:ext cx="0" cy="0"/>
+          <a:chOff x="0" y="0"/>
+          <a:chExt cx="0" cy="0"/>
+        </a:xfrm>
+      </p:grpSpPr>
+      <p:sp>
+        <p:nvSpPr>
+          <p:cNvPr id="2" name="Título 1"/>
+          <p:cNvSpPr>
+            <a:spLocks noGrp="1"/>
+          </p:cNvSpPr>
+          <p:nvPr>
+            <p:ph type="title"/>
+          </p:nvPr>
+        </p:nvSpPr>
+        <p:spPr/>
+        <p:txBody>
+          <a:bodyPr>
+            <a:normAutofit/>
+          </a:bodyPr>
+          <a:lstStyle/>
+          <a:p>
+            <a:pPr algn="ctr"/>
+            <a:r>
+              <a:rPr lang="pt-BR" sz="6600" dirty="0" smtClean="0">
+                <a:latin typeface="Segoe UI" pitchFamily="34" charset="0"/>
+                <a:ea typeface="Segoe UI" pitchFamily="34" charset="0"/>
+                <a:cs typeface="Segoe UI" pitchFamily="34" charset="0"/>
+              </a:rPr>
+              <a:t>O Grupo</a:t>
+            </a:r>
+            <a:endParaRPr lang="pt-BR" sz="6600" dirty="0">
+              <a:latin typeface="Segoe UI" pitchFamily="34" charset="0"/>
+              <a:ea typeface="Segoe UI" pitchFamily="34" charset="0"/>
+              <a:cs typeface="Segoe UI" pitchFamily="34" charset="0"/>
+            </a:endParaRPr>
+          </a:p>
+        </p:txBody>
+      </p:sp>
+      <p:sp>
+        <p:nvSpPr>
+          <p:cNvPr id="3" name="Espaço Reservado para Conteúdo 2"/>
+          <p:cNvSpPr>
+            <a:spLocks noGrp="1"/>
+          </p:cNvSpPr>
+          <p:nvPr>
+            <p:ph idx="1"/>
+          </p:nvPr>
+        </p:nvSpPr>
+        <p:spPr/>
+        <p:txBody>
+          <a:bodyPr>
+            <a:normAutofit/>
+          </a:bodyPr>
+          <a:lstStyle/>
+          <a:p>
+            <a:pPr>
+              <a:buNone/>
+            </a:pPr>
+            <a:r>
+              <a:rPr lang="pt-BR" sz="3600" dirty="0" smtClean="0">
+                <a:latin typeface="Segoe UI" pitchFamily="34" charset="0"/>
+                <a:ea typeface="Segoe UI" pitchFamily="34" charset="0"/>
+                <a:cs typeface="Segoe UI" pitchFamily="34" charset="0"/>
+              </a:rPr>
+              <a:t>	</a:t>
+            </a:r>
+            <a:endParaRPr lang="pt-BR" sz="3600" dirty="0"/>
+          </a:p>
+          <a:p>
+            <a:r>
+              <a:rPr lang="pt-BR" b="1" dirty="0"/>
+              <a:t>Adriano Duarte </a:t>
+            </a:r>
+            <a:r>
+              <a:rPr lang="pt-BR" dirty="0" smtClean="0"/>
+              <a:t>–Função </a:t>
+            </a:r>
+            <a:r>
+              <a:rPr lang="pt-BR" dirty="0"/>
+              <a:t>na equipe: </a:t>
+            </a:r>
+            <a:endParaRPr lang="pt-BR" dirty="0" smtClean="0"/>
+          </a:p>
+          <a:p>
+            <a:pPr lvl="1"/>
+            <a:r>
+              <a:rPr lang="pt-BR" dirty="0" err="1" smtClean="0"/>
+              <a:t>Product</a:t>
+            </a:r>
+            <a:r>
+              <a:rPr lang="pt-BR" dirty="0" smtClean="0"/>
+              <a:t> </a:t>
+            </a:r>
+            <a:r>
+              <a:rPr lang="pt-BR" dirty="0" err="1" smtClean="0"/>
+              <a:t>Owner</a:t>
+            </a:r>
+            <a:r>
+              <a:rPr lang="pt-BR" dirty="0" smtClean="0"/>
+              <a:t> e </a:t>
+            </a:r>
+            <a:r>
+              <a:rPr lang="pt-BR" dirty="0"/>
+              <a:t>Desenvolvedor</a:t>
+            </a:r>
+          </a:p>
+          <a:p>
+            <a:r>
+              <a:rPr lang="pt-BR" b="1" dirty="0"/>
+              <a:t>Bruno Macedo </a:t>
+            </a:r>
+            <a:r>
+              <a:rPr lang="pt-BR" dirty="0"/>
+              <a:t>- </a:t>
+            </a:r>
+            <a:r>
+              <a:rPr lang="pt-BR" dirty="0" smtClean="0"/>
+              <a:t>Função </a:t>
+            </a:r>
+            <a:r>
+              <a:rPr lang="pt-BR" dirty="0"/>
+              <a:t>na equipe: </a:t>
+            </a:r>
+            <a:endParaRPr lang="pt-BR" dirty="0" smtClean="0"/>
+          </a:p>
+          <a:p>
+            <a:pPr lvl="1"/>
+            <a:r>
+              <a:rPr lang="pt-BR" dirty="0" err="1" smtClean="0"/>
+              <a:t>Scrum</a:t>
+            </a:r>
+            <a:r>
+              <a:rPr lang="pt-BR" dirty="0" smtClean="0"/>
+              <a:t> </a:t>
+            </a:r>
+            <a:r>
+              <a:rPr lang="pt-BR" dirty="0"/>
+              <a:t>Master, Desenvolvedor</a:t>
+            </a:r>
+          </a:p>
+          <a:p>
+            <a:r>
+              <a:rPr lang="pt-BR" b="1" dirty="0" err="1"/>
+              <a:t>Tailor</a:t>
+            </a:r>
+            <a:r>
+              <a:rPr lang="pt-BR" b="1" dirty="0"/>
+              <a:t> </a:t>
+            </a:r>
+            <a:r>
+              <a:rPr lang="pt-BR" b="1" dirty="0" err="1"/>
+              <a:t>Figueiro</a:t>
+            </a:r>
+            <a:r>
+              <a:rPr lang="pt-BR" b="1" dirty="0"/>
+              <a:t> </a:t>
+            </a:r>
+            <a:r>
+              <a:rPr lang="pt-BR" dirty="0"/>
+              <a:t>- </a:t>
+            </a:r>
+            <a:r>
+              <a:rPr lang="pt-BR" dirty="0" smtClean="0"/>
+              <a:t>Função </a:t>
+            </a:r>
+            <a:r>
+              <a:rPr lang="pt-BR" dirty="0"/>
+              <a:t>na equipe</a:t>
+            </a:r>
+            <a:r>
+              <a:rPr lang="pt-BR" dirty="0" smtClean="0"/>
+              <a:t>:</a:t>
+            </a:r>
+          </a:p>
+          <a:p>
+            <a:pPr lvl="1"/>
+            <a:r>
+              <a:rPr lang="pt-BR" dirty="0" smtClean="0"/>
+              <a:t> </a:t>
+            </a:r>
+            <a:r>
+              <a:rPr lang="pt-BR" dirty="0"/>
+              <a:t>Desenvolvedor</a:t>
+            </a:r>
+          </a:p>
+          <a:p>
+            <a:r>
+              <a:rPr lang="pt-BR" b="1" dirty="0"/>
+              <a:t>Leon Dias </a:t>
+            </a:r>
+            <a:r>
+              <a:rPr lang="pt-BR" dirty="0" smtClean="0"/>
+              <a:t>–Função </a:t>
+            </a:r>
+            <a:r>
+              <a:rPr lang="pt-BR" dirty="0"/>
+              <a:t>na equipe: </a:t>
+            </a:r>
+            <a:endParaRPr lang="pt-BR" dirty="0" smtClean="0"/>
+          </a:p>
+          <a:p>
+            <a:pPr lvl="1"/>
+            <a:r>
+              <a:rPr lang="pt-BR" dirty="0" smtClean="0"/>
+              <a:t>Desenvolvedor.</a:t>
+            </a:r>
+            <a:endParaRPr lang="pt-BR" dirty="0"/>
+          </a:p>
+          <a:p>
+            <a:endParaRPr lang="pt-BR" dirty="0"/>
+          </a:p>
+        </p:txBody>
+      </p:sp>
+    </p:spTree>
+  </p:cSld>
+  <p:clrMapOvr>
+    <a:masterClrMapping/>
+  </p:clrMapOvr>
+  <p:timing>
+    <p:tnLst>
+      <p:par>
+        <p:cTn id="1" dur="indefinite" restart="never" nodeType="tmRoot"/>
+      </p:par>
+    </p:tnLst>
+  </p:timing>
+</p:sld>
+</file>
+
+<file path=ppt/slides/slide20.xml><?xml version="1.0" encoding="utf-8"?>
 <p:sld xmlns:a="http://schemas.openxmlformats.org/drawingml/2006/main" xmlns:r="http://schemas.openxmlformats.org/officeDocument/2006/relationships" xmlns:p="http://schemas.openxmlformats.org/presentationml/2006/main">
   <p:cSld>
     <p:spTree>
@@ -5654,7 +6083,7 @@
 </p:sld>
 </file>
 
-<file path=ppt/slides/slide19.xml><?xml version="1.0" encoding="utf-8"?>
+<file path=ppt/slides/slide21.xml><?xml version="1.0" encoding="utf-8"?>
 <p:sld xmlns:a="http://schemas.openxmlformats.org/drawingml/2006/main" xmlns:r="http://schemas.openxmlformats.org/officeDocument/2006/relationships" xmlns:p="http://schemas.openxmlformats.org/presentationml/2006/main">
   <p:cSld>
     <p:spTree>
@@ -5743,248 +6172,7 @@
 </p:sld>
 </file>
 
-<file path=ppt/slides/slide2.xml><?xml version="1.0" encoding="utf-8"?>
-<p:sld xmlns:a="http://schemas.openxmlformats.org/drawingml/2006/main" xmlns:r="http://schemas.openxmlformats.org/officeDocument/2006/relationships" xmlns:p="http://schemas.openxmlformats.org/presentationml/2006/main">
-  <p:cSld>
-    <p:spTree>
-      <p:nvGrpSpPr>
-        <p:cNvPr id="1" name=""/>
-        <p:cNvGrpSpPr/>
-        <p:nvPr/>
-      </p:nvGrpSpPr>
-      <p:grpSpPr>
-        <a:xfrm>
-          <a:off x="0" y="0"/>
-          <a:ext cx="0" cy="0"/>
-          <a:chOff x="0" y="0"/>
-          <a:chExt cx="0" cy="0"/>
-        </a:xfrm>
-      </p:grpSpPr>
-      <p:sp>
-        <p:nvSpPr>
-          <p:cNvPr id="2" name="Título 1"/>
-          <p:cNvSpPr>
-            <a:spLocks noGrp="1"/>
-          </p:cNvSpPr>
-          <p:nvPr>
-            <p:ph type="title"/>
-          </p:nvPr>
-        </p:nvSpPr>
-        <p:spPr/>
-        <p:txBody>
-          <a:bodyPr>
-            <a:normAutofit/>
-          </a:bodyPr>
-          <a:lstStyle/>
-          <a:p>
-            <a:pPr algn="ctr"/>
-            <a:r>
-              <a:rPr lang="pt-BR" sz="6600" dirty="0" smtClean="0">
-                <a:latin typeface="Segoe UI" pitchFamily="34" charset="0"/>
-                <a:ea typeface="Segoe UI" pitchFamily="34" charset="0"/>
-                <a:cs typeface="Segoe UI" pitchFamily="34" charset="0"/>
-              </a:rPr>
-              <a:t>O Grupo</a:t>
-            </a:r>
-            <a:endParaRPr lang="pt-BR" sz="6600" dirty="0">
-              <a:latin typeface="Segoe UI" pitchFamily="34" charset="0"/>
-              <a:ea typeface="Segoe UI" pitchFamily="34" charset="0"/>
-              <a:cs typeface="Segoe UI" pitchFamily="34" charset="0"/>
-            </a:endParaRPr>
-          </a:p>
-        </p:txBody>
-      </p:sp>
-      <p:sp>
-        <p:nvSpPr>
-          <p:cNvPr id="3" name="Espaço Reservado para Conteúdo 2"/>
-          <p:cNvSpPr>
-            <a:spLocks noGrp="1"/>
-          </p:cNvSpPr>
-          <p:nvPr>
-            <p:ph idx="1"/>
-          </p:nvPr>
-        </p:nvSpPr>
-        <p:spPr/>
-        <p:txBody>
-          <a:bodyPr>
-            <a:normAutofit/>
-          </a:bodyPr>
-          <a:lstStyle/>
-          <a:p>
-            <a:pPr>
-              <a:buNone/>
-            </a:pPr>
-            <a:r>
-              <a:rPr lang="pt-BR" sz="3600" dirty="0" smtClean="0">
-                <a:latin typeface="Segoe UI" pitchFamily="34" charset="0"/>
-                <a:ea typeface="Segoe UI" pitchFamily="34" charset="0"/>
-                <a:cs typeface="Segoe UI" pitchFamily="34" charset="0"/>
-              </a:rPr>
-              <a:t>	</a:t>
-            </a:r>
-            <a:endParaRPr lang="pt-BR" sz="3600" dirty="0"/>
-          </a:p>
-          <a:p>
-            <a:r>
-              <a:rPr lang="pt-BR" b="1" dirty="0"/>
-              <a:t>Adriano Duarte </a:t>
-            </a:r>
-            <a:r>
-              <a:rPr lang="pt-BR" dirty="0" smtClean="0"/>
-              <a:t>–Função </a:t>
-            </a:r>
-            <a:r>
-              <a:rPr lang="pt-BR" dirty="0"/>
-              <a:t>na equipe: </a:t>
-            </a:r>
-            <a:endParaRPr lang="pt-BR" dirty="0" smtClean="0"/>
-          </a:p>
-          <a:p>
-            <a:pPr lvl="1"/>
-            <a:r>
-              <a:rPr lang="pt-BR" dirty="0" err="1" smtClean="0"/>
-              <a:t>Product</a:t>
-            </a:r>
-            <a:r>
-              <a:rPr lang="pt-BR" dirty="0" smtClean="0"/>
-              <a:t> </a:t>
-            </a:r>
-            <a:r>
-              <a:rPr lang="pt-BR" dirty="0" err="1" smtClean="0"/>
-              <a:t>Owner</a:t>
-            </a:r>
-            <a:r>
-              <a:rPr lang="pt-BR" dirty="0" smtClean="0"/>
-              <a:t> e </a:t>
-            </a:r>
-            <a:r>
-              <a:rPr lang="pt-BR" dirty="0"/>
-              <a:t>Desenvolvedor</a:t>
-            </a:r>
-          </a:p>
-          <a:p>
-            <a:r>
-              <a:rPr lang="pt-BR" b="1" dirty="0"/>
-              <a:t>Bruno Macedo </a:t>
-            </a:r>
-            <a:r>
-              <a:rPr lang="pt-BR" dirty="0"/>
-              <a:t>- </a:t>
-            </a:r>
-            <a:r>
-              <a:rPr lang="pt-BR" dirty="0" smtClean="0"/>
-              <a:t>Função </a:t>
-            </a:r>
-            <a:r>
-              <a:rPr lang="pt-BR" dirty="0"/>
-              <a:t>na equipe: </a:t>
-            </a:r>
-            <a:endParaRPr lang="pt-BR" dirty="0" smtClean="0"/>
-          </a:p>
-          <a:p>
-            <a:pPr lvl="1"/>
-            <a:r>
-              <a:rPr lang="pt-BR" dirty="0" err="1" smtClean="0"/>
-              <a:t>Scrum</a:t>
-            </a:r>
-            <a:r>
-              <a:rPr lang="pt-BR" dirty="0" smtClean="0"/>
-              <a:t> </a:t>
-            </a:r>
-            <a:r>
-              <a:rPr lang="pt-BR" dirty="0"/>
-              <a:t>Master, Desenvolvedor</a:t>
-            </a:r>
-          </a:p>
-          <a:p>
-            <a:r>
-              <a:rPr lang="pt-BR" b="1" dirty="0" err="1"/>
-              <a:t>Tailor</a:t>
-            </a:r>
-            <a:r>
-              <a:rPr lang="pt-BR" b="1" dirty="0"/>
-              <a:t> </a:t>
-            </a:r>
-            <a:r>
-              <a:rPr lang="pt-BR" b="1" dirty="0" err="1"/>
-              <a:t>Figueiro</a:t>
-            </a:r>
-            <a:r>
-              <a:rPr lang="pt-BR" b="1" dirty="0"/>
-              <a:t> </a:t>
-            </a:r>
-            <a:r>
-              <a:rPr lang="pt-BR" dirty="0"/>
-              <a:t>- </a:t>
-            </a:r>
-            <a:r>
-              <a:rPr lang="pt-BR" dirty="0" smtClean="0"/>
-              <a:t>Função </a:t>
-            </a:r>
-            <a:r>
-              <a:rPr lang="pt-BR" dirty="0"/>
-              <a:t>na equipe</a:t>
-            </a:r>
-            <a:r>
-              <a:rPr lang="pt-BR" dirty="0" smtClean="0"/>
-              <a:t>:</a:t>
-            </a:r>
-          </a:p>
-          <a:p>
-            <a:pPr lvl="1"/>
-            <a:r>
-              <a:rPr lang="pt-BR" dirty="0" smtClean="0"/>
-              <a:t> </a:t>
-            </a:r>
-            <a:r>
-              <a:rPr lang="pt-BR" dirty="0"/>
-              <a:t>Desenvolvedor</a:t>
-            </a:r>
-          </a:p>
-          <a:p>
-            <a:r>
-              <a:rPr lang="pt-BR" b="1" dirty="0"/>
-              <a:t>Leon Dias </a:t>
-            </a:r>
-            <a:r>
-              <a:rPr lang="pt-BR" dirty="0" smtClean="0"/>
-              <a:t>–Função </a:t>
-            </a:r>
-            <a:r>
-              <a:rPr lang="pt-BR" dirty="0"/>
-              <a:t>na equipe: </a:t>
-            </a:r>
-            <a:endParaRPr lang="pt-BR" dirty="0" smtClean="0"/>
-          </a:p>
-          <a:p>
-            <a:pPr lvl="1"/>
-            <a:r>
-              <a:rPr lang="pt-BR" dirty="0" smtClean="0"/>
-              <a:t>Desenvolvedor.</a:t>
-            </a:r>
-            <a:endParaRPr lang="pt-BR" dirty="0"/>
-          </a:p>
-          <a:p>
-            <a:endParaRPr lang="pt-BR" dirty="0"/>
-          </a:p>
-        </p:txBody>
-      </p:sp>
-    </p:spTree>
-  </p:cSld>
-  <p:clrMapOvr>
-    <a:masterClrMapping/>
-  </p:clrMapOvr>
-  <p:timing>
-    <p:tnLst>
-      <p:par>
-        <p:cTn id="1" dur="indefinite" restart="never" nodeType="tmRoot"/>
-      </p:par>
-    </p:tnLst>
-  </p:timing>
-</p:sld>
-</file>
-
-<file path=ppt/slides/slide20.xml><?xml version="1.0" encoding="utf-8"?>
+<file path=ppt/slides/slide22.xml><?xml version="1.0" encoding="utf-8"?>
 <p:sld xmlns:a="http://schemas.openxmlformats.org/drawingml/2006/main" xmlns:r="http://schemas.openxmlformats.org/officeDocument/2006/relationships" xmlns:p="http://schemas.openxmlformats.org/presentationml/2006/main">
   <p:cSld>
     <p:spTree>
@@ -6078,7 +6266,7 @@
 </p:sld>
 </file>
 
-<file path=ppt/slides/slide21.xml><?xml version="1.0" encoding="utf-8"?>
+<file path=ppt/slides/slide23.xml><?xml version="1.0" encoding="utf-8"?>
 <p:sld xmlns:a="http://schemas.openxmlformats.org/drawingml/2006/main" xmlns:r="http://schemas.openxmlformats.org/officeDocument/2006/relationships" xmlns:p="http://schemas.openxmlformats.org/presentationml/2006/main">
   <p:cSld>
     <p:spTree>
@@ -6421,7 +6609,7 @@
 </p:sld>
 </file>
 
-<file path=ppt/slides/slide22.xml><?xml version="1.0" encoding="utf-8"?>
+<file path=ppt/slides/slide24.xml><?xml version="1.0" encoding="utf-8"?>
 <p:sld xmlns:a="http://schemas.openxmlformats.org/drawingml/2006/main" xmlns:r="http://schemas.openxmlformats.org/officeDocument/2006/relationships" xmlns:p="http://schemas.openxmlformats.org/presentationml/2006/main">
   <p:cSld>
     <p:spTree>
@@ -6532,7 +6720,7 @@
 </p:sld>
 </file>
 
-<file path=ppt/slides/slide23.xml><?xml version="1.0" encoding="utf-8"?>
+<file path=ppt/slides/slide25.xml><?xml version="1.0" encoding="utf-8"?>
 <p:sld xmlns:a="http://schemas.openxmlformats.org/drawingml/2006/main" xmlns:r="http://schemas.openxmlformats.org/officeDocument/2006/relationships" xmlns:p="http://schemas.openxmlformats.org/presentationml/2006/main">
   <p:cSld>
     <p:spTree>
@@ -6667,154 +6855,6 @@
               </a:rPr>
               <a:t>	</a:t>
             </a:r>
-          </a:p>
-          <a:p>
-            <a:pPr>
-              <a:buNone/>
-            </a:pPr>
-            <a:r>
-              <a:rPr lang="pt-BR" b="1" dirty="0" smtClean="0">
-                <a:latin typeface="Segoe UI" pitchFamily="34" charset="0"/>
-                <a:ea typeface="Segoe UI" pitchFamily="34" charset="0"/>
-                <a:cs typeface="Segoe UI" pitchFamily="34" charset="0"/>
-              </a:rPr>
-              <a:t>	</a:t>
-            </a:r>
-          </a:p>
-        </p:txBody>
-      </p:sp>
-    </p:spTree>
-  </p:cSld>
-  <p:clrMapOvr>
-    <a:masterClrMapping/>
-  </p:clrMapOvr>
-  <p:timing>
-    <p:tnLst>
-      <p:par>
-        <p:cTn id="1" dur="indefinite" restart="never" nodeType="tmRoot"/>
-      </p:par>
-    </p:tnLst>
-  </p:timing>
-</p:sld>
-</file>
-
-<file path=ppt/slides/slide24.xml><?xml version="1.0" encoding="utf-8"?>
-<p:sld xmlns:a="http://schemas.openxmlformats.org/drawingml/2006/main" xmlns:r="http://schemas.openxmlformats.org/officeDocument/2006/relationships" xmlns:p="http://schemas.openxmlformats.org/presentationml/2006/main">
-  <p:cSld>
-    <p:spTree>
-      <p:nvGrpSpPr>
-        <p:cNvPr id="1" name=""/>
-        <p:cNvGrpSpPr/>
-        <p:nvPr/>
-      </p:nvGrpSpPr>
-      <p:grpSpPr>
-        <a:xfrm>
-          <a:off x="0" y="0"/>
-          <a:ext cx="0" cy="0"/>
-          <a:chOff x="0" y="0"/>
-          <a:chExt cx="0" cy="0"/>
-        </a:xfrm>
-      </p:grpSpPr>
-      <p:sp>
-        <p:nvSpPr>
-          <p:cNvPr id="2" name="Título 1"/>
-          <p:cNvSpPr>
-            <a:spLocks noGrp="1"/>
-          </p:cNvSpPr>
-          <p:nvPr>
-            <p:ph type="title"/>
-          </p:nvPr>
-        </p:nvSpPr>
-        <p:spPr>
-          <a:xfrm>
-            <a:off x="683568" y="476672"/>
-            <a:ext cx="8229600" cy="1143000"/>
-          </a:xfrm>
-        </p:spPr>
-        <p:txBody>
-          <a:bodyPr>
-            <a:noAutofit/>
-          </a:bodyPr>
-          <a:lstStyle/>
-          <a:p>
-            <a:r>
-              <a:rPr lang="pt-BR" sz="4000" dirty="0" smtClean="0">
-                <a:latin typeface="Segoe UI" pitchFamily="34" charset="0"/>
-                <a:ea typeface="Segoe UI" pitchFamily="34" charset="0"/>
-                <a:cs typeface="Segoe UI" pitchFamily="34" charset="0"/>
-              </a:rPr>
-              <a:t>Próximas ações</a:t>
-            </a:r>
-            <a:endParaRPr lang="pt-BR" sz="4000" dirty="0">
-              <a:latin typeface="Segoe UI" pitchFamily="34" charset="0"/>
-              <a:ea typeface="Segoe UI" pitchFamily="34" charset="0"/>
-              <a:cs typeface="Segoe UI" pitchFamily="34" charset="0"/>
-            </a:endParaRPr>
-          </a:p>
-        </p:txBody>
-      </p:sp>
-      <p:sp>
-        <p:nvSpPr>
-          <p:cNvPr id="3" name="Espaço Reservado para Conteúdo 2"/>
-          <p:cNvSpPr>
-            <a:spLocks noGrp="1"/>
-          </p:cNvSpPr>
-          <p:nvPr>
-            <p:ph idx="1"/>
-          </p:nvPr>
-        </p:nvSpPr>
-        <p:spPr/>
-        <p:txBody>
-          <a:bodyPr>
-            <a:normAutofit/>
-          </a:bodyPr>
-          <a:lstStyle/>
-          <a:p>
-            <a:pPr>
-              <a:buNone/>
-            </a:pPr>
-            <a:r>
-              <a:rPr lang="pt-BR" sz="3600" dirty="0" smtClean="0"/>
-              <a:t>	- Desenvolver funcionalidades de menos complexidade tais como: </a:t>
-            </a:r>
-            <a:r>
-              <a:rPr lang="pt-BR" sz="3600" dirty="0" smtClean="0"/>
-              <a:t>melhor </a:t>
-            </a:r>
-            <a:r>
-              <a:rPr lang="pt-BR" sz="3600" dirty="0" smtClean="0"/>
-              <a:t>estruturação do </a:t>
-            </a:r>
-            <a:r>
-              <a:rPr lang="pt-BR" sz="3600" dirty="0" smtClean="0"/>
-              <a:t>código, </a:t>
-            </a:r>
-            <a:r>
-              <a:rPr lang="pt-BR" sz="3600" dirty="0" err="1" smtClean="0"/>
-              <a:t>responsividade</a:t>
-            </a:r>
-            <a:r>
-              <a:rPr lang="pt-BR" sz="3600" dirty="0" smtClean="0"/>
-              <a:t>.</a:t>
-            </a:r>
-            <a:r>
-              <a:rPr lang="pt-BR" sz="3600" dirty="0" smtClean="0"/>
-              <a:t>	</a:t>
-            </a:r>
-            <a:r>
-              <a:rPr lang="pt-BR" sz="3600" b="1" i="1" dirty="0" smtClean="0"/>
-              <a:t> </a:t>
-            </a:r>
-          </a:p>
-          <a:p>
-            <a:pPr>
-              <a:buNone/>
-            </a:pPr>
-            <a:endParaRPr lang="pt-BR" b="1" dirty="0" smtClean="0">
-              <a:latin typeface="Segoe UI" pitchFamily="34" charset="0"/>
-              <a:ea typeface="Segoe UI" pitchFamily="34" charset="0"/>
-              <a:cs typeface="Segoe UI" pitchFamily="34" charset="0"/>
-            </a:endParaRPr>
           </a:p>
           <a:p>
             <a:pPr>

</xml_diff>